<commit_message>
FR-3 Feedback form styling
</commit_message>
<xml_diff>
--- a/HelpMyStreetFE/HelpMyStreetFE/src/pptx/Icons.pptx
+++ b/HelpMyStreetFE/HelpMyStreetFE/src/pptx/Icons.pptx
@@ -262,7 +262,7 @@
           <a:p>
             <a:fld id="{B2EC5630-BBBD-40F6-B459-AD74AAD6AD00}" type="datetimeFigureOut">
               <a:rPr lang="en-GB" smtClean="0"/>
-              <a:t>13/11/2020</a:t>
+              <a:t>16/11/2020</a:t>
             </a:fld>
             <a:endParaRPr lang="en-GB"/>
           </a:p>
@@ -462,7 +462,7 @@
           <a:p>
             <a:fld id="{B2EC5630-BBBD-40F6-B459-AD74AAD6AD00}" type="datetimeFigureOut">
               <a:rPr lang="en-GB" smtClean="0"/>
-              <a:t>13/11/2020</a:t>
+              <a:t>16/11/2020</a:t>
             </a:fld>
             <a:endParaRPr lang="en-GB"/>
           </a:p>
@@ -672,7 +672,7 @@
           <a:p>
             <a:fld id="{B2EC5630-BBBD-40F6-B459-AD74AAD6AD00}" type="datetimeFigureOut">
               <a:rPr lang="en-GB" smtClean="0"/>
-              <a:t>13/11/2020</a:t>
+              <a:t>16/11/2020</a:t>
             </a:fld>
             <a:endParaRPr lang="en-GB"/>
           </a:p>
@@ -872,7 +872,7 @@
           <a:p>
             <a:fld id="{B2EC5630-BBBD-40F6-B459-AD74AAD6AD00}" type="datetimeFigureOut">
               <a:rPr lang="en-GB" smtClean="0"/>
-              <a:t>13/11/2020</a:t>
+              <a:t>16/11/2020</a:t>
             </a:fld>
             <a:endParaRPr lang="en-GB"/>
           </a:p>
@@ -1148,7 +1148,7 @@
           <a:p>
             <a:fld id="{B2EC5630-BBBD-40F6-B459-AD74AAD6AD00}" type="datetimeFigureOut">
               <a:rPr lang="en-GB" smtClean="0"/>
-              <a:t>13/11/2020</a:t>
+              <a:t>16/11/2020</a:t>
             </a:fld>
             <a:endParaRPr lang="en-GB"/>
           </a:p>
@@ -1416,7 +1416,7 @@
           <a:p>
             <a:fld id="{B2EC5630-BBBD-40F6-B459-AD74AAD6AD00}" type="datetimeFigureOut">
               <a:rPr lang="en-GB" smtClean="0"/>
-              <a:t>13/11/2020</a:t>
+              <a:t>16/11/2020</a:t>
             </a:fld>
             <a:endParaRPr lang="en-GB"/>
           </a:p>
@@ -1831,7 +1831,7 @@
           <a:p>
             <a:fld id="{B2EC5630-BBBD-40F6-B459-AD74AAD6AD00}" type="datetimeFigureOut">
               <a:rPr lang="en-GB" smtClean="0"/>
-              <a:t>13/11/2020</a:t>
+              <a:t>16/11/2020</a:t>
             </a:fld>
             <a:endParaRPr lang="en-GB"/>
           </a:p>
@@ -1973,7 +1973,7 @@
           <a:p>
             <a:fld id="{B2EC5630-BBBD-40F6-B459-AD74AAD6AD00}" type="datetimeFigureOut">
               <a:rPr lang="en-GB" smtClean="0"/>
-              <a:t>13/11/2020</a:t>
+              <a:t>16/11/2020</a:t>
             </a:fld>
             <a:endParaRPr lang="en-GB"/>
           </a:p>
@@ -2086,7 +2086,7 @@
           <a:p>
             <a:fld id="{B2EC5630-BBBD-40F6-B459-AD74AAD6AD00}" type="datetimeFigureOut">
               <a:rPr lang="en-GB" smtClean="0"/>
-              <a:t>13/11/2020</a:t>
+              <a:t>16/11/2020</a:t>
             </a:fld>
             <a:endParaRPr lang="en-GB"/>
           </a:p>
@@ -2399,7 +2399,7 @@
           <a:p>
             <a:fld id="{B2EC5630-BBBD-40F6-B459-AD74AAD6AD00}" type="datetimeFigureOut">
               <a:rPr lang="en-GB" smtClean="0"/>
-              <a:t>13/11/2020</a:t>
+              <a:t>16/11/2020</a:t>
             </a:fld>
             <a:endParaRPr lang="en-GB"/>
           </a:p>
@@ -2688,7 +2688,7 @@
           <a:p>
             <a:fld id="{B2EC5630-BBBD-40F6-B459-AD74AAD6AD00}" type="datetimeFigureOut">
               <a:rPr lang="en-GB" smtClean="0"/>
-              <a:t>13/11/2020</a:t>
+              <a:t>16/11/2020</a:t>
             </a:fld>
             <a:endParaRPr lang="en-GB"/>
           </a:p>
@@ -2931,7 +2931,7 @@
           <a:p>
             <a:fld id="{B2EC5630-BBBD-40F6-B459-AD74AAD6AD00}" type="datetimeFigureOut">
               <a:rPr lang="en-GB" smtClean="0"/>
-              <a:t>13/11/2020</a:t>
+              <a:t>16/11/2020</a:t>
             </a:fld>
             <a:endParaRPr lang="en-GB"/>
           </a:p>
@@ -3958,7 +3958,7 @@
         </p:nvSpPr>
         <p:spPr>
           <a:xfrm rot="10800000">
-            <a:off x="5829300" y="3157537"/>
+            <a:off x="1453681" y="1003481"/>
             <a:ext cx="535305" cy="542401"/>
           </a:xfrm>
           <a:custGeom>
@@ -4410,6 +4410,1303 @@
           </a:p>
         </p:txBody>
       </p:sp>
+      <p:grpSp>
+        <p:nvGrpSpPr>
+          <p:cNvPr id="17" name="Group 16">
+            <a:extLst>
+              <a:ext uri="{FF2B5EF4-FFF2-40B4-BE49-F238E27FC236}">
+                <a16:creationId xmlns:a16="http://schemas.microsoft.com/office/drawing/2014/main" id="{B7191AD2-F135-4BFB-B2A7-0A50FE97F2D3}"/>
+              </a:ext>
+            </a:extLst>
+          </p:cNvPr>
+          <p:cNvGrpSpPr/>
+          <p:nvPr/>
+        </p:nvGrpSpPr>
+        <p:grpSpPr>
+          <a:xfrm>
+            <a:off x="7565565" y="2385852"/>
+            <a:ext cx="723900" cy="723900"/>
+            <a:chOff x="7565565" y="2385852"/>
+            <a:chExt cx="723900" cy="723900"/>
+          </a:xfrm>
+        </p:grpSpPr>
+        <p:sp>
+          <p:nvSpPr>
+            <p:cNvPr id="14" name="Freeform: Shape 13">
+              <a:extLst>
+                <a:ext uri="{FF2B5EF4-FFF2-40B4-BE49-F238E27FC236}">
+                  <a16:creationId xmlns:a16="http://schemas.microsoft.com/office/drawing/2014/main" id="{5BA588AB-3BB2-4C66-8CBA-F85C41EEC574}"/>
+                </a:ext>
+              </a:extLst>
+            </p:cNvPr>
+            <p:cNvSpPr/>
+            <p:nvPr/>
+          </p:nvSpPr>
+          <p:spPr>
+            <a:xfrm>
+              <a:off x="7671820" y="2604927"/>
+              <a:ext cx="508126" cy="190500"/>
+            </a:xfrm>
+            <a:custGeom>
+              <a:avLst/>
+              <a:gdLst>
+                <a:gd name="connsiteX0" fmla="*/ 254075 w 508126"/>
+                <a:gd name="connsiteY0" fmla="*/ 22479 h 190500"/>
+                <a:gd name="connsiteX1" fmla="*/ 115486 w 508126"/>
+                <a:gd name="connsiteY1" fmla="*/ 0 h 190500"/>
+                <a:gd name="connsiteX2" fmla="*/ 3472 w 508126"/>
+                <a:gd name="connsiteY2" fmla="*/ 21907 h 190500"/>
+                <a:gd name="connsiteX3" fmla="*/ 43 w 508126"/>
+                <a:gd name="connsiteY3" fmla="*/ 26575 h 190500"/>
+                <a:gd name="connsiteX4" fmla="*/ 43 w 508126"/>
+                <a:gd name="connsiteY4" fmla="*/ 50197 h 190500"/>
+                <a:gd name="connsiteX5" fmla="*/ 4711 w 508126"/>
+                <a:gd name="connsiteY5" fmla="*/ 61150 h 190500"/>
+                <a:gd name="connsiteX6" fmla="*/ 11569 w 508126"/>
+                <a:gd name="connsiteY6" fmla="*/ 66961 h 190500"/>
+                <a:gd name="connsiteX7" fmla="*/ 25475 w 508126"/>
+                <a:gd name="connsiteY7" fmla="*/ 141446 h 190500"/>
+                <a:gd name="connsiteX8" fmla="*/ 121297 w 508126"/>
+                <a:gd name="connsiteY8" fmla="*/ 190500 h 190500"/>
+                <a:gd name="connsiteX9" fmla="*/ 241978 w 508126"/>
+                <a:gd name="connsiteY9" fmla="*/ 84296 h 190500"/>
+                <a:gd name="connsiteX10" fmla="*/ 254075 w 508126"/>
+                <a:gd name="connsiteY10" fmla="*/ 74771 h 190500"/>
+                <a:gd name="connsiteX11" fmla="*/ 266172 w 508126"/>
+                <a:gd name="connsiteY11" fmla="*/ 84296 h 190500"/>
+                <a:gd name="connsiteX12" fmla="*/ 386854 w 508126"/>
+                <a:gd name="connsiteY12" fmla="*/ 190500 h 190500"/>
+                <a:gd name="connsiteX13" fmla="*/ 482675 w 508126"/>
+                <a:gd name="connsiteY13" fmla="*/ 141446 h 190500"/>
+                <a:gd name="connsiteX14" fmla="*/ 496582 w 508126"/>
+                <a:gd name="connsiteY14" fmla="*/ 66961 h 190500"/>
+                <a:gd name="connsiteX15" fmla="*/ 503440 w 508126"/>
+                <a:gd name="connsiteY15" fmla="*/ 61722 h 190500"/>
+                <a:gd name="connsiteX16" fmla="*/ 508107 w 508126"/>
+                <a:gd name="connsiteY16" fmla="*/ 50768 h 190500"/>
+                <a:gd name="connsiteX17" fmla="*/ 508107 w 508126"/>
+                <a:gd name="connsiteY17" fmla="*/ 27146 h 190500"/>
+                <a:gd name="connsiteX18" fmla="*/ 504678 w 508126"/>
+                <a:gd name="connsiteY18" fmla="*/ 21907 h 190500"/>
+                <a:gd name="connsiteX19" fmla="*/ 392664 w 508126"/>
+                <a:gd name="connsiteY19" fmla="*/ 0 h 190500"/>
+                <a:gd name="connsiteX20" fmla="*/ 254075 w 508126"/>
+                <a:gd name="connsiteY20" fmla="*/ 22479 h 190500"/>
+              </a:gdLst>
+              <a:ahLst/>
+              <a:cxnLst>
+                <a:cxn ang="0">
+                  <a:pos x="connsiteX0" y="connsiteY0"/>
+                </a:cxn>
+                <a:cxn ang="0">
+                  <a:pos x="connsiteX1" y="connsiteY1"/>
+                </a:cxn>
+                <a:cxn ang="0">
+                  <a:pos x="connsiteX2" y="connsiteY2"/>
+                </a:cxn>
+                <a:cxn ang="0">
+                  <a:pos x="connsiteX3" y="connsiteY3"/>
+                </a:cxn>
+                <a:cxn ang="0">
+                  <a:pos x="connsiteX4" y="connsiteY4"/>
+                </a:cxn>
+                <a:cxn ang="0">
+                  <a:pos x="connsiteX5" y="connsiteY5"/>
+                </a:cxn>
+                <a:cxn ang="0">
+                  <a:pos x="connsiteX6" y="connsiteY6"/>
+                </a:cxn>
+                <a:cxn ang="0">
+                  <a:pos x="connsiteX7" y="connsiteY7"/>
+                </a:cxn>
+                <a:cxn ang="0">
+                  <a:pos x="connsiteX8" y="connsiteY8"/>
+                </a:cxn>
+                <a:cxn ang="0">
+                  <a:pos x="connsiteX9" y="connsiteY9"/>
+                </a:cxn>
+                <a:cxn ang="0">
+                  <a:pos x="connsiteX10" y="connsiteY10"/>
+                </a:cxn>
+                <a:cxn ang="0">
+                  <a:pos x="connsiteX11" y="connsiteY11"/>
+                </a:cxn>
+                <a:cxn ang="0">
+                  <a:pos x="connsiteX12" y="connsiteY12"/>
+                </a:cxn>
+                <a:cxn ang="0">
+                  <a:pos x="connsiteX13" y="connsiteY13"/>
+                </a:cxn>
+                <a:cxn ang="0">
+                  <a:pos x="connsiteX14" y="connsiteY14"/>
+                </a:cxn>
+                <a:cxn ang="0">
+                  <a:pos x="connsiteX15" y="connsiteY15"/>
+                </a:cxn>
+                <a:cxn ang="0">
+                  <a:pos x="connsiteX16" y="connsiteY16"/>
+                </a:cxn>
+                <a:cxn ang="0">
+                  <a:pos x="connsiteX17" y="connsiteY17"/>
+                </a:cxn>
+                <a:cxn ang="0">
+                  <a:pos x="connsiteX18" y="connsiteY18"/>
+                </a:cxn>
+                <a:cxn ang="0">
+                  <a:pos x="connsiteX19" y="connsiteY19"/>
+                </a:cxn>
+                <a:cxn ang="0">
+                  <a:pos x="connsiteX20" y="connsiteY20"/>
+                </a:cxn>
+              </a:cxnLst>
+              <a:rect l="l" t="t" r="r" b="b"/>
+              <a:pathLst>
+                <a:path w="508126" h="190500">
+                  <a:moveTo>
+                    <a:pt x="254075" y="22479"/>
+                  </a:moveTo>
+                  <a:cubicBezTo>
+                    <a:pt x="235025" y="18478"/>
+                    <a:pt x="151872" y="0"/>
+                    <a:pt x="115486" y="0"/>
+                  </a:cubicBezTo>
+                  <a:cubicBezTo>
+                    <a:pt x="72243" y="0"/>
+                    <a:pt x="16807" y="17335"/>
+                    <a:pt x="3472" y="21907"/>
+                  </a:cubicBezTo>
+                  <a:cubicBezTo>
+                    <a:pt x="1462" y="22588"/>
+                    <a:pt x="92" y="24453"/>
+                    <a:pt x="43" y="26575"/>
+                  </a:cubicBezTo>
+                  <a:lnTo>
+                    <a:pt x="43" y="50197"/>
+                  </a:lnTo>
+                  <a:cubicBezTo>
+                    <a:pt x="-303" y="54394"/>
+                    <a:pt x="1443" y="58493"/>
+                    <a:pt x="4711" y="61150"/>
+                  </a:cubicBezTo>
+                  <a:lnTo>
+                    <a:pt x="11569" y="66961"/>
+                  </a:lnTo>
+                  <a:cubicBezTo>
+                    <a:pt x="12140" y="90011"/>
+                    <a:pt x="15093" y="124682"/>
+                    <a:pt x="25475" y="141446"/>
+                  </a:cubicBezTo>
+                  <a:cubicBezTo>
+                    <a:pt x="38715" y="164497"/>
+                    <a:pt x="79768" y="190500"/>
+                    <a:pt x="121297" y="190500"/>
+                  </a:cubicBezTo>
+                  <a:cubicBezTo>
+                    <a:pt x="194639" y="190500"/>
+                    <a:pt x="229215" y="135065"/>
+                    <a:pt x="241978" y="84296"/>
+                  </a:cubicBezTo>
+                  <a:cubicBezTo>
+                    <a:pt x="243307" y="78696"/>
+                    <a:pt x="248319" y="74748"/>
+                    <a:pt x="254075" y="74771"/>
+                  </a:cubicBezTo>
+                  <a:cubicBezTo>
+                    <a:pt x="259773" y="74914"/>
+                    <a:pt x="264696" y="78791"/>
+                    <a:pt x="266172" y="84296"/>
+                  </a:cubicBezTo>
+                  <a:cubicBezTo>
+                    <a:pt x="279507" y="135065"/>
+                    <a:pt x="314083" y="190500"/>
+                    <a:pt x="386854" y="190500"/>
+                  </a:cubicBezTo>
+                  <a:cubicBezTo>
+                    <a:pt x="428478" y="190500"/>
+                    <a:pt x="469435" y="164497"/>
+                    <a:pt x="482675" y="141446"/>
+                  </a:cubicBezTo>
+                  <a:cubicBezTo>
+                    <a:pt x="492200" y="124111"/>
+                    <a:pt x="495439" y="90011"/>
+                    <a:pt x="496582" y="66961"/>
+                  </a:cubicBezTo>
+                  <a:lnTo>
+                    <a:pt x="503440" y="61722"/>
+                  </a:lnTo>
+                  <a:cubicBezTo>
+                    <a:pt x="506606" y="58988"/>
+                    <a:pt x="508329" y="54945"/>
+                    <a:pt x="508107" y="50768"/>
+                  </a:cubicBezTo>
+                  <a:lnTo>
+                    <a:pt x="508107" y="27146"/>
+                  </a:lnTo>
+                  <a:cubicBezTo>
+                    <a:pt x="507535" y="24194"/>
+                    <a:pt x="506392" y="22479"/>
+                    <a:pt x="504678" y="21907"/>
+                  </a:cubicBezTo>
+                  <a:cubicBezTo>
+                    <a:pt x="468571" y="9315"/>
+                    <a:pt x="430853" y="1938"/>
+                    <a:pt x="392664" y="0"/>
+                  </a:cubicBezTo>
+                  <a:cubicBezTo>
+                    <a:pt x="356278" y="0"/>
+                    <a:pt x="273125" y="18478"/>
+                    <a:pt x="254075" y="22479"/>
+                  </a:cubicBezTo>
+                  <a:close/>
+                </a:path>
+              </a:pathLst>
+            </a:custGeom>
+            <a:solidFill>
+              <a:srgbClr val="000000"/>
+            </a:solidFill>
+            <a:ln w="9525" cap="flat">
+              <a:noFill/>
+              <a:prstDash val="solid"/>
+              <a:miter/>
+            </a:ln>
+          </p:spPr>
+          <p:txBody>
+            <a:bodyPr rtlCol="0" anchor="ctr"/>
+            <a:lstStyle/>
+            <a:p>
+              <a:endParaRPr lang="en-GB"/>
+            </a:p>
+          </p:txBody>
+        </p:sp>
+        <p:sp>
+          <p:nvSpPr>
+            <p:cNvPr id="15" name="Freeform: Shape 14">
+              <a:extLst>
+                <a:ext uri="{FF2B5EF4-FFF2-40B4-BE49-F238E27FC236}">
+                  <a16:creationId xmlns:a16="http://schemas.microsoft.com/office/drawing/2014/main" id="{563A263E-2543-457A-BB83-073789AA979E}"/>
+                </a:ext>
+              </a:extLst>
+            </p:cNvPr>
+            <p:cNvSpPr/>
+            <p:nvPr/>
+          </p:nvSpPr>
+          <p:spPr>
+            <a:xfrm>
+              <a:off x="7734678" y="2871616"/>
+              <a:ext cx="385678" cy="123809"/>
+            </a:xfrm>
+            <a:custGeom>
+              <a:avLst/>
+              <a:gdLst>
+                <a:gd name="connsiteX0" fmla="*/ 378193 w 385678"/>
+                <a:gd name="connsiteY0" fmla="*/ 3915 h 123809"/>
+                <a:gd name="connsiteX1" fmla="*/ 351523 w 385678"/>
+                <a:gd name="connsiteY1" fmla="*/ 7440 h 123809"/>
+                <a:gd name="connsiteX2" fmla="*/ 71064 w 385678"/>
+                <a:gd name="connsiteY2" fmla="*/ 44354 h 123809"/>
+                <a:gd name="connsiteX3" fmla="*/ 34150 w 385678"/>
+                <a:gd name="connsiteY3" fmla="*/ 7440 h 123809"/>
+                <a:gd name="connsiteX4" fmla="*/ 7432 w 385678"/>
+                <a:gd name="connsiteY4" fmla="*/ 3963 h 123809"/>
+                <a:gd name="connsiteX5" fmla="*/ 3955 w 385678"/>
+                <a:gd name="connsiteY5" fmla="*/ 30681 h 123809"/>
+                <a:gd name="connsiteX6" fmla="*/ 337845 w 385678"/>
+                <a:gd name="connsiteY6" fmla="*/ 74553 h 123809"/>
+                <a:gd name="connsiteX7" fmla="*/ 381717 w 385678"/>
+                <a:gd name="connsiteY7" fmla="*/ 30681 h 123809"/>
+                <a:gd name="connsiteX8" fmla="*/ 378255 w 385678"/>
+                <a:gd name="connsiteY8" fmla="*/ 3963 h 123809"/>
+                <a:gd name="connsiteX9" fmla="*/ 378193 w 385678"/>
+                <a:gd name="connsiteY9" fmla="*/ 3915 h 123809"/>
+              </a:gdLst>
+              <a:ahLst/>
+              <a:cxnLst>
+                <a:cxn ang="0">
+                  <a:pos x="connsiteX0" y="connsiteY0"/>
+                </a:cxn>
+                <a:cxn ang="0">
+                  <a:pos x="connsiteX1" y="connsiteY1"/>
+                </a:cxn>
+                <a:cxn ang="0">
+                  <a:pos x="connsiteX2" y="connsiteY2"/>
+                </a:cxn>
+                <a:cxn ang="0">
+                  <a:pos x="connsiteX3" y="connsiteY3"/>
+                </a:cxn>
+                <a:cxn ang="0">
+                  <a:pos x="connsiteX4" y="connsiteY4"/>
+                </a:cxn>
+                <a:cxn ang="0">
+                  <a:pos x="connsiteX5" y="connsiteY5"/>
+                </a:cxn>
+                <a:cxn ang="0">
+                  <a:pos x="connsiteX6" y="connsiteY6"/>
+                </a:cxn>
+                <a:cxn ang="0">
+                  <a:pos x="connsiteX7" y="connsiteY7"/>
+                </a:cxn>
+                <a:cxn ang="0">
+                  <a:pos x="connsiteX8" y="connsiteY8"/>
+                </a:cxn>
+                <a:cxn ang="0">
+                  <a:pos x="connsiteX9" y="connsiteY9"/>
+                </a:cxn>
+              </a:cxnLst>
+              <a:rect l="l" t="t" r="r" b="b"/>
+              <a:pathLst>
+                <a:path w="385678" h="123809">
+                  <a:moveTo>
+                    <a:pt x="378193" y="3915"/>
+                  </a:moveTo>
+                  <a:cubicBezTo>
+                    <a:pt x="369851" y="-2461"/>
+                    <a:pt x="357923" y="-884"/>
+                    <a:pt x="351523" y="7440"/>
+                  </a:cubicBezTo>
+                  <a:cubicBezTo>
+                    <a:pt x="284270" y="95080"/>
+                    <a:pt x="158703" y="111607"/>
+                    <a:pt x="71064" y="44354"/>
+                  </a:cubicBezTo>
+                  <a:cubicBezTo>
+                    <a:pt x="57199" y="33714"/>
+                    <a:pt x="44789" y="21304"/>
+                    <a:pt x="34150" y="7440"/>
+                  </a:cubicBezTo>
+                  <a:cubicBezTo>
+                    <a:pt x="27732" y="-898"/>
+                    <a:pt x="15770" y="-2455"/>
+                    <a:pt x="7432" y="3963"/>
+                  </a:cubicBezTo>
+                  <a:cubicBezTo>
+                    <a:pt x="-906" y="10381"/>
+                    <a:pt x="-2462" y="22343"/>
+                    <a:pt x="3955" y="30681"/>
+                  </a:cubicBezTo>
+                  <a:cubicBezTo>
+                    <a:pt x="84042" y="134997"/>
+                    <a:pt x="233529" y="154639"/>
+                    <a:pt x="337845" y="74553"/>
+                  </a:cubicBezTo>
+                  <a:cubicBezTo>
+                    <a:pt x="354320" y="61905"/>
+                    <a:pt x="369069" y="47155"/>
+                    <a:pt x="381717" y="30681"/>
+                  </a:cubicBezTo>
+                  <a:cubicBezTo>
+                    <a:pt x="388139" y="22347"/>
+                    <a:pt x="386589" y="10385"/>
+                    <a:pt x="378255" y="3963"/>
+                  </a:cubicBezTo>
+                  <a:cubicBezTo>
+                    <a:pt x="378235" y="3947"/>
+                    <a:pt x="378214" y="3932"/>
+                    <a:pt x="378193" y="3915"/>
+                  </a:cubicBezTo>
+                  <a:close/>
+                </a:path>
+              </a:pathLst>
+            </a:custGeom>
+            <a:solidFill>
+              <a:srgbClr val="000000"/>
+            </a:solidFill>
+            <a:ln w="9525" cap="flat">
+              <a:noFill/>
+              <a:prstDash val="solid"/>
+              <a:miter/>
+            </a:ln>
+          </p:spPr>
+          <p:txBody>
+            <a:bodyPr rtlCol="0" anchor="ctr"/>
+            <a:lstStyle/>
+            <a:p>
+              <a:endParaRPr lang="en-GB"/>
+            </a:p>
+          </p:txBody>
+        </p:sp>
+        <p:sp>
+          <p:nvSpPr>
+            <p:cNvPr id="16" name="Freeform: Shape 15">
+              <a:extLst>
+                <a:ext uri="{FF2B5EF4-FFF2-40B4-BE49-F238E27FC236}">
+                  <a16:creationId xmlns:a16="http://schemas.microsoft.com/office/drawing/2014/main" id="{2CDE73CE-EB8A-4C8D-A105-EAEAED8621D1}"/>
+                </a:ext>
+              </a:extLst>
+            </p:cNvPr>
+            <p:cNvSpPr/>
+            <p:nvPr/>
+          </p:nvSpPr>
+          <p:spPr>
+            <a:xfrm>
+              <a:off x="7565565" y="2385852"/>
+              <a:ext cx="723900" cy="723900"/>
+            </a:xfrm>
+            <a:custGeom>
+              <a:avLst/>
+              <a:gdLst>
+                <a:gd name="connsiteX0" fmla="*/ 361950 w 723900"/>
+                <a:gd name="connsiteY0" fmla="*/ 38100 h 723900"/>
+                <a:gd name="connsiteX1" fmla="*/ 685800 w 723900"/>
+                <a:gd name="connsiteY1" fmla="*/ 361950 h 723900"/>
+                <a:gd name="connsiteX2" fmla="*/ 361950 w 723900"/>
+                <a:gd name="connsiteY2" fmla="*/ 685800 h 723900"/>
+                <a:gd name="connsiteX3" fmla="*/ 38100 w 723900"/>
+                <a:gd name="connsiteY3" fmla="*/ 361950 h 723900"/>
+                <a:gd name="connsiteX4" fmla="*/ 361950 w 723900"/>
+                <a:gd name="connsiteY4" fmla="*/ 38100 h 723900"/>
+                <a:gd name="connsiteX5" fmla="*/ 361950 w 723900"/>
+                <a:gd name="connsiteY5" fmla="*/ 0 h 723900"/>
+                <a:gd name="connsiteX6" fmla="*/ 0 w 723900"/>
+                <a:gd name="connsiteY6" fmla="*/ 361950 h 723900"/>
+                <a:gd name="connsiteX7" fmla="*/ 361950 w 723900"/>
+                <a:gd name="connsiteY7" fmla="*/ 723900 h 723900"/>
+                <a:gd name="connsiteX8" fmla="*/ 723900 w 723900"/>
+                <a:gd name="connsiteY8" fmla="*/ 361950 h 723900"/>
+                <a:gd name="connsiteX9" fmla="*/ 361950 w 723900"/>
+                <a:gd name="connsiteY9" fmla="*/ 0 h 723900"/>
+              </a:gdLst>
+              <a:ahLst/>
+              <a:cxnLst>
+                <a:cxn ang="0">
+                  <a:pos x="connsiteX0" y="connsiteY0"/>
+                </a:cxn>
+                <a:cxn ang="0">
+                  <a:pos x="connsiteX1" y="connsiteY1"/>
+                </a:cxn>
+                <a:cxn ang="0">
+                  <a:pos x="connsiteX2" y="connsiteY2"/>
+                </a:cxn>
+                <a:cxn ang="0">
+                  <a:pos x="connsiteX3" y="connsiteY3"/>
+                </a:cxn>
+                <a:cxn ang="0">
+                  <a:pos x="connsiteX4" y="connsiteY4"/>
+                </a:cxn>
+                <a:cxn ang="0">
+                  <a:pos x="connsiteX5" y="connsiteY5"/>
+                </a:cxn>
+                <a:cxn ang="0">
+                  <a:pos x="connsiteX6" y="connsiteY6"/>
+                </a:cxn>
+                <a:cxn ang="0">
+                  <a:pos x="connsiteX7" y="connsiteY7"/>
+                </a:cxn>
+                <a:cxn ang="0">
+                  <a:pos x="connsiteX8" y="connsiteY8"/>
+                </a:cxn>
+                <a:cxn ang="0">
+                  <a:pos x="connsiteX9" y="connsiteY9"/>
+                </a:cxn>
+              </a:cxnLst>
+              <a:rect l="l" t="t" r="r" b="b"/>
+              <a:pathLst>
+                <a:path w="723900" h="723900">
+                  <a:moveTo>
+                    <a:pt x="361950" y="38100"/>
+                  </a:moveTo>
+                  <a:cubicBezTo>
+                    <a:pt x="540808" y="38100"/>
+                    <a:pt x="685800" y="183092"/>
+                    <a:pt x="685800" y="361950"/>
+                  </a:cubicBezTo>
+                  <a:cubicBezTo>
+                    <a:pt x="685800" y="540808"/>
+                    <a:pt x="540808" y="685800"/>
+                    <a:pt x="361950" y="685800"/>
+                  </a:cubicBezTo>
+                  <a:cubicBezTo>
+                    <a:pt x="183092" y="685800"/>
+                    <a:pt x="38100" y="540808"/>
+                    <a:pt x="38100" y="361950"/>
+                  </a:cubicBezTo>
+                  <a:cubicBezTo>
+                    <a:pt x="38100" y="183092"/>
+                    <a:pt x="183092" y="38100"/>
+                    <a:pt x="361950" y="38100"/>
+                  </a:cubicBezTo>
+                  <a:moveTo>
+                    <a:pt x="361950" y="0"/>
+                  </a:moveTo>
+                  <a:cubicBezTo>
+                    <a:pt x="162051" y="0"/>
+                    <a:pt x="0" y="162051"/>
+                    <a:pt x="0" y="361950"/>
+                  </a:cubicBezTo>
+                  <a:cubicBezTo>
+                    <a:pt x="0" y="561849"/>
+                    <a:pt x="162051" y="723900"/>
+                    <a:pt x="361950" y="723900"/>
+                  </a:cubicBezTo>
+                  <a:cubicBezTo>
+                    <a:pt x="561849" y="723900"/>
+                    <a:pt x="723900" y="561849"/>
+                    <a:pt x="723900" y="361950"/>
+                  </a:cubicBezTo>
+                  <a:cubicBezTo>
+                    <a:pt x="723900" y="162051"/>
+                    <a:pt x="561849" y="0"/>
+                    <a:pt x="361950" y="0"/>
+                  </a:cubicBezTo>
+                  <a:close/>
+                </a:path>
+              </a:pathLst>
+            </a:custGeom>
+            <a:solidFill>
+              <a:srgbClr val="000000"/>
+            </a:solidFill>
+            <a:ln w="9525" cap="flat">
+              <a:noFill/>
+              <a:prstDash val="solid"/>
+              <a:miter/>
+            </a:ln>
+          </p:spPr>
+          <p:txBody>
+            <a:bodyPr rtlCol="0" anchor="ctr"/>
+            <a:lstStyle/>
+            <a:p>
+              <a:endParaRPr lang="en-GB"/>
+            </a:p>
+          </p:txBody>
+        </p:sp>
+      </p:grpSp>
+      <p:grpSp>
+        <p:nvGrpSpPr>
+          <p:cNvPr id="18" name="Graphic 4" descr="Confused face outline">
+            <a:extLst>
+              <a:ext uri="{FF2B5EF4-FFF2-40B4-BE49-F238E27FC236}">
+                <a16:creationId xmlns:a16="http://schemas.microsoft.com/office/drawing/2014/main" id="{4A6A8308-27CB-4C8A-B142-F2E8DC885120}"/>
+              </a:ext>
+            </a:extLst>
+          </p:cNvPr>
+          <p:cNvGrpSpPr/>
+          <p:nvPr/>
+        </p:nvGrpSpPr>
+        <p:grpSpPr>
+          <a:xfrm>
+            <a:off x="6006761" y="2378548"/>
+            <a:ext cx="723900" cy="723900"/>
+            <a:chOff x="5956754" y="2385852"/>
+            <a:chExt cx="723900" cy="723900"/>
+          </a:xfrm>
+          <a:solidFill>
+            <a:srgbClr val="000000"/>
+          </a:solidFill>
+        </p:grpSpPr>
+        <p:sp>
+          <p:nvSpPr>
+            <p:cNvPr id="19" name="Freeform: Shape 18">
+              <a:extLst>
+                <a:ext uri="{FF2B5EF4-FFF2-40B4-BE49-F238E27FC236}">
+                  <a16:creationId xmlns:a16="http://schemas.microsoft.com/office/drawing/2014/main" id="{A372598E-6D7B-4002-95BF-1DD4198ED0BC}"/>
+                </a:ext>
+              </a:extLst>
+            </p:cNvPr>
+            <p:cNvSpPr/>
+            <p:nvPr/>
+          </p:nvSpPr>
+          <p:spPr>
+            <a:xfrm>
+              <a:off x="6213184" y="2871643"/>
+              <a:ext cx="224712" cy="77136"/>
+            </a:xfrm>
+            <a:custGeom>
+              <a:avLst/>
+              <a:gdLst>
+                <a:gd name="connsiteX0" fmla="*/ 210295 w 224712"/>
+                <a:gd name="connsiteY0" fmla="*/ 7604 h 77136"/>
+                <a:gd name="connsiteX1" fmla="*/ 7412 w 224712"/>
+                <a:gd name="connsiteY1" fmla="*/ 42846 h 77136"/>
+                <a:gd name="connsiteX2" fmla="*/ 3602 w 224712"/>
+                <a:gd name="connsiteY2" fmla="*/ 69516 h 77136"/>
+                <a:gd name="connsiteX3" fmla="*/ 18842 w 224712"/>
+                <a:gd name="connsiteY3" fmla="*/ 77136 h 77136"/>
+                <a:gd name="connsiteX4" fmla="*/ 30272 w 224712"/>
+                <a:gd name="connsiteY4" fmla="*/ 73326 h 77136"/>
+                <a:gd name="connsiteX5" fmla="*/ 200770 w 224712"/>
+                <a:gd name="connsiteY5" fmla="*/ 44751 h 77136"/>
+                <a:gd name="connsiteX6" fmla="*/ 223630 w 224712"/>
+                <a:gd name="connsiteY6" fmla="*/ 30464 h 77136"/>
+                <a:gd name="connsiteX7" fmla="*/ 210295 w 224712"/>
+                <a:gd name="connsiteY7" fmla="*/ 7604 h 77136"/>
+              </a:gdLst>
+              <a:ahLst/>
+              <a:cxnLst>
+                <a:cxn ang="0">
+                  <a:pos x="connsiteX0" y="connsiteY0"/>
+                </a:cxn>
+                <a:cxn ang="0">
+                  <a:pos x="connsiteX1" y="connsiteY1"/>
+                </a:cxn>
+                <a:cxn ang="0">
+                  <a:pos x="connsiteX2" y="connsiteY2"/>
+                </a:cxn>
+                <a:cxn ang="0">
+                  <a:pos x="connsiteX3" y="connsiteY3"/>
+                </a:cxn>
+                <a:cxn ang="0">
+                  <a:pos x="connsiteX4" y="connsiteY4"/>
+                </a:cxn>
+                <a:cxn ang="0">
+                  <a:pos x="connsiteX5" y="connsiteY5"/>
+                </a:cxn>
+                <a:cxn ang="0">
+                  <a:pos x="connsiteX6" y="connsiteY6"/>
+                </a:cxn>
+                <a:cxn ang="0">
+                  <a:pos x="connsiteX7" y="connsiteY7"/>
+                </a:cxn>
+              </a:cxnLst>
+              <a:rect l="l" t="t" r="r" b="b"/>
+              <a:pathLst>
+                <a:path w="224712" h="77136">
+                  <a:moveTo>
+                    <a:pt x="210295" y="7604"/>
+                  </a:moveTo>
+                  <a:cubicBezTo>
+                    <a:pt x="91232" y="-20971"/>
+                    <a:pt x="11222" y="39989"/>
+                    <a:pt x="7412" y="42846"/>
+                  </a:cubicBezTo>
+                  <a:cubicBezTo>
+                    <a:pt x="-1160" y="49514"/>
+                    <a:pt x="-2113" y="60944"/>
+                    <a:pt x="3602" y="69516"/>
+                  </a:cubicBezTo>
+                  <a:cubicBezTo>
+                    <a:pt x="7412" y="74279"/>
+                    <a:pt x="13127" y="77136"/>
+                    <a:pt x="18842" y="77136"/>
+                  </a:cubicBezTo>
+                  <a:cubicBezTo>
+                    <a:pt x="22652" y="77136"/>
+                    <a:pt x="27415" y="76184"/>
+                    <a:pt x="30272" y="73326"/>
+                  </a:cubicBezTo>
+                  <a:cubicBezTo>
+                    <a:pt x="31225" y="72374"/>
+                    <a:pt x="98852" y="20939"/>
+                    <a:pt x="200770" y="44751"/>
+                  </a:cubicBezTo>
+                  <a:cubicBezTo>
+                    <a:pt x="211247" y="47609"/>
+                    <a:pt x="221725" y="40941"/>
+                    <a:pt x="223630" y="30464"/>
+                  </a:cubicBezTo>
+                  <a:cubicBezTo>
+                    <a:pt x="227440" y="19986"/>
+                    <a:pt x="220772" y="9509"/>
+                    <a:pt x="210295" y="7604"/>
+                  </a:cubicBezTo>
+                  <a:close/>
+                </a:path>
+              </a:pathLst>
+            </a:custGeom>
+            <a:solidFill>
+              <a:srgbClr val="000000"/>
+            </a:solidFill>
+            <a:ln w="9525" cap="flat">
+              <a:noFill/>
+              <a:prstDash val="solid"/>
+              <a:miter/>
+            </a:ln>
+          </p:spPr>
+          <p:txBody>
+            <a:bodyPr rtlCol="0" anchor="ctr"/>
+            <a:lstStyle/>
+            <a:p>
+              <a:endParaRPr lang="en-GB"/>
+            </a:p>
+          </p:txBody>
+        </p:sp>
+        <p:sp>
+          <p:nvSpPr>
+            <p:cNvPr id="20" name="Freeform: Shape 19">
+              <a:extLst>
+                <a:ext uri="{FF2B5EF4-FFF2-40B4-BE49-F238E27FC236}">
+                  <a16:creationId xmlns:a16="http://schemas.microsoft.com/office/drawing/2014/main" id="{D29D204F-24EA-4666-93F2-C2457A1E2D8D}"/>
+                </a:ext>
+              </a:extLst>
+            </p:cNvPr>
+            <p:cNvSpPr/>
+            <p:nvPr/>
+          </p:nvSpPr>
+          <p:spPr>
+            <a:xfrm>
+              <a:off x="6109154" y="2659219"/>
+              <a:ext cx="114300" cy="114300"/>
+            </a:xfrm>
+            <a:custGeom>
+              <a:avLst/>
+              <a:gdLst>
+                <a:gd name="connsiteX0" fmla="*/ 114300 w 114300"/>
+                <a:gd name="connsiteY0" fmla="*/ 57150 h 114300"/>
+                <a:gd name="connsiteX1" fmla="*/ 57150 w 114300"/>
+                <a:gd name="connsiteY1" fmla="*/ 114300 h 114300"/>
+                <a:gd name="connsiteX2" fmla="*/ 0 w 114300"/>
+                <a:gd name="connsiteY2" fmla="*/ 57150 h 114300"/>
+                <a:gd name="connsiteX3" fmla="*/ 57150 w 114300"/>
+                <a:gd name="connsiteY3" fmla="*/ 0 h 114300"/>
+                <a:gd name="connsiteX4" fmla="*/ 114300 w 114300"/>
+                <a:gd name="connsiteY4" fmla="*/ 57150 h 114300"/>
+              </a:gdLst>
+              <a:ahLst/>
+              <a:cxnLst>
+                <a:cxn ang="0">
+                  <a:pos x="connsiteX0" y="connsiteY0"/>
+                </a:cxn>
+                <a:cxn ang="0">
+                  <a:pos x="connsiteX1" y="connsiteY1"/>
+                </a:cxn>
+                <a:cxn ang="0">
+                  <a:pos x="connsiteX2" y="connsiteY2"/>
+                </a:cxn>
+                <a:cxn ang="0">
+                  <a:pos x="connsiteX3" y="connsiteY3"/>
+                </a:cxn>
+                <a:cxn ang="0">
+                  <a:pos x="connsiteX4" y="connsiteY4"/>
+                </a:cxn>
+              </a:cxnLst>
+              <a:rect l="l" t="t" r="r" b="b"/>
+              <a:pathLst>
+                <a:path w="114300" h="114300">
+                  <a:moveTo>
+                    <a:pt x="114300" y="57150"/>
+                  </a:moveTo>
+                  <a:cubicBezTo>
+                    <a:pt x="114300" y="88713"/>
+                    <a:pt x="88713" y="114300"/>
+                    <a:pt x="57150" y="114300"/>
+                  </a:cubicBezTo>
+                  <a:cubicBezTo>
+                    <a:pt x="25587" y="114300"/>
+                    <a:pt x="0" y="88713"/>
+                    <a:pt x="0" y="57150"/>
+                  </a:cubicBezTo>
+                  <a:cubicBezTo>
+                    <a:pt x="0" y="25587"/>
+                    <a:pt x="25587" y="0"/>
+                    <a:pt x="57150" y="0"/>
+                  </a:cubicBezTo>
+                  <a:cubicBezTo>
+                    <a:pt x="88713" y="0"/>
+                    <a:pt x="114300" y="25587"/>
+                    <a:pt x="114300" y="57150"/>
+                  </a:cubicBezTo>
+                  <a:close/>
+                </a:path>
+              </a:pathLst>
+            </a:custGeom>
+            <a:solidFill>
+              <a:srgbClr val="000000"/>
+            </a:solidFill>
+            <a:ln w="9525" cap="flat">
+              <a:noFill/>
+              <a:prstDash val="solid"/>
+              <a:miter/>
+            </a:ln>
+          </p:spPr>
+          <p:txBody>
+            <a:bodyPr rtlCol="0" anchor="ctr"/>
+            <a:lstStyle/>
+            <a:p>
+              <a:endParaRPr lang="en-GB"/>
+            </a:p>
+          </p:txBody>
+        </p:sp>
+        <p:sp>
+          <p:nvSpPr>
+            <p:cNvPr id="21" name="Freeform: Shape 20">
+              <a:extLst>
+                <a:ext uri="{FF2B5EF4-FFF2-40B4-BE49-F238E27FC236}">
+                  <a16:creationId xmlns:a16="http://schemas.microsoft.com/office/drawing/2014/main" id="{4E5A3BBF-CDE0-4B8D-B8A9-24EF2BC7A2FB}"/>
+                </a:ext>
+              </a:extLst>
+            </p:cNvPr>
+            <p:cNvSpPr/>
+            <p:nvPr/>
+          </p:nvSpPr>
+          <p:spPr>
+            <a:xfrm>
+              <a:off x="6099548" y="2563889"/>
+              <a:ext cx="133510" cy="47705"/>
+            </a:xfrm>
+            <a:custGeom>
+              <a:avLst/>
+              <a:gdLst>
+                <a:gd name="connsiteX0" fmla="*/ 21035 w 133510"/>
+                <a:gd name="connsiteY0" fmla="*/ 47705 h 47705"/>
+                <a:gd name="connsiteX1" fmla="*/ 116285 w 133510"/>
+                <a:gd name="connsiteY1" fmla="*/ 38180 h 47705"/>
+                <a:gd name="connsiteX2" fmla="*/ 133430 w 133510"/>
+                <a:gd name="connsiteY2" fmla="*/ 17225 h 47705"/>
+                <a:gd name="connsiteX3" fmla="*/ 112475 w 133510"/>
+                <a:gd name="connsiteY3" fmla="*/ 80 h 47705"/>
+                <a:gd name="connsiteX4" fmla="*/ 17225 w 133510"/>
+                <a:gd name="connsiteY4" fmla="*/ 9605 h 47705"/>
+                <a:gd name="connsiteX5" fmla="*/ 80 w 133510"/>
+                <a:gd name="connsiteY5" fmla="*/ 30560 h 47705"/>
+                <a:gd name="connsiteX6" fmla="*/ 19130 w 133510"/>
+                <a:gd name="connsiteY6" fmla="*/ 47705 h 47705"/>
+                <a:gd name="connsiteX7" fmla="*/ 21035 w 133510"/>
+                <a:gd name="connsiteY7" fmla="*/ 47705 h 47705"/>
+              </a:gdLst>
+              <a:ahLst/>
+              <a:cxnLst>
+                <a:cxn ang="0">
+                  <a:pos x="connsiteX0" y="connsiteY0"/>
+                </a:cxn>
+                <a:cxn ang="0">
+                  <a:pos x="connsiteX1" y="connsiteY1"/>
+                </a:cxn>
+                <a:cxn ang="0">
+                  <a:pos x="connsiteX2" y="connsiteY2"/>
+                </a:cxn>
+                <a:cxn ang="0">
+                  <a:pos x="connsiteX3" y="connsiteY3"/>
+                </a:cxn>
+                <a:cxn ang="0">
+                  <a:pos x="connsiteX4" y="connsiteY4"/>
+                </a:cxn>
+                <a:cxn ang="0">
+                  <a:pos x="connsiteX5" y="connsiteY5"/>
+                </a:cxn>
+                <a:cxn ang="0">
+                  <a:pos x="connsiteX6" y="connsiteY6"/>
+                </a:cxn>
+                <a:cxn ang="0">
+                  <a:pos x="connsiteX7" y="connsiteY7"/>
+                </a:cxn>
+              </a:cxnLst>
+              <a:rect l="l" t="t" r="r" b="b"/>
+              <a:pathLst>
+                <a:path w="133510" h="47705">
+                  <a:moveTo>
+                    <a:pt x="21035" y="47705"/>
+                  </a:moveTo>
+                  <a:lnTo>
+                    <a:pt x="116285" y="38180"/>
+                  </a:lnTo>
+                  <a:cubicBezTo>
+                    <a:pt x="126763" y="37228"/>
+                    <a:pt x="134383" y="27703"/>
+                    <a:pt x="133430" y="17225"/>
+                  </a:cubicBezTo>
+                  <a:cubicBezTo>
+                    <a:pt x="132478" y="6748"/>
+                    <a:pt x="122953" y="-872"/>
+                    <a:pt x="112475" y="80"/>
+                  </a:cubicBezTo>
+                  <a:lnTo>
+                    <a:pt x="17225" y="9605"/>
+                  </a:lnTo>
+                  <a:cubicBezTo>
+                    <a:pt x="6748" y="10558"/>
+                    <a:pt x="-872" y="20083"/>
+                    <a:pt x="80" y="30560"/>
+                  </a:cubicBezTo>
+                  <a:cubicBezTo>
+                    <a:pt x="1033" y="40085"/>
+                    <a:pt x="9605" y="47705"/>
+                    <a:pt x="19130" y="47705"/>
+                  </a:cubicBezTo>
+                  <a:cubicBezTo>
+                    <a:pt x="20083" y="47705"/>
+                    <a:pt x="20083" y="47705"/>
+                    <a:pt x="21035" y="47705"/>
+                  </a:cubicBezTo>
+                  <a:close/>
+                </a:path>
+              </a:pathLst>
+            </a:custGeom>
+            <a:solidFill>
+              <a:srgbClr val="000000"/>
+            </a:solidFill>
+            <a:ln w="9525" cap="flat">
+              <a:noFill/>
+              <a:prstDash val="solid"/>
+              <a:miter/>
+            </a:ln>
+          </p:spPr>
+          <p:txBody>
+            <a:bodyPr rtlCol="0" anchor="ctr"/>
+            <a:lstStyle/>
+            <a:p>
+              <a:endParaRPr lang="en-GB"/>
+            </a:p>
+          </p:txBody>
+        </p:sp>
+        <p:sp>
+          <p:nvSpPr>
+            <p:cNvPr id="22" name="Freeform: Shape 21">
+              <a:extLst>
+                <a:ext uri="{FF2B5EF4-FFF2-40B4-BE49-F238E27FC236}">
+                  <a16:creationId xmlns:a16="http://schemas.microsoft.com/office/drawing/2014/main" id="{0C44D5E2-D147-4429-B5B0-D428D348C60F}"/>
+                </a:ext>
+              </a:extLst>
+            </p:cNvPr>
+            <p:cNvSpPr/>
+            <p:nvPr/>
+          </p:nvSpPr>
+          <p:spPr>
+            <a:xfrm>
+              <a:off x="6413954" y="2659219"/>
+              <a:ext cx="114300" cy="114300"/>
+            </a:xfrm>
+            <a:custGeom>
+              <a:avLst/>
+              <a:gdLst>
+                <a:gd name="connsiteX0" fmla="*/ 114300 w 114300"/>
+                <a:gd name="connsiteY0" fmla="*/ 57150 h 114300"/>
+                <a:gd name="connsiteX1" fmla="*/ 57150 w 114300"/>
+                <a:gd name="connsiteY1" fmla="*/ 114300 h 114300"/>
+                <a:gd name="connsiteX2" fmla="*/ 0 w 114300"/>
+                <a:gd name="connsiteY2" fmla="*/ 57150 h 114300"/>
+                <a:gd name="connsiteX3" fmla="*/ 57150 w 114300"/>
+                <a:gd name="connsiteY3" fmla="*/ 0 h 114300"/>
+                <a:gd name="connsiteX4" fmla="*/ 114300 w 114300"/>
+                <a:gd name="connsiteY4" fmla="*/ 57150 h 114300"/>
+              </a:gdLst>
+              <a:ahLst/>
+              <a:cxnLst>
+                <a:cxn ang="0">
+                  <a:pos x="connsiteX0" y="connsiteY0"/>
+                </a:cxn>
+                <a:cxn ang="0">
+                  <a:pos x="connsiteX1" y="connsiteY1"/>
+                </a:cxn>
+                <a:cxn ang="0">
+                  <a:pos x="connsiteX2" y="connsiteY2"/>
+                </a:cxn>
+                <a:cxn ang="0">
+                  <a:pos x="connsiteX3" y="connsiteY3"/>
+                </a:cxn>
+                <a:cxn ang="0">
+                  <a:pos x="connsiteX4" y="connsiteY4"/>
+                </a:cxn>
+              </a:cxnLst>
+              <a:rect l="l" t="t" r="r" b="b"/>
+              <a:pathLst>
+                <a:path w="114300" h="114300">
+                  <a:moveTo>
+                    <a:pt x="114300" y="57150"/>
+                  </a:moveTo>
+                  <a:cubicBezTo>
+                    <a:pt x="114300" y="88713"/>
+                    <a:pt x="88713" y="114300"/>
+                    <a:pt x="57150" y="114300"/>
+                  </a:cubicBezTo>
+                  <a:cubicBezTo>
+                    <a:pt x="25587" y="114300"/>
+                    <a:pt x="0" y="88713"/>
+                    <a:pt x="0" y="57150"/>
+                  </a:cubicBezTo>
+                  <a:cubicBezTo>
+                    <a:pt x="0" y="25587"/>
+                    <a:pt x="25587" y="0"/>
+                    <a:pt x="57150" y="0"/>
+                  </a:cubicBezTo>
+                  <a:cubicBezTo>
+                    <a:pt x="88713" y="0"/>
+                    <a:pt x="114300" y="25587"/>
+                    <a:pt x="114300" y="57150"/>
+                  </a:cubicBezTo>
+                  <a:close/>
+                </a:path>
+              </a:pathLst>
+            </a:custGeom>
+            <a:solidFill>
+              <a:srgbClr val="000000"/>
+            </a:solidFill>
+            <a:ln w="9525" cap="flat">
+              <a:noFill/>
+              <a:prstDash val="solid"/>
+              <a:miter/>
+            </a:ln>
+          </p:spPr>
+          <p:txBody>
+            <a:bodyPr rtlCol="0" anchor="ctr"/>
+            <a:lstStyle/>
+            <a:p>
+              <a:endParaRPr lang="en-GB"/>
+            </a:p>
+          </p:txBody>
+        </p:sp>
+        <p:sp>
+          <p:nvSpPr>
+            <p:cNvPr id="23" name="Freeform: Shape 22">
+              <a:extLst>
+                <a:ext uri="{FF2B5EF4-FFF2-40B4-BE49-F238E27FC236}">
+                  <a16:creationId xmlns:a16="http://schemas.microsoft.com/office/drawing/2014/main" id="{C9D5B0C5-0A0B-4AD4-8158-D7B7B5EB0388}"/>
+                </a:ext>
+              </a:extLst>
+            </p:cNvPr>
+            <p:cNvSpPr/>
+            <p:nvPr/>
+          </p:nvSpPr>
+          <p:spPr>
+            <a:xfrm>
+              <a:off x="6404348" y="2563889"/>
+              <a:ext cx="133510" cy="47705"/>
+            </a:xfrm>
+            <a:custGeom>
+              <a:avLst/>
+              <a:gdLst>
+                <a:gd name="connsiteX0" fmla="*/ 116285 w 133510"/>
+                <a:gd name="connsiteY0" fmla="*/ 9605 h 47705"/>
+                <a:gd name="connsiteX1" fmla="*/ 21035 w 133510"/>
+                <a:gd name="connsiteY1" fmla="*/ 80 h 47705"/>
+                <a:gd name="connsiteX2" fmla="*/ 80 w 133510"/>
+                <a:gd name="connsiteY2" fmla="*/ 17225 h 47705"/>
+                <a:gd name="connsiteX3" fmla="*/ 17225 w 133510"/>
+                <a:gd name="connsiteY3" fmla="*/ 38180 h 47705"/>
+                <a:gd name="connsiteX4" fmla="*/ 112475 w 133510"/>
+                <a:gd name="connsiteY4" fmla="*/ 47705 h 47705"/>
+                <a:gd name="connsiteX5" fmla="*/ 114380 w 133510"/>
+                <a:gd name="connsiteY5" fmla="*/ 47705 h 47705"/>
+                <a:gd name="connsiteX6" fmla="*/ 133430 w 133510"/>
+                <a:gd name="connsiteY6" fmla="*/ 30560 h 47705"/>
+                <a:gd name="connsiteX7" fmla="*/ 116285 w 133510"/>
+                <a:gd name="connsiteY7" fmla="*/ 9605 h 47705"/>
+              </a:gdLst>
+              <a:ahLst/>
+              <a:cxnLst>
+                <a:cxn ang="0">
+                  <a:pos x="connsiteX0" y="connsiteY0"/>
+                </a:cxn>
+                <a:cxn ang="0">
+                  <a:pos x="connsiteX1" y="connsiteY1"/>
+                </a:cxn>
+                <a:cxn ang="0">
+                  <a:pos x="connsiteX2" y="connsiteY2"/>
+                </a:cxn>
+                <a:cxn ang="0">
+                  <a:pos x="connsiteX3" y="connsiteY3"/>
+                </a:cxn>
+                <a:cxn ang="0">
+                  <a:pos x="connsiteX4" y="connsiteY4"/>
+                </a:cxn>
+                <a:cxn ang="0">
+                  <a:pos x="connsiteX5" y="connsiteY5"/>
+                </a:cxn>
+                <a:cxn ang="0">
+                  <a:pos x="connsiteX6" y="connsiteY6"/>
+                </a:cxn>
+                <a:cxn ang="0">
+                  <a:pos x="connsiteX7" y="connsiteY7"/>
+                </a:cxn>
+              </a:cxnLst>
+              <a:rect l="l" t="t" r="r" b="b"/>
+              <a:pathLst>
+                <a:path w="133510" h="47705">
+                  <a:moveTo>
+                    <a:pt x="116285" y="9605"/>
+                  </a:moveTo>
+                  <a:lnTo>
+                    <a:pt x="21035" y="80"/>
+                  </a:lnTo>
+                  <a:cubicBezTo>
+                    <a:pt x="10558" y="-872"/>
+                    <a:pt x="1033" y="6748"/>
+                    <a:pt x="80" y="17225"/>
+                  </a:cubicBezTo>
+                  <a:cubicBezTo>
+                    <a:pt x="-872" y="27703"/>
+                    <a:pt x="6748" y="37228"/>
+                    <a:pt x="17225" y="38180"/>
+                  </a:cubicBezTo>
+                  <a:lnTo>
+                    <a:pt x="112475" y="47705"/>
+                  </a:lnTo>
+                  <a:cubicBezTo>
+                    <a:pt x="113428" y="47705"/>
+                    <a:pt x="113428" y="47705"/>
+                    <a:pt x="114380" y="47705"/>
+                  </a:cubicBezTo>
+                  <a:cubicBezTo>
+                    <a:pt x="123905" y="47705"/>
+                    <a:pt x="132478" y="40085"/>
+                    <a:pt x="133430" y="30560"/>
+                  </a:cubicBezTo>
+                  <a:cubicBezTo>
+                    <a:pt x="134383" y="20083"/>
+                    <a:pt x="126763" y="10558"/>
+                    <a:pt x="116285" y="9605"/>
+                  </a:cubicBezTo>
+                  <a:close/>
+                </a:path>
+              </a:pathLst>
+            </a:custGeom>
+            <a:solidFill>
+              <a:srgbClr val="000000"/>
+            </a:solidFill>
+            <a:ln w="9525" cap="flat">
+              <a:noFill/>
+              <a:prstDash val="solid"/>
+              <a:miter/>
+            </a:ln>
+          </p:spPr>
+          <p:txBody>
+            <a:bodyPr rtlCol="0" anchor="ctr"/>
+            <a:lstStyle/>
+            <a:p>
+              <a:endParaRPr lang="en-GB"/>
+            </a:p>
+          </p:txBody>
+        </p:sp>
+        <p:sp>
+          <p:nvSpPr>
+            <p:cNvPr id="24" name="Freeform: Shape 23">
+              <a:extLst>
+                <a:ext uri="{FF2B5EF4-FFF2-40B4-BE49-F238E27FC236}">
+                  <a16:creationId xmlns:a16="http://schemas.microsoft.com/office/drawing/2014/main" id="{E55BA6B2-B233-40A9-9B13-96E6061FB093}"/>
+                </a:ext>
+              </a:extLst>
+            </p:cNvPr>
+            <p:cNvSpPr/>
+            <p:nvPr/>
+          </p:nvSpPr>
+          <p:spPr>
+            <a:xfrm>
+              <a:off x="5956754" y="2385852"/>
+              <a:ext cx="723900" cy="723900"/>
+            </a:xfrm>
+            <a:custGeom>
+              <a:avLst/>
+              <a:gdLst>
+                <a:gd name="connsiteX0" fmla="*/ 361950 w 723900"/>
+                <a:gd name="connsiteY0" fmla="*/ 38100 h 723900"/>
+                <a:gd name="connsiteX1" fmla="*/ 685800 w 723900"/>
+                <a:gd name="connsiteY1" fmla="*/ 361950 h 723900"/>
+                <a:gd name="connsiteX2" fmla="*/ 361950 w 723900"/>
+                <a:gd name="connsiteY2" fmla="*/ 685800 h 723900"/>
+                <a:gd name="connsiteX3" fmla="*/ 38100 w 723900"/>
+                <a:gd name="connsiteY3" fmla="*/ 361950 h 723900"/>
+                <a:gd name="connsiteX4" fmla="*/ 361950 w 723900"/>
+                <a:gd name="connsiteY4" fmla="*/ 38100 h 723900"/>
+                <a:gd name="connsiteX5" fmla="*/ 361950 w 723900"/>
+                <a:gd name="connsiteY5" fmla="*/ 0 h 723900"/>
+                <a:gd name="connsiteX6" fmla="*/ 0 w 723900"/>
+                <a:gd name="connsiteY6" fmla="*/ 361950 h 723900"/>
+                <a:gd name="connsiteX7" fmla="*/ 361950 w 723900"/>
+                <a:gd name="connsiteY7" fmla="*/ 723900 h 723900"/>
+                <a:gd name="connsiteX8" fmla="*/ 723900 w 723900"/>
+                <a:gd name="connsiteY8" fmla="*/ 361950 h 723900"/>
+                <a:gd name="connsiteX9" fmla="*/ 361950 w 723900"/>
+                <a:gd name="connsiteY9" fmla="*/ 0 h 723900"/>
+                <a:gd name="connsiteX10" fmla="*/ 361950 w 723900"/>
+                <a:gd name="connsiteY10" fmla="*/ 0 h 723900"/>
+              </a:gdLst>
+              <a:ahLst/>
+              <a:cxnLst>
+                <a:cxn ang="0">
+                  <a:pos x="connsiteX0" y="connsiteY0"/>
+                </a:cxn>
+                <a:cxn ang="0">
+                  <a:pos x="connsiteX1" y="connsiteY1"/>
+                </a:cxn>
+                <a:cxn ang="0">
+                  <a:pos x="connsiteX2" y="connsiteY2"/>
+                </a:cxn>
+                <a:cxn ang="0">
+                  <a:pos x="connsiteX3" y="connsiteY3"/>
+                </a:cxn>
+                <a:cxn ang="0">
+                  <a:pos x="connsiteX4" y="connsiteY4"/>
+                </a:cxn>
+                <a:cxn ang="0">
+                  <a:pos x="connsiteX5" y="connsiteY5"/>
+                </a:cxn>
+                <a:cxn ang="0">
+                  <a:pos x="connsiteX6" y="connsiteY6"/>
+                </a:cxn>
+                <a:cxn ang="0">
+                  <a:pos x="connsiteX7" y="connsiteY7"/>
+                </a:cxn>
+                <a:cxn ang="0">
+                  <a:pos x="connsiteX8" y="connsiteY8"/>
+                </a:cxn>
+                <a:cxn ang="0">
+                  <a:pos x="connsiteX9" y="connsiteY9"/>
+                </a:cxn>
+                <a:cxn ang="0">
+                  <a:pos x="connsiteX10" y="connsiteY10"/>
+                </a:cxn>
+              </a:cxnLst>
+              <a:rect l="l" t="t" r="r" b="b"/>
+              <a:pathLst>
+                <a:path w="723900" h="723900">
+                  <a:moveTo>
+                    <a:pt x="361950" y="38100"/>
+                  </a:moveTo>
+                  <a:cubicBezTo>
+                    <a:pt x="540068" y="38100"/>
+                    <a:pt x="685800" y="183833"/>
+                    <a:pt x="685800" y="361950"/>
+                  </a:cubicBezTo>
+                  <a:cubicBezTo>
+                    <a:pt x="685800" y="540068"/>
+                    <a:pt x="540068" y="685800"/>
+                    <a:pt x="361950" y="685800"/>
+                  </a:cubicBezTo>
+                  <a:cubicBezTo>
+                    <a:pt x="183833" y="685800"/>
+                    <a:pt x="38100" y="540068"/>
+                    <a:pt x="38100" y="361950"/>
+                  </a:cubicBezTo>
+                  <a:cubicBezTo>
+                    <a:pt x="38100" y="183833"/>
+                    <a:pt x="183833" y="38100"/>
+                    <a:pt x="361950" y="38100"/>
+                  </a:cubicBezTo>
+                  <a:moveTo>
+                    <a:pt x="361950" y="0"/>
+                  </a:moveTo>
+                  <a:cubicBezTo>
+                    <a:pt x="161925" y="0"/>
+                    <a:pt x="0" y="161925"/>
+                    <a:pt x="0" y="361950"/>
+                  </a:cubicBezTo>
+                  <a:cubicBezTo>
+                    <a:pt x="0" y="561975"/>
+                    <a:pt x="161925" y="723900"/>
+                    <a:pt x="361950" y="723900"/>
+                  </a:cubicBezTo>
+                  <a:cubicBezTo>
+                    <a:pt x="561975" y="723900"/>
+                    <a:pt x="723900" y="561975"/>
+                    <a:pt x="723900" y="361950"/>
+                  </a:cubicBezTo>
+                  <a:cubicBezTo>
+                    <a:pt x="723900" y="161925"/>
+                    <a:pt x="561975" y="0"/>
+                    <a:pt x="361950" y="0"/>
+                  </a:cubicBezTo>
+                  <a:lnTo>
+                    <a:pt x="361950" y="0"/>
+                  </a:lnTo>
+                  <a:close/>
+                </a:path>
+              </a:pathLst>
+            </a:custGeom>
+            <a:solidFill>
+              <a:srgbClr val="000000"/>
+            </a:solidFill>
+            <a:ln w="9525" cap="flat">
+              <a:noFill/>
+              <a:prstDash val="solid"/>
+              <a:miter/>
+            </a:ln>
+          </p:spPr>
+          <p:txBody>
+            <a:bodyPr rtlCol="0" anchor="ctr"/>
+            <a:lstStyle/>
+            <a:p>
+              <a:endParaRPr lang="en-GB"/>
+            </a:p>
+          </p:txBody>
+        </p:sp>
+      </p:grpSp>
     </p:spTree>
     <p:extLst>
       <p:ext uri="{BB962C8B-B14F-4D97-AF65-F5344CB8AC3E}">

</xml_diff>

<commit_message>
GPS-330 SVG for meals on wheels icon
</commit_message>
<xml_diff>
--- a/HelpMyStreetFE/HelpMyStreetFE/src/pptx/Icons.pptx
+++ b/HelpMyStreetFE/HelpMyStreetFE/src/pptx/Icons.pptx
@@ -8,6 +8,7 @@
     <p:sldId id="256" r:id="rId2"/>
     <p:sldId id="257" r:id="rId3"/>
     <p:sldId id="258" r:id="rId4"/>
+    <p:sldId id="259" r:id="rId5"/>
   </p:sldIdLst>
   <p:sldSz cx="12192000" cy="6858000"/>
   <p:notesSz cx="6858000" cy="9144000"/>
@@ -263,7 +264,7 @@
           <a:p>
             <a:fld id="{B2EC5630-BBBD-40F6-B459-AD74AAD6AD00}" type="datetimeFigureOut">
               <a:rPr lang="en-GB" smtClean="0"/>
-              <a:t>07/12/2020</a:t>
+              <a:t>05/01/2021</a:t>
             </a:fld>
             <a:endParaRPr lang="en-GB"/>
           </a:p>
@@ -463,7 +464,7 @@
           <a:p>
             <a:fld id="{B2EC5630-BBBD-40F6-B459-AD74AAD6AD00}" type="datetimeFigureOut">
               <a:rPr lang="en-GB" smtClean="0"/>
-              <a:t>07/12/2020</a:t>
+              <a:t>05/01/2021</a:t>
             </a:fld>
             <a:endParaRPr lang="en-GB"/>
           </a:p>
@@ -673,7 +674,7 @@
           <a:p>
             <a:fld id="{B2EC5630-BBBD-40F6-B459-AD74AAD6AD00}" type="datetimeFigureOut">
               <a:rPr lang="en-GB" smtClean="0"/>
-              <a:t>07/12/2020</a:t>
+              <a:t>05/01/2021</a:t>
             </a:fld>
             <a:endParaRPr lang="en-GB"/>
           </a:p>
@@ -873,7 +874,7 @@
           <a:p>
             <a:fld id="{B2EC5630-BBBD-40F6-B459-AD74AAD6AD00}" type="datetimeFigureOut">
               <a:rPr lang="en-GB" smtClean="0"/>
-              <a:t>07/12/2020</a:t>
+              <a:t>05/01/2021</a:t>
             </a:fld>
             <a:endParaRPr lang="en-GB"/>
           </a:p>
@@ -1149,7 +1150,7 @@
           <a:p>
             <a:fld id="{B2EC5630-BBBD-40F6-B459-AD74AAD6AD00}" type="datetimeFigureOut">
               <a:rPr lang="en-GB" smtClean="0"/>
-              <a:t>07/12/2020</a:t>
+              <a:t>05/01/2021</a:t>
             </a:fld>
             <a:endParaRPr lang="en-GB"/>
           </a:p>
@@ -1417,7 +1418,7 @@
           <a:p>
             <a:fld id="{B2EC5630-BBBD-40F6-B459-AD74AAD6AD00}" type="datetimeFigureOut">
               <a:rPr lang="en-GB" smtClean="0"/>
-              <a:t>07/12/2020</a:t>
+              <a:t>05/01/2021</a:t>
             </a:fld>
             <a:endParaRPr lang="en-GB"/>
           </a:p>
@@ -1832,7 +1833,7 @@
           <a:p>
             <a:fld id="{B2EC5630-BBBD-40F6-B459-AD74AAD6AD00}" type="datetimeFigureOut">
               <a:rPr lang="en-GB" smtClean="0"/>
-              <a:t>07/12/2020</a:t>
+              <a:t>05/01/2021</a:t>
             </a:fld>
             <a:endParaRPr lang="en-GB"/>
           </a:p>
@@ -1974,7 +1975,7 @@
           <a:p>
             <a:fld id="{B2EC5630-BBBD-40F6-B459-AD74AAD6AD00}" type="datetimeFigureOut">
               <a:rPr lang="en-GB" smtClean="0"/>
-              <a:t>07/12/2020</a:t>
+              <a:t>05/01/2021</a:t>
             </a:fld>
             <a:endParaRPr lang="en-GB"/>
           </a:p>
@@ -2087,7 +2088,7 @@
           <a:p>
             <a:fld id="{B2EC5630-BBBD-40F6-B459-AD74AAD6AD00}" type="datetimeFigureOut">
               <a:rPr lang="en-GB" smtClean="0"/>
-              <a:t>07/12/2020</a:t>
+              <a:t>05/01/2021</a:t>
             </a:fld>
             <a:endParaRPr lang="en-GB"/>
           </a:p>
@@ -2400,7 +2401,7 @@
           <a:p>
             <a:fld id="{B2EC5630-BBBD-40F6-B459-AD74AAD6AD00}" type="datetimeFigureOut">
               <a:rPr lang="en-GB" smtClean="0"/>
-              <a:t>07/12/2020</a:t>
+              <a:t>05/01/2021</a:t>
             </a:fld>
             <a:endParaRPr lang="en-GB"/>
           </a:p>
@@ -2689,7 +2690,7 @@
           <a:p>
             <a:fld id="{B2EC5630-BBBD-40F6-B459-AD74AAD6AD00}" type="datetimeFigureOut">
               <a:rPr lang="en-GB" smtClean="0"/>
-              <a:t>07/12/2020</a:t>
+              <a:t>05/01/2021</a:t>
             </a:fld>
             <a:endParaRPr lang="en-GB"/>
           </a:p>
@@ -2932,7 +2933,7 @@
           <a:p>
             <a:fld id="{B2EC5630-BBBD-40F6-B459-AD74AAD6AD00}" type="datetimeFigureOut">
               <a:rPr lang="en-GB" smtClean="0"/>
-              <a:t>07/12/2020</a:t>
+              <a:t>05/01/2021</a:t>
             </a:fld>
             <a:endParaRPr lang="en-GB"/>
           </a:p>
@@ -6473,6 +6474,1174 @@
 </p:sld>
 </file>
 
+<file path=ppt/slides/slide4.xml><?xml version="1.0" encoding="utf-8"?>
+<p:sld xmlns:a="http://schemas.openxmlformats.org/drawingml/2006/main" xmlns:r="http://schemas.openxmlformats.org/officeDocument/2006/relationships" xmlns:p="http://schemas.openxmlformats.org/presentationml/2006/main">
+  <p:cSld>
+    <p:spTree>
+      <p:nvGrpSpPr>
+        <p:cNvPr id="1" name=""/>
+        <p:cNvGrpSpPr/>
+        <p:nvPr/>
+      </p:nvGrpSpPr>
+      <p:grpSpPr>
+        <a:xfrm>
+          <a:off x="0" y="0"/>
+          <a:ext cx="0" cy="0"/>
+          <a:chOff x="0" y="0"/>
+          <a:chExt cx="0" cy="0"/>
+        </a:xfrm>
+      </p:grpSpPr>
+      <p:grpSp>
+        <p:nvGrpSpPr>
+          <p:cNvPr id="18" name="Group 17">
+            <a:extLst>
+              <a:ext uri="{FF2B5EF4-FFF2-40B4-BE49-F238E27FC236}">
+                <a16:creationId xmlns:a16="http://schemas.microsoft.com/office/drawing/2014/main" id="{6D34F1F0-9540-46C0-9541-837F2D30A7FE}"/>
+              </a:ext>
+            </a:extLst>
+          </p:cNvPr>
+          <p:cNvGrpSpPr/>
+          <p:nvPr/>
+        </p:nvGrpSpPr>
+        <p:grpSpPr>
+          <a:xfrm>
+            <a:off x="2114490" y="1195798"/>
+            <a:ext cx="2698982" cy="2822728"/>
+            <a:chOff x="2114490" y="1195798"/>
+            <a:chExt cx="2698982" cy="2822728"/>
+          </a:xfrm>
+        </p:grpSpPr>
+        <p:sp>
+          <p:nvSpPr>
+            <p:cNvPr id="9" name="Freeform: Shape 8">
+              <a:extLst>
+                <a:ext uri="{FF2B5EF4-FFF2-40B4-BE49-F238E27FC236}">
+                  <a16:creationId xmlns:a16="http://schemas.microsoft.com/office/drawing/2014/main" id="{0CAD81AB-2484-4BD0-9BDD-B20920EE2D21}"/>
+                </a:ext>
+              </a:extLst>
+            </p:cNvPr>
+            <p:cNvSpPr/>
+            <p:nvPr/>
+          </p:nvSpPr>
+          <p:spPr>
+            <a:xfrm>
+              <a:off x="2181964" y="1195798"/>
+              <a:ext cx="2564033" cy="1585652"/>
+            </a:xfrm>
+            <a:custGeom>
+              <a:avLst/>
+              <a:gdLst>
+                <a:gd name="connsiteX0" fmla="*/ 1113330 w 2564033"/>
+                <a:gd name="connsiteY0" fmla="*/ 303636 h 1585652"/>
+                <a:gd name="connsiteX1" fmla="*/ 1282017 w 2564033"/>
+                <a:gd name="connsiteY1" fmla="*/ 134949 h 1585652"/>
+                <a:gd name="connsiteX2" fmla="*/ 1450703 w 2564033"/>
+                <a:gd name="connsiteY2" fmla="*/ 303636 h 1585652"/>
+                <a:gd name="connsiteX3" fmla="*/ 1450703 w 2564033"/>
+                <a:gd name="connsiteY3" fmla="*/ 313757 h 1585652"/>
+                <a:gd name="connsiteX4" fmla="*/ 1282017 w 2564033"/>
+                <a:gd name="connsiteY4" fmla="*/ 303636 h 1585652"/>
+                <a:gd name="connsiteX5" fmla="*/ 1113330 w 2564033"/>
+                <a:gd name="connsiteY5" fmla="*/ 313757 h 1585652"/>
+                <a:gd name="connsiteX6" fmla="*/ 1113330 w 2564033"/>
+                <a:gd name="connsiteY6" fmla="*/ 303636 h 1585652"/>
+                <a:gd name="connsiteX7" fmla="*/ 1582279 w 2564033"/>
+                <a:gd name="connsiteY7" fmla="*/ 340747 h 1585652"/>
+                <a:gd name="connsiteX8" fmla="*/ 1585652 w 2564033"/>
+                <a:gd name="connsiteY8" fmla="*/ 303636 h 1585652"/>
+                <a:gd name="connsiteX9" fmla="*/ 1282017 w 2564033"/>
+                <a:gd name="connsiteY9" fmla="*/ 0 h 1585652"/>
+                <a:gd name="connsiteX10" fmla="*/ 978381 w 2564033"/>
+                <a:gd name="connsiteY10" fmla="*/ 303636 h 1585652"/>
+                <a:gd name="connsiteX11" fmla="*/ 981755 w 2564033"/>
+                <a:gd name="connsiteY11" fmla="*/ 340747 h 1585652"/>
+                <a:gd name="connsiteX12" fmla="*/ 0 w 2564033"/>
+                <a:gd name="connsiteY12" fmla="*/ 1585652 h 1585652"/>
+                <a:gd name="connsiteX13" fmla="*/ 2564034 w 2564033"/>
+                <a:gd name="connsiteY13" fmla="*/ 1585652 h 1585652"/>
+                <a:gd name="connsiteX14" fmla="*/ 1582279 w 2564033"/>
+                <a:gd name="connsiteY14" fmla="*/ 340747 h 1585652"/>
+              </a:gdLst>
+              <a:ahLst/>
+              <a:cxnLst>
+                <a:cxn ang="0">
+                  <a:pos x="connsiteX0" y="connsiteY0"/>
+                </a:cxn>
+                <a:cxn ang="0">
+                  <a:pos x="connsiteX1" y="connsiteY1"/>
+                </a:cxn>
+                <a:cxn ang="0">
+                  <a:pos x="connsiteX2" y="connsiteY2"/>
+                </a:cxn>
+                <a:cxn ang="0">
+                  <a:pos x="connsiteX3" y="connsiteY3"/>
+                </a:cxn>
+                <a:cxn ang="0">
+                  <a:pos x="connsiteX4" y="connsiteY4"/>
+                </a:cxn>
+                <a:cxn ang="0">
+                  <a:pos x="connsiteX5" y="connsiteY5"/>
+                </a:cxn>
+                <a:cxn ang="0">
+                  <a:pos x="connsiteX6" y="connsiteY6"/>
+                </a:cxn>
+                <a:cxn ang="0">
+                  <a:pos x="connsiteX7" y="connsiteY7"/>
+                </a:cxn>
+                <a:cxn ang="0">
+                  <a:pos x="connsiteX8" y="connsiteY8"/>
+                </a:cxn>
+                <a:cxn ang="0">
+                  <a:pos x="connsiteX9" y="connsiteY9"/>
+                </a:cxn>
+                <a:cxn ang="0">
+                  <a:pos x="connsiteX10" y="connsiteY10"/>
+                </a:cxn>
+                <a:cxn ang="0">
+                  <a:pos x="connsiteX11" y="connsiteY11"/>
+                </a:cxn>
+                <a:cxn ang="0">
+                  <a:pos x="connsiteX12" y="connsiteY12"/>
+                </a:cxn>
+                <a:cxn ang="0">
+                  <a:pos x="connsiteX13" y="connsiteY13"/>
+                </a:cxn>
+                <a:cxn ang="0">
+                  <a:pos x="connsiteX14" y="connsiteY14"/>
+                </a:cxn>
+              </a:cxnLst>
+              <a:rect l="l" t="t" r="r" b="b"/>
+              <a:pathLst>
+                <a:path w="2564033" h="1585652">
+                  <a:moveTo>
+                    <a:pt x="1113330" y="303636"/>
+                  </a:moveTo>
+                  <a:cubicBezTo>
+                    <a:pt x="1113330" y="209171"/>
+                    <a:pt x="1187552" y="134949"/>
+                    <a:pt x="1282017" y="134949"/>
+                  </a:cubicBezTo>
+                  <a:cubicBezTo>
+                    <a:pt x="1376481" y="134949"/>
+                    <a:pt x="1450703" y="209171"/>
+                    <a:pt x="1450703" y="303636"/>
+                  </a:cubicBezTo>
+                  <a:cubicBezTo>
+                    <a:pt x="1450703" y="307009"/>
+                    <a:pt x="1450703" y="310383"/>
+                    <a:pt x="1450703" y="313757"/>
+                  </a:cubicBezTo>
+                  <a:cubicBezTo>
+                    <a:pt x="1396724" y="307009"/>
+                    <a:pt x="1339370" y="303636"/>
+                    <a:pt x="1282017" y="303636"/>
+                  </a:cubicBezTo>
+                  <a:cubicBezTo>
+                    <a:pt x="1224663" y="303636"/>
+                    <a:pt x="1170684" y="307009"/>
+                    <a:pt x="1113330" y="313757"/>
+                  </a:cubicBezTo>
+                  <a:cubicBezTo>
+                    <a:pt x="1113330" y="310383"/>
+                    <a:pt x="1113330" y="307009"/>
+                    <a:pt x="1113330" y="303636"/>
+                  </a:cubicBezTo>
+                  <a:close/>
+                  <a:moveTo>
+                    <a:pt x="1582279" y="340747"/>
+                  </a:moveTo>
+                  <a:cubicBezTo>
+                    <a:pt x="1582279" y="327252"/>
+                    <a:pt x="1585652" y="317130"/>
+                    <a:pt x="1585652" y="303636"/>
+                  </a:cubicBezTo>
+                  <a:cubicBezTo>
+                    <a:pt x="1585652" y="134949"/>
+                    <a:pt x="1450703" y="0"/>
+                    <a:pt x="1282017" y="0"/>
+                  </a:cubicBezTo>
+                  <a:cubicBezTo>
+                    <a:pt x="1113330" y="0"/>
+                    <a:pt x="978381" y="134949"/>
+                    <a:pt x="978381" y="303636"/>
+                  </a:cubicBezTo>
+                  <a:cubicBezTo>
+                    <a:pt x="978381" y="317130"/>
+                    <a:pt x="978381" y="327252"/>
+                    <a:pt x="981755" y="340747"/>
+                  </a:cubicBezTo>
+                  <a:cubicBezTo>
+                    <a:pt x="418342" y="475696"/>
+                    <a:pt x="0" y="981755"/>
+                    <a:pt x="0" y="1585652"/>
+                  </a:cubicBezTo>
+                  <a:lnTo>
+                    <a:pt x="2564034" y="1585652"/>
+                  </a:lnTo>
+                  <a:cubicBezTo>
+                    <a:pt x="2564034" y="981755"/>
+                    <a:pt x="2145691" y="475696"/>
+                    <a:pt x="1582279" y="340747"/>
+                  </a:cubicBezTo>
+                  <a:close/>
+                </a:path>
+              </a:pathLst>
+            </a:custGeom>
+            <a:solidFill>
+              <a:srgbClr val="000F86"/>
+            </a:solidFill>
+            <a:ln w="33734" cap="flat">
+              <a:noFill/>
+              <a:prstDash val="solid"/>
+              <a:miter/>
+            </a:ln>
+          </p:spPr>
+          <p:txBody>
+            <a:bodyPr rtlCol="0" anchor="ctr"/>
+            <a:lstStyle/>
+            <a:p>
+              <a:endParaRPr lang="en-GB"/>
+            </a:p>
+          </p:txBody>
+        </p:sp>
+        <p:sp>
+          <p:nvSpPr>
+            <p:cNvPr id="10" name="Freeform: Shape 9">
+              <a:extLst>
+                <a:ext uri="{FF2B5EF4-FFF2-40B4-BE49-F238E27FC236}">
+                  <a16:creationId xmlns:a16="http://schemas.microsoft.com/office/drawing/2014/main" id="{4B1D12C7-807F-4E1F-A45C-CD47AD470193}"/>
+                </a:ext>
+              </a:extLst>
+            </p:cNvPr>
+            <p:cNvSpPr/>
+            <p:nvPr/>
+          </p:nvSpPr>
+          <p:spPr>
+            <a:xfrm>
+              <a:off x="2114490" y="2916399"/>
+              <a:ext cx="2698982" cy="202423"/>
+            </a:xfrm>
+            <a:custGeom>
+              <a:avLst/>
+              <a:gdLst>
+                <a:gd name="connsiteX0" fmla="*/ 0 w 2698982"/>
+                <a:gd name="connsiteY0" fmla="*/ 0 h 202423"/>
+                <a:gd name="connsiteX1" fmla="*/ 0 w 2698982"/>
+                <a:gd name="connsiteY1" fmla="*/ 67475 h 202423"/>
+                <a:gd name="connsiteX2" fmla="*/ 134949 w 2698982"/>
+                <a:gd name="connsiteY2" fmla="*/ 202424 h 202423"/>
+                <a:gd name="connsiteX3" fmla="*/ 2564034 w 2698982"/>
+                <a:gd name="connsiteY3" fmla="*/ 202424 h 202423"/>
+                <a:gd name="connsiteX4" fmla="*/ 2698983 w 2698982"/>
+                <a:gd name="connsiteY4" fmla="*/ 67475 h 202423"/>
+                <a:gd name="connsiteX5" fmla="*/ 2698983 w 2698982"/>
+                <a:gd name="connsiteY5" fmla="*/ 0 h 202423"/>
+                <a:gd name="connsiteX6" fmla="*/ 0 w 2698982"/>
+                <a:gd name="connsiteY6" fmla="*/ 0 h 202423"/>
+              </a:gdLst>
+              <a:ahLst/>
+              <a:cxnLst>
+                <a:cxn ang="0">
+                  <a:pos x="connsiteX0" y="connsiteY0"/>
+                </a:cxn>
+                <a:cxn ang="0">
+                  <a:pos x="connsiteX1" y="connsiteY1"/>
+                </a:cxn>
+                <a:cxn ang="0">
+                  <a:pos x="connsiteX2" y="connsiteY2"/>
+                </a:cxn>
+                <a:cxn ang="0">
+                  <a:pos x="connsiteX3" y="connsiteY3"/>
+                </a:cxn>
+                <a:cxn ang="0">
+                  <a:pos x="connsiteX4" y="connsiteY4"/>
+                </a:cxn>
+                <a:cxn ang="0">
+                  <a:pos x="connsiteX5" y="connsiteY5"/>
+                </a:cxn>
+                <a:cxn ang="0">
+                  <a:pos x="connsiteX6" y="connsiteY6"/>
+                </a:cxn>
+              </a:cxnLst>
+              <a:rect l="l" t="t" r="r" b="b"/>
+              <a:pathLst>
+                <a:path w="2698982" h="202423">
+                  <a:moveTo>
+                    <a:pt x="0" y="0"/>
+                  </a:moveTo>
+                  <a:lnTo>
+                    <a:pt x="0" y="67475"/>
+                  </a:lnTo>
+                  <a:cubicBezTo>
+                    <a:pt x="0" y="141696"/>
+                    <a:pt x="60727" y="202424"/>
+                    <a:pt x="134949" y="202424"/>
+                  </a:cubicBezTo>
+                  <a:lnTo>
+                    <a:pt x="2564034" y="202424"/>
+                  </a:lnTo>
+                  <a:cubicBezTo>
+                    <a:pt x="2638255" y="202424"/>
+                    <a:pt x="2698983" y="141696"/>
+                    <a:pt x="2698983" y="67475"/>
+                  </a:cubicBezTo>
+                  <a:lnTo>
+                    <a:pt x="2698983" y="0"/>
+                  </a:lnTo>
+                  <a:lnTo>
+                    <a:pt x="0" y="0"/>
+                  </a:lnTo>
+                  <a:close/>
+                </a:path>
+              </a:pathLst>
+            </a:custGeom>
+            <a:solidFill>
+              <a:srgbClr val="000F86"/>
+            </a:solidFill>
+            <a:ln w="33734" cap="flat">
+              <a:noFill/>
+              <a:prstDash val="solid"/>
+              <a:miter/>
+            </a:ln>
+          </p:spPr>
+          <p:txBody>
+            <a:bodyPr rtlCol="0" anchor="ctr"/>
+            <a:lstStyle/>
+            <a:p>
+              <a:endParaRPr lang="en-GB"/>
+            </a:p>
+          </p:txBody>
+        </p:sp>
+        <p:sp>
+          <p:nvSpPr>
+            <p:cNvPr id="13" name="Freeform: Shape 12">
+              <a:extLst>
+                <a:ext uri="{FF2B5EF4-FFF2-40B4-BE49-F238E27FC236}">
+                  <a16:creationId xmlns:a16="http://schemas.microsoft.com/office/drawing/2014/main" id="{9F03423E-B0BF-4E1D-A0F3-DCB7A78A5FAE}"/>
+                </a:ext>
+              </a:extLst>
+            </p:cNvPr>
+            <p:cNvSpPr/>
+            <p:nvPr/>
+          </p:nvSpPr>
+          <p:spPr>
+            <a:xfrm>
+              <a:off x="3714114" y="2999443"/>
+              <a:ext cx="1019065" cy="1019065"/>
+            </a:xfrm>
+            <a:custGeom>
+              <a:avLst/>
+              <a:gdLst>
+                <a:gd name="connsiteX0" fmla="*/ 509533 w 1019065"/>
+                <a:gd name="connsiteY0" fmla="*/ 0 h 1019065"/>
+                <a:gd name="connsiteX1" fmla="*/ 0 w 1019065"/>
+                <a:gd name="connsiteY1" fmla="*/ 509533 h 1019065"/>
+                <a:gd name="connsiteX2" fmla="*/ 509533 w 1019065"/>
+                <a:gd name="connsiteY2" fmla="*/ 1019066 h 1019065"/>
+                <a:gd name="connsiteX3" fmla="*/ 1019066 w 1019065"/>
+                <a:gd name="connsiteY3" fmla="*/ 509533 h 1019065"/>
+                <a:gd name="connsiteX4" fmla="*/ 509533 w 1019065"/>
+                <a:gd name="connsiteY4" fmla="*/ 0 h 1019065"/>
+                <a:gd name="connsiteX5" fmla="*/ 565649 w 1019065"/>
+                <a:gd name="connsiteY5" fmla="*/ 907773 h 1019065"/>
+                <a:gd name="connsiteX6" fmla="*/ 596690 w 1019065"/>
+                <a:gd name="connsiteY6" fmla="*/ 690551 h 1019065"/>
+                <a:gd name="connsiteX7" fmla="*/ 422376 w 1019065"/>
+                <a:gd name="connsiteY7" fmla="*/ 690551 h 1019065"/>
+                <a:gd name="connsiteX8" fmla="*/ 453404 w 1019065"/>
+                <a:gd name="connsiteY8" fmla="*/ 907773 h 1019065"/>
+                <a:gd name="connsiteX9" fmla="*/ 111169 w 1019065"/>
+                <a:gd name="connsiteY9" fmla="*/ 453938 h 1019065"/>
+                <a:gd name="connsiteX10" fmla="*/ 122556 w 1019065"/>
+                <a:gd name="connsiteY10" fmla="*/ 399970 h 1019065"/>
+                <a:gd name="connsiteX11" fmla="*/ 309045 w 1019065"/>
+                <a:gd name="connsiteY11" fmla="*/ 522352 h 1019065"/>
+                <a:gd name="connsiteX12" fmla="*/ 308402 w 1019065"/>
+                <a:gd name="connsiteY12" fmla="*/ 509533 h 1019065"/>
+                <a:gd name="connsiteX13" fmla="*/ 376947 w 1019065"/>
+                <a:gd name="connsiteY13" fmla="*/ 358671 h 1019065"/>
+                <a:gd name="connsiteX14" fmla="*/ 169406 w 1019065"/>
+                <a:gd name="connsiteY14" fmla="*/ 295167 h 1019065"/>
+                <a:gd name="connsiteX15" fmla="*/ 723429 w 1019065"/>
+                <a:gd name="connsiteY15" fmla="*/ 168937 h 1019065"/>
+                <a:gd name="connsiteX16" fmla="*/ 849660 w 1019065"/>
+                <a:gd name="connsiteY16" fmla="*/ 295167 h 1019065"/>
+                <a:gd name="connsiteX17" fmla="*/ 642105 w 1019065"/>
+                <a:gd name="connsiteY17" fmla="*/ 358671 h 1019065"/>
+                <a:gd name="connsiteX18" fmla="*/ 710664 w 1019065"/>
+                <a:gd name="connsiteY18" fmla="*/ 509533 h 1019065"/>
+                <a:gd name="connsiteX19" fmla="*/ 710021 w 1019065"/>
+                <a:gd name="connsiteY19" fmla="*/ 522352 h 1019065"/>
+                <a:gd name="connsiteX20" fmla="*/ 896510 w 1019065"/>
+                <a:gd name="connsiteY20" fmla="*/ 399970 h 1019065"/>
+                <a:gd name="connsiteX21" fmla="*/ 619627 w 1019065"/>
+                <a:gd name="connsiteY21" fmla="*/ 896385 h 1019065"/>
+                <a:gd name="connsiteX22" fmla="*/ 565649 w 1019065"/>
+                <a:gd name="connsiteY22" fmla="*/ 907773 h 1019065"/>
+              </a:gdLst>
+              <a:ahLst/>
+              <a:cxnLst>
+                <a:cxn ang="0">
+                  <a:pos x="connsiteX0" y="connsiteY0"/>
+                </a:cxn>
+                <a:cxn ang="0">
+                  <a:pos x="connsiteX1" y="connsiteY1"/>
+                </a:cxn>
+                <a:cxn ang="0">
+                  <a:pos x="connsiteX2" y="connsiteY2"/>
+                </a:cxn>
+                <a:cxn ang="0">
+                  <a:pos x="connsiteX3" y="connsiteY3"/>
+                </a:cxn>
+                <a:cxn ang="0">
+                  <a:pos x="connsiteX4" y="connsiteY4"/>
+                </a:cxn>
+                <a:cxn ang="0">
+                  <a:pos x="connsiteX5" y="connsiteY5"/>
+                </a:cxn>
+                <a:cxn ang="0">
+                  <a:pos x="connsiteX6" y="connsiteY6"/>
+                </a:cxn>
+                <a:cxn ang="0">
+                  <a:pos x="connsiteX7" y="connsiteY7"/>
+                </a:cxn>
+                <a:cxn ang="0">
+                  <a:pos x="connsiteX8" y="connsiteY8"/>
+                </a:cxn>
+                <a:cxn ang="0">
+                  <a:pos x="connsiteX9" y="connsiteY9"/>
+                </a:cxn>
+                <a:cxn ang="0">
+                  <a:pos x="connsiteX10" y="connsiteY10"/>
+                </a:cxn>
+                <a:cxn ang="0">
+                  <a:pos x="connsiteX11" y="connsiteY11"/>
+                </a:cxn>
+                <a:cxn ang="0">
+                  <a:pos x="connsiteX12" y="connsiteY12"/>
+                </a:cxn>
+                <a:cxn ang="0">
+                  <a:pos x="connsiteX13" y="connsiteY13"/>
+                </a:cxn>
+                <a:cxn ang="0">
+                  <a:pos x="connsiteX14" y="connsiteY14"/>
+                </a:cxn>
+                <a:cxn ang="0">
+                  <a:pos x="connsiteX15" y="connsiteY15"/>
+                </a:cxn>
+                <a:cxn ang="0">
+                  <a:pos x="connsiteX16" y="connsiteY16"/>
+                </a:cxn>
+                <a:cxn ang="0">
+                  <a:pos x="connsiteX17" y="connsiteY17"/>
+                </a:cxn>
+                <a:cxn ang="0">
+                  <a:pos x="connsiteX18" y="connsiteY18"/>
+                </a:cxn>
+                <a:cxn ang="0">
+                  <a:pos x="connsiteX19" y="connsiteY19"/>
+                </a:cxn>
+                <a:cxn ang="0">
+                  <a:pos x="connsiteX20" y="connsiteY20"/>
+                </a:cxn>
+                <a:cxn ang="0">
+                  <a:pos x="connsiteX21" y="connsiteY21"/>
+                </a:cxn>
+                <a:cxn ang="0">
+                  <a:pos x="connsiteX22" y="connsiteY22"/>
+                </a:cxn>
+              </a:cxnLst>
+              <a:rect l="l" t="t" r="r" b="b"/>
+              <a:pathLst>
+                <a:path w="1019065" h="1019065">
+                  <a:moveTo>
+                    <a:pt x="509533" y="0"/>
+                  </a:moveTo>
+                  <a:cubicBezTo>
+                    <a:pt x="228126" y="0"/>
+                    <a:pt x="0" y="228126"/>
+                    <a:pt x="0" y="509533"/>
+                  </a:cubicBezTo>
+                  <a:cubicBezTo>
+                    <a:pt x="0" y="790940"/>
+                    <a:pt x="228126" y="1019066"/>
+                    <a:pt x="509533" y="1019066"/>
+                  </a:cubicBezTo>
+                  <a:cubicBezTo>
+                    <a:pt x="790940" y="1019066"/>
+                    <a:pt x="1019066" y="790940"/>
+                    <a:pt x="1019066" y="509533"/>
+                  </a:cubicBezTo>
+                  <a:cubicBezTo>
+                    <a:pt x="1019066" y="228126"/>
+                    <a:pt x="790940" y="0"/>
+                    <a:pt x="509533" y="0"/>
+                  </a:cubicBezTo>
+                  <a:close/>
+                  <a:moveTo>
+                    <a:pt x="565649" y="907773"/>
+                  </a:moveTo>
+                  <a:lnTo>
+                    <a:pt x="596690" y="690551"/>
+                  </a:lnTo>
+                  <a:cubicBezTo>
+                    <a:pt x="541693" y="717422"/>
+                    <a:pt x="477375" y="717422"/>
+                    <a:pt x="422376" y="690551"/>
+                  </a:cubicBezTo>
+                  <a:lnTo>
+                    <a:pt x="453404" y="907773"/>
+                  </a:lnTo>
+                  <a:cubicBezTo>
+                    <a:pt x="233575" y="876956"/>
+                    <a:pt x="80351" y="673766"/>
+                    <a:pt x="111169" y="453938"/>
+                  </a:cubicBezTo>
+                  <a:cubicBezTo>
+                    <a:pt x="113725" y="435708"/>
+                    <a:pt x="117529" y="417678"/>
+                    <a:pt x="122556" y="399970"/>
+                  </a:cubicBezTo>
+                  <a:lnTo>
+                    <a:pt x="309045" y="522352"/>
+                  </a:lnTo>
+                  <a:cubicBezTo>
+                    <a:pt x="308777" y="518088"/>
+                    <a:pt x="308402" y="513864"/>
+                    <a:pt x="308402" y="509533"/>
+                  </a:cubicBezTo>
+                  <a:cubicBezTo>
+                    <a:pt x="308432" y="451716"/>
+                    <a:pt x="333418" y="396725"/>
+                    <a:pt x="376947" y="358671"/>
+                  </a:cubicBezTo>
+                  <a:lnTo>
+                    <a:pt x="169406" y="295167"/>
+                  </a:lnTo>
+                  <a:cubicBezTo>
+                    <a:pt x="287539" y="107320"/>
+                    <a:pt x="535583" y="50806"/>
+                    <a:pt x="723429" y="168937"/>
+                  </a:cubicBezTo>
+                  <a:cubicBezTo>
+                    <a:pt x="774439" y="201016"/>
+                    <a:pt x="817580" y="244157"/>
+                    <a:pt x="849660" y="295167"/>
+                  </a:cubicBezTo>
+                  <a:lnTo>
+                    <a:pt x="642105" y="358671"/>
+                  </a:lnTo>
+                  <a:cubicBezTo>
+                    <a:pt x="685642" y="396721"/>
+                    <a:pt x="710634" y="451713"/>
+                    <a:pt x="710664" y="509533"/>
+                  </a:cubicBezTo>
+                  <a:cubicBezTo>
+                    <a:pt x="710664" y="513864"/>
+                    <a:pt x="710289" y="518088"/>
+                    <a:pt x="710021" y="522352"/>
+                  </a:cubicBezTo>
+                  <a:lnTo>
+                    <a:pt x="896510" y="399970"/>
+                  </a:lnTo>
+                  <a:cubicBezTo>
+                    <a:pt x="957132" y="613510"/>
+                    <a:pt x="833167" y="835763"/>
+                    <a:pt x="619627" y="896385"/>
+                  </a:cubicBezTo>
+                  <a:cubicBezTo>
+                    <a:pt x="601917" y="901412"/>
+                    <a:pt x="583881" y="905217"/>
+                    <a:pt x="565649" y="907773"/>
+                  </a:cubicBezTo>
+                  <a:close/>
+                </a:path>
+              </a:pathLst>
+            </a:custGeom>
+            <a:solidFill>
+              <a:srgbClr val="000F86"/>
+            </a:solidFill>
+            <a:ln w="13395" cap="flat">
+              <a:noFill/>
+              <a:prstDash val="solid"/>
+              <a:miter/>
+            </a:ln>
+          </p:spPr>
+          <p:txBody>
+            <a:bodyPr rtlCol="0" anchor="ctr"/>
+            <a:lstStyle/>
+            <a:p>
+              <a:endParaRPr lang="en-GB"/>
+            </a:p>
+          </p:txBody>
+        </p:sp>
+        <p:sp>
+          <p:nvSpPr>
+            <p:cNvPr id="14" name="Freeform: Shape 13">
+              <a:extLst>
+                <a:ext uri="{FF2B5EF4-FFF2-40B4-BE49-F238E27FC236}">
+                  <a16:creationId xmlns:a16="http://schemas.microsoft.com/office/drawing/2014/main" id="{E73D1810-C831-4EFE-B448-618658A9C856}"/>
+                </a:ext>
+              </a:extLst>
+            </p:cNvPr>
+            <p:cNvSpPr/>
+            <p:nvPr/>
+          </p:nvSpPr>
+          <p:spPr>
+            <a:xfrm>
+              <a:off x="4076150" y="3361480"/>
+              <a:ext cx="294992" cy="294992"/>
+            </a:xfrm>
+            <a:custGeom>
+              <a:avLst/>
+              <a:gdLst>
+                <a:gd name="connsiteX0" fmla="*/ 147496 w 294992"/>
+                <a:gd name="connsiteY0" fmla="*/ 0 h 294992"/>
+                <a:gd name="connsiteX1" fmla="*/ 0 w 294992"/>
+                <a:gd name="connsiteY1" fmla="*/ 147496 h 294992"/>
+                <a:gd name="connsiteX2" fmla="*/ 147496 w 294992"/>
+                <a:gd name="connsiteY2" fmla="*/ 294993 h 294992"/>
+                <a:gd name="connsiteX3" fmla="*/ 294993 w 294992"/>
+                <a:gd name="connsiteY3" fmla="*/ 147496 h 294992"/>
+                <a:gd name="connsiteX4" fmla="*/ 147496 w 294992"/>
+                <a:gd name="connsiteY4" fmla="*/ 0 h 294992"/>
+                <a:gd name="connsiteX5" fmla="*/ 147496 w 294992"/>
+                <a:gd name="connsiteY5" fmla="*/ 214540 h 294992"/>
+                <a:gd name="connsiteX6" fmla="*/ 80453 w 294992"/>
+                <a:gd name="connsiteY6" fmla="*/ 147496 h 294992"/>
+                <a:gd name="connsiteX7" fmla="*/ 147496 w 294992"/>
+                <a:gd name="connsiteY7" fmla="*/ 80453 h 294992"/>
+                <a:gd name="connsiteX8" fmla="*/ 214540 w 294992"/>
+                <a:gd name="connsiteY8" fmla="*/ 147496 h 294992"/>
+                <a:gd name="connsiteX9" fmla="*/ 147496 w 294992"/>
+                <a:gd name="connsiteY9" fmla="*/ 214540 h 294992"/>
+              </a:gdLst>
+              <a:ahLst/>
+              <a:cxnLst>
+                <a:cxn ang="0">
+                  <a:pos x="connsiteX0" y="connsiteY0"/>
+                </a:cxn>
+                <a:cxn ang="0">
+                  <a:pos x="connsiteX1" y="connsiteY1"/>
+                </a:cxn>
+                <a:cxn ang="0">
+                  <a:pos x="connsiteX2" y="connsiteY2"/>
+                </a:cxn>
+                <a:cxn ang="0">
+                  <a:pos x="connsiteX3" y="connsiteY3"/>
+                </a:cxn>
+                <a:cxn ang="0">
+                  <a:pos x="connsiteX4" y="connsiteY4"/>
+                </a:cxn>
+                <a:cxn ang="0">
+                  <a:pos x="connsiteX5" y="connsiteY5"/>
+                </a:cxn>
+                <a:cxn ang="0">
+                  <a:pos x="connsiteX6" y="connsiteY6"/>
+                </a:cxn>
+                <a:cxn ang="0">
+                  <a:pos x="connsiteX7" y="connsiteY7"/>
+                </a:cxn>
+                <a:cxn ang="0">
+                  <a:pos x="connsiteX8" y="connsiteY8"/>
+                </a:cxn>
+                <a:cxn ang="0">
+                  <a:pos x="connsiteX9" y="connsiteY9"/>
+                </a:cxn>
+              </a:cxnLst>
+              <a:rect l="l" t="t" r="r" b="b"/>
+              <a:pathLst>
+                <a:path w="294992" h="294992">
+                  <a:moveTo>
+                    <a:pt x="147496" y="0"/>
+                  </a:moveTo>
+                  <a:cubicBezTo>
+                    <a:pt x="66037" y="0"/>
+                    <a:pt x="0" y="66037"/>
+                    <a:pt x="0" y="147496"/>
+                  </a:cubicBezTo>
+                  <a:cubicBezTo>
+                    <a:pt x="0" y="228956"/>
+                    <a:pt x="66037" y="294993"/>
+                    <a:pt x="147496" y="294993"/>
+                  </a:cubicBezTo>
+                  <a:cubicBezTo>
+                    <a:pt x="228956" y="294993"/>
+                    <a:pt x="294993" y="228956"/>
+                    <a:pt x="294993" y="147496"/>
+                  </a:cubicBezTo>
+                  <a:cubicBezTo>
+                    <a:pt x="294904" y="66073"/>
+                    <a:pt x="228920" y="88"/>
+                    <a:pt x="147496" y="0"/>
+                  </a:cubicBezTo>
+                  <a:close/>
+                  <a:moveTo>
+                    <a:pt x="147496" y="214540"/>
+                  </a:moveTo>
+                  <a:cubicBezTo>
+                    <a:pt x="110469" y="214540"/>
+                    <a:pt x="80453" y="184523"/>
+                    <a:pt x="80453" y="147496"/>
+                  </a:cubicBezTo>
+                  <a:cubicBezTo>
+                    <a:pt x="80453" y="110469"/>
+                    <a:pt x="110469" y="80453"/>
+                    <a:pt x="147496" y="80453"/>
+                  </a:cubicBezTo>
+                  <a:cubicBezTo>
+                    <a:pt x="184523" y="80453"/>
+                    <a:pt x="214540" y="110469"/>
+                    <a:pt x="214540" y="147496"/>
+                  </a:cubicBezTo>
+                  <a:cubicBezTo>
+                    <a:pt x="214496" y="184506"/>
+                    <a:pt x="184506" y="214496"/>
+                    <a:pt x="147496" y="214540"/>
+                  </a:cubicBezTo>
+                  <a:close/>
+                </a:path>
+              </a:pathLst>
+            </a:custGeom>
+            <a:solidFill>
+              <a:srgbClr val="000F86"/>
+            </a:solidFill>
+            <a:ln w="13395" cap="flat">
+              <a:noFill/>
+              <a:prstDash val="solid"/>
+              <a:miter/>
+            </a:ln>
+          </p:spPr>
+          <p:txBody>
+            <a:bodyPr rtlCol="0" anchor="ctr"/>
+            <a:lstStyle/>
+            <a:p>
+              <a:endParaRPr lang="en-GB"/>
+            </a:p>
+          </p:txBody>
+        </p:sp>
+        <p:sp>
+          <p:nvSpPr>
+            <p:cNvPr id="16" name="Freeform: Shape 15">
+              <a:extLst>
+                <a:ext uri="{FF2B5EF4-FFF2-40B4-BE49-F238E27FC236}">
+                  <a16:creationId xmlns:a16="http://schemas.microsoft.com/office/drawing/2014/main" id="{415D6596-6273-4BEB-AFFF-3A70A3DCD85A}"/>
+                </a:ext>
+              </a:extLst>
+            </p:cNvPr>
+            <p:cNvSpPr/>
+            <p:nvPr/>
+          </p:nvSpPr>
+          <p:spPr>
+            <a:xfrm>
+              <a:off x="2219901" y="2999461"/>
+              <a:ext cx="1019065" cy="1019065"/>
+            </a:xfrm>
+            <a:custGeom>
+              <a:avLst/>
+              <a:gdLst>
+                <a:gd name="connsiteX0" fmla="*/ 509533 w 1019065"/>
+                <a:gd name="connsiteY0" fmla="*/ 0 h 1019065"/>
+                <a:gd name="connsiteX1" fmla="*/ 0 w 1019065"/>
+                <a:gd name="connsiteY1" fmla="*/ 509533 h 1019065"/>
+                <a:gd name="connsiteX2" fmla="*/ 509533 w 1019065"/>
+                <a:gd name="connsiteY2" fmla="*/ 1019066 h 1019065"/>
+                <a:gd name="connsiteX3" fmla="*/ 1019066 w 1019065"/>
+                <a:gd name="connsiteY3" fmla="*/ 509533 h 1019065"/>
+                <a:gd name="connsiteX4" fmla="*/ 509533 w 1019065"/>
+                <a:gd name="connsiteY4" fmla="*/ 0 h 1019065"/>
+                <a:gd name="connsiteX5" fmla="*/ 565649 w 1019065"/>
+                <a:gd name="connsiteY5" fmla="*/ 907773 h 1019065"/>
+                <a:gd name="connsiteX6" fmla="*/ 596690 w 1019065"/>
+                <a:gd name="connsiteY6" fmla="*/ 690551 h 1019065"/>
+                <a:gd name="connsiteX7" fmla="*/ 422376 w 1019065"/>
+                <a:gd name="connsiteY7" fmla="*/ 690551 h 1019065"/>
+                <a:gd name="connsiteX8" fmla="*/ 453404 w 1019065"/>
+                <a:gd name="connsiteY8" fmla="*/ 907773 h 1019065"/>
+                <a:gd name="connsiteX9" fmla="*/ 111169 w 1019065"/>
+                <a:gd name="connsiteY9" fmla="*/ 453938 h 1019065"/>
+                <a:gd name="connsiteX10" fmla="*/ 122556 w 1019065"/>
+                <a:gd name="connsiteY10" fmla="*/ 399970 h 1019065"/>
+                <a:gd name="connsiteX11" fmla="*/ 309045 w 1019065"/>
+                <a:gd name="connsiteY11" fmla="*/ 522352 h 1019065"/>
+                <a:gd name="connsiteX12" fmla="*/ 308402 w 1019065"/>
+                <a:gd name="connsiteY12" fmla="*/ 509533 h 1019065"/>
+                <a:gd name="connsiteX13" fmla="*/ 376947 w 1019065"/>
+                <a:gd name="connsiteY13" fmla="*/ 358671 h 1019065"/>
+                <a:gd name="connsiteX14" fmla="*/ 169406 w 1019065"/>
+                <a:gd name="connsiteY14" fmla="*/ 295167 h 1019065"/>
+                <a:gd name="connsiteX15" fmla="*/ 723429 w 1019065"/>
+                <a:gd name="connsiteY15" fmla="*/ 168937 h 1019065"/>
+                <a:gd name="connsiteX16" fmla="*/ 849660 w 1019065"/>
+                <a:gd name="connsiteY16" fmla="*/ 295167 h 1019065"/>
+                <a:gd name="connsiteX17" fmla="*/ 642105 w 1019065"/>
+                <a:gd name="connsiteY17" fmla="*/ 358671 h 1019065"/>
+                <a:gd name="connsiteX18" fmla="*/ 710664 w 1019065"/>
+                <a:gd name="connsiteY18" fmla="*/ 509533 h 1019065"/>
+                <a:gd name="connsiteX19" fmla="*/ 710021 w 1019065"/>
+                <a:gd name="connsiteY19" fmla="*/ 522352 h 1019065"/>
+                <a:gd name="connsiteX20" fmla="*/ 896510 w 1019065"/>
+                <a:gd name="connsiteY20" fmla="*/ 399970 h 1019065"/>
+                <a:gd name="connsiteX21" fmla="*/ 619627 w 1019065"/>
+                <a:gd name="connsiteY21" fmla="*/ 896385 h 1019065"/>
+                <a:gd name="connsiteX22" fmla="*/ 565649 w 1019065"/>
+                <a:gd name="connsiteY22" fmla="*/ 907773 h 1019065"/>
+              </a:gdLst>
+              <a:ahLst/>
+              <a:cxnLst>
+                <a:cxn ang="0">
+                  <a:pos x="connsiteX0" y="connsiteY0"/>
+                </a:cxn>
+                <a:cxn ang="0">
+                  <a:pos x="connsiteX1" y="connsiteY1"/>
+                </a:cxn>
+                <a:cxn ang="0">
+                  <a:pos x="connsiteX2" y="connsiteY2"/>
+                </a:cxn>
+                <a:cxn ang="0">
+                  <a:pos x="connsiteX3" y="connsiteY3"/>
+                </a:cxn>
+                <a:cxn ang="0">
+                  <a:pos x="connsiteX4" y="connsiteY4"/>
+                </a:cxn>
+                <a:cxn ang="0">
+                  <a:pos x="connsiteX5" y="connsiteY5"/>
+                </a:cxn>
+                <a:cxn ang="0">
+                  <a:pos x="connsiteX6" y="connsiteY6"/>
+                </a:cxn>
+                <a:cxn ang="0">
+                  <a:pos x="connsiteX7" y="connsiteY7"/>
+                </a:cxn>
+                <a:cxn ang="0">
+                  <a:pos x="connsiteX8" y="connsiteY8"/>
+                </a:cxn>
+                <a:cxn ang="0">
+                  <a:pos x="connsiteX9" y="connsiteY9"/>
+                </a:cxn>
+                <a:cxn ang="0">
+                  <a:pos x="connsiteX10" y="connsiteY10"/>
+                </a:cxn>
+                <a:cxn ang="0">
+                  <a:pos x="connsiteX11" y="connsiteY11"/>
+                </a:cxn>
+                <a:cxn ang="0">
+                  <a:pos x="connsiteX12" y="connsiteY12"/>
+                </a:cxn>
+                <a:cxn ang="0">
+                  <a:pos x="connsiteX13" y="connsiteY13"/>
+                </a:cxn>
+                <a:cxn ang="0">
+                  <a:pos x="connsiteX14" y="connsiteY14"/>
+                </a:cxn>
+                <a:cxn ang="0">
+                  <a:pos x="connsiteX15" y="connsiteY15"/>
+                </a:cxn>
+                <a:cxn ang="0">
+                  <a:pos x="connsiteX16" y="connsiteY16"/>
+                </a:cxn>
+                <a:cxn ang="0">
+                  <a:pos x="connsiteX17" y="connsiteY17"/>
+                </a:cxn>
+                <a:cxn ang="0">
+                  <a:pos x="connsiteX18" y="connsiteY18"/>
+                </a:cxn>
+                <a:cxn ang="0">
+                  <a:pos x="connsiteX19" y="connsiteY19"/>
+                </a:cxn>
+                <a:cxn ang="0">
+                  <a:pos x="connsiteX20" y="connsiteY20"/>
+                </a:cxn>
+                <a:cxn ang="0">
+                  <a:pos x="connsiteX21" y="connsiteY21"/>
+                </a:cxn>
+                <a:cxn ang="0">
+                  <a:pos x="connsiteX22" y="connsiteY22"/>
+                </a:cxn>
+              </a:cxnLst>
+              <a:rect l="l" t="t" r="r" b="b"/>
+              <a:pathLst>
+                <a:path w="1019065" h="1019065">
+                  <a:moveTo>
+                    <a:pt x="509533" y="0"/>
+                  </a:moveTo>
+                  <a:cubicBezTo>
+                    <a:pt x="228126" y="0"/>
+                    <a:pt x="0" y="228126"/>
+                    <a:pt x="0" y="509533"/>
+                  </a:cubicBezTo>
+                  <a:cubicBezTo>
+                    <a:pt x="0" y="790940"/>
+                    <a:pt x="228126" y="1019066"/>
+                    <a:pt x="509533" y="1019066"/>
+                  </a:cubicBezTo>
+                  <a:cubicBezTo>
+                    <a:pt x="790940" y="1019066"/>
+                    <a:pt x="1019066" y="790940"/>
+                    <a:pt x="1019066" y="509533"/>
+                  </a:cubicBezTo>
+                  <a:cubicBezTo>
+                    <a:pt x="1019066" y="228126"/>
+                    <a:pt x="790940" y="0"/>
+                    <a:pt x="509533" y="0"/>
+                  </a:cubicBezTo>
+                  <a:close/>
+                  <a:moveTo>
+                    <a:pt x="565649" y="907773"/>
+                  </a:moveTo>
+                  <a:lnTo>
+                    <a:pt x="596690" y="690551"/>
+                  </a:lnTo>
+                  <a:cubicBezTo>
+                    <a:pt x="541693" y="717422"/>
+                    <a:pt x="477375" y="717422"/>
+                    <a:pt x="422376" y="690551"/>
+                  </a:cubicBezTo>
+                  <a:lnTo>
+                    <a:pt x="453404" y="907773"/>
+                  </a:lnTo>
+                  <a:cubicBezTo>
+                    <a:pt x="233575" y="876956"/>
+                    <a:pt x="80351" y="673766"/>
+                    <a:pt x="111169" y="453938"/>
+                  </a:cubicBezTo>
+                  <a:cubicBezTo>
+                    <a:pt x="113725" y="435708"/>
+                    <a:pt x="117529" y="417678"/>
+                    <a:pt x="122556" y="399970"/>
+                  </a:cubicBezTo>
+                  <a:lnTo>
+                    <a:pt x="309045" y="522352"/>
+                  </a:lnTo>
+                  <a:cubicBezTo>
+                    <a:pt x="308777" y="518088"/>
+                    <a:pt x="308402" y="513864"/>
+                    <a:pt x="308402" y="509533"/>
+                  </a:cubicBezTo>
+                  <a:cubicBezTo>
+                    <a:pt x="308432" y="451716"/>
+                    <a:pt x="333418" y="396725"/>
+                    <a:pt x="376947" y="358671"/>
+                  </a:cubicBezTo>
+                  <a:lnTo>
+                    <a:pt x="169406" y="295167"/>
+                  </a:lnTo>
+                  <a:cubicBezTo>
+                    <a:pt x="287539" y="107320"/>
+                    <a:pt x="535583" y="50806"/>
+                    <a:pt x="723429" y="168937"/>
+                  </a:cubicBezTo>
+                  <a:cubicBezTo>
+                    <a:pt x="774439" y="201016"/>
+                    <a:pt x="817580" y="244157"/>
+                    <a:pt x="849660" y="295167"/>
+                  </a:cubicBezTo>
+                  <a:lnTo>
+                    <a:pt x="642105" y="358671"/>
+                  </a:lnTo>
+                  <a:cubicBezTo>
+                    <a:pt x="685642" y="396721"/>
+                    <a:pt x="710634" y="451713"/>
+                    <a:pt x="710664" y="509533"/>
+                  </a:cubicBezTo>
+                  <a:cubicBezTo>
+                    <a:pt x="710664" y="513864"/>
+                    <a:pt x="710289" y="518088"/>
+                    <a:pt x="710021" y="522352"/>
+                  </a:cubicBezTo>
+                  <a:lnTo>
+                    <a:pt x="896510" y="399970"/>
+                  </a:lnTo>
+                  <a:cubicBezTo>
+                    <a:pt x="957132" y="613510"/>
+                    <a:pt x="833167" y="835763"/>
+                    <a:pt x="619627" y="896385"/>
+                  </a:cubicBezTo>
+                  <a:cubicBezTo>
+                    <a:pt x="601917" y="901412"/>
+                    <a:pt x="583881" y="905217"/>
+                    <a:pt x="565649" y="907773"/>
+                  </a:cubicBezTo>
+                  <a:close/>
+                </a:path>
+              </a:pathLst>
+            </a:custGeom>
+            <a:solidFill>
+              <a:srgbClr val="000F86"/>
+            </a:solidFill>
+            <a:ln w="13395" cap="flat">
+              <a:noFill/>
+              <a:prstDash val="solid"/>
+              <a:miter/>
+            </a:ln>
+          </p:spPr>
+          <p:txBody>
+            <a:bodyPr rtlCol="0" anchor="ctr"/>
+            <a:lstStyle/>
+            <a:p>
+              <a:endParaRPr lang="en-GB"/>
+            </a:p>
+          </p:txBody>
+        </p:sp>
+        <p:sp>
+          <p:nvSpPr>
+            <p:cNvPr id="17" name="Freeform: Shape 16">
+              <a:extLst>
+                <a:ext uri="{FF2B5EF4-FFF2-40B4-BE49-F238E27FC236}">
+                  <a16:creationId xmlns:a16="http://schemas.microsoft.com/office/drawing/2014/main" id="{3D2564B6-5DB2-4AA1-828B-C4E241C54CE4}"/>
+                </a:ext>
+              </a:extLst>
+            </p:cNvPr>
+            <p:cNvSpPr/>
+            <p:nvPr/>
+          </p:nvSpPr>
+          <p:spPr>
+            <a:xfrm>
+              <a:off x="2581937" y="3361498"/>
+              <a:ext cx="294992" cy="294992"/>
+            </a:xfrm>
+            <a:custGeom>
+              <a:avLst/>
+              <a:gdLst>
+                <a:gd name="connsiteX0" fmla="*/ 147496 w 294992"/>
+                <a:gd name="connsiteY0" fmla="*/ 0 h 294992"/>
+                <a:gd name="connsiteX1" fmla="*/ 0 w 294992"/>
+                <a:gd name="connsiteY1" fmla="*/ 147496 h 294992"/>
+                <a:gd name="connsiteX2" fmla="*/ 147496 w 294992"/>
+                <a:gd name="connsiteY2" fmla="*/ 294993 h 294992"/>
+                <a:gd name="connsiteX3" fmla="*/ 294993 w 294992"/>
+                <a:gd name="connsiteY3" fmla="*/ 147496 h 294992"/>
+                <a:gd name="connsiteX4" fmla="*/ 147496 w 294992"/>
+                <a:gd name="connsiteY4" fmla="*/ 0 h 294992"/>
+                <a:gd name="connsiteX5" fmla="*/ 147496 w 294992"/>
+                <a:gd name="connsiteY5" fmla="*/ 214540 h 294992"/>
+                <a:gd name="connsiteX6" fmla="*/ 80453 w 294992"/>
+                <a:gd name="connsiteY6" fmla="*/ 147496 h 294992"/>
+                <a:gd name="connsiteX7" fmla="*/ 147496 w 294992"/>
+                <a:gd name="connsiteY7" fmla="*/ 80453 h 294992"/>
+                <a:gd name="connsiteX8" fmla="*/ 214540 w 294992"/>
+                <a:gd name="connsiteY8" fmla="*/ 147496 h 294992"/>
+                <a:gd name="connsiteX9" fmla="*/ 147496 w 294992"/>
+                <a:gd name="connsiteY9" fmla="*/ 214540 h 294992"/>
+              </a:gdLst>
+              <a:ahLst/>
+              <a:cxnLst>
+                <a:cxn ang="0">
+                  <a:pos x="connsiteX0" y="connsiteY0"/>
+                </a:cxn>
+                <a:cxn ang="0">
+                  <a:pos x="connsiteX1" y="connsiteY1"/>
+                </a:cxn>
+                <a:cxn ang="0">
+                  <a:pos x="connsiteX2" y="connsiteY2"/>
+                </a:cxn>
+                <a:cxn ang="0">
+                  <a:pos x="connsiteX3" y="connsiteY3"/>
+                </a:cxn>
+                <a:cxn ang="0">
+                  <a:pos x="connsiteX4" y="connsiteY4"/>
+                </a:cxn>
+                <a:cxn ang="0">
+                  <a:pos x="connsiteX5" y="connsiteY5"/>
+                </a:cxn>
+                <a:cxn ang="0">
+                  <a:pos x="connsiteX6" y="connsiteY6"/>
+                </a:cxn>
+                <a:cxn ang="0">
+                  <a:pos x="connsiteX7" y="connsiteY7"/>
+                </a:cxn>
+                <a:cxn ang="0">
+                  <a:pos x="connsiteX8" y="connsiteY8"/>
+                </a:cxn>
+                <a:cxn ang="0">
+                  <a:pos x="connsiteX9" y="connsiteY9"/>
+                </a:cxn>
+              </a:cxnLst>
+              <a:rect l="l" t="t" r="r" b="b"/>
+              <a:pathLst>
+                <a:path w="294992" h="294992">
+                  <a:moveTo>
+                    <a:pt x="147496" y="0"/>
+                  </a:moveTo>
+                  <a:cubicBezTo>
+                    <a:pt x="66037" y="0"/>
+                    <a:pt x="0" y="66037"/>
+                    <a:pt x="0" y="147496"/>
+                  </a:cubicBezTo>
+                  <a:cubicBezTo>
+                    <a:pt x="0" y="228956"/>
+                    <a:pt x="66037" y="294993"/>
+                    <a:pt x="147496" y="294993"/>
+                  </a:cubicBezTo>
+                  <a:cubicBezTo>
+                    <a:pt x="228956" y="294993"/>
+                    <a:pt x="294993" y="228956"/>
+                    <a:pt x="294993" y="147496"/>
+                  </a:cubicBezTo>
+                  <a:cubicBezTo>
+                    <a:pt x="294904" y="66073"/>
+                    <a:pt x="228920" y="88"/>
+                    <a:pt x="147496" y="0"/>
+                  </a:cubicBezTo>
+                  <a:close/>
+                  <a:moveTo>
+                    <a:pt x="147496" y="214540"/>
+                  </a:moveTo>
+                  <a:cubicBezTo>
+                    <a:pt x="110469" y="214540"/>
+                    <a:pt x="80453" y="184523"/>
+                    <a:pt x="80453" y="147496"/>
+                  </a:cubicBezTo>
+                  <a:cubicBezTo>
+                    <a:pt x="80453" y="110469"/>
+                    <a:pt x="110469" y="80453"/>
+                    <a:pt x="147496" y="80453"/>
+                  </a:cubicBezTo>
+                  <a:cubicBezTo>
+                    <a:pt x="184523" y="80453"/>
+                    <a:pt x="214540" y="110469"/>
+                    <a:pt x="214540" y="147496"/>
+                  </a:cubicBezTo>
+                  <a:cubicBezTo>
+                    <a:pt x="214496" y="184506"/>
+                    <a:pt x="184506" y="214496"/>
+                    <a:pt x="147496" y="214540"/>
+                  </a:cubicBezTo>
+                  <a:close/>
+                </a:path>
+              </a:pathLst>
+            </a:custGeom>
+            <a:solidFill>
+              <a:srgbClr val="000F86"/>
+            </a:solidFill>
+            <a:ln w="13395" cap="flat">
+              <a:noFill/>
+              <a:prstDash val="solid"/>
+              <a:miter/>
+            </a:ln>
+          </p:spPr>
+          <p:txBody>
+            <a:bodyPr rtlCol="0" anchor="ctr"/>
+            <a:lstStyle/>
+            <a:p>
+              <a:endParaRPr lang="en-GB"/>
+            </a:p>
+          </p:txBody>
+        </p:sp>
+      </p:grpSp>
+    </p:spTree>
+    <p:extLst>
+      <p:ext uri="{BB962C8B-B14F-4D97-AF65-F5344CB8AC3E}">
+        <p14:creationId xmlns:p14="http://schemas.microsoft.com/office/powerpoint/2010/main" val="2831570447"/>
+      </p:ext>
+    </p:extLst>
+  </p:cSld>
+  <p:clrMapOvr>
+    <a:masterClrMapping/>
+  </p:clrMapOvr>
+</p:sld>
+</file>
+
 <file path=ppt/theme/theme1.xml><?xml version="1.0" encoding="utf-8"?>
 <a:theme xmlns:a="http://schemas.openxmlformats.org/drawingml/2006/main" name="Office Theme">
   <a:themeElements>

</xml_diff>

<commit_message>
VRRM-204 Adding Sandbox logo
</commit_message>
<xml_diff>
--- a/HelpMyStreetFE/HelpMyStreetFE/src/pptx/Icons.pptx
+++ b/HelpMyStreetFE/HelpMyStreetFE/src/pptx/Icons.pptx
@@ -9,6 +9,7 @@
     <p:sldId id="257" r:id="rId3"/>
     <p:sldId id="258" r:id="rId4"/>
     <p:sldId id="259" r:id="rId5"/>
+    <p:sldId id="260" r:id="rId6"/>
   </p:sldIdLst>
   <p:sldSz cx="12192000" cy="6858000"/>
   <p:notesSz cx="6858000" cy="9144000"/>
@@ -264,7 +265,7 @@
           <a:p>
             <a:fld id="{B2EC5630-BBBD-40F6-B459-AD74AAD6AD00}" type="datetimeFigureOut">
               <a:rPr lang="en-GB" smtClean="0"/>
-              <a:t>26/01/2021</a:t>
+              <a:t>25/02/2021</a:t>
             </a:fld>
             <a:endParaRPr lang="en-GB"/>
           </a:p>
@@ -464,7 +465,7 @@
           <a:p>
             <a:fld id="{B2EC5630-BBBD-40F6-B459-AD74AAD6AD00}" type="datetimeFigureOut">
               <a:rPr lang="en-GB" smtClean="0"/>
-              <a:t>26/01/2021</a:t>
+              <a:t>25/02/2021</a:t>
             </a:fld>
             <a:endParaRPr lang="en-GB"/>
           </a:p>
@@ -674,7 +675,7 @@
           <a:p>
             <a:fld id="{B2EC5630-BBBD-40F6-B459-AD74AAD6AD00}" type="datetimeFigureOut">
               <a:rPr lang="en-GB" smtClean="0"/>
-              <a:t>26/01/2021</a:t>
+              <a:t>25/02/2021</a:t>
             </a:fld>
             <a:endParaRPr lang="en-GB"/>
           </a:p>
@@ -874,7 +875,7 @@
           <a:p>
             <a:fld id="{B2EC5630-BBBD-40F6-B459-AD74AAD6AD00}" type="datetimeFigureOut">
               <a:rPr lang="en-GB" smtClean="0"/>
-              <a:t>26/01/2021</a:t>
+              <a:t>25/02/2021</a:t>
             </a:fld>
             <a:endParaRPr lang="en-GB"/>
           </a:p>
@@ -1150,7 +1151,7 @@
           <a:p>
             <a:fld id="{B2EC5630-BBBD-40F6-B459-AD74AAD6AD00}" type="datetimeFigureOut">
               <a:rPr lang="en-GB" smtClean="0"/>
-              <a:t>26/01/2021</a:t>
+              <a:t>25/02/2021</a:t>
             </a:fld>
             <a:endParaRPr lang="en-GB"/>
           </a:p>
@@ -1418,7 +1419,7 @@
           <a:p>
             <a:fld id="{B2EC5630-BBBD-40F6-B459-AD74AAD6AD00}" type="datetimeFigureOut">
               <a:rPr lang="en-GB" smtClean="0"/>
-              <a:t>26/01/2021</a:t>
+              <a:t>25/02/2021</a:t>
             </a:fld>
             <a:endParaRPr lang="en-GB"/>
           </a:p>
@@ -1833,7 +1834,7 @@
           <a:p>
             <a:fld id="{B2EC5630-BBBD-40F6-B459-AD74AAD6AD00}" type="datetimeFigureOut">
               <a:rPr lang="en-GB" smtClean="0"/>
-              <a:t>26/01/2021</a:t>
+              <a:t>25/02/2021</a:t>
             </a:fld>
             <a:endParaRPr lang="en-GB"/>
           </a:p>
@@ -1975,7 +1976,7 @@
           <a:p>
             <a:fld id="{B2EC5630-BBBD-40F6-B459-AD74AAD6AD00}" type="datetimeFigureOut">
               <a:rPr lang="en-GB" smtClean="0"/>
-              <a:t>26/01/2021</a:t>
+              <a:t>25/02/2021</a:t>
             </a:fld>
             <a:endParaRPr lang="en-GB"/>
           </a:p>
@@ -2088,7 +2089,7 @@
           <a:p>
             <a:fld id="{B2EC5630-BBBD-40F6-B459-AD74AAD6AD00}" type="datetimeFigureOut">
               <a:rPr lang="en-GB" smtClean="0"/>
-              <a:t>26/01/2021</a:t>
+              <a:t>25/02/2021</a:t>
             </a:fld>
             <a:endParaRPr lang="en-GB"/>
           </a:p>
@@ -2401,7 +2402,7 @@
           <a:p>
             <a:fld id="{B2EC5630-BBBD-40F6-B459-AD74AAD6AD00}" type="datetimeFigureOut">
               <a:rPr lang="en-GB" smtClean="0"/>
-              <a:t>26/01/2021</a:t>
+              <a:t>25/02/2021</a:t>
             </a:fld>
             <a:endParaRPr lang="en-GB"/>
           </a:p>
@@ -2690,7 +2691,7 @@
           <a:p>
             <a:fld id="{B2EC5630-BBBD-40F6-B459-AD74AAD6AD00}" type="datetimeFigureOut">
               <a:rPr lang="en-GB" smtClean="0"/>
-              <a:t>26/01/2021</a:t>
+              <a:t>25/02/2021</a:t>
             </a:fld>
             <a:endParaRPr lang="en-GB"/>
           </a:p>
@@ -2933,7 +2934,7 @@
           <a:p>
             <a:fld id="{B2EC5630-BBBD-40F6-B459-AD74AAD6AD00}" type="datetimeFigureOut">
               <a:rPr lang="en-GB" smtClean="0"/>
-              <a:t>26/01/2021</a:t>
+              <a:t>25/02/2021</a:t>
             </a:fld>
             <a:endParaRPr lang="en-GB"/>
           </a:p>
@@ -10139,6 +10140,177 @@
 </p:sld>
 </file>
 
+<file path=ppt/slides/slide5.xml><?xml version="1.0" encoding="utf-8"?>
+<p:sld xmlns:a="http://schemas.openxmlformats.org/drawingml/2006/main" xmlns:r="http://schemas.openxmlformats.org/officeDocument/2006/relationships" xmlns:p="http://schemas.openxmlformats.org/presentationml/2006/main">
+  <p:cSld>
+    <p:spTree>
+      <p:nvGrpSpPr>
+        <p:cNvPr id="1" name=""/>
+        <p:cNvGrpSpPr/>
+        <p:nvPr/>
+      </p:nvGrpSpPr>
+      <p:grpSpPr>
+        <a:xfrm>
+          <a:off x="0" y="0"/>
+          <a:ext cx="0" cy="0"/>
+          <a:chOff x="0" y="0"/>
+          <a:chExt cx="0" cy="0"/>
+        </a:xfrm>
+      </p:grpSpPr>
+      <p:sp>
+        <p:nvSpPr>
+          <p:cNvPr id="8" name="Rectangle: Rounded Corners 7">
+            <a:extLst>
+              <a:ext uri="{FF2B5EF4-FFF2-40B4-BE49-F238E27FC236}">
+                <a16:creationId xmlns:a16="http://schemas.microsoft.com/office/drawing/2014/main" id="{1667608F-9038-443E-8742-682A593C0FAD}"/>
+              </a:ext>
+            </a:extLst>
+          </p:cNvPr>
+          <p:cNvSpPr/>
+          <p:nvPr/>
+        </p:nvSpPr>
+        <p:spPr>
+          <a:xfrm>
+            <a:off x="528320" y="1441765"/>
+            <a:ext cx="11160760" cy="2743200"/>
+          </a:xfrm>
+          <a:prstGeom prst="roundRect">
+            <a:avLst>
+              <a:gd name="adj" fmla="val 10556"/>
+            </a:avLst>
+          </a:prstGeom>
+          <a:solidFill>
+            <a:srgbClr val="2C98D9"/>
+          </a:solidFill>
+          <a:ln>
+            <a:noFill/>
+          </a:ln>
+        </p:spPr>
+        <p:style>
+          <a:lnRef idx="2">
+            <a:schemeClr val="accent1">
+              <a:shade val="50000"/>
+            </a:schemeClr>
+          </a:lnRef>
+          <a:fillRef idx="1">
+            <a:schemeClr val="accent1"/>
+          </a:fillRef>
+          <a:effectRef idx="0">
+            <a:schemeClr val="accent1"/>
+          </a:effectRef>
+          <a:fontRef idx="minor">
+            <a:schemeClr val="lt1"/>
+          </a:fontRef>
+        </p:style>
+        <p:txBody>
+          <a:bodyPr rtlCol="0" anchor="ctr"/>
+          <a:lstStyle/>
+          <a:p>
+            <a:pPr algn="ctr"/>
+            <a:endParaRPr lang="en-GB" dirty="0"/>
+          </a:p>
+        </p:txBody>
+      </p:sp>
+      <p:pic>
+        <p:nvPicPr>
+          <p:cNvPr id="16" name="Graphic 15">
+            <a:extLst>
+              <a:ext uri="{FF2B5EF4-FFF2-40B4-BE49-F238E27FC236}">
+                <a16:creationId xmlns:a16="http://schemas.microsoft.com/office/drawing/2014/main" id="{1B7BC54F-410F-440F-8934-2595D6B1C51F}"/>
+              </a:ext>
+            </a:extLst>
+          </p:cNvPr>
+          <p:cNvPicPr>
+            <a:picLocks noChangeAspect="1"/>
+          </p:cNvPicPr>
+          <p:nvPr/>
+        </p:nvPicPr>
+        <p:blipFill>
+          <a:blip r:embed="rId2">
+            <a:extLst>
+              <a:ext uri="{28A0092B-C50C-407E-A947-70E740481C1C}">
+                <a14:useLocalDpi xmlns:a14="http://schemas.microsoft.com/office/drawing/2010/main" val="0"/>
+              </a:ext>
+              <a:ext uri="{96DAC541-7B7A-43D3-8B79-37D633B846F1}">
+                <asvg:svgBlip xmlns:asvg="http://schemas.microsoft.com/office/drawing/2016/SVG/main" r:embed="rId3"/>
+              </a:ext>
+            </a:extLst>
+          </a:blip>
+          <a:stretch>
+            <a:fillRect/>
+          </a:stretch>
+        </p:blipFill>
+        <p:spPr>
+          <a:xfrm>
+            <a:off x="1351112" y="1902534"/>
+            <a:ext cx="1639547" cy="1982708"/>
+          </a:xfrm>
+          <a:prstGeom prst="rect">
+            <a:avLst/>
+          </a:prstGeom>
+        </p:spPr>
+      </p:pic>
+      <p:sp>
+        <p:nvSpPr>
+          <p:cNvPr id="14" name="TextBox 13">
+            <a:extLst>
+              <a:ext uri="{FF2B5EF4-FFF2-40B4-BE49-F238E27FC236}">
+                <a16:creationId xmlns:a16="http://schemas.microsoft.com/office/drawing/2014/main" id="{0C6A9690-19E7-4A46-9B7A-3FA8D30D5B70}"/>
+              </a:ext>
+            </a:extLst>
+          </p:cNvPr>
+          <p:cNvSpPr txBox="1"/>
+          <p:nvPr/>
+        </p:nvSpPr>
+        <p:spPr>
+          <a:xfrm>
+            <a:off x="3451517" y="1811221"/>
+            <a:ext cx="7558479" cy="1862048"/>
+          </a:xfrm>
+          <a:prstGeom prst="rect">
+            <a:avLst/>
+          </a:prstGeom>
+          <a:noFill/>
+        </p:spPr>
+        <p:txBody>
+          <a:bodyPr wrap="none" rtlCol="0">
+            <a:spAutoFit/>
+          </a:bodyPr>
+          <a:lstStyle/>
+          <a:p>
+            <a:r>
+              <a:rPr lang="en-US" sz="11500" b="1" dirty="0">
+                <a:solidFill>
+                  <a:schemeClr val="bg1"/>
+                </a:solidFill>
+                <a:latin typeface="Arial" panose="020B0604020202020204" pitchFamily="34" charset="0"/>
+                <a:cs typeface="Arial" panose="020B0604020202020204" pitchFamily="34" charset="0"/>
+              </a:rPr>
+              <a:t>SANDBOX</a:t>
+            </a:r>
+            <a:endParaRPr lang="en-GB" sz="11500" b="1" dirty="0">
+              <a:solidFill>
+                <a:schemeClr val="bg1"/>
+              </a:solidFill>
+              <a:latin typeface="Arial" panose="020B0604020202020204" pitchFamily="34" charset="0"/>
+              <a:cs typeface="Arial" panose="020B0604020202020204" pitchFamily="34" charset="0"/>
+            </a:endParaRPr>
+          </a:p>
+        </p:txBody>
+      </p:sp>
+    </p:spTree>
+    <p:extLst>
+      <p:ext uri="{BB962C8B-B14F-4D97-AF65-F5344CB8AC3E}">
+        <p14:creationId xmlns:p14="http://schemas.microsoft.com/office/powerpoint/2010/main" val="1799274505"/>
+      </p:ext>
+    </p:extLst>
+  </p:cSld>
+  <p:clrMapOvr>
+    <a:masterClrMapping/>
+  </p:clrMapOvr>
+</p:sld>
+</file>
+
 <file path=ppt/theme/theme1.xml><?xml version="1.0" encoding="utf-8"?>
 <a:theme xmlns:a="http://schemas.openxmlformats.org/drawingml/2006/main" name="Office Theme">
   <a:themeElements>

</xml_diff>

<commit_message>
Resizing mealtime companion icon
</commit_message>
<xml_diff>
--- a/HelpMyStreetFE/HelpMyStreetFE/src/pptx/Icons.pptx
+++ b/HelpMyStreetFE/HelpMyStreetFE/src/pptx/Icons.pptx
@@ -265,7 +265,7 @@
           <a:p>
             <a:fld id="{B2EC5630-BBBD-40F6-B459-AD74AAD6AD00}" type="datetimeFigureOut">
               <a:rPr lang="en-GB" smtClean="0"/>
-              <a:t>25/02/2021</a:t>
+              <a:t>03/03/2021</a:t>
             </a:fld>
             <a:endParaRPr lang="en-GB"/>
           </a:p>
@@ -465,7 +465,7 @@
           <a:p>
             <a:fld id="{B2EC5630-BBBD-40F6-B459-AD74AAD6AD00}" type="datetimeFigureOut">
               <a:rPr lang="en-GB" smtClean="0"/>
-              <a:t>25/02/2021</a:t>
+              <a:t>03/03/2021</a:t>
             </a:fld>
             <a:endParaRPr lang="en-GB"/>
           </a:p>
@@ -675,7 +675,7 @@
           <a:p>
             <a:fld id="{B2EC5630-BBBD-40F6-B459-AD74AAD6AD00}" type="datetimeFigureOut">
               <a:rPr lang="en-GB" smtClean="0"/>
-              <a:t>25/02/2021</a:t>
+              <a:t>03/03/2021</a:t>
             </a:fld>
             <a:endParaRPr lang="en-GB"/>
           </a:p>
@@ -875,7 +875,7 @@
           <a:p>
             <a:fld id="{B2EC5630-BBBD-40F6-B459-AD74AAD6AD00}" type="datetimeFigureOut">
               <a:rPr lang="en-GB" smtClean="0"/>
-              <a:t>25/02/2021</a:t>
+              <a:t>03/03/2021</a:t>
             </a:fld>
             <a:endParaRPr lang="en-GB"/>
           </a:p>
@@ -1151,7 +1151,7 @@
           <a:p>
             <a:fld id="{B2EC5630-BBBD-40F6-B459-AD74AAD6AD00}" type="datetimeFigureOut">
               <a:rPr lang="en-GB" smtClean="0"/>
-              <a:t>25/02/2021</a:t>
+              <a:t>03/03/2021</a:t>
             </a:fld>
             <a:endParaRPr lang="en-GB"/>
           </a:p>
@@ -1419,7 +1419,7 @@
           <a:p>
             <a:fld id="{B2EC5630-BBBD-40F6-B459-AD74AAD6AD00}" type="datetimeFigureOut">
               <a:rPr lang="en-GB" smtClean="0"/>
-              <a:t>25/02/2021</a:t>
+              <a:t>03/03/2021</a:t>
             </a:fld>
             <a:endParaRPr lang="en-GB"/>
           </a:p>
@@ -1834,7 +1834,7 @@
           <a:p>
             <a:fld id="{B2EC5630-BBBD-40F6-B459-AD74AAD6AD00}" type="datetimeFigureOut">
               <a:rPr lang="en-GB" smtClean="0"/>
-              <a:t>25/02/2021</a:t>
+              <a:t>03/03/2021</a:t>
             </a:fld>
             <a:endParaRPr lang="en-GB"/>
           </a:p>
@@ -1976,7 +1976,7 @@
           <a:p>
             <a:fld id="{B2EC5630-BBBD-40F6-B459-AD74AAD6AD00}" type="datetimeFigureOut">
               <a:rPr lang="en-GB" smtClean="0"/>
-              <a:t>25/02/2021</a:t>
+              <a:t>03/03/2021</a:t>
             </a:fld>
             <a:endParaRPr lang="en-GB"/>
           </a:p>
@@ -2089,7 +2089,7 @@
           <a:p>
             <a:fld id="{B2EC5630-BBBD-40F6-B459-AD74AAD6AD00}" type="datetimeFigureOut">
               <a:rPr lang="en-GB" smtClean="0"/>
-              <a:t>25/02/2021</a:t>
+              <a:t>03/03/2021</a:t>
             </a:fld>
             <a:endParaRPr lang="en-GB"/>
           </a:p>
@@ -2402,7 +2402,7 @@
           <a:p>
             <a:fld id="{B2EC5630-BBBD-40F6-B459-AD74AAD6AD00}" type="datetimeFigureOut">
               <a:rPr lang="en-GB" smtClean="0"/>
-              <a:t>25/02/2021</a:t>
+              <a:t>03/03/2021</a:t>
             </a:fld>
             <a:endParaRPr lang="en-GB"/>
           </a:p>
@@ -2691,7 +2691,7 @@
           <a:p>
             <a:fld id="{B2EC5630-BBBD-40F6-B459-AD74AAD6AD00}" type="datetimeFigureOut">
               <a:rPr lang="en-GB" smtClean="0"/>
-              <a:t>25/02/2021</a:t>
+              <a:t>03/03/2021</a:t>
             </a:fld>
             <a:endParaRPr lang="en-GB"/>
           </a:p>
@@ -2934,7 +2934,7 @@
           <a:p>
             <a:fld id="{B2EC5630-BBBD-40F6-B459-AD74AAD6AD00}" type="datetimeFigureOut">
               <a:rPr lang="en-GB" smtClean="0"/>
-              <a:t>25/02/2021</a:t>
+              <a:t>03/03/2021</a:t>
             </a:fld>
             <a:endParaRPr lang="en-GB"/>
           </a:p>
@@ -10127,6 +10127,705 @@
           </a:p>
         </p:txBody>
       </p:sp>
+      <p:grpSp>
+        <p:nvGrpSpPr>
+          <p:cNvPr id="28" name="Group 27">
+            <a:extLst>
+              <a:ext uri="{FF2B5EF4-FFF2-40B4-BE49-F238E27FC236}">
+                <a16:creationId xmlns:a16="http://schemas.microsoft.com/office/drawing/2014/main" id="{04B349CD-64FE-480B-B1C5-B0CC2DE6FFAB}"/>
+              </a:ext>
+            </a:extLst>
+          </p:cNvPr>
+          <p:cNvGrpSpPr/>
+          <p:nvPr/>
+        </p:nvGrpSpPr>
+        <p:grpSpPr>
+          <a:xfrm>
+            <a:off x="939356" y="4952169"/>
+            <a:ext cx="761999" cy="504825"/>
+            <a:chOff x="939356" y="4952169"/>
+            <a:chExt cx="761999" cy="504825"/>
+          </a:xfrm>
+        </p:grpSpPr>
+        <p:sp>
+          <p:nvSpPr>
+            <p:cNvPr id="25" name="Freeform: Shape 24">
+              <a:extLst>
+                <a:ext uri="{FF2B5EF4-FFF2-40B4-BE49-F238E27FC236}">
+                  <a16:creationId xmlns:a16="http://schemas.microsoft.com/office/drawing/2014/main" id="{818F91A5-644B-4B9A-B2BA-CB0C5F3B433F}"/>
+                </a:ext>
+              </a:extLst>
+            </p:cNvPr>
+            <p:cNvSpPr/>
+            <p:nvPr/>
+          </p:nvSpPr>
+          <p:spPr>
+            <a:xfrm>
+              <a:off x="1082231" y="5104569"/>
+              <a:ext cx="495300" cy="352425"/>
+            </a:xfrm>
+            <a:custGeom>
+              <a:avLst/>
+              <a:gdLst>
+                <a:gd name="connsiteX0" fmla="*/ 266700 w 495300"/>
+                <a:gd name="connsiteY0" fmla="*/ 57150 h 352425"/>
+                <a:gd name="connsiteX1" fmla="*/ 466725 w 495300"/>
+                <a:gd name="connsiteY1" fmla="*/ 57150 h 352425"/>
+                <a:gd name="connsiteX2" fmla="*/ 495300 w 495300"/>
+                <a:gd name="connsiteY2" fmla="*/ 28575 h 352425"/>
+                <a:gd name="connsiteX3" fmla="*/ 466725 w 495300"/>
+                <a:gd name="connsiteY3" fmla="*/ 0 h 352425"/>
+                <a:gd name="connsiteX4" fmla="*/ 28575 w 495300"/>
+                <a:gd name="connsiteY4" fmla="*/ 0 h 352425"/>
+                <a:gd name="connsiteX5" fmla="*/ 0 w 495300"/>
+                <a:gd name="connsiteY5" fmla="*/ 28575 h 352425"/>
+                <a:gd name="connsiteX6" fmla="*/ 28575 w 495300"/>
+                <a:gd name="connsiteY6" fmla="*/ 57150 h 352425"/>
+                <a:gd name="connsiteX7" fmla="*/ 209550 w 495300"/>
+                <a:gd name="connsiteY7" fmla="*/ 57150 h 352425"/>
+                <a:gd name="connsiteX8" fmla="*/ 209550 w 495300"/>
+                <a:gd name="connsiteY8" fmla="*/ 295275 h 352425"/>
+                <a:gd name="connsiteX9" fmla="*/ 152400 w 495300"/>
+                <a:gd name="connsiteY9" fmla="*/ 295275 h 352425"/>
+                <a:gd name="connsiteX10" fmla="*/ 152400 w 495300"/>
+                <a:gd name="connsiteY10" fmla="*/ 352425 h 352425"/>
+                <a:gd name="connsiteX11" fmla="*/ 323850 w 495300"/>
+                <a:gd name="connsiteY11" fmla="*/ 352425 h 352425"/>
+                <a:gd name="connsiteX12" fmla="*/ 323850 w 495300"/>
+                <a:gd name="connsiteY12" fmla="*/ 295275 h 352425"/>
+                <a:gd name="connsiteX13" fmla="*/ 266700 w 495300"/>
+                <a:gd name="connsiteY13" fmla="*/ 295275 h 352425"/>
+                <a:gd name="connsiteX14" fmla="*/ 266700 w 495300"/>
+                <a:gd name="connsiteY14" fmla="*/ 57150 h 352425"/>
+              </a:gdLst>
+              <a:ahLst/>
+              <a:cxnLst>
+                <a:cxn ang="0">
+                  <a:pos x="connsiteX0" y="connsiteY0"/>
+                </a:cxn>
+                <a:cxn ang="0">
+                  <a:pos x="connsiteX1" y="connsiteY1"/>
+                </a:cxn>
+                <a:cxn ang="0">
+                  <a:pos x="connsiteX2" y="connsiteY2"/>
+                </a:cxn>
+                <a:cxn ang="0">
+                  <a:pos x="connsiteX3" y="connsiteY3"/>
+                </a:cxn>
+                <a:cxn ang="0">
+                  <a:pos x="connsiteX4" y="connsiteY4"/>
+                </a:cxn>
+                <a:cxn ang="0">
+                  <a:pos x="connsiteX5" y="connsiteY5"/>
+                </a:cxn>
+                <a:cxn ang="0">
+                  <a:pos x="connsiteX6" y="connsiteY6"/>
+                </a:cxn>
+                <a:cxn ang="0">
+                  <a:pos x="connsiteX7" y="connsiteY7"/>
+                </a:cxn>
+                <a:cxn ang="0">
+                  <a:pos x="connsiteX8" y="connsiteY8"/>
+                </a:cxn>
+                <a:cxn ang="0">
+                  <a:pos x="connsiteX9" y="connsiteY9"/>
+                </a:cxn>
+                <a:cxn ang="0">
+                  <a:pos x="connsiteX10" y="connsiteY10"/>
+                </a:cxn>
+                <a:cxn ang="0">
+                  <a:pos x="connsiteX11" y="connsiteY11"/>
+                </a:cxn>
+                <a:cxn ang="0">
+                  <a:pos x="connsiteX12" y="connsiteY12"/>
+                </a:cxn>
+                <a:cxn ang="0">
+                  <a:pos x="connsiteX13" y="connsiteY13"/>
+                </a:cxn>
+                <a:cxn ang="0">
+                  <a:pos x="connsiteX14" y="connsiteY14"/>
+                </a:cxn>
+              </a:cxnLst>
+              <a:rect l="l" t="t" r="r" b="b"/>
+              <a:pathLst>
+                <a:path w="495300" h="352425">
+                  <a:moveTo>
+                    <a:pt x="266700" y="57150"/>
+                  </a:moveTo>
+                  <a:lnTo>
+                    <a:pt x="466725" y="57150"/>
+                  </a:lnTo>
+                  <a:cubicBezTo>
+                    <a:pt x="482917" y="57150"/>
+                    <a:pt x="495300" y="44768"/>
+                    <a:pt x="495300" y="28575"/>
+                  </a:cubicBezTo>
+                  <a:cubicBezTo>
+                    <a:pt x="495300" y="12382"/>
+                    <a:pt x="482917" y="0"/>
+                    <a:pt x="466725" y="0"/>
+                  </a:cubicBezTo>
+                  <a:lnTo>
+                    <a:pt x="28575" y="0"/>
+                  </a:lnTo>
+                  <a:cubicBezTo>
+                    <a:pt x="12382" y="0"/>
+                    <a:pt x="0" y="12382"/>
+                    <a:pt x="0" y="28575"/>
+                  </a:cubicBezTo>
+                  <a:cubicBezTo>
+                    <a:pt x="0" y="44768"/>
+                    <a:pt x="12382" y="57150"/>
+                    <a:pt x="28575" y="57150"/>
+                  </a:cubicBezTo>
+                  <a:lnTo>
+                    <a:pt x="209550" y="57150"/>
+                  </a:lnTo>
+                  <a:lnTo>
+                    <a:pt x="209550" y="295275"/>
+                  </a:lnTo>
+                  <a:lnTo>
+                    <a:pt x="152400" y="295275"/>
+                  </a:lnTo>
+                  <a:lnTo>
+                    <a:pt x="152400" y="352425"/>
+                  </a:lnTo>
+                  <a:lnTo>
+                    <a:pt x="323850" y="352425"/>
+                  </a:lnTo>
+                  <a:lnTo>
+                    <a:pt x="323850" y="295275"/>
+                  </a:lnTo>
+                  <a:lnTo>
+                    <a:pt x="266700" y="295275"/>
+                  </a:lnTo>
+                  <a:lnTo>
+                    <a:pt x="266700" y="57150"/>
+                  </a:lnTo>
+                  <a:close/>
+                </a:path>
+              </a:pathLst>
+            </a:custGeom>
+            <a:solidFill>
+              <a:srgbClr val="8F87EB"/>
+            </a:solidFill>
+            <a:ln w="9525" cap="flat">
+              <a:noFill/>
+              <a:prstDash val="solid"/>
+              <a:miter/>
+            </a:ln>
+          </p:spPr>
+          <p:txBody>
+            <a:bodyPr rtlCol="0" anchor="ctr"/>
+            <a:lstStyle/>
+            <a:p>
+              <a:endParaRPr lang="en-GB"/>
+            </a:p>
+          </p:txBody>
+        </p:sp>
+        <p:sp>
+          <p:nvSpPr>
+            <p:cNvPr id="26" name="Freeform: Shape 25">
+              <a:extLst>
+                <a:ext uri="{FF2B5EF4-FFF2-40B4-BE49-F238E27FC236}">
+                  <a16:creationId xmlns:a16="http://schemas.microsoft.com/office/drawing/2014/main" id="{50A44A2D-864E-4E8D-B72F-2D95DAB86DCD}"/>
+                </a:ext>
+              </a:extLst>
+            </p:cNvPr>
+            <p:cNvSpPr/>
+            <p:nvPr/>
+          </p:nvSpPr>
+          <p:spPr>
+            <a:xfrm>
+              <a:off x="939356" y="4952169"/>
+              <a:ext cx="286702" cy="504825"/>
+            </a:xfrm>
+            <a:custGeom>
+              <a:avLst/>
+              <a:gdLst>
+                <a:gd name="connsiteX0" fmla="*/ 258127 w 286702"/>
+                <a:gd name="connsiteY0" fmla="*/ 285750 h 504825"/>
+                <a:gd name="connsiteX1" fmla="*/ 82868 w 286702"/>
+                <a:gd name="connsiteY1" fmla="*/ 285750 h 504825"/>
+                <a:gd name="connsiteX2" fmla="*/ 57150 w 286702"/>
+                <a:gd name="connsiteY2" fmla="*/ 25718 h 504825"/>
+                <a:gd name="connsiteX3" fmla="*/ 57150 w 286702"/>
+                <a:gd name="connsiteY3" fmla="*/ 25718 h 504825"/>
+                <a:gd name="connsiteX4" fmla="*/ 28575 w 286702"/>
+                <a:gd name="connsiteY4" fmla="*/ 0 h 504825"/>
+                <a:gd name="connsiteX5" fmla="*/ 0 w 286702"/>
+                <a:gd name="connsiteY5" fmla="*/ 28575 h 504825"/>
+                <a:gd name="connsiteX6" fmla="*/ 0 w 286702"/>
+                <a:gd name="connsiteY6" fmla="*/ 31432 h 504825"/>
+                <a:gd name="connsiteX7" fmla="*/ 0 w 286702"/>
+                <a:gd name="connsiteY7" fmla="*/ 31432 h 504825"/>
+                <a:gd name="connsiteX8" fmla="*/ 28575 w 286702"/>
+                <a:gd name="connsiteY8" fmla="*/ 313373 h 504825"/>
+                <a:gd name="connsiteX9" fmla="*/ 953 w 286702"/>
+                <a:gd name="connsiteY9" fmla="*/ 504825 h 504825"/>
+                <a:gd name="connsiteX10" fmla="*/ 59055 w 286702"/>
+                <a:gd name="connsiteY10" fmla="*/ 504825 h 504825"/>
+                <a:gd name="connsiteX11" fmla="*/ 68580 w 286702"/>
+                <a:gd name="connsiteY11" fmla="*/ 438150 h 504825"/>
+                <a:gd name="connsiteX12" fmla="*/ 200025 w 286702"/>
+                <a:gd name="connsiteY12" fmla="*/ 438150 h 504825"/>
+                <a:gd name="connsiteX13" fmla="*/ 200025 w 286702"/>
+                <a:gd name="connsiteY13" fmla="*/ 504825 h 504825"/>
+                <a:gd name="connsiteX14" fmla="*/ 257175 w 286702"/>
+                <a:gd name="connsiteY14" fmla="*/ 504825 h 504825"/>
+                <a:gd name="connsiteX15" fmla="*/ 257175 w 286702"/>
+                <a:gd name="connsiteY15" fmla="*/ 342900 h 504825"/>
+                <a:gd name="connsiteX16" fmla="*/ 258127 w 286702"/>
+                <a:gd name="connsiteY16" fmla="*/ 342900 h 504825"/>
+                <a:gd name="connsiteX17" fmla="*/ 286703 w 286702"/>
+                <a:gd name="connsiteY17" fmla="*/ 314325 h 504825"/>
+                <a:gd name="connsiteX18" fmla="*/ 258127 w 286702"/>
+                <a:gd name="connsiteY18" fmla="*/ 285750 h 504825"/>
+                <a:gd name="connsiteX19" fmla="*/ 200025 w 286702"/>
+                <a:gd name="connsiteY19" fmla="*/ 400050 h 504825"/>
+                <a:gd name="connsiteX20" fmla="*/ 73343 w 286702"/>
+                <a:gd name="connsiteY20" fmla="*/ 400050 h 504825"/>
+                <a:gd name="connsiteX21" fmla="*/ 81915 w 286702"/>
+                <a:gd name="connsiteY21" fmla="*/ 342900 h 504825"/>
+                <a:gd name="connsiteX22" fmla="*/ 200025 w 286702"/>
+                <a:gd name="connsiteY22" fmla="*/ 342900 h 504825"/>
+                <a:gd name="connsiteX23" fmla="*/ 200025 w 286702"/>
+                <a:gd name="connsiteY23" fmla="*/ 400050 h 504825"/>
+              </a:gdLst>
+              <a:ahLst/>
+              <a:cxnLst>
+                <a:cxn ang="0">
+                  <a:pos x="connsiteX0" y="connsiteY0"/>
+                </a:cxn>
+                <a:cxn ang="0">
+                  <a:pos x="connsiteX1" y="connsiteY1"/>
+                </a:cxn>
+                <a:cxn ang="0">
+                  <a:pos x="connsiteX2" y="connsiteY2"/>
+                </a:cxn>
+                <a:cxn ang="0">
+                  <a:pos x="connsiteX3" y="connsiteY3"/>
+                </a:cxn>
+                <a:cxn ang="0">
+                  <a:pos x="connsiteX4" y="connsiteY4"/>
+                </a:cxn>
+                <a:cxn ang="0">
+                  <a:pos x="connsiteX5" y="connsiteY5"/>
+                </a:cxn>
+                <a:cxn ang="0">
+                  <a:pos x="connsiteX6" y="connsiteY6"/>
+                </a:cxn>
+                <a:cxn ang="0">
+                  <a:pos x="connsiteX7" y="connsiteY7"/>
+                </a:cxn>
+                <a:cxn ang="0">
+                  <a:pos x="connsiteX8" y="connsiteY8"/>
+                </a:cxn>
+                <a:cxn ang="0">
+                  <a:pos x="connsiteX9" y="connsiteY9"/>
+                </a:cxn>
+                <a:cxn ang="0">
+                  <a:pos x="connsiteX10" y="connsiteY10"/>
+                </a:cxn>
+                <a:cxn ang="0">
+                  <a:pos x="connsiteX11" y="connsiteY11"/>
+                </a:cxn>
+                <a:cxn ang="0">
+                  <a:pos x="connsiteX12" y="connsiteY12"/>
+                </a:cxn>
+                <a:cxn ang="0">
+                  <a:pos x="connsiteX13" y="connsiteY13"/>
+                </a:cxn>
+                <a:cxn ang="0">
+                  <a:pos x="connsiteX14" y="connsiteY14"/>
+                </a:cxn>
+                <a:cxn ang="0">
+                  <a:pos x="connsiteX15" y="connsiteY15"/>
+                </a:cxn>
+                <a:cxn ang="0">
+                  <a:pos x="connsiteX16" y="connsiteY16"/>
+                </a:cxn>
+                <a:cxn ang="0">
+                  <a:pos x="connsiteX17" y="connsiteY17"/>
+                </a:cxn>
+                <a:cxn ang="0">
+                  <a:pos x="connsiteX18" y="connsiteY18"/>
+                </a:cxn>
+                <a:cxn ang="0">
+                  <a:pos x="connsiteX19" y="connsiteY19"/>
+                </a:cxn>
+                <a:cxn ang="0">
+                  <a:pos x="connsiteX20" y="connsiteY20"/>
+                </a:cxn>
+                <a:cxn ang="0">
+                  <a:pos x="connsiteX21" y="connsiteY21"/>
+                </a:cxn>
+                <a:cxn ang="0">
+                  <a:pos x="connsiteX22" y="connsiteY22"/>
+                </a:cxn>
+                <a:cxn ang="0">
+                  <a:pos x="connsiteX23" y="connsiteY23"/>
+                </a:cxn>
+              </a:cxnLst>
+              <a:rect l="l" t="t" r="r" b="b"/>
+              <a:pathLst>
+                <a:path w="286702" h="504825">
+                  <a:moveTo>
+                    <a:pt x="258127" y="285750"/>
+                  </a:moveTo>
+                  <a:lnTo>
+                    <a:pt x="82868" y="285750"/>
+                  </a:lnTo>
+                  <a:lnTo>
+                    <a:pt x="57150" y="25718"/>
+                  </a:lnTo>
+                  <a:lnTo>
+                    <a:pt x="57150" y="25718"/>
+                  </a:lnTo>
+                  <a:cubicBezTo>
+                    <a:pt x="55245" y="11430"/>
+                    <a:pt x="43815" y="0"/>
+                    <a:pt x="28575" y="0"/>
+                  </a:cubicBezTo>
+                  <a:cubicBezTo>
+                    <a:pt x="12383" y="0"/>
+                    <a:pt x="0" y="12382"/>
+                    <a:pt x="0" y="28575"/>
+                  </a:cubicBezTo>
+                  <a:cubicBezTo>
+                    <a:pt x="0" y="29528"/>
+                    <a:pt x="0" y="30480"/>
+                    <a:pt x="0" y="31432"/>
+                  </a:cubicBezTo>
+                  <a:lnTo>
+                    <a:pt x="0" y="31432"/>
+                  </a:lnTo>
+                  <a:lnTo>
+                    <a:pt x="28575" y="313373"/>
+                  </a:lnTo>
+                  <a:lnTo>
+                    <a:pt x="953" y="504825"/>
+                  </a:lnTo>
+                  <a:lnTo>
+                    <a:pt x="59055" y="504825"/>
+                  </a:lnTo>
+                  <a:lnTo>
+                    <a:pt x="68580" y="438150"/>
+                  </a:lnTo>
+                  <a:lnTo>
+                    <a:pt x="200025" y="438150"/>
+                  </a:lnTo>
+                  <a:lnTo>
+                    <a:pt x="200025" y="504825"/>
+                  </a:lnTo>
+                  <a:lnTo>
+                    <a:pt x="257175" y="504825"/>
+                  </a:lnTo>
+                  <a:lnTo>
+                    <a:pt x="257175" y="342900"/>
+                  </a:lnTo>
+                  <a:lnTo>
+                    <a:pt x="258127" y="342900"/>
+                  </a:lnTo>
+                  <a:cubicBezTo>
+                    <a:pt x="274320" y="342900"/>
+                    <a:pt x="286703" y="330518"/>
+                    <a:pt x="286703" y="314325"/>
+                  </a:cubicBezTo>
+                  <a:cubicBezTo>
+                    <a:pt x="286703" y="298133"/>
+                    <a:pt x="273368" y="285750"/>
+                    <a:pt x="258127" y="285750"/>
+                  </a:cubicBezTo>
+                  <a:close/>
+                  <a:moveTo>
+                    <a:pt x="200025" y="400050"/>
+                  </a:moveTo>
+                  <a:lnTo>
+                    <a:pt x="73343" y="400050"/>
+                  </a:lnTo>
+                  <a:lnTo>
+                    <a:pt x="81915" y="342900"/>
+                  </a:lnTo>
+                  <a:lnTo>
+                    <a:pt x="200025" y="342900"/>
+                  </a:lnTo>
+                  <a:lnTo>
+                    <a:pt x="200025" y="400050"/>
+                  </a:lnTo>
+                  <a:close/>
+                </a:path>
+              </a:pathLst>
+            </a:custGeom>
+            <a:solidFill>
+              <a:srgbClr val="8F87EB"/>
+            </a:solidFill>
+            <a:ln w="9525" cap="flat">
+              <a:noFill/>
+              <a:prstDash val="solid"/>
+              <a:miter/>
+            </a:ln>
+          </p:spPr>
+          <p:txBody>
+            <a:bodyPr rtlCol="0" anchor="ctr"/>
+            <a:lstStyle/>
+            <a:p>
+              <a:endParaRPr lang="en-GB"/>
+            </a:p>
+          </p:txBody>
+        </p:sp>
+        <p:sp>
+          <p:nvSpPr>
+            <p:cNvPr id="27" name="Freeform: Shape 26">
+              <a:extLst>
+                <a:ext uri="{FF2B5EF4-FFF2-40B4-BE49-F238E27FC236}">
+                  <a16:creationId xmlns:a16="http://schemas.microsoft.com/office/drawing/2014/main" id="{84CB86BA-A720-4448-BD70-AA099E22BF46}"/>
+                </a:ext>
+              </a:extLst>
+            </p:cNvPr>
+            <p:cNvSpPr/>
+            <p:nvPr/>
+          </p:nvSpPr>
+          <p:spPr>
+            <a:xfrm>
+              <a:off x="1414653" y="4952169"/>
+              <a:ext cx="286702" cy="504825"/>
+            </a:xfrm>
+            <a:custGeom>
+              <a:avLst/>
+              <a:gdLst>
+                <a:gd name="connsiteX0" fmla="*/ 286703 w 286702"/>
+                <a:gd name="connsiteY0" fmla="*/ 31432 h 504825"/>
+                <a:gd name="connsiteX1" fmla="*/ 286703 w 286702"/>
+                <a:gd name="connsiteY1" fmla="*/ 28575 h 504825"/>
+                <a:gd name="connsiteX2" fmla="*/ 258127 w 286702"/>
+                <a:gd name="connsiteY2" fmla="*/ 0 h 504825"/>
+                <a:gd name="connsiteX3" fmla="*/ 229552 w 286702"/>
+                <a:gd name="connsiteY3" fmla="*/ 25718 h 504825"/>
+                <a:gd name="connsiteX4" fmla="*/ 229552 w 286702"/>
+                <a:gd name="connsiteY4" fmla="*/ 25718 h 504825"/>
+                <a:gd name="connsiteX5" fmla="*/ 203835 w 286702"/>
+                <a:gd name="connsiteY5" fmla="*/ 285750 h 504825"/>
+                <a:gd name="connsiteX6" fmla="*/ 28575 w 286702"/>
+                <a:gd name="connsiteY6" fmla="*/ 285750 h 504825"/>
+                <a:gd name="connsiteX7" fmla="*/ 0 w 286702"/>
+                <a:gd name="connsiteY7" fmla="*/ 314325 h 504825"/>
+                <a:gd name="connsiteX8" fmla="*/ 28575 w 286702"/>
+                <a:gd name="connsiteY8" fmla="*/ 342900 h 504825"/>
+                <a:gd name="connsiteX9" fmla="*/ 29527 w 286702"/>
+                <a:gd name="connsiteY9" fmla="*/ 342900 h 504825"/>
+                <a:gd name="connsiteX10" fmla="*/ 29527 w 286702"/>
+                <a:gd name="connsiteY10" fmla="*/ 504825 h 504825"/>
+                <a:gd name="connsiteX11" fmla="*/ 86677 w 286702"/>
+                <a:gd name="connsiteY11" fmla="*/ 504825 h 504825"/>
+                <a:gd name="connsiteX12" fmla="*/ 86677 w 286702"/>
+                <a:gd name="connsiteY12" fmla="*/ 438150 h 504825"/>
+                <a:gd name="connsiteX13" fmla="*/ 218123 w 286702"/>
+                <a:gd name="connsiteY13" fmla="*/ 438150 h 504825"/>
+                <a:gd name="connsiteX14" fmla="*/ 227648 w 286702"/>
+                <a:gd name="connsiteY14" fmla="*/ 504825 h 504825"/>
+                <a:gd name="connsiteX15" fmla="*/ 285750 w 286702"/>
+                <a:gd name="connsiteY15" fmla="*/ 504825 h 504825"/>
+                <a:gd name="connsiteX16" fmla="*/ 258127 w 286702"/>
+                <a:gd name="connsiteY16" fmla="*/ 313373 h 504825"/>
+                <a:gd name="connsiteX17" fmla="*/ 286703 w 286702"/>
+                <a:gd name="connsiteY17" fmla="*/ 31432 h 504825"/>
+                <a:gd name="connsiteX18" fmla="*/ 286703 w 286702"/>
+                <a:gd name="connsiteY18" fmla="*/ 31432 h 504825"/>
+                <a:gd name="connsiteX19" fmla="*/ 86677 w 286702"/>
+                <a:gd name="connsiteY19" fmla="*/ 400050 h 504825"/>
+                <a:gd name="connsiteX20" fmla="*/ 86677 w 286702"/>
+                <a:gd name="connsiteY20" fmla="*/ 342900 h 504825"/>
+                <a:gd name="connsiteX21" fmla="*/ 204788 w 286702"/>
+                <a:gd name="connsiteY21" fmla="*/ 342900 h 504825"/>
+                <a:gd name="connsiteX22" fmla="*/ 213360 w 286702"/>
+                <a:gd name="connsiteY22" fmla="*/ 400050 h 504825"/>
+                <a:gd name="connsiteX23" fmla="*/ 86677 w 286702"/>
+                <a:gd name="connsiteY23" fmla="*/ 400050 h 504825"/>
+              </a:gdLst>
+              <a:ahLst/>
+              <a:cxnLst>
+                <a:cxn ang="0">
+                  <a:pos x="connsiteX0" y="connsiteY0"/>
+                </a:cxn>
+                <a:cxn ang="0">
+                  <a:pos x="connsiteX1" y="connsiteY1"/>
+                </a:cxn>
+                <a:cxn ang="0">
+                  <a:pos x="connsiteX2" y="connsiteY2"/>
+                </a:cxn>
+                <a:cxn ang="0">
+                  <a:pos x="connsiteX3" y="connsiteY3"/>
+                </a:cxn>
+                <a:cxn ang="0">
+                  <a:pos x="connsiteX4" y="connsiteY4"/>
+                </a:cxn>
+                <a:cxn ang="0">
+                  <a:pos x="connsiteX5" y="connsiteY5"/>
+                </a:cxn>
+                <a:cxn ang="0">
+                  <a:pos x="connsiteX6" y="connsiteY6"/>
+                </a:cxn>
+                <a:cxn ang="0">
+                  <a:pos x="connsiteX7" y="connsiteY7"/>
+                </a:cxn>
+                <a:cxn ang="0">
+                  <a:pos x="connsiteX8" y="connsiteY8"/>
+                </a:cxn>
+                <a:cxn ang="0">
+                  <a:pos x="connsiteX9" y="connsiteY9"/>
+                </a:cxn>
+                <a:cxn ang="0">
+                  <a:pos x="connsiteX10" y="connsiteY10"/>
+                </a:cxn>
+                <a:cxn ang="0">
+                  <a:pos x="connsiteX11" y="connsiteY11"/>
+                </a:cxn>
+                <a:cxn ang="0">
+                  <a:pos x="connsiteX12" y="connsiteY12"/>
+                </a:cxn>
+                <a:cxn ang="0">
+                  <a:pos x="connsiteX13" y="connsiteY13"/>
+                </a:cxn>
+                <a:cxn ang="0">
+                  <a:pos x="connsiteX14" y="connsiteY14"/>
+                </a:cxn>
+                <a:cxn ang="0">
+                  <a:pos x="connsiteX15" y="connsiteY15"/>
+                </a:cxn>
+                <a:cxn ang="0">
+                  <a:pos x="connsiteX16" y="connsiteY16"/>
+                </a:cxn>
+                <a:cxn ang="0">
+                  <a:pos x="connsiteX17" y="connsiteY17"/>
+                </a:cxn>
+                <a:cxn ang="0">
+                  <a:pos x="connsiteX18" y="connsiteY18"/>
+                </a:cxn>
+                <a:cxn ang="0">
+                  <a:pos x="connsiteX19" y="connsiteY19"/>
+                </a:cxn>
+                <a:cxn ang="0">
+                  <a:pos x="connsiteX20" y="connsiteY20"/>
+                </a:cxn>
+                <a:cxn ang="0">
+                  <a:pos x="connsiteX21" y="connsiteY21"/>
+                </a:cxn>
+                <a:cxn ang="0">
+                  <a:pos x="connsiteX22" y="connsiteY22"/>
+                </a:cxn>
+                <a:cxn ang="0">
+                  <a:pos x="connsiteX23" y="connsiteY23"/>
+                </a:cxn>
+              </a:cxnLst>
+              <a:rect l="l" t="t" r="r" b="b"/>
+              <a:pathLst>
+                <a:path w="286702" h="504825">
+                  <a:moveTo>
+                    <a:pt x="286703" y="31432"/>
+                  </a:moveTo>
+                  <a:cubicBezTo>
+                    <a:pt x="286703" y="30480"/>
+                    <a:pt x="286703" y="29528"/>
+                    <a:pt x="286703" y="28575"/>
+                  </a:cubicBezTo>
+                  <a:cubicBezTo>
+                    <a:pt x="286703" y="12382"/>
+                    <a:pt x="274320" y="0"/>
+                    <a:pt x="258127" y="0"/>
+                  </a:cubicBezTo>
+                  <a:cubicBezTo>
+                    <a:pt x="243840" y="0"/>
+                    <a:pt x="231457" y="11430"/>
+                    <a:pt x="229552" y="25718"/>
+                  </a:cubicBezTo>
+                  <a:lnTo>
+                    <a:pt x="229552" y="25718"/>
+                  </a:lnTo>
+                  <a:lnTo>
+                    <a:pt x="203835" y="285750"/>
+                  </a:lnTo>
+                  <a:lnTo>
+                    <a:pt x="28575" y="285750"/>
+                  </a:lnTo>
+                  <a:cubicBezTo>
+                    <a:pt x="12382" y="285750"/>
+                    <a:pt x="0" y="298133"/>
+                    <a:pt x="0" y="314325"/>
+                  </a:cubicBezTo>
+                  <a:cubicBezTo>
+                    <a:pt x="0" y="330518"/>
+                    <a:pt x="12382" y="342900"/>
+                    <a:pt x="28575" y="342900"/>
+                  </a:cubicBezTo>
+                  <a:lnTo>
+                    <a:pt x="29527" y="342900"/>
+                  </a:lnTo>
+                  <a:lnTo>
+                    <a:pt x="29527" y="504825"/>
+                  </a:lnTo>
+                  <a:lnTo>
+                    <a:pt x="86677" y="504825"/>
+                  </a:lnTo>
+                  <a:lnTo>
+                    <a:pt x="86677" y="438150"/>
+                  </a:lnTo>
+                  <a:lnTo>
+                    <a:pt x="218123" y="438150"/>
+                  </a:lnTo>
+                  <a:lnTo>
+                    <a:pt x="227648" y="504825"/>
+                  </a:lnTo>
+                  <a:lnTo>
+                    <a:pt x="285750" y="504825"/>
+                  </a:lnTo>
+                  <a:lnTo>
+                    <a:pt x="258127" y="313373"/>
+                  </a:lnTo>
+                  <a:lnTo>
+                    <a:pt x="286703" y="31432"/>
+                  </a:lnTo>
+                  <a:lnTo>
+                    <a:pt x="286703" y="31432"/>
+                  </a:lnTo>
+                  <a:close/>
+                  <a:moveTo>
+                    <a:pt x="86677" y="400050"/>
+                  </a:moveTo>
+                  <a:lnTo>
+                    <a:pt x="86677" y="342900"/>
+                  </a:lnTo>
+                  <a:lnTo>
+                    <a:pt x="204788" y="342900"/>
+                  </a:lnTo>
+                  <a:lnTo>
+                    <a:pt x="213360" y="400050"/>
+                  </a:lnTo>
+                  <a:lnTo>
+                    <a:pt x="86677" y="400050"/>
+                  </a:lnTo>
+                  <a:close/>
+                </a:path>
+              </a:pathLst>
+            </a:custGeom>
+            <a:solidFill>
+              <a:srgbClr val="8F87EB"/>
+            </a:solidFill>
+            <a:ln w="9525" cap="flat">
+              <a:noFill/>
+              <a:prstDash val="solid"/>
+              <a:miter/>
+            </a:ln>
+          </p:spPr>
+          <p:txBody>
+            <a:bodyPr rtlCol="0" anchor="ctr"/>
+            <a:lstStyle/>
+            <a:p>
+              <a:endParaRPr lang="en-GB"/>
+            </a:p>
+          </p:txBody>
+        </p:sp>
+      </p:grpSp>
     </p:spTree>
     <p:extLst>
       <p:ext uri="{BB962C8B-B14F-4D97-AF65-F5344CB8AC3E}">

</xml_diff>

<commit_message>
FE-610 Adding Emergency Support to Sandbox form
</commit_message>
<xml_diff>
--- a/HelpMyStreetFE/HelpMyStreetFE/src/pptx/Icons.pptx
+++ b/HelpMyStreetFE/HelpMyStreetFE/src/pptx/Icons.pptx
@@ -265,7 +265,7 @@
           <a:p>
             <a:fld id="{B2EC5630-BBBD-40F6-B459-AD74AAD6AD00}" type="datetimeFigureOut">
               <a:rPr lang="en-GB" smtClean="0"/>
-              <a:t>03/03/2021</a:t>
+              <a:t>10/03/2021</a:t>
             </a:fld>
             <a:endParaRPr lang="en-GB"/>
           </a:p>
@@ -465,7 +465,7 @@
           <a:p>
             <a:fld id="{B2EC5630-BBBD-40F6-B459-AD74AAD6AD00}" type="datetimeFigureOut">
               <a:rPr lang="en-GB" smtClean="0"/>
-              <a:t>03/03/2021</a:t>
+              <a:t>10/03/2021</a:t>
             </a:fld>
             <a:endParaRPr lang="en-GB"/>
           </a:p>
@@ -675,7 +675,7 @@
           <a:p>
             <a:fld id="{B2EC5630-BBBD-40F6-B459-AD74AAD6AD00}" type="datetimeFigureOut">
               <a:rPr lang="en-GB" smtClean="0"/>
-              <a:t>03/03/2021</a:t>
+              <a:t>10/03/2021</a:t>
             </a:fld>
             <a:endParaRPr lang="en-GB"/>
           </a:p>
@@ -875,7 +875,7 @@
           <a:p>
             <a:fld id="{B2EC5630-BBBD-40F6-B459-AD74AAD6AD00}" type="datetimeFigureOut">
               <a:rPr lang="en-GB" smtClean="0"/>
-              <a:t>03/03/2021</a:t>
+              <a:t>10/03/2021</a:t>
             </a:fld>
             <a:endParaRPr lang="en-GB"/>
           </a:p>
@@ -1151,7 +1151,7 @@
           <a:p>
             <a:fld id="{B2EC5630-BBBD-40F6-B459-AD74AAD6AD00}" type="datetimeFigureOut">
               <a:rPr lang="en-GB" smtClean="0"/>
-              <a:t>03/03/2021</a:t>
+              <a:t>10/03/2021</a:t>
             </a:fld>
             <a:endParaRPr lang="en-GB"/>
           </a:p>
@@ -1419,7 +1419,7 @@
           <a:p>
             <a:fld id="{B2EC5630-BBBD-40F6-B459-AD74AAD6AD00}" type="datetimeFigureOut">
               <a:rPr lang="en-GB" smtClean="0"/>
-              <a:t>03/03/2021</a:t>
+              <a:t>10/03/2021</a:t>
             </a:fld>
             <a:endParaRPr lang="en-GB"/>
           </a:p>
@@ -1834,7 +1834,7 @@
           <a:p>
             <a:fld id="{B2EC5630-BBBD-40F6-B459-AD74AAD6AD00}" type="datetimeFigureOut">
               <a:rPr lang="en-GB" smtClean="0"/>
-              <a:t>03/03/2021</a:t>
+              <a:t>10/03/2021</a:t>
             </a:fld>
             <a:endParaRPr lang="en-GB"/>
           </a:p>
@@ -1976,7 +1976,7 @@
           <a:p>
             <a:fld id="{B2EC5630-BBBD-40F6-B459-AD74AAD6AD00}" type="datetimeFigureOut">
               <a:rPr lang="en-GB" smtClean="0"/>
-              <a:t>03/03/2021</a:t>
+              <a:t>10/03/2021</a:t>
             </a:fld>
             <a:endParaRPr lang="en-GB"/>
           </a:p>
@@ -2089,7 +2089,7 @@
           <a:p>
             <a:fld id="{B2EC5630-BBBD-40F6-B459-AD74AAD6AD00}" type="datetimeFigureOut">
               <a:rPr lang="en-GB" smtClean="0"/>
-              <a:t>03/03/2021</a:t>
+              <a:t>10/03/2021</a:t>
             </a:fld>
             <a:endParaRPr lang="en-GB"/>
           </a:p>
@@ -2402,7 +2402,7 @@
           <a:p>
             <a:fld id="{B2EC5630-BBBD-40F6-B459-AD74AAD6AD00}" type="datetimeFigureOut">
               <a:rPr lang="en-GB" smtClean="0"/>
-              <a:t>03/03/2021</a:t>
+              <a:t>10/03/2021</a:t>
             </a:fld>
             <a:endParaRPr lang="en-GB"/>
           </a:p>
@@ -2691,7 +2691,7 @@
           <a:p>
             <a:fld id="{B2EC5630-BBBD-40F6-B459-AD74AAD6AD00}" type="datetimeFigureOut">
               <a:rPr lang="en-GB" smtClean="0"/>
-              <a:t>03/03/2021</a:t>
+              <a:t>10/03/2021</a:t>
             </a:fld>
             <a:endParaRPr lang="en-GB"/>
           </a:p>
@@ -2934,7 +2934,7 @@
           <a:p>
             <a:fld id="{B2EC5630-BBBD-40F6-B459-AD74AAD6AD00}" type="datetimeFigureOut">
               <a:rPr lang="en-GB" smtClean="0"/>
-              <a:t>03/03/2021</a:t>
+              <a:t>10/03/2021</a:t>
             </a:fld>
             <a:endParaRPr lang="en-GB"/>
           </a:p>
@@ -10826,6 +10826,720 @@
           </p:txBody>
         </p:sp>
       </p:grpSp>
+      <p:grpSp>
+        <p:nvGrpSpPr>
+          <p:cNvPr id="33" name="Group 32">
+            <a:extLst>
+              <a:ext uri="{FF2B5EF4-FFF2-40B4-BE49-F238E27FC236}">
+                <a16:creationId xmlns:a16="http://schemas.microsoft.com/office/drawing/2014/main" id="{E1B6E294-745A-4066-A80B-5347DC3938B6}"/>
+              </a:ext>
+            </a:extLst>
+          </p:cNvPr>
+          <p:cNvGrpSpPr/>
+          <p:nvPr/>
+        </p:nvGrpSpPr>
+        <p:grpSpPr>
+          <a:xfrm>
+            <a:off x="394685" y="735262"/>
+            <a:ext cx="647700" cy="647700"/>
+            <a:chOff x="706412" y="658751"/>
+            <a:chExt cx="647700" cy="647700"/>
+          </a:xfrm>
+        </p:grpSpPr>
+        <p:sp>
+          <p:nvSpPr>
+            <p:cNvPr id="3" name="Freeform: Shape 2">
+              <a:extLst>
+                <a:ext uri="{FF2B5EF4-FFF2-40B4-BE49-F238E27FC236}">
+                  <a16:creationId xmlns:a16="http://schemas.microsoft.com/office/drawing/2014/main" id="{BF099A87-374F-49DF-BCED-C94542241664}"/>
+                </a:ext>
+              </a:extLst>
+            </p:cNvPr>
+            <p:cNvSpPr/>
+            <p:nvPr/>
+          </p:nvSpPr>
+          <p:spPr>
+            <a:xfrm>
+              <a:off x="1011212" y="658751"/>
+              <a:ext cx="38100" cy="114300"/>
+            </a:xfrm>
+            <a:custGeom>
+              <a:avLst/>
+              <a:gdLst>
+                <a:gd name="connsiteX0" fmla="*/ 0 w 38100"/>
+                <a:gd name="connsiteY0" fmla="*/ 0 h 114300"/>
+                <a:gd name="connsiteX1" fmla="*/ 38100 w 38100"/>
+                <a:gd name="connsiteY1" fmla="*/ 0 h 114300"/>
+                <a:gd name="connsiteX2" fmla="*/ 38100 w 38100"/>
+                <a:gd name="connsiteY2" fmla="*/ 114300 h 114300"/>
+                <a:gd name="connsiteX3" fmla="*/ 0 w 38100"/>
+                <a:gd name="connsiteY3" fmla="*/ 114300 h 114300"/>
+              </a:gdLst>
+              <a:ahLst/>
+              <a:cxnLst>
+                <a:cxn ang="0">
+                  <a:pos x="connsiteX0" y="connsiteY0"/>
+                </a:cxn>
+                <a:cxn ang="0">
+                  <a:pos x="connsiteX1" y="connsiteY1"/>
+                </a:cxn>
+                <a:cxn ang="0">
+                  <a:pos x="connsiteX2" y="connsiteY2"/>
+                </a:cxn>
+                <a:cxn ang="0">
+                  <a:pos x="connsiteX3" y="connsiteY3"/>
+                </a:cxn>
+              </a:cxnLst>
+              <a:rect l="l" t="t" r="r" b="b"/>
+              <a:pathLst>
+                <a:path w="38100" h="114300">
+                  <a:moveTo>
+                    <a:pt x="0" y="0"/>
+                  </a:moveTo>
+                  <a:lnTo>
+                    <a:pt x="38100" y="0"/>
+                  </a:lnTo>
+                  <a:lnTo>
+                    <a:pt x="38100" y="114300"/>
+                  </a:lnTo>
+                  <a:lnTo>
+                    <a:pt x="0" y="114300"/>
+                  </a:lnTo>
+                  <a:close/>
+                </a:path>
+              </a:pathLst>
+            </a:custGeom>
+            <a:solidFill>
+              <a:srgbClr val="1E91D6"/>
+            </a:solidFill>
+            <a:ln w="9525" cap="flat">
+              <a:noFill/>
+              <a:prstDash val="solid"/>
+              <a:miter/>
+            </a:ln>
+          </p:spPr>
+          <p:txBody>
+            <a:bodyPr rtlCol="0" anchor="ctr"/>
+            <a:lstStyle/>
+            <a:p>
+              <a:endParaRPr lang="en-GB"/>
+            </a:p>
+          </p:txBody>
+        </p:sp>
+        <p:sp>
+          <p:nvSpPr>
+            <p:cNvPr id="15" name="Freeform: Shape 14">
+              <a:extLst>
+                <a:ext uri="{FF2B5EF4-FFF2-40B4-BE49-F238E27FC236}">
+                  <a16:creationId xmlns:a16="http://schemas.microsoft.com/office/drawing/2014/main" id="{DB11D397-3128-4F8B-A4B7-ECC18B257724}"/>
+                </a:ext>
+              </a:extLst>
+            </p:cNvPr>
+            <p:cNvSpPr/>
+            <p:nvPr/>
+          </p:nvSpPr>
+          <p:spPr>
+            <a:xfrm rot="8100000">
+              <a:off x="1209806" y="730671"/>
+              <a:ext cx="107631" cy="38099"/>
+            </a:xfrm>
+            <a:custGeom>
+              <a:avLst/>
+              <a:gdLst>
+                <a:gd name="connsiteX0" fmla="*/ 0 w 107631"/>
+                <a:gd name="connsiteY0" fmla="*/ 0 h 38099"/>
+                <a:gd name="connsiteX1" fmla="*/ 107632 w 107631"/>
+                <a:gd name="connsiteY1" fmla="*/ 0 h 38099"/>
+                <a:gd name="connsiteX2" fmla="*/ 107632 w 107631"/>
+                <a:gd name="connsiteY2" fmla="*/ 38100 h 38099"/>
+                <a:gd name="connsiteX3" fmla="*/ 0 w 107631"/>
+                <a:gd name="connsiteY3" fmla="*/ 38100 h 38099"/>
+              </a:gdLst>
+              <a:ahLst/>
+              <a:cxnLst>
+                <a:cxn ang="0">
+                  <a:pos x="connsiteX0" y="connsiteY0"/>
+                </a:cxn>
+                <a:cxn ang="0">
+                  <a:pos x="connsiteX1" y="connsiteY1"/>
+                </a:cxn>
+                <a:cxn ang="0">
+                  <a:pos x="connsiteX2" y="connsiteY2"/>
+                </a:cxn>
+                <a:cxn ang="0">
+                  <a:pos x="connsiteX3" y="connsiteY3"/>
+                </a:cxn>
+              </a:cxnLst>
+              <a:rect l="l" t="t" r="r" b="b"/>
+              <a:pathLst>
+                <a:path w="107631" h="38099">
+                  <a:moveTo>
+                    <a:pt x="0" y="0"/>
+                  </a:moveTo>
+                  <a:lnTo>
+                    <a:pt x="107632" y="0"/>
+                  </a:lnTo>
+                  <a:lnTo>
+                    <a:pt x="107632" y="38100"/>
+                  </a:lnTo>
+                  <a:lnTo>
+                    <a:pt x="0" y="38100"/>
+                  </a:lnTo>
+                  <a:close/>
+                </a:path>
+              </a:pathLst>
+            </a:custGeom>
+            <a:solidFill>
+              <a:srgbClr val="1E91D6"/>
+            </a:solidFill>
+            <a:ln w="9525" cap="flat">
+              <a:noFill/>
+              <a:prstDash val="solid"/>
+              <a:miter/>
+            </a:ln>
+          </p:spPr>
+          <p:txBody>
+            <a:bodyPr rtlCol="0" anchor="ctr"/>
+            <a:lstStyle/>
+            <a:p>
+              <a:endParaRPr lang="en-GB"/>
+            </a:p>
+          </p:txBody>
+        </p:sp>
+        <p:sp>
+          <p:nvSpPr>
+            <p:cNvPr id="19" name="Freeform: Shape 18">
+              <a:extLst>
+                <a:ext uri="{FF2B5EF4-FFF2-40B4-BE49-F238E27FC236}">
+                  <a16:creationId xmlns:a16="http://schemas.microsoft.com/office/drawing/2014/main" id="{4821E1A8-1B73-4653-A6DD-E879E7DD2E22}"/>
+                </a:ext>
+              </a:extLst>
+            </p:cNvPr>
+            <p:cNvSpPr/>
+            <p:nvPr/>
+          </p:nvSpPr>
+          <p:spPr>
+            <a:xfrm rot="8100000">
+              <a:off x="777372" y="695425"/>
+              <a:ext cx="38099" cy="107631"/>
+            </a:xfrm>
+            <a:custGeom>
+              <a:avLst/>
+              <a:gdLst>
+                <a:gd name="connsiteX0" fmla="*/ 0 w 38099"/>
+                <a:gd name="connsiteY0" fmla="*/ 0 h 107631"/>
+                <a:gd name="connsiteX1" fmla="*/ 38100 w 38099"/>
+                <a:gd name="connsiteY1" fmla="*/ 0 h 107631"/>
+                <a:gd name="connsiteX2" fmla="*/ 38100 w 38099"/>
+                <a:gd name="connsiteY2" fmla="*/ 107632 h 107631"/>
+                <a:gd name="connsiteX3" fmla="*/ 0 w 38099"/>
+                <a:gd name="connsiteY3" fmla="*/ 107632 h 107631"/>
+              </a:gdLst>
+              <a:ahLst/>
+              <a:cxnLst>
+                <a:cxn ang="0">
+                  <a:pos x="connsiteX0" y="connsiteY0"/>
+                </a:cxn>
+                <a:cxn ang="0">
+                  <a:pos x="connsiteX1" y="connsiteY1"/>
+                </a:cxn>
+                <a:cxn ang="0">
+                  <a:pos x="connsiteX2" y="connsiteY2"/>
+                </a:cxn>
+                <a:cxn ang="0">
+                  <a:pos x="connsiteX3" y="connsiteY3"/>
+                </a:cxn>
+              </a:cxnLst>
+              <a:rect l="l" t="t" r="r" b="b"/>
+              <a:pathLst>
+                <a:path w="38099" h="107631">
+                  <a:moveTo>
+                    <a:pt x="0" y="0"/>
+                  </a:moveTo>
+                  <a:lnTo>
+                    <a:pt x="38100" y="0"/>
+                  </a:lnTo>
+                  <a:lnTo>
+                    <a:pt x="38100" y="107632"/>
+                  </a:lnTo>
+                  <a:lnTo>
+                    <a:pt x="0" y="107632"/>
+                  </a:lnTo>
+                  <a:close/>
+                </a:path>
+              </a:pathLst>
+            </a:custGeom>
+            <a:solidFill>
+              <a:srgbClr val="1E91D6"/>
+            </a:solidFill>
+            <a:ln w="9525" cap="flat">
+              <a:noFill/>
+              <a:prstDash val="solid"/>
+              <a:miter/>
+            </a:ln>
+          </p:spPr>
+          <p:txBody>
+            <a:bodyPr rtlCol="0" anchor="ctr"/>
+            <a:lstStyle/>
+            <a:p>
+              <a:endParaRPr lang="en-GB"/>
+            </a:p>
+          </p:txBody>
+        </p:sp>
+        <p:sp>
+          <p:nvSpPr>
+            <p:cNvPr id="20" name="Freeform: Shape 19">
+              <a:extLst>
+                <a:ext uri="{FF2B5EF4-FFF2-40B4-BE49-F238E27FC236}">
+                  <a16:creationId xmlns:a16="http://schemas.microsoft.com/office/drawing/2014/main" id="{BBD03C4D-F8E4-4BA8-AA25-FC13C77141AB}"/>
+                </a:ext>
+              </a:extLst>
+            </p:cNvPr>
+            <p:cNvSpPr/>
+            <p:nvPr/>
+          </p:nvSpPr>
+          <p:spPr>
+            <a:xfrm>
+              <a:off x="1258862" y="925451"/>
+              <a:ext cx="95250" cy="38100"/>
+            </a:xfrm>
+            <a:custGeom>
+              <a:avLst/>
+              <a:gdLst>
+                <a:gd name="connsiteX0" fmla="*/ 0 w 95250"/>
+                <a:gd name="connsiteY0" fmla="*/ 0 h 38100"/>
+                <a:gd name="connsiteX1" fmla="*/ 95250 w 95250"/>
+                <a:gd name="connsiteY1" fmla="*/ 0 h 38100"/>
+                <a:gd name="connsiteX2" fmla="*/ 95250 w 95250"/>
+                <a:gd name="connsiteY2" fmla="*/ 38100 h 38100"/>
+                <a:gd name="connsiteX3" fmla="*/ 0 w 95250"/>
+                <a:gd name="connsiteY3" fmla="*/ 38100 h 38100"/>
+              </a:gdLst>
+              <a:ahLst/>
+              <a:cxnLst>
+                <a:cxn ang="0">
+                  <a:pos x="connsiteX0" y="connsiteY0"/>
+                </a:cxn>
+                <a:cxn ang="0">
+                  <a:pos x="connsiteX1" y="connsiteY1"/>
+                </a:cxn>
+                <a:cxn ang="0">
+                  <a:pos x="connsiteX2" y="connsiteY2"/>
+                </a:cxn>
+                <a:cxn ang="0">
+                  <a:pos x="connsiteX3" y="connsiteY3"/>
+                </a:cxn>
+              </a:cxnLst>
+              <a:rect l="l" t="t" r="r" b="b"/>
+              <a:pathLst>
+                <a:path w="95250" h="38100">
+                  <a:moveTo>
+                    <a:pt x="0" y="0"/>
+                  </a:moveTo>
+                  <a:lnTo>
+                    <a:pt x="95250" y="0"/>
+                  </a:lnTo>
+                  <a:lnTo>
+                    <a:pt x="95250" y="38100"/>
+                  </a:lnTo>
+                  <a:lnTo>
+                    <a:pt x="0" y="38100"/>
+                  </a:lnTo>
+                  <a:close/>
+                </a:path>
+              </a:pathLst>
+            </a:custGeom>
+            <a:solidFill>
+              <a:srgbClr val="1E91D6"/>
+            </a:solidFill>
+            <a:ln w="9525" cap="flat">
+              <a:noFill/>
+              <a:prstDash val="solid"/>
+              <a:miter/>
+            </a:ln>
+          </p:spPr>
+          <p:txBody>
+            <a:bodyPr rtlCol="0" anchor="ctr"/>
+            <a:lstStyle/>
+            <a:p>
+              <a:endParaRPr lang="en-GB"/>
+            </a:p>
+          </p:txBody>
+        </p:sp>
+        <p:sp>
+          <p:nvSpPr>
+            <p:cNvPr id="30" name="Freeform: Shape 29">
+              <a:extLst>
+                <a:ext uri="{FF2B5EF4-FFF2-40B4-BE49-F238E27FC236}">
+                  <a16:creationId xmlns:a16="http://schemas.microsoft.com/office/drawing/2014/main" id="{3EF34412-6E6A-4F2E-8073-130B16143D04}"/>
+                </a:ext>
+              </a:extLst>
+            </p:cNvPr>
+            <p:cNvSpPr/>
+            <p:nvPr/>
+          </p:nvSpPr>
+          <p:spPr>
+            <a:xfrm>
+              <a:off x="706412" y="925451"/>
+              <a:ext cx="95250" cy="38100"/>
+            </a:xfrm>
+            <a:custGeom>
+              <a:avLst/>
+              <a:gdLst>
+                <a:gd name="connsiteX0" fmla="*/ 0 w 95250"/>
+                <a:gd name="connsiteY0" fmla="*/ 0 h 38100"/>
+                <a:gd name="connsiteX1" fmla="*/ 95250 w 95250"/>
+                <a:gd name="connsiteY1" fmla="*/ 0 h 38100"/>
+                <a:gd name="connsiteX2" fmla="*/ 95250 w 95250"/>
+                <a:gd name="connsiteY2" fmla="*/ 38100 h 38100"/>
+                <a:gd name="connsiteX3" fmla="*/ 0 w 95250"/>
+                <a:gd name="connsiteY3" fmla="*/ 38100 h 38100"/>
+              </a:gdLst>
+              <a:ahLst/>
+              <a:cxnLst>
+                <a:cxn ang="0">
+                  <a:pos x="connsiteX0" y="connsiteY0"/>
+                </a:cxn>
+                <a:cxn ang="0">
+                  <a:pos x="connsiteX1" y="connsiteY1"/>
+                </a:cxn>
+                <a:cxn ang="0">
+                  <a:pos x="connsiteX2" y="connsiteY2"/>
+                </a:cxn>
+                <a:cxn ang="0">
+                  <a:pos x="connsiteX3" y="connsiteY3"/>
+                </a:cxn>
+              </a:cxnLst>
+              <a:rect l="l" t="t" r="r" b="b"/>
+              <a:pathLst>
+                <a:path w="95250" h="38100">
+                  <a:moveTo>
+                    <a:pt x="0" y="0"/>
+                  </a:moveTo>
+                  <a:lnTo>
+                    <a:pt x="95250" y="0"/>
+                  </a:lnTo>
+                  <a:lnTo>
+                    <a:pt x="95250" y="38100"/>
+                  </a:lnTo>
+                  <a:lnTo>
+                    <a:pt x="0" y="38100"/>
+                  </a:lnTo>
+                  <a:close/>
+                </a:path>
+              </a:pathLst>
+            </a:custGeom>
+            <a:solidFill>
+              <a:srgbClr val="1E91D6"/>
+            </a:solidFill>
+            <a:ln w="9525" cap="flat">
+              <a:noFill/>
+              <a:prstDash val="solid"/>
+              <a:miter/>
+            </a:ln>
+          </p:spPr>
+          <p:txBody>
+            <a:bodyPr rtlCol="0" anchor="ctr"/>
+            <a:lstStyle/>
+            <a:p>
+              <a:endParaRPr lang="en-GB"/>
+            </a:p>
+          </p:txBody>
+        </p:sp>
+        <p:sp>
+          <p:nvSpPr>
+            <p:cNvPr id="31" name="Freeform: Shape 30">
+              <a:extLst>
+                <a:ext uri="{FF2B5EF4-FFF2-40B4-BE49-F238E27FC236}">
+                  <a16:creationId xmlns:a16="http://schemas.microsoft.com/office/drawing/2014/main" id="{AF8D28C5-FDEC-4E69-9B42-C6ED0BF34892}"/>
+                </a:ext>
+              </a:extLst>
+            </p:cNvPr>
+            <p:cNvSpPr/>
+            <p:nvPr/>
+          </p:nvSpPr>
+          <p:spPr>
+            <a:xfrm>
+              <a:off x="706412" y="811151"/>
+              <a:ext cx="647700" cy="495300"/>
+            </a:xfrm>
+            <a:custGeom>
+              <a:avLst/>
+              <a:gdLst>
+                <a:gd name="connsiteX0" fmla="*/ 171450 w 647700"/>
+                <a:gd name="connsiteY0" fmla="*/ 381000 h 495300"/>
+                <a:gd name="connsiteX1" fmla="*/ 203835 w 647700"/>
+                <a:gd name="connsiteY1" fmla="*/ 57150 h 495300"/>
+                <a:gd name="connsiteX2" fmla="*/ 442913 w 647700"/>
+                <a:gd name="connsiteY2" fmla="*/ 57150 h 495300"/>
+                <a:gd name="connsiteX3" fmla="*/ 476250 w 647700"/>
+                <a:gd name="connsiteY3" fmla="*/ 381000 h 495300"/>
+                <a:gd name="connsiteX4" fmla="*/ 171450 w 647700"/>
+                <a:gd name="connsiteY4" fmla="*/ 381000 h 495300"/>
+                <a:gd name="connsiteX5" fmla="*/ 590550 w 647700"/>
+                <a:gd name="connsiteY5" fmla="*/ 381000 h 495300"/>
+                <a:gd name="connsiteX6" fmla="*/ 533400 w 647700"/>
+                <a:gd name="connsiteY6" fmla="*/ 381000 h 495300"/>
+                <a:gd name="connsiteX7" fmla="*/ 499110 w 647700"/>
+                <a:gd name="connsiteY7" fmla="*/ 34290 h 495300"/>
+                <a:gd name="connsiteX8" fmla="*/ 461010 w 647700"/>
+                <a:gd name="connsiteY8" fmla="*/ 0 h 495300"/>
+                <a:gd name="connsiteX9" fmla="*/ 186690 w 647700"/>
+                <a:gd name="connsiteY9" fmla="*/ 0 h 495300"/>
+                <a:gd name="connsiteX10" fmla="*/ 148590 w 647700"/>
+                <a:gd name="connsiteY10" fmla="*/ 34290 h 495300"/>
+                <a:gd name="connsiteX11" fmla="*/ 114300 w 647700"/>
+                <a:gd name="connsiteY11" fmla="*/ 381000 h 495300"/>
+                <a:gd name="connsiteX12" fmla="*/ 57150 w 647700"/>
+                <a:gd name="connsiteY12" fmla="*/ 381000 h 495300"/>
+                <a:gd name="connsiteX13" fmla="*/ 57150 w 647700"/>
+                <a:gd name="connsiteY13" fmla="*/ 438150 h 495300"/>
+                <a:gd name="connsiteX14" fmla="*/ 0 w 647700"/>
+                <a:gd name="connsiteY14" fmla="*/ 438150 h 495300"/>
+                <a:gd name="connsiteX15" fmla="*/ 0 w 647700"/>
+                <a:gd name="connsiteY15" fmla="*/ 495300 h 495300"/>
+                <a:gd name="connsiteX16" fmla="*/ 647700 w 647700"/>
+                <a:gd name="connsiteY16" fmla="*/ 495300 h 495300"/>
+                <a:gd name="connsiteX17" fmla="*/ 647700 w 647700"/>
+                <a:gd name="connsiteY17" fmla="*/ 438150 h 495300"/>
+                <a:gd name="connsiteX18" fmla="*/ 590550 w 647700"/>
+                <a:gd name="connsiteY18" fmla="*/ 438150 h 495300"/>
+                <a:gd name="connsiteX19" fmla="*/ 590550 w 647700"/>
+                <a:gd name="connsiteY19" fmla="*/ 381000 h 495300"/>
+              </a:gdLst>
+              <a:ahLst/>
+              <a:cxnLst>
+                <a:cxn ang="0">
+                  <a:pos x="connsiteX0" y="connsiteY0"/>
+                </a:cxn>
+                <a:cxn ang="0">
+                  <a:pos x="connsiteX1" y="connsiteY1"/>
+                </a:cxn>
+                <a:cxn ang="0">
+                  <a:pos x="connsiteX2" y="connsiteY2"/>
+                </a:cxn>
+                <a:cxn ang="0">
+                  <a:pos x="connsiteX3" y="connsiteY3"/>
+                </a:cxn>
+                <a:cxn ang="0">
+                  <a:pos x="connsiteX4" y="connsiteY4"/>
+                </a:cxn>
+                <a:cxn ang="0">
+                  <a:pos x="connsiteX5" y="connsiteY5"/>
+                </a:cxn>
+                <a:cxn ang="0">
+                  <a:pos x="connsiteX6" y="connsiteY6"/>
+                </a:cxn>
+                <a:cxn ang="0">
+                  <a:pos x="connsiteX7" y="connsiteY7"/>
+                </a:cxn>
+                <a:cxn ang="0">
+                  <a:pos x="connsiteX8" y="connsiteY8"/>
+                </a:cxn>
+                <a:cxn ang="0">
+                  <a:pos x="connsiteX9" y="connsiteY9"/>
+                </a:cxn>
+                <a:cxn ang="0">
+                  <a:pos x="connsiteX10" y="connsiteY10"/>
+                </a:cxn>
+                <a:cxn ang="0">
+                  <a:pos x="connsiteX11" y="connsiteY11"/>
+                </a:cxn>
+                <a:cxn ang="0">
+                  <a:pos x="connsiteX12" y="connsiteY12"/>
+                </a:cxn>
+                <a:cxn ang="0">
+                  <a:pos x="connsiteX13" y="connsiteY13"/>
+                </a:cxn>
+                <a:cxn ang="0">
+                  <a:pos x="connsiteX14" y="connsiteY14"/>
+                </a:cxn>
+                <a:cxn ang="0">
+                  <a:pos x="connsiteX15" y="connsiteY15"/>
+                </a:cxn>
+                <a:cxn ang="0">
+                  <a:pos x="connsiteX16" y="connsiteY16"/>
+                </a:cxn>
+                <a:cxn ang="0">
+                  <a:pos x="connsiteX17" y="connsiteY17"/>
+                </a:cxn>
+                <a:cxn ang="0">
+                  <a:pos x="connsiteX18" y="connsiteY18"/>
+                </a:cxn>
+                <a:cxn ang="0">
+                  <a:pos x="connsiteX19" y="connsiteY19"/>
+                </a:cxn>
+              </a:cxnLst>
+              <a:rect l="l" t="t" r="r" b="b"/>
+              <a:pathLst>
+                <a:path w="647700" h="495300">
+                  <a:moveTo>
+                    <a:pt x="171450" y="381000"/>
+                  </a:moveTo>
+                  <a:lnTo>
+                    <a:pt x="203835" y="57150"/>
+                  </a:lnTo>
+                  <a:lnTo>
+                    <a:pt x="442913" y="57150"/>
+                  </a:lnTo>
+                  <a:lnTo>
+                    <a:pt x="476250" y="381000"/>
+                  </a:lnTo>
+                  <a:lnTo>
+                    <a:pt x="171450" y="381000"/>
+                  </a:lnTo>
+                  <a:close/>
+                  <a:moveTo>
+                    <a:pt x="590550" y="381000"/>
+                  </a:moveTo>
+                  <a:lnTo>
+                    <a:pt x="533400" y="381000"/>
+                  </a:lnTo>
+                  <a:lnTo>
+                    <a:pt x="499110" y="34290"/>
+                  </a:lnTo>
+                  <a:cubicBezTo>
+                    <a:pt x="497205" y="15240"/>
+                    <a:pt x="481013" y="0"/>
+                    <a:pt x="461010" y="0"/>
+                  </a:cubicBezTo>
+                  <a:lnTo>
+                    <a:pt x="186690" y="0"/>
+                  </a:lnTo>
+                  <a:cubicBezTo>
+                    <a:pt x="166688" y="0"/>
+                    <a:pt x="150495" y="15240"/>
+                    <a:pt x="148590" y="34290"/>
+                  </a:cubicBezTo>
+                  <a:lnTo>
+                    <a:pt x="114300" y="381000"/>
+                  </a:lnTo>
+                  <a:lnTo>
+                    <a:pt x="57150" y="381000"/>
+                  </a:lnTo>
+                  <a:lnTo>
+                    <a:pt x="57150" y="438150"/>
+                  </a:lnTo>
+                  <a:lnTo>
+                    <a:pt x="0" y="438150"/>
+                  </a:lnTo>
+                  <a:lnTo>
+                    <a:pt x="0" y="495300"/>
+                  </a:lnTo>
+                  <a:lnTo>
+                    <a:pt x="647700" y="495300"/>
+                  </a:lnTo>
+                  <a:lnTo>
+                    <a:pt x="647700" y="438150"/>
+                  </a:lnTo>
+                  <a:lnTo>
+                    <a:pt x="590550" y="438150"/>
+                  </a:lnTo>
+                  <a:lnTo>
+                    <a:pt x="590550" y="381000"/>
+                  </a:lnTo>
+                  <a:close/>
+                </a:path>
+              </a:pathLst>
+            </a:custGeom>
+            <a:solidFill>
+              <a:srgbClr val="1E91D6"/>
+            </a:solidFill>
+            <a:ln w="9525" cap="flat">
+              <a:noFill/>
+              <a:prstDash val="solid"/>
+              <a:miter/>
+            </a:ln>
+          </p:spPr>
+          <p:txBody>
+            <a:bodyPr rtlCol="0" anchor="ctr"/>
+            <a:lstStyle/>
+            <a:p>
+              <a:endParaRPr lang="en-GB"/>
+            </a:p>
+          </p:txBody>
+        </p:sp>
+        <p:sp>
+          <p:nvSpPr>
+            <p:cNvPr id="32" name="Freeform: Shape 31">
+              <a:extLst>
+                <a:ext uri="{FF2B5EF4-FFF2-40B4-BE49-F238E27FC236}">
+                  <a16:creationId xmlns:a16="http://schemas.microsoft.com/office/drawing/2014/main" id="{2020394A-E4C1-4C78-9D84-C67D3F42E6FC}"/>
+                </a:ext>
+              </a:extLst>
+            </p:cNvPr>
+            <p:cNvSpPr/>
+            <p:nvPr/>
+          </p:nvSpPr>
+          <p:spPr>
+            <a:xfrm>
+              <a:off x="1075981" y="906401"/>
+              <a:ext cx="62865" cy="247650"/>
+            </a:xfrm>
+            <a:custGeom>
+              <a:avLst/>
+              <a:gdLst>
+                <a:gd name="connsiteX0" fmla="*/ 0 w 62865"/>
+                <a:gd name="connsiteY0" fmla="*/ 0 h 247650"/>
+                <a:gd name="connsiteX1" fmla="*/ 23813 w 62865"/>
+                <a:gd name="connsiteY1" fmla="*/ 247650 h 247650"/>
+                <a:gd name="connsiteX2" fmla="*/ 62865 w 62865"/>
+                <a:gd name="connsiteY2" fmla="*/ 247650 h 247650"/>
+                <a:gd name="connsiteX3" fmla="*/ 38100 w 62865"/>
+                <a:gd name="connsiteY3" fmla="*/ 0 h 247650"/>
+              </a:gdLst>
+              <a:ahLst/>
+              <a:cxnLst>
+                <a:cxn ang="0">
+                  <a:pos x="connsiteX0" y="connsiteY0"/>
+                </a:cxn>
+                <a:cxn ang="0">
+                  <a:pos x="connsiteX1" y="connsiteY1"/>
+                </a:cxn>
+                <a:cxn ang="0">
+                  <a:pos x="connsiteX2" y="connsiteY2"/>
+                </a:cxn>
+                <a:cxn ang="0">
+                  <a:pos x="connsiteX3" y="connsiteY3"/>
+                </a:cxn>
+              </a:cxnLst>
+              <a:rect l="l" t="t" r="r" b="b"/>
+              <a:pathLst>
+                <a:path w="62865" h="247650">
+                  <a:moveTo>
+                    <a:pt x="0" y="0"/>
+                  </a:moveTo>
+                  <a:lnTo>
+                    <a:pt x="23813" y="247650"/>
+                  </a:lnTo>
+                  <a:lnTo>
+                    <a:pt x="62865" y="247650"/>
+                  </a:lnTo>
+                  <a:lnTo>
+                    <a:pt x="38100" y="0"/>
+                  </a:lnTo>
+                  <a:close/>
+                </a:path>
+              </a:pathLst>
+            </a:custGeom>
+            <a:solidFill>
+              <a:srgbClr val="1E91D6"/>
+            </a:solidFill>
+            <a:ln w="9525" cap="flat">
+              <a:noFill/>
+              <a:prstDash val="solid"/>
+              <a:miter/>
+            </a:ln>
+          </p:spPr>
+          <p:txBody>
+            <a:bodyPr rtlCol="0" anchor="ctr"/>
+            <a:lstStyle/>
+            <a:p>
+              <a:endParaRPr lang="en-GB"/>
+            </a:p>
+          </p:txBody>
+        </p:sp>
+      </p:grpSp>
     </p:spTree>
     <p:extLst>
       <p:ext uri="{BB962C8B-B14F-4D97-AF65-F5344CB8AC3E}">

</xml_diff>

<commit_message>
FE-762 Changing emergency support to dark blue
</commit_message>
<xml_diff>
--- a/HelpMyStreetFE/HelpMyStreetFE/src/pptx/Icons.pptx
+++ b/HelpMyStreetFE/HelpMyStreetFE/src/pptx/Icons.pptx
@@ -265,7 +265,7 @@
           <a:p>
             <a:fld id="{B2EC5630-BBBD-40F6-B459-AD74AAD6AD00}" type="datetimeFigureOut">
               <a:rPr lang="en-GB" smtClean="0"/>
-              <a:t>10/03/2021</a:t>
+              <a:t>12/03/2021</a:t>
             </a:fld>
             <a:endParaRPr lang="en-GB"/>
           </a:p>
@@ -465,7 +465,7 @@
           <a:p>
             <a:fld id="{B2EC5630-BBBD-40F6-B459-AD74AAD6AD00}" type="datetimeFigureOut">
               <a:rPr lang="en-GB" smtClean="0"/>
-              <a:t>10/03/2021</a:t>
+              <a:t>12/03/2021</a:t>
             </a:fld>
             <a:endParaRPr lang="en-GB"/>
           </a:p>
@@ -675,7 +675,7 @@
           <a:p>
             <a:fld id="{B2EC5630-BBBD-40F6-B459-AD74AAD6AD00}" type="datetimeFigureOut">
               <a:rPr lang="en-GB" smtClean="0"/>
-              <a:t>10/03/2021</a:t>
+              <a:t>12/03/2021</a:t>
             </a:fld>
             <a:endParaRPr lang="en-GB"/>
           </a:p>
@@ -875,7 +875,7 @@
           <a:p>
             <a:fld id="{B2EC5630-BBBD-40F6-B459-AD74AAD6AD00}" type="datetimeFigureOut">
               <a:rPr lang="en-GB" smtClean="0"/>
-              <a:t>10/03/2021</a:t>
+              <a:t>12/03/2021</a:t>
             </a:fld>
             <a:endParaRPr lang="en-GB"/>
           </a:p>
@@ -1151,7 +1151,7 @@
           <a:p>
             <a:fld id="{B2EC5630-BBBD-40F6-B459-AD74AAD6AD00}" type="datetimeFigureOut">
               <a:rPr lang="en-GB" smtClean="0"/>
-              <a:t>10/03/2021</a:t>
+              <a:t>12/03/2021</a:t>
             </a:fld>
             <a:endParaRPr lang="en-GB"/>
           </a:p>
@@ -1419,7 +1419,7 @@
           <a:p>
             <a:fld id="{B2EC5630-BBBD-40F6-B459-AD74AAD6AD00}" type="datetimeFigureOut">
               <a:rPr lang="en-GB" smtClean="0"/>
-              <a:t>10/03/2021</a:t>
+              <a:t>12/03/2021</a:t>
             </a:fld>
             <a:endParaRPr lang="en-GB"/>
           </a:p>
@@ -1834,7 +1834,7 @@
           <a:p>
             <a:fld id="{B2EC5630-BBBD-40F6-B459-AD74AAD6AD00}" type="datetimeFigureOut">
               <a:rPr lang="en-GB" smtClean="0"/>
-              <a:t>10/03/2021</a:t>
+              <a:t>12/03/2021</a:t>
             </a:fld>
             <a:endParaRPr lang="en-GB"/>
           </a:p>
@@ -1976,7 +1976,7 @@
           <a:p>
             <a:fld id="{B2EC5630-BBBD-40F6-B459-AD74AAD6AD00}" type="datetimeFigureOut">
               <a:rPr lang="en-GB" smtClean="0"/>
-              <a:t>10/03/2021</a:t>
+              <a:t>12/03/2021</a:t>
             </a:fld>
             <a:endParaRPr lang="en-GB"/>
           </a:p>
@@ -2089,7 +2089,7 @@
           <a:p>
             <a:fld id="{B2EC5630-BBBD-40F6-B459-AD74AAD6AD00}" type="datetimeFigureOut">
               <a:rPr lang="en-GB" smtClean="0"/>
-              <a:t>10/03/2021</a:t>
+              <a:t>12/03/2021</a:t>
             </a:fld>
             <a:endParaRPr lang="en-GB"/>
           </a:p>
@@ -2402,7 +2402,7 @@
           <a:p>
             <a:fld id="{B2EC5630-BBBD-40F6-B459-AD74AAD6AD00}" type="datetimeFigureOut">
               <a:rPr lang="en-GB" smtClean="0"/>
-              <a:t>10/03/2021</a:t>
+              <a:t>12/03/2021</a:t>
             </a:fld>
             <a:endParaRPr lang="en-GB"/>
           </a:p>
@@ -2691,7 +2691,7 @@
           <a:p>
             <a:fld id="{B2EC5630-BBBD-40F6-B459-AD74AAD6AD00}" type="datetimeFigureOut">
               <a:rPr lang="en-GB" smtClean="0"/>
-              <a:t>10/03/2021</a:t>
+              <a:t>12/03/2021</a:t>
             </a:fld>
             <a:endParaRPr lang="en-GB"/>
           </a:p>
@@ -2934,7 +2934,7 @@
           <a:p>
             <a:fld id="{B2EC5630-BBBD-40F6-B459-AD74AAD6AD00}" type="datetimeFigureOut">
               <a:rPr lang="en-GB" smtClean="0"/>
-              <a:t>10/03/2021</a:t>
+              <a:t>12/03/2021</a:t>
             </a:fld>
             <a:endParaRPr lang="en-GB"/>
           </a:p>
@@ -10828,10 +10828,10 @@
       </p:grpSp>
       <p:grpSp>
         <p:nvGrpSpPr>
-          <p:cNvPr id="33" name="Group 32">
+          <p:cNvPr id="2" name="Group 1">
             <a:extLst>
               <a:ext uri="{FF2B5EF4-FFF2-40B4-BE49-F238E27FC236}">
-                <a16:creationId xmlns:a16="http://schemas.microsoft.com/office/drawing/2014/main" id="{E1B6E294-745A-4066-A80B-5347DC3938B6}"/>
+                <a16:creationId xmlns:a16="http://schemas.microsoft.com/office/drawing/2014/main" id="{D1F887D9-CCD6-44DE-9C8B-423DEDE96A9A}"/>
               </a:ext>
             </a:extLst>
           </p:cNvPr>
@@ -10842,7 +10842,7 @@
           <a:xfrm>
             <a:off x="394685" y="735262"/>
             <a:ext cx="647700" cy="647700"/>
-            <a:chOff x="706412" y="658751"/>
+            <a:chOff x="394685" y="735262"/>
             <a:chExt cx="647700" cy="647700"/>
           </a:xfrm>
         </p:grpSpPr>
@@ -10860,7 +10860,7 @@
           </p:nvSpPr>
           <p:spPr>
             <a:xfrm>
-              <a:off x="1011212" y="658751"/>
+              <a:off x="699485" y="735262"/>
               <a:ext cx="38100" cy="114300"/>
             </a:xfrm>
             <a:custGeom>
@@ -10910,7 +10910,7 @@
               </a:pathLst>
             </a:custGeom>
             <a:solidFill>
-              <a:srgbClr val="1E91D6"/>
+              <a:srgbClr val="001489"/>
             </a:solidFill>
             <a:ln w="9525" cap="flat">
               <a:noFill/>
@@ -10940,7 +10940,7 @@
           </p:nvSpPr>
           <p:spPr>
             <a:xfrm rot="8100000">
-              <a:off x="1209806" y="730671"/>
+              <a:off x="898079" y="807182"/>
               <a:ext cx="107631" cy="38099"/>
             </a:xfrm>
             <a:custGeom>
@@ -10990,7 +10990,7 @@
               </a:pathLst>
             </a:custGeom>
             <a:solidFill>
-              <a:srgbClr val="1E91D6"/>
+              <a:srgbClr val="001489"/>
             </a:solidFill>
             <a:ln w="9525" cap="flat">
               <a:noFill/>
@@ -11020,7 +11020,7 @@
           </p:nvSpPr>
           <p:spPr>
             <a:xfrm rot="8100000">
-              <a:off x="777372" y="695425"/>
+              <a:off x="465645" y="771936"/>
               <a:ext cx="38099" cy="107631"/>
             </a:xfrm>
             <a:custGeom>
@@ -11070,7 +11070,7 @@
               </a:pathLst>
             </a:custGeom>
             <a:solidFill>
-              <a:srgbClr val="1E91D6"/>
+              <a:srgbClr val="001489"/>
             </a:solidFill>
             <a:ln w="9525" cap="flat">
               <a:noFill/>
@@ -11100,7 +11100,7 @@
           </p:nvSpPr>
           <p:spPr>
             <a:xfrm>
-              <a:off x="1258862" y="925451"/>
+              <a:off x="947135" y="1001962"/>
               <a:ext cx="95250" cy="38100"/>
             </a:xfrm>
             <a:custGeom>
@@ -11150,7 +11150,7 @@
               </a:pathLst>
             </a:custGeom>
             <a:solidFill>
-              <a:srgbClr val="1E91D6"/>
+              <a:srgbClr val="001489"/>
             </a:solidFill>
             <a:ln w="9525" cap="flat">
               <a:noFill/>
@@ -11180,7 +11180,7 @@
           </p:nvSpPr>
           <p:spPr>
             <a:xfrm>
-              <a:off x="706412" y="925451"/>
+              <a:off x="394685" y="1001962"/>
               <a:ext cx="95250" cy="38100"/>
             </a:xfrm>
             <a:custGeom>
@@ -11230,7 +11230,7 @@
               </a:pathLst>
             </a:custGeom>
             <a:solidFill>
-              <a:srgbClr val="1E91D6"/>
+              <a:srgbClr val="001489"/>
             </a:solidFill>
             <a:ln w="9525" cap="flat">
               <a:noFill/>
@@ -11260,7 +11260,7 @@
           </p:nvSpPr>
           <p:spPr>
             <a:xfrm>
-              <a:off x="706412" y="811151"/>
+              <a:off x="394685" y="887662"/>
               <a:ext cx="647700" cy="495300"/>
             </a:xfrm>
             <a:custGeom>
@@ -11443,7 +11443,7 @@
               </a:pathLst>
             </a:custGeom>
             <a:solidFill>
-              <a:srgbClr val="1E91D6"/>
+              <a:srgbClr val="001489"/>
             </a:solidFill>
             <a:ln w="9525" cap="flat">
               <a:noFill/>
@@ -11473,7 +11473,7 @@
           </p:nvSpPr>
           <p:spPr>
             <a:xfrm>
-              <a:off x="1075981" y="906401"/>
+              <a:off x="764254" y="982912"/>
               <a:ext cx="62865" cy="247650"/>
             </a:xfrm>
             <a:custGeom>
@@ -11523,7 +11523,7 @@
               </a:pathLst>
             </a:custGeom>
             <a:solidFill>
-              <a:srgbClr val="1E91D6"/>
+              <a:srgbClr val="001489"/>
             </a:solidFill>
             <a:ln w="9525" cap="flat">
               <a:noFill/>

</xml_diff>

<commit_message>
FE-723 Icon colour updates
</commit_message>
<xml_diff>
--- a/HelpMyStreetFE/HelpMyStreetFE/src/pptx/Icons.pptx
+++ b/HelpMyStreetFE/HelpMyStreetFE/src/pptx/Icons.pptx
@@ -6730,10 +6730,10 @@
       </p:grpSpPr>
       <p:grpSp>
         <p:nvGrpSpPr>
-          <p:cNvPr id="18" name="Group 17">
+          <p:cNvPr id="29" name="Group 28">
             <a:extLst>
               <a:ext uri="{FF2B5EF4-FFF2-40B4-BE49-F238E27FC236}">
-                <a16:creationId xmlns:a16="http://schemas.microsoft.com/office/drawing/2014/main" id="{6D34F1F0-9540-46C0-9541-837F2D30A7FE}"/>
+                <a16:creationId xmlns:a16="http://schemas.microsoft.com/office/drawing/2014/main" id="{BDB55361-CAA1-4612-84A2-26C3FCDC1BF1}"/>
               </a:ext>
             </a:extLst>
           </p:cNvPr>
@@ -6925,7 +6925,7 @@
               </a:pathLst>
             </a:custGeom>
             <a:solidFill>
-              <a:srgbClr val="000F86"/>
+              <a:srgbClr val="1E91D6"/>
             </a:solidFill>
             <a:ln w="33734" cap="flat">
               <a:noFill/>
@@ -7033,7 +7033,7 @@
               </a:pathLst>
             </a:custGeom>
             <a:solidFill>
-              <a:srgbClr val="000F86"/>
+              <a:srgbClr val="1E91D6"/>
             </a:solidFill>
             <a:ln w="33734" cap="flat">
               <a:noFill/>
@@ -7296,7 +7296,7 @@
               </a:pathLst>
             </a:custGeom>
             <a:solidFill>
-              <a:srgbClr val="000F86"/>
+              <a:srgbClr val="1E91D6"/>
             </a:solidFill>
             <a:ln w="13395" cap="flat">
               <a:noFill/>
@@ -7441,7 +7441,7 @@
               </a:pathLst>
             </a:custGeom>
             <a:solidFill>
-              <a:srgbClr val="000F86"/>
+              <a:srgbClr val="1E91D6"/>
             </a:solidFill>
             <a:ln w="13395" cap="flat">
               <a:noFill/>
@@ -7704,7 +7704,7 @@
               </a:pathLst>
             </a:custGeom>
             <a:solidFill>
-              <a:srgbClr val="000F86"/>
+              <a:srgbClr val="1E91D6"/>
             </a:solidFill>
             <a:ln w="13395" cap="flat">
               <a:noFill/>
@@ -7849,7 +7849,7 @@
               </a:pathLst>
             </a:custGeom>
             <a:solidFill>
-              <a:srgbClr val="000F86"/>
+              <a:srgbClr val="1E91D6"/>
             </a:solidFill>
             <a:ln w="13395" cap="flat">
               <a:noFill/>
@@ -10129,10 +10129,10 @@
       </p:sp>
       <p:grpSp>
         <p:nvGrpSpPr>
-          <p:cNvPr id="28" name="Group 27">
+          <p:cNvPr id="39" name="Group 38">
             <a:extLst>
               <a:ext uri="{FF2B5EF4-FFF2-40B4-BE49-F238E27FC236}">
-                <a16:creationId xmlns:a16="http://schemas.microsoft.com/office/drawing/2014/main" id="{04B349CD-64FE-480B-B1C5-B0CC2DE6FFAB}"/>
+                <a16:creationId xmlns:a16="http://schemas.microsoft.com/office/drawing/2014/main" id="{B64F92D4-BD15-49AC-8370-716938B4E110}"/>
               </a:ext>
             </a:extLst>
           </p:cNvPr>
@@ -11524,6 +11524,705 @@
             </a:custGeom>
             <a:solidFill>
               <a:srgbClr val="001489"/>
+            </a:solidFill>
+            <a:ln w="9525" cap="flat">
+              <a:noFill/>
+              <a:prstDash val="solid"/>
+              <a:miter/>
+            </a:ln>
+          </p:spPr>
+          <p:txBody>
+            <a:bodyPr rtlCol="0" anchor="ctr"/>
+            <a:lstStyle/>
+            <a:p>
+              <a:endParaRPr lang="en-GB"/>
+            </a:p>
+          </p:txBody>
+        </p:sp>
+      </p:grpSp>
+      <p:grpSp>
+        <p:nvGrpSpPr>
+          <p:cNvPr id="35" name="Group 34">
+            <a:extLst>
+              <a:ext uri="{FF2B5EF4-FFF2-40B4-BE49-F238E27FC236}">
+                <a16:creationId xmlns:a16="http://schemas.microsoft.com/office/drawing/2014/main" id="{596624E5-EFB6-4D77-BD23-92CDA50C6B2E}"/>
+              </a:ext>
+            </a:extLst>
+          </p:cNvPr>
+          <p:cNvGrpSpPr/>
+          <p:nvPr/>
+        </p:nvGrpSpPr>
+        <p:grpSpPr>
+          <a:xfrm>
+            <a:off x="2857966" y="5608874"/>
+            <a:ext cx="761999" cy="504825"/>
+            <a:chOff x="939356" y="4952169"/>
+            <a:chExt cx="761999" cy="504825"/>
+          </a:xfrm>
+        </p:grpSpPr>
+        <p:sp>
+          <p:nvSpPr>
+            <p:cNvPr id="36" name="Freeform: Shape 35">
+              <a:extLst>
+                <a:ext uri="{FF2B5EF4-FFF2-40B4-BE49-F238E27FC236}">
+                  <a16:creationId xmlns:a16="http://schemas.microsoft.com/office/drawing/2014/main" id="{67E3E0D7-E4D1-4B8B-BD6F-29A828393238}"/>
+                </a:ext>
+              </a:extLst>
+            </p:cNvPr>
+            <p:cNvSpPr/>
+            <p:nvPr/>
+          </p:nvSpPr>
+          <p:spPr>
+            <a:xfrm>
+              <a:off x="1082231" y="5104569"/>
+              <a:ext cx="495300" cy="352425"/>
+            </a:xfrm>
+            <a:custGeom>
+              <a:avLst/>
+              <a:gdLst>
+                <a:gd name="connsiteX0" fmla="*/ 266700 w 495300"/>
+                <a:gd name="connsiteY0" fmla="*/ 57150 h 352425"/>
+                <a:gd name="connsiteX1" fmla="*/ 466725 w 495300"/>
+                <a:gd name="connsiteY1" fmla="*/ 57150 h 352425"/>
+                <a:gd name="connsiteX2" fmla="*/ 495300 w 495300"/>
+                <a:gd name="connsiteY2" fmla="*/ 28575 h 352425"/>
+                <a:gd name="connsiteX3" fmla="*/ 466725 w 495300"/>
+                <a:gd name="connsiteY3" fmla="*/ 0 h 352425"/>
+                <a:gd name="connsiteX4" fmla="*/ 28575 w 495300"/>
+                <a:gd name="connsiteY4" fmla="*/ 0 h 352425"/>
+                <a:gd name="connsiteX5" fmla="*/ 0 w 495300"/>
+                <a:gd name="connsiteY5" fmla="*/ 28575 h 352425"/>
+                <a:gd name="connsiteX6" fmla="*/ 28575 w 495300"/>
+                <a:gd name="connsiteY6" fmla="*/ 57150 h 352425"/>
+                <a:gd name="connsiteX7" fmla="*/ 209550 w 495300"/>
+                <a:gd name="connsiteY7" fmla="*/ 57150 h 352425"/>
+                <a:gd name="connsiteX8" fmla="*/ 209550 w 495300"/>
+                <a:gd name="connsiteY8" fmla="*/ 295275 h 352425"/>
+                <a:gd name="connsiteX9" fmla="*/ 152400 w 495300"/>
+                <a:gd name="connsiteY9" fmla="*/ 295275 h 352425"/>
+                <a:gd name="connsiteX10" fmla="*/ 152400 w 495300"/>
+                <a:gd name="connsiteY10" fmla="*/ 352425 h 352425"/>
+                <a:gd name="connsiteX11" fmla="*/ 323850 w 495300"/>
+                <a:gd name="connsiteY11" fmla="*/ 352425 h 352425"/>
+                <a:gd name="connsiteX12" fmla="*/ 323850 w 495300"/>
+                <a:gd name="connsiteY12" fmla="*/ 295275 h 352425"/>
+                <a:gd name="connsiteX13" fmla="*/ 266700 w 495300"/>
+                <a:gd name="connsiteY13" fmla="*/ 295275 h 352425"/>
+                <a:gd name="connsiteX14" fmla="*/ 266700 w 495300"/>
+                <a:gd name="connsiteY14" fmla="*/ 57150 h 352425"/>
+              </a:gdLst>
+              <a:ahLst/>
+              <a:cxnLst>
+                <a:cxn ang="0">
+                  <a:pos x="connsiteX0" y="connsiteY0"/>
+                </a:cxn>
+                <a:cxn ang="0">
+                  <a:pos x="connsiteX1" y="connsiteY1"/>
+                </a:cxn>
+                <a:cxn ang="0">
+                  <a:pos x="connsiteX2" y="connsiteY2"/>
+                </a:cxn>
+                <a:cxn ang="0">
+                  <a:pos x="connsiteX3" y="connsiteY3"/>
+                </a:cxn>
+                <a:cxn ang="0">
+                  <a:pos x="connsiteX4" y="connsiteY4"/>
+                </a:cxn>
+                <a:cxn ang="0">
+                  <a:pos x="connsiteX5" y="connsiteY5"/>
+                </a:cxn>
+                <a:cxn ang="0">
+                  <a:pos x="connsiteX6" y="connsiteY6"/>
+                </a:cxn>
+                <a:cxn ang="0">
+                  <a:pos x="connsiteX7" y="connsiteY7"/>
+                </a:cxn>
+                <a:cxn ang="0">
+                  <a:pos x="connsiteX8" y="connsiteY8"/>
+                </a:cxn>
+                <a:cxn ang="0">
+                  <a:pos x="connsiteX9" y="connsiteY9"/>
+                </a:cxn>
+                <a:cxn ang="0">
+                  <a:pos x="connsiteX10" y="connsiteY10"/>
+                </a:cxn>
+                <a:cxn ang="0">
+                  <a:pos x="connsiteX11" y="connsiteY11"/>
+                </a:cxn>
+                <a:cxn ang="0">
+                  <a:pos x="connsiteX12" y="connsiteY12"/>
+                </a:cxn>
+                <a:cxn ang="0">
+                  <a:pos x="connsiteX13" y="connsiteY13"/>
+                </a:cxn>
+                <a:cxn ang="0">
+                  <a:pos x="connsiteX14" y="connsiteY14"/>
+                </a:cxn>
+              </a:cxnLst>
+              <a:rect l="l" t="t" r="r" b="b"/>
+              <a:pathLst>
+                <a:path w="495300" h="352425">
+                  <a:moveTo>
+                    <a:pt x="266700" y="57150"/>
+                  </a:moveTo>
+                  <a:lnTo>
+                    <a:pt x="466725" y="57150"/>
+                  </a:lnTo>
+                  <a:cubicBezTo>
+                    <a:pt x="482917" y="57150"/>
+                    <a:pt x="495300" y="44768"/>
+                    <a:pt x="495300" y="28575"/>
+                  </a:cubicBezTo>
+                  <a:cubicBezTo>
+                    <a:pt x="495300" y="12382"/>
+                    <a:pt x="482917" y="0"/>
+                    <a:pt x="466725" y="0"/>
+                  </a:cubicBezTo>
+                  <a:lnTo>
+                    <a:pt x="28575" y="0"/>
+                  </a:lnTo>
+                  <a:cubicBezTo>
+                    <a:pt x="12382" y="0"/>
+                    <a:pt x="0" y="12382"/>
+                    <a:pt x="0" y="28575"/>
+                  </a:cubicBezTo>
+                  <a:cubicBezTo>
+                    <a:pt x="0" y="44768"/>
+                    <a:pt x="12382" y="57150"/>
+                    <a:pt x="28575" y="57150"/>
+                  </a:cubicBezTo>
+                  <a:lnTo>
+                    <a:pt x="209550" y="57150"/>
+                  </a:lnTo>
+                  <a:lnTo>
+                    <a:pt x="209550" y="295275"/>
+                  </a:lnTo>
+                  <a:lnTo>
+                    <a:pt x="152400" y="295275"/>
+                  </a:lnTo>
+                  <a:lnTo>
+                    <a:pt x="152400" y="352425"/>
+                  </a:lnTo>
+                  <a:lnTo>
+                    <a:pt x="323850" y="352425"/>
+                  </a:lnTo>
+                  <a:lnTo>
+                    <a:pt x="323850" y="295275"/>
+                  </a:lnTo>
+                  <a:lnTo>
+                    <a:pt x="266700" y="295275"/>
+                  </a:lnTo>
+                  <a:lnTo>
+                    <a:pt x="266700" y="57150"/>
+                  </a:lnTo>
+                  <a:close/>
+                </a:path>
+              </a:pathLst>
+            </a:custGeom>
+            <a:solidFill>
+              <a:srgbClr val="574AE2"/>
+            </a:solidFill>
+            <a:ln w="9525" cap="flat">
+              <a:noFill/>
+              <a:prstDash val="solid"/>
+              <a:miter/>
+            </a:ln>
+          </p:spPr>
+          <p:txBody>
+            <a:bodyPr rtlCol="0" anchor="ctr"/>
+            <a:lstStyle/>
+            <a:p>
+              <a:endParaRPr lang="en-GB"/>
+            </a:p>
+          </p:txBody>
+        </p:sp>
+        <p:sp>
+          <p:nvSpPr>
+            <p:cNvPr id="37" name="Freeform: Shape 36">
+              <a:extLst>
+                <a:ext uri="{FF2B5EF4-FFF2-40B4-BE49-F238E27FC236}">
+                  <a16:creationId xmlns:a16="http://schemas.microsoft.com/office/drawing/2014/main" id="{29AF096A-8FAE-4044-A97B-CA1CC01D992F}"/>
+                </a:ext>
+              </a:extLst>
+            </p:cNvPr>
+            <p:cNvSpPr/>
+            <p:nvPr/>
+          </p:nvSpPr>
+          <p:spPr>
+            <a:xfrm>
+              <a:off x="939356" y="4952169"/>
+              <a:ext cx="286702" cy="504825"/>
+            </a:xfrm>
+            <a:custGeom>
+              <a:avLst/>
+              <a:gdLst>
+                <a:gd name="connsiteX0" fmla="*/ 258127 w 286702"/>
+                <a:gd name="connsiteY0" fmla="*/ 285750 h 504825"/>
+                <a:gd name="connsiteX1" fmla="*/ 82868 w 286702"/>
+                <a:gd name="connsiteY1" fmla="*/ 285750 h 504825"/>
+                <a:gd name="connsiteX2" fmla="*/ 57150 w 286702"/>
+                <a:gd name="connsiteY2" fmla="*/ 25718 h 504825"/>
+                <a:gd name="connsiteX3" fmla="*/ 57150 w 286702"/>
+                <a:gd name="connsiteY3" fmla="*/ 25718 h 504825"/>
+                <a:gd name="connsiteX4" fmla="*/ 28575 w 286702"/>
+                <a:gd name="connsiteY4" fmla="*/ 0 h 504825"/>
+                <a:gd name="connsiteX5" fmla="*/ 0 w 286702"/>
+                <a:gd name="connsiteY5" fmla="*/ 28575 h 504825"/>
+                <a:gd name="connsiteX6" fmla="*/ 0 w 286702"/>
+                <a:gd name="connsiteY6" fmla="*/ 31432 h 504825"/>
+                <a:gd name="connsiteX7" fmla="*/ 0 w 286702"/>
+                <a:gd name="connsiteY7" fmla="*/ 31432 h 504825"/>
+                <a:gd name="connsiteX8" fmla="*/ 28575 w 286702"/>
+                <a:gd name="connsiteY8" fmla="*/ 313373 h 504825"/>
+                <a:gd name="connsiteX9" fmla="*/ 953 w 286702"/>
+                <a:gd name="connsiteY9" fmla="*/ 504825 h 504825"/>
+                <a:gd name="connsiteX10" fmla="*/ 59055 w 286702"/>
+                <a:gd name="connsiteY10" fmla="*/ 504825 h 504825"/>
+                <a:gd name="connsiteX11" fmla="*/ 68580 w 286702"/>
+                <a:gd name="connsiteY11" fmla="*/ 438150 h 504825"/>
+                <a:gd name="connsiteX12" fmla="*/ 200025 w 286702"/>
+                <a:gd name="connsiteY12" fmla="*/ 438150 h 504825"/>
+                <a:gd name="connsiteX13" fmla="*/ 200025 w 286702"/>
+                <a:gd name="connsiteY13" fmla="*/ 504825 h 504825"/>
+                <a:gd name="connsiteX14" fmla="*/ 257175 w 286702"/>
+                <a:gd name="connsiteY14" fmla="*/ 504825 h 504825"/>
+                <a:gd name="connsiteX15" fmla="*/ 257175 w 286702"/>
+                <a:gd name="connsiteY15" fmla="*/ 342900 h 504825"/>
+                <a:gd name="connsiteX16" fmla="*/ 258127 w 286702"/>
+                <a:gd name="connsiteY16" fmla="*/ 342900 h 504825"/>
+                <a:gd name="connsiteX17" fmla="*/ 286703 w 286702"/>
+                <a:gd name="connsiteY17" fmla="*/ 314325 h 504825"/>
+                <a:gd name="connsiteX18" fmla="*/ 258127 w 286702"/>
+                <a:gd name="connsiteY18" fmla="*/ 285750 h 504825"/>
+                <a:gd name="connsiteX19" fmla="*/ 200025 w 286702"/>
+                <a:gd name="connsiteY19" fmla="*/ 400050 h 504825"/>
+                <a:gd name="connsiteX20" fmla="*/ 73343 w 286702"/>
+                <a:gd name="connsiteY20" fmla="*/ 400050 h 504825"/>
+                <a:gd name="connsiteX21" fmla="*/ 81915 w 286702"/>
+                <a:gd name="connsiteY21" fmla="*/ 342900 h 504825"/>
+                <a:gd name="connsiteX22" fmla="*/ 200025 w 286702"/>
+                <a:gd name="connsiteY22" fmla="*/ 342900 h 504825"/>
+                <a:gd name="connsiteX23" fmla="*/ 200025 w 286702"/>
+                <a:gd name="connsiteY23" fmla="*/ 400050 h 504825"/>
+              </a:gdLst>
+              <a:ahLst/>
+              <a:cxnLst>
+                <a:cxn ang="0">
+                  <a:pos x="connsiteX0" y="connsiteY0"/>
+                </a:cxn>
+                <a:cxn ang="0">
+                  <a:pos x="connsiteX1" y="connsiteY1"/>
+                </a:cxn>
+                <a:cxn ang="0">
+                  <a:pos x="connsiteX2" y="connsiteY2"/>
+                </a:cxn>
+                <a:cxn ang="0">
+                  <a:pos x="connsiteX3" y="connsiteY3"/>
+                </a:cxn>
+                <a:cxn ang="0">
+                  <a:pos x="connsiteX4" y="connsiteY4"/>
+                </a:cxn>
+                <a:cxn ang="0">
+                  <a:pos x="connsiteX5" y="connsiteY5"/>
+                </a:cxn>
+                <a:cxn ang="0">
+                  <a:pos x="connsiteX6" y="connsiteY6"/>
+                </a:cxn>
+                <a:cxn ang="0">
+                  <a:pos x="connsiteX7" y="connsiteY7"/>
+                </a:cxn>
+                <a:cxn ang="0">
+                  <a:pos x="connsiteX8" y="connsiteY8"/>
+                </a:cxn>
+                <a:cxn ang="0">
+                  <a:pos x="connsiteX9" y="connsiteY9"/>
+                </a:cxn>
+                <a:cxn ang="0">
+                  <a:pos x="connsiteX10" y="connsiteY10"/>
+                </a:cxn>
+                <a:cxn ang="0">
+                  <a:pos x="connsiteX11" y="connsiteY11"/>
+                </a:cxn>
+                <a:cxn ang="0">
+                  <a:pos x="connsiteX12" y="connsiteY12"/>
+                </a:cxn>
+                <a:cxn ang="0">
+                  <a:pos x="connsiteX13" y="connsiteY13"/>
+                </a:cxn>
+                <a:cxn ang="0">
+                  <a:pos x="connsiteX14" y="connsiteY14"/>
+                </a:cxn>
+                <a:cxn ang="0">
+                  <a:pos x="connsiteX15" y="connsiteY15"/>
+                </a:cxn>
+                <a:cxn ang="0">
+                  <a:pos x="connsiteX16" y="connsiteY16"/>
+                </a:cxn>
+                <a:cxn ang="0">
+                  <a:pos x="connsiteX17" y="connsiteY17"/>
+                </a:cxn>
+                <a:cxn ang="0">
+                  <a:pos x="connsiteX18" y="connsiteY18"/>
+                </a:cxn>
+                <a:cxn ang="0">
+                  <a:pos x="connsiteX19" y="connsiteY19"/>
+                </a:cxn>
+                <a:cxn ang="0">
+                  <a:pos x="connsiteX20" y="connsiteY20"/>
+                </a:cxn>
+                <a:cxn ang="0">
+                  <a:pos x="connsiteX21" y="connsiteY21"/>
+                </a:cxn>
+                <a:cxn ang="0">
+                  <a:pos x="connsiteX22" y="connsiteY22"/>
+                </a:cxn>
+                <a:cxn ang="0">
+                  <a:pos x="connsiteX23" y="connsiteY23"/>
+                </a:cxn>
+              </a:cxnLst>
+              <a:rect l="l" t="t" r="r" b="b"/>
+              <a:pathLst>
+                <a:path w="286702" h="504825">
+                  <a:moveTo>
+                    <a:pt x="258127" y="285750"/>
+                  </a:moveTo>
+                  <a:lnTo>
+                    <a:pt x="82868" y="285750"/>
+                  </a:lnTo>
+                  <a:lnTo>
+                    <a:pt x="57150" y="25718"/>
+                  </a:lnTo>
+                  <a:lnTo>
+                    <a:pt x="57150" y="25718"/>
+                  </a:lnTo>
+                  <a:cubicBezTo>
+                    <a:pt x="55245" y="11430"/>
+                    <a:pt x="43815" y="0"/>
+                    <a:pt x="28575" y="0"/>
+                  </a:cubicBezTo>
+                  <a:cubicBezTo>
+                    <a:pt x="12383" y="0"/>
+                    <a:pt x="0" y="12382"/>
+                    <a:pt x="0" y="28575"/>
+                  </a:cubicBezTo>
+                  <a:cubicBezTo>
+                    <a:pt x="0" y="29528"/>
+                    <a:pt x="0" y="30480"/>
+                    <a:pt x="0" y="31432"/>
+                  </a:cubicBezTo>
+                  <a:lnTo>
+                    <a:pt x="0" y="31432"/>
+                  </a:lnTo>
+                  <a:lnTo>
+                    <a:pt x="28575" y="313373"/>
+                  </a:lnTo>
+                  <a:lnTo>
+                    <a:pt x="953" y="504825"/>
+                  </a:lnTo>
+                  <a:lnTo>
+                    <a:pt x="59055" y="504825"/>
+                  </a:lnTo>
+                  <a:lnTo>
+                    <a:pt x="68580" y="438150"/>
+                  </a:lnTo>
+                  <a:lnTo>
+                    <a:pt x="200025" y="438150"/>
+                  </a:lnTo>
+                  <a:lnTo>
+                    <a:pt x="200025" y="504825"/>
+                  </a:lnTo>
+                  <a:lnTo>
+                    <a:pt x="257175" y="504825"/>
+                  </a:lnTo>
+                  <a:lnTo>
+                    <a:pt x="257175" y="342900"/>
+                  </a:lnTo>
+                  <a:lnTo>
+                    <a:pt x="258127" y="342900"/>
+                  </a:lnTo>
+                  <a:cubicBezTo>
+                    <a:pt x="274320" y="342900"/>
+                    <a:pt x="286703" y="330518"/>
+                    <a:pt x="286703" y="314325"/>
+                  </a:cubicBezTo>
+                  <a:cubicBezTo>
+                    <a:pt x="286703" y="298133"/>
+                    <a:pt x="273368" y="285750"/>
+                    <a:pt x="258127" y="285750"/>
+                  </a:cubicBezTo>
+                  <a:close/>
+                  <a:moveTo>
+                    <a:pt x="200025" y="400050"/>
+                  </a:moveTo>
+                  <a:lnTo>
+                    <a:pt x="73343" y="400050"/>
+                  </a:lnTo>
+                  <a:lnTo>
+                    <a:pt x="81915" y="342900"/>
+                  </a:lnTo>
+                  <a:lnTo>
+                    <a:pt x="200025" y="342900"/>
+                  </a:lnTo>
+                  <a:lnTo>
+                    <a:pt x="200025" y="400050"/>
+                  </a:lnTo>
+                  <a:close/>
+                </a:path>
+              </a:pathLst>
+            </a:custGeom>
+            <a:solidFill>
+              <a:srgbClr val="574AE2"/>
+            </a:solidFill>
+            <a:ln w="9525" cap="flat">
+              <a:noFill/>
+              <a:prstDash val="solid"/>
+              <a:miter/>
+            </a:ln>
+          </p:spPr>
+          <p:txBody>
+            <a:bodyPr rtlCol="0" anchor="ctr"/>
+            <a:lstStyle/>
+            <a:p>
+              <a:endParaRPr lang="en-GB"/>
+            </a:p>
+          </p:txBody>
+        </p:sp>
+        <p:sp>
+          <p:nvSpPr>
+            <p:cNvPr id="38" name="Freeform: Shape 37">
+              <a:extLst>
+                <a:ext uri="{FF2B5EF4-FFF2-40B4-BE49-F238E27FC236}">
+                  <a16:creationId xmlns:a16="http://schemas.microsoft.com/office/drawing/2014/main" id="{68430D64-3606-472E-A935-AAE6E226649F}"/>
+                </a:ext>
+              </a:extLst>
+            </p:cNvPr>
+            <p:cNvSpPr/>
+            <p:nvPr/>
+          </p:nvSpPr>
+          <p:spPr>
+            <a:xfrm>
+              <a:off x="1414653" y="4952169"/>
+              <a:ext cx="286702" cy="504825"/>
+            </a:xfrm>
+            <a:custGeom>
+              <a:avLst/>
+              <a:gdLst>
+                <a:gd name="connsiteX0" fmla="*/ 286703 w 286702"/>
+                <a:gd name="connsiteY0" fmla="*/ 31432 h 504825"/>
+                <a:gd name="connsiteX1" fmla="*/ 286703 w 286702"/>
+                <a:gd name="connsiteY1" fmla="*/ 28575 h 504825"/>
+                <a:gd name="connsiteX2" fmla="*/ 258127 w 286702"/>
+                <a:gd name="connsiteY2" fmla="*/ 0 h 504825"/>
+                <a:gd name="connsiteX3" fmla="*/ 229552 w 286702"/>
+                <a:gd name="connsiteY3" fmla="*/ 25718 h 504825"/>
+                <a:gd name="connsiteX4" fmla="*/ 229552 w 286702"/>
+                <a:gd name="connsiteY4" fmla="*/ 25718 h 504825"/>
+                <a:gd name="connsiteX5" fmla="*/ 203835 w 286702"/>
+                <a:gd name="connsiteY5" fmla="*/ 285750 h 504825"/>
+                <a:gd name="connsiteX6" fmla="*/ 28575 w 286702"/>
+                <a:gd name="connsiteY6" fmla="*/ 285750 h 504825"/>
+                <a:gd name="connsiteX7" fmla="*/ 0 w 286702"/>
+                <a:gd name="connsiteY7" fmla="*/ 314325 h 504825"/>
+                <a:gd name="connsiteX8" fmla="*/ 28575 w 286702"/>
+                <a:gd name="connsiteY8" fmla="*/ 342900 h 504825"/>
+                <a:gd name="connsiteX9" fmla="*/ 29527 w 286702"/>
+                <a:gd name="connsiteY9" fmla="*/ 342900 h 504825"/>
+                <a:gd name="connsiteX10" fmla="*/ 29527 w 286702"/>
+                <a:gd name="connsiteY10" fmla="*/ 504825 h 504825"/>
+                <a:gd name="connsiteX11" fmla="*/ 86677 w 286702"/>
+                <a:gd name="connsiteY11" fmla="*/ 504825 h 504825"/>
+                <a:gd name="connsiteX12" fmla="*/ 86677 w 286702"/>
+                <a:gd name="connsiteY12" fmla="*/ 438150 h 504825"/>
+                <a:gd name="connsiteX13" fmla="*/ 218123 w 286702"/>
+                <a:gd name="connsiteY13" fmla="*/ 438150 h 504825"/>
+                <a:gd name="connsiteX14" fmla="*/ 227648 w 286702"/>
+                <a:gd name="connsiteY14" fmla="*/ 504825 h 504825"/>
+                <a:gd name="connsiteX15" fmla="*/ 285750 w 286702"/>
+                <a:gd name="connsiteY15" fmla="*/ 504825 h 504825"/>
+                <a:gd name="connsiteX16" fmla="*/ 258127 w 286702"/>
+                <a:gd name="connsiteY16" fmla="*/ 313373 h 504825"/>
+                <a:gd name="connsiteX17" fmla="*/ 286703 w 286702"/>
+                <a:gd name="connsiteY17" fmla="*/ 31432 h 504825"/>
+                <a:gd name="connsiteX18" fmla="*/ 286703 w 286702"/>
+                <a:gd name="connsiteY18" fmla="*/ 31432 h 504825"/>
+                <a:gd name="connsiteX19" fmla="*/ 86677 w 286702"/>
+                <a:gd name="connsiteY19" fmla="*/ 400050 h 504825"/>
+                <a:gd name="connsiteX20" fmla="*/ 86677 w 286702"/>
+                <a:gd name="connsiteY20" fmla="*/ 342900 h 504825"/>
+                <a:gd name="connsiteX21" fmla="*/ 204788 w 286702"/>
+                <a:gd name="connsiteY21" fmla="*/ 342900 h 504825"/>
+                <a:gd name="connsiteX22" fmla="*/ 213360 w 286702"/>
+                <a:gd name="connsiteY22" fmla="*/ 400050 h 504825"/>
+                <a:gd name="connsiteX23" fmla="*/ 86677 w 286702"/>
+                <a:gd name="connsiteY23" fmla="*/ 400050 h 504825"/>
+              </a:gdLst>
+              <a:ahLst/>
+              <a:cxnLst>
+                <a:cxn ang="0">
+                  <a:pos x="connsiteX0" y="connsiteY0"/>
+                </a:cxn>
+                <a:cxn ang="0">
+                  <a:pos x="connsiteX1" y="connsiteY1"/>
+                </a:cxn>
+                <a:cxn ang="0">
+                  <a:pos x="connsiteX2" y="connsiteY2"/>
+                </a:cxn>
+                <a:cxn ang="0">
+                  <a:pos x="connsiteX3" y="connsiteY3"/>
+                </a:cxn>
+                <a:cxn ang="0">
+                  <a:pos x="connsiteX4" y="connsiteY4"/>
+                </a:cxn>
+                <a:cxn ang="0">
+                  <a:pos x="connsiteX5" y="connsiteY5"/>
+                </a:cxn>
+                <a:cxn ang="0">
+                  <a:pos x="connsiteX6" y="connsiteY6"/>
+                </a:cxn>
+                <a:cxn ang="0">
+                  <a:pos x="connsiteX7" y="connsiteY7"/>
+                </a:cxn>
+                <a:cxn ang="0">
+                  <a:pos x="connsiteX8" y="connsiteY8"/>
+                </a:cxn>
+                <a:cxn ang="0">
+                  <a:pos x="connsiteX9" y="connsiteY9"/>
+                </a:cxn>
+                <a:cxn ang="0">
+                  <a:pos x="connsiteX10" y="connsiteY10"/>
+                </a:cxn>
+                <a:cxn ang="0">
+                  <a:pos x="connsiteX11" y="connsiteY11"/>
+                </a:cxn>
+                <a:cxn ang="0">
+                  <a:pos x="connsiteX12" y="connsiteY12"/>
+                </a:cxn>
+                <a:cxn ang="0">
+                  <a:pos x="connsiteX13" y="connsiteY13"/>
+                </a:cxn>
+                <a:cxn ang="0">
+                  <a:pos x="connsiteX14" y="connsiteY14"/>
+                </a:cxn>
+                <a:cxn ang="0">
+                  <a:pos x="connsiteX15" y="connsiteY15"/>
+                </a:cxn>
+                <a:cxn ang="0">
+                  <a:pos x="connsiteX16" y="connsiteY16"/>
+                </a:cxn>
+                <a:cxn ang="0">
+                  <a:pos x="connsiteX17" y="connsiteY17"/>
+                </a:cxn>
+                <a:cxn ang="0">
+                  <a:pos x="connsiteX18" y="connsiteY18"/>
+                </a:cxn>
+                <a:cxn ang="0">
+                  <a:pos x="connsiteX19" y="connsiteY19"/>
+                </a:cxn>
+                <a:cxn ang="0">
+                  <a:pos x="connsiteX20" y="connsiteY20"/>
+                </a:cxn>
+                <a:cxn ang="0">
+                  <a:pos x="connsiteX21" y="connsiteY21"/>
+                </a:cxn>
+                <a:cxn ang="0">
+                  <a:pos x="connsiteX22" y="connsiteY22"/>
+                </a:cxn>
+                <a:cxn ang="0">
+                  <a:pos x="connsiteX23" y="connsiteY23"/>
+                </a:cxn>
+              </a:cxnLst>
+              <a:rect l="l" t="t" r="r" b="b"/>
+              <a:pathLst>
+                <a:path w="286702" h="504825">
+                  <a:moveTo>
+                    <a:pt x="286703" y="31432"/>
+                  </a:moveTo>
+                  <a:cubicBezTo>
+                    <a:pt x="286703" y="30480"/>
+                    <a:pt x="286703" y="29528"/>
+                    <a:pt x="286703" y="28575"/>
+                  </a:cubicBezTo>
+                  <a:cubicBezTo>
+                    <a:pt x="286703" y="12382"/>
+                    <a:pt x="274320" y="0"/>
+                    <a:pt x="258127" y="0"/>
+                  </a:cubicBezTo>
+                  <a:cubicBezTo>
+                    <a:pt x="243840" y="0"/>
+                    <a:pt x="231457" y="11430"/>
+                    <a:pt x="229552" y="25718"/>
+                  </a:cubicBezTo>
+                  <a:lnTo>
+                    <a:pt x="229552" y="25718"/>
+                  </a:lnTo>
+                  <a:lnTo>
+                    <a:pt x="203835" y="285750"/>
+                  </a:lnTo>
+                  <a:lnTo>
+                    <a:pt x="28575" y="285750"/>
+                  </a:lnTo>
+                  <a:cubicBezTo>
+                    <a:pt x="12382" y="285750"/>
+                    <a:pt x="0" y="298133"/>
+                    <a:pt x="0" y="314325"/>
+                  </a:cubicBezTo>
+                  <a:cubicBezTo>
+                    <a:pt x="0" y="330518"/>
+                    <a:pt x="12382" y="342900"/>
+                    <a:pt x="28575" y="342900"/>
+                  </a:cubicBezTo>
+                  <a:lnTo>
+                    <a:pt x="29527" y="342900"/>
+                  </a:lnTo>
+                  <a:lnTo>
+                    <a:pt x="29527" y="504825"/>
+                  </a:lnTo>
+                  <a:lnTo>
+                    <a:pt x="86677" y="504825"/>
+                  </a:lnTo>
+                  <a:lnTo>
+                    <a:pt x="86677" y="438150"/>
+                  </a:lnTo>
+                  <a:lnTo>
+                    <a:pt x="218123" y="438150"/>
+                  </a:lnTo>
+                  <a:lnTo>
+                    <a:pt x="227648" y="504825"/>
+                  </a:lnTo>
+                  <a:lnTo>
+                    <a:pt x="285750" y="504825"/>
+                  </a:lnTo>
+                  <a:lnTo>
+                    <a:pt x="258127" y="313373"/>
+                  </a:lnTo>
+                  <a:lnTo>
+                    <a:pt x="286703" y="31432"/>
+                  </a:lnTo>
+                  <a:lnTo>
+                    <a:pt x="286703" y="31432"/>
+                  </a:lnTo>
+                  <a:close/>
+                  <a:moveTo>
+                    <a:pt x="86677" y="400050"/>
+                  </a:moveTo>
+                  <a:lnTo>
+                    <a:pt x="86677" y="342900"/>
+                  </a:lnTo>
+                  <a:lnTo>
+                    <a:pt x="204788" y="342900"/>
+                  </a:lnTo>
+                  <a:lnTo>
+                    <a:pt x="213360" y="400050"/>
+                  </a:lnTo>
+                  <a:lnTo>
+                    <a:pt x="86677" y="400050"/>
+                  </a:lnTo>
+                  <a:close/>
+                </a:path>
+              </a:pathLst>
+            </a:custGeom>
+            <a:solidFill>
+              <a:srgbClr val="574AE2"/>
             </a:solidFill>
             <a:ln w="9525" cap="flat">
               <a:noFill/>

</xml_diff>

<commit_message>
FE-738 FE-739 FE-746 Correcting icon colours
</commit_message>
<xml_diff>
--- a/HelpMyStreetFE/HelpMyStreetFE/src/pptx/Icons.pptx
+++ b/HelpMyStreetFE/HelpMyStreetFE/src/pptx/Icons.pptx
@@ -265,7 +265,7 @@
           <a:p>
             <a:fld id="{B2EC5630-BBBD-40F6-B459-AD74AAD6AD00}" type="datetimeFigureOut">
               <a:rPr lang="en-GB" smtClean="0"/>
-              <a:t>12/03/2021</a:t>
+              <a:t>17/03/2021</a:t>
             </a:fld>
             <a:endParaRPr lang="en-GB"/>
           </a:p>
@@ -465,7 +465,7 @@
           <a:p>
             <a:fld id="{B2EC5630-BBBD-40F6-B459-AD74AAD6AD00}" type="datetimeFigureOut">
               <a:rPr lang="en-GB" smtClean="0"/>
-              <a:t>12/03/2021</a:t>
+              <a:t>17/03/2021</a:t>
             </a:fld>
             <a:endParaRPr lang="en-GB"/>
           </a:p>
@@ -675,7 +675,7 @@
           <a:p>
             <a:fld id="{B2EC5630-BBBD-40F6-B459-AD74AAD6AD00}" type="datetimeFigureOut">
               <a:rPr lang="en-GB" smtClean="0"/>
-              <a:t>12/03/2021</a:t>
+              <a:t>17/03/2021</a:t>
             </a:fld>
             <a:endParaRPr lang="en-GB"/>
           </a:p>
@@ -875,7 +875,7 @@
           <a:p>
             <a:fld id="{B2EC5630-BBBD-40F6-B459-AD74AAD6AD00}" type="datetimeFigureOut">
               <a:rPr lang="en-GB" smtClean="0"/>
-              <a:t>12/03/2021</a:t>
+              <a:t>17/03/2021</a:t>
             </a:fld>
             <a:endParaRPr lang="en-GB"/>
           </a:p>
@@ -1151,7 +1151,7 @@
           <a:p>
             <a:fld id="{B2EC5630-BBBD-40F6-B459-AD74AAD6AD00}" type="datetimeFigureOut">
               <a:rPr lang="en-GB" smtClean="0"/>
-              <a:t>12/03/2021</a:t>
+              <a:t>17/03/2021</a:t>
             </a:fld>
             <a:endParaRPr lang="en-GB"/>
           </a:p>
@@ -1419,7 +1419,7 @@
           <a:p>
             <a:fld id="{B2EC5630-BBBD-40F6-B459-AD74AAD6AD00}" type="datetimeFigureOut">
               <a:rPr lang="en-GB" smtClean="0"/>
-              <a:t>12/03/2021</a:t>
+              <a:t>17/03/2021</a:t>
             </a:fld>
             <a:endParaRPr lang="en-GB"/>
           </a:p>
@@ -1834,7 +1834,7 @@
           <a:p>
             <a:fld id="{B2EC5630-BBBD-40F6-B459-AD74AAD6AD00}" type="datetimeFigureOut">
               <a:rPr lang="en-GB" smtClean="0"/>
-              <a:t>12/03/2021</a:t>
+              <a:t>17/03/2021</a:t>
             </a:fld>
             <a:endParaRPr lang="en-GB"/>
           </a:p>
@@ -1976,7 +1976,7 @@
           <a:p>
             <a:fld id="{B2EC5630-BBBD-40F6-B459-AD74AAD6AD00}" type="datetimeFigureOut">
               <a:rPr lang="en-GB" smtClean="0"/>
-              <a:t>12/03/2021</a:t>
+              <a:t>17/03/2021</a:t>
             </a:fld>
             <a:endParaRPr lang="en-GB"/>
           </a:p>
@@ -2089,7 +2089,7 @@
           <a:p>
             <a:fld id="{B2EC5630-BBBD-40F6-B459-AD74AAD6AD00}" type="datetimeFigureOut">
               <a:rPr lang="en-GB" smtClean="0"/>
-              <a:t>12/03/2021</a:t>
+              <a:t>17/03/2021</a:t>
             </a:fld>
             <a:endParaRPr lang="en-GB"/>
           </a:p>
@@ -2402,7 +2402,7 @@
           <a:p>
             <a:fld id="{B2EC5630-BBBD-40F6-B459-AD74AAD6AD00}" type="datetimeFigureOut">
               <a:rPr lang="en-GB" smtClean="0"/>
-              <a:t>12/03/2021</a:t>
+              <a:t>17/03/2021</a:t>
             </a:fld>
             <a:endParaRPr lang="en-GB"/>
           </a:p>
@@ -2691,7 +2691,7 @@
           <a:p>
             <a:fld id="{B2EC5630-BBBD-40F6-B459-AD74AAD6AD00}" type="datetimeFigureOut">
               <a:rPr lang="en-GB" smtClean="0"/>
-              <a:t>12/03/2021</a:t>
+              <a:t>17/03/2021</a:t>
             </a:fld>
             <a:endParaRPr lang="en-GB"/>
           </a:p>
@@ -2934,7 +2934,7 @@
           <a:p>
             <a:fld id="{B2EC5630-BBBD-40F6-B459-AD74AAD6AD00}" type="datetimeFigureOut">
               <a:rPr lang="en-GB" smtClean="0"/>
-              <a:t>12/03/2021</a:t>
+              <a:t>17/03/2021</a:t>
             </a:fld>
             <a:endParaRPr lang="en-GB"/>
           </a:p>
@@ -7880,7 +7880,7 @@
         </p:nvGrpSpPr>
         <p:grpSpPr>
           <a:xfrm>
-            <a:off x="6686675" y="2110759"/>
+            <a:off x="6630772" y="2781450"/>
             <a:ext cx="2129660" cy="1438072"/>
             <a:chOff x="6686675" y="2110759"/>
             <a:chExt cx="2129660" cy="1438072"/>
@@ -12225,6 +12225,2666 @@
               <a:srgbClr val="574AE2"/>
             </a:solidFill>
             <a:ln w="9525" cap="flat">
+              <a:noFill/>
+              <a:prstDash val="solid"/>
+              <a:miter/>
+            </a:ln>
+          </p:spPr>
+          <p:txBody>
+            <a:bodyPr rtlCol="0" anchor="ctr"/>
+            <a:lstStyle/>
+            <a:p>
+              <a:endParaRPr lang="en-GB"/>
+            </a:p>
+          </p:txBody>
+        </p:sp>
+      </p:grpSp>
+      <p:sp>
+        <p:nvSpPr>
+          <p:cNvPr id="18" name="Graphic 2" descr="Covid-19 with solid fill">
+            <a:extLst>
+              <a:ext uri="{FF2B5EF4-FFF2-40B4-BE49-F238E27FC236}">
+                <a16:creationId xmlns:a16="http://schemas.microsoft.com/office/drawing/2014/main" id="{D6E018F5-2C39-427D-AA89-D725BB94D9C4}"/>
+              </a:ext>
+            </a:extLst>
+          </p:cNvPr>
+          <p:cNvSpPr/>
+          <p:nvPr/>
+        </p:nvSpPr>
+        <p:spPr>
+          <a:xfrm>
+            <a:off x="5032967" y="375259"/>
+            <a:ext cx="1735497" cy="1735500"/>
+          </a:xfrm>
+          <a:custGeom>
+            <a:avLst/>
+            <a:gdLst>
+              <a:gd name="connsiteX0" fmla="*/ 537561 w 1024040"/>
+              <a:gd name="connsiteY0" fmla="*/ 110549 h 1024042"/>
+              <a:gd name="connsiteX1" fmla="*/ 571348 w 1024040"/>
+              <a:gd name="connsiteY1" fmla="*/ 51239 h 1024042"/>
+              <a:gd name="connsiteX2" fmla="*/ 512020 w 1024040"/>
+              <a:gd name="connsiteY2" fmla="*/ 0 h 1024042"/>
+              <a:gd name="connsiteX3" fmla="*/ 452691 w 1024040"/>
+              <a:gd name="connsiteY3" fmla="*/ 51239 h 1024042"/>
+              <a:gd name="connsiteX4" fmla="*/ 486322 w 1024040"/>
+              <a:gd name="connsiteY4" fmla="*/ 110343 h 1024042"/>
+              <a:gd name="connsiteX5" fmla="*/ 486331 w 1024040"/>
+              <a:gd name="connsiteY5" fmla="*/ 154738 h 1024042"/>
+              <a:gd name="connsiteX6" fmla="*/ 393036 w 1024040"/>
+              <a:gd name="connsiteY6" fmla="*/ 174090 h 1024042"/>
+              <a:gd name="connsiteX7" fmla="*/ 397332 w 1024040"/>
+              <a:gd name="connsiteY7" fmla="*/ 135461 h 1024042"/>
+              <a:gd name="connsiteX8" fmla="*/ 349926 w 1024040"/>
+              <a:gd name="connsiteY8" fmla="*/ 119637 h 1024042"/>
+              <a:gd name="connsiteX9" fmla="*/ 327371 w 1024040"/>
+              <a:gd name="connsiteY9" fmla="*/ 164237 h 1024042"/>
+              <a:gd name="connsiteX10" fmla="*/ 357425 w 1024040"/>
+              <a:gd name="connsiteY10" fmla="*/ 188570 h 1024042"/>
+              <a:gd name="connsiteX11" fmla="*/ 357503 w 1024040"/>
+              <a:gd name="connsiteY11" fmla="*/ 188761 h 1024042"/>
+              <a:gd name="connsiteX12" fmla="*/ 277495 w 1024040"/>
+              <a:gd name="connsiteY12" fmla="*/ 241369 h 1024042"/>
+              <a:gd name="connsiteX13" fmla="*/ 246196 w 1024040"/>
+              <a:gd name="connsiteY13" fmla="*/ 210084 h 1024042"/>
+              <a:gd name="connsiteX14" fmla="*/ 228149 w 1024040"/>
+              <a:gd name="connsiteY14" fmla="*/ 144246 h 1024042"/>
+              <a:gd name="connsiteX15" fmla="*/ 149966 w 1024040"/>
+              <a:gd name="connsiteY15" fmla="*/ 149968 h 1024042"/>
+              <a:gd name="connsiteX16" fmla="*/ 144246 w 1024040"/>
+              <a:gd name="connsiteY16" fmla="*/ 228151 h 1024042"/>
+              <a:gd name="connsiteX17" fmla="*/ 209807 w 1024040"/>
+              <a:gd name="connsiteY17" fmla="*/ 246161 h 1024042"/>
+              <a:gd name="connsiteX18" fmla="*/ 241245 w 1024040"/>
+              <a:gd name="connsiteY18" fmla="*/ 277586 h 1024042"/>
+              <a:gd name="connsiteX19" fmla="*/ 188098 w 1024040"/>
+              <a:gd name="connsiteY19" fmla="*/ 358545 h 1024042"/>
+              <a:gd name="connsiteX20" fmla="*/ 187634 w 1024040"/>
+              <a:gd name="connsiteY20" fmla="*/ 358354 h 1024042"/>
+              <a:gd name="connsiteX21" fmla="*/ 163303 w 1024040"/>
+              <a:gd name="connsiteY21" fmla="*/ 328303 h 1024042"/>
+              <a:gd name="connsiteX22" fmla="*/ 118704 w 1024040"/>
+              <a:gd name="connsiteY22" fmla="*/ 350859 h 1024042"/>
+              <a:gd name="connsiteX23" fmla="*/ 134529 w 1024040"/>
+              <a:gd name="connsiteY23" fmla="*/ 398265 h 1024042"/>
+              <a:gd name="connsiteX24" fmla="*/ 173171 w 1024040"/>
+              <a:gd name="connsiteY24" fmla="*/ 393965 h 1024042"/>
+              <a:gd name="connsiteX25" fmla="*/ 173498 w 1024040"/>
+              <a:gd name="connsiteY25" fmla="*/ 394100 h 1024042"/>
+              <a:gd name="connsiteX26" fmla="*/ 154401 w 1024040"/>
+              <a:gd name="connsiteY26" fmla="*/ 486476 h 1024042"/>
+              <a:gd name="connsiteX27" fmla="*/ 110554 w 1024040"/>
+              <a:gd name="connsiteY27" fmla="*/ 486484 h 1024042"/>
+              <a:gd name="connsiteX28" fmla="*/ 51239 w 1024040"/>
+              <a:gd name="connsiteY28" fmla="*/ 452691 h 1024042"/>
+              <a:gd name="connsiteX29" fmla="*/ 0 w 1024040"/>
+              <a:gd name="connsiteY29" fmla="*/ 512020 h 1024042"/>
+              <a:gd name="connsiteX30" fmla="*/ 51239 w 1024040"/>
+              <a:gd name="connsiteY30" fmla="*/ 571349 h 1024042"/>
+              <a:gd name="connsiteX31" fmla="*/ 110338 w 1024040"/>
+              <a:gd name="connsiteY31" fmla="*/ 537723 h 1024042"/>
+              <a:gd name="connsiteX32" fmla="*/ 154356 w 1024040"/>
+              <a:gd name="connsiteY32" fmla="*/ 537715 h 1024042"/>
+              <a:gd name="connsiteX33" fmla="*/ 173498 w 1024040"/>
+              <a:gd name="connsiteY33" fmla="*/ 630672 h 1024042"/>
+              <a:gd name="connsiteX34" fmla="*/ 173171 w 1024040"/>
+              <a:gd name="connsiteY34" fmla="*/ 630807 h 1024042"/>
+              <a:gd name="connsiteX35" fmla="*/ 134528 w 1024040"/>
+              <a:gd name="connsiteY35" fmla="*/ 626506 h 1024042"/>
+              <a:gd name="connsiteX36" fmla="*/ 118704 w 1024040"/>
+              <a:gd name="connsiteY36" fmla="*/ 673912 h 1024042"/>
+              <a:gd name="connsiteX37" fmla="*/ 163303 w 1024040"/>
+              <a:gd name="connsiteY37" fmla="*/ 696469 h 1024042"/>
+              <a:gd name="connsiteX38" fmla="*/ 187634 w 1024040"/>
+              <a:gd name="connsiteY38" fmla="*/ 666418 h 1024042"/>
+              <a:gd name="connsiteX39" fmla="*/ 188097 w 1024040"/>
+              <a:gd name="connsiteY39" fmla="*/ 666227 h 1024042"/>
+              <a:gd name="connsiteX40" fmla="*/ 241008 w 1024040"/>
+              <a:gd name="connsiteY40" fmla="*/ 746916 h 1024042"/>
+              <a:gd name="connsiteX41" fmla="*/ 210095 w 1024040"/>
+              <a:gd name="connsiteY41" fmla="*/ 777842 h 1024042"/>
+              <a:gd name="connsiteX42" fmla="*/ 144247 w 1024040"/>
+              <a:gd name="connsiteY42" fmla="*/ 795891 h 1024042"/>
+              <a:gd name="connsiteX43" fmla="*/ 149968 w 1024040"/>
+              <a:gd name="connsiteY43" fmla="*/ 874075 h 1024042"/>
+              <a:gd name="connsiteX44" fmla="*/ 228149 w 1024040"/>
+              <a:gd name="connsiteY44" fmla="*/ 879794 h 1024042"/>
+              <a:gd name="connsiteX45" fmla="*/ 246160 w 1024040"/>
+              <a:gd name="connsiteY45" fmla="*/ 814231 h 1024042"/>
+              <a:gd name="connsiteX46" fmla="*/ 277218 w 1024040"/>
+              <a:gd name="connsiteY46" fmla="*/ 783162 h 1024042"/>
+              <a:gd name="connsiteX47" fmla="*/ 357503 w 1024040"/>
+              <a:gd name="connsiteY47" fmla="*/ 836010 h 1024042"/>
+              <a:gd name="connsiteX48" fmla="*/ 357421 w 1024040"/>
+              <a:gd name="connsiteY48" fmla="*/ 836206 h 1024042"/>
+              <a:gd name="connsiteX49" fmla="*/ 327370 w 1024040"/>
+              <a:gd name="connsiteY49" fmla="*/ 860536 h 1024042"/>
+              <a:gd name="connsiteX50" fmla="*/ 349926 w 1024040"/>
+              <a:gd name="connsiteY50" fmla="*/ 905136 h 1024042"/>
+              <a:gd name="connsiteX51" fmla="*/ 397332 w 1024040"/>
+              <a:gd name="connsiteY51" fmla="*/ 889311 h 1024042"/>
+              <a:gd name="connsiteX52" fmla="*/ 393035 w 1024040"/>
+              <a:gd name="connsiteY52" fmla="*/ 850682 h 1024042"/>
+              <a:gd name="connsiteX53" fmla="*/ 486475 w 1024040"/>
+              <a:gd name="connsiteY53" fmla="*/ 870045 h 1024042"/>
+              <a:gd name="connsiteX54" fmla="*/ 486482 w 1024040"/>
+              <a:gd name="connsiteY54" fmla="*/ 913489 h 1024042"/>
+              <a:gd name="connsiteX55" fmla="*/ 452689 w 1024040"/>
+              <a:gd name="connsiteY55" fmla="*/ 972804 h 1024042"/>
+              <a:gd name="connsiteX56" fmla="*/ 512019 w 1024040"/>
+              <a:gd name="connsiteY56" fmla="*/ 1024043 h 1024042"/>
+              <a:gd name="connsiteX57" fmla="*/ 571348 w 1024040"/>
+              <a:gd name="connsiteY57" fmla="*/ 972804 h 1024042"/>
+              <a:gd name="connsiteX58" fmla="*/ 537721 w 1024040"/>
+              <a:gd name="connsiteY58" fmla="*/ 913704 h 1024042"/>
+              <a:gd name="connsiteX59" fmla="*/ 537713 w 1024040"/>
+              <a:gd name="connsiteY59" fmla="*/ 870036 h 1024042"/>
+              <a:gd name="connsiteX60" fmla="*/ 629738 w 1024040"/>
+              <a:gd name="connsiteY60" fmla="*/ 851120 h 1024042"/>
+              <a:gd name="connsiteX61" fmla="*/ 625574 w 1024040"/>
+              <a:gd name="connsiteY61" fmla="*/ 889311 h 1024042"/>
+              <a:gd name="connsiteX62" fmla="*/ 672980 w 1024040"/>
+              <a:gd name="connsiteY62" fmla="*/ 905136 h 1024042"/>
+              <a:gd name="connsiteX63" fmla="*/ 695535 w 1024040"/>
+              <a:gd name="connsiteY63" fmla="*/ 860536 h 1024042"/>
+              <a:gd name="connsiteX64" fmla="*/ 665778 w 1024040"/>
+              <a:gd name="connsiteY64" fmla="*/ 836364 h 1024042"/>
+              <a:gd name="connsiteX65" fmla="*/ 746942 w 1024040"/>
+              <a:gd name="connsiteY65" fmla="*/ 783078 h 1024042"/>
+              <a:gd name="connsiteX66" fmla="*/ 777844 w 1024040"/>
+              <a:gd name="connsiteY66" fmla="*/ 813967 h 1024042"/>
+              <a:gd name="connsiteX67" fmla="*/ 795889 w 1024040"/>
+              <a:gd name="connsiteY67" fmla="*/ 879794 h 1024042"/>
+              <a:gd name="connsiteX68" fmla="*/ 874073 w 1024040"/>
+              <a:gd name="connsiteY68" fmla="*/ 874075 h 1024042"/>
+              <a:gd name="connsiteX69" fmla="*/ 879793 w 1024040"/>
+              <a:gd name="connsiteY69" fmla="*/ 795891 h 1024042"/>
+              <a:gd name="connsiteX70" fmla="*/ 814224 w 1024040"/>
+              <a:gd name="connsiteY70" fmla="*/ 777881 h 1024042"/>
+              <a:gd name="connsiteX71" fmla="*/ 783145 w 1024040"/>
+              <a:gd name="connsiteY71" fmla="*/ 746813 h 1024042"/>
+              <a:gd name="connsiteX72" fmla="*/ 835603 w 1024040"/>
+              <a:gd name="connsiteY72" fmla="*/ 667031 h 1024042"/>
+              <a:gd name="connsiteX73" fmla="*/ 859603 w 1024040"/>
+              <a:gd name="connsiteY73" fmla="*/ 696469 h 1024042"/>
+              <a:gd name="connsiteX74" fmla="*/ 904203 w 1024040"/>
+              <a:gd name="connsiteY74" fmla="*/ 673912 h 1024042"/>
+              <a:gd name="connsiteX75" fmla="*/ 888378 w 1024040"/>
+              <a:gd name="connsiteY75" fmla="*/ 626506 h 1024042"/>
+              <a:gd name="connsiteX76" fmla="*/ 850612 w 1024040"/>
+              <a:gd name="connsiteY76" fmla="*/ 630543 h 1024042"/>
+              <a:gd name="connsiteX77" fmla="*/ 869720 w 1024040"/>
+              <a:gd name="connsiteY77" fmla="*/ 537572 h 1024042"/>
+              <a:gd name="connsiteX78" fmla="*/ 913492 w 1024040"/>
+              <a:gd name="connsiteY78" fmla="*/ 537561 h 1024042"/>
+              <a:gd name="connsiteX79" fmla="*/ 972802 w 1024040"/>
+              <a:gd name="connsiteY79" fmla="*/ 571349 h 1024042"/>
+              <a:gd name="connsiteX80" fmla="*/ 1024041 w 1024040"/>
+              <a:gd name="connsiteY80" fmla="*/ 512020 h 1024042"/>
+              <a:gd name="connsiteX81" fmla="*/ 972802 w 1024040"/>
+              <a:gd name="connsiteY81" fmla="*/ 452691 h 1024042"/>
+              <a:gd name="connsiteX82" fmla="*/ 913699 w 1024040"/>
+              <a:gd name="connsiteY82" fmla="*/ 486323 h 1024042"/>
+              <a:gd name="connsiteX83" fmla="*/ 869655 w 1024040"/>
+              <a:gd name="connsiteY83" fmla="*/ 486333 h 1024042"/>
+              <a:gd name="connsiteX84" fmla="*/ 850612 w 1024040"/>
+              <a:gd name="connsiteY84" fmla="*/ 394230 h 1024042"/>
+              <a:gd name="connsiteX85" fmla="*/ 888378 w 1024040"/>
+              <a:gd name="connsiteY85" fmla="*/ 398267 h 1024042"/>
+              <a:gd name="connsiteX86" fmla="*/ 904203 w 1024040"/>
+              <a:gd name="connsiteY86" fmla="*/ 350861 h 1024042"/>
+              <a:gd name="connsiteX87" fmla="*/ 859603 w 1024040"/>
+              <a:gd name="connsiteY87" fmla="*/ 328304 h 1024042"/>
+              <a:gd name="connsiteX88" fmla="*/ 835606 w 1024040"/>
+              <a:gd name="connsiteY88" fmla="*/ 357743 h 1024042"/>
+              <a:gd name="connsiteX89" fmla="*/ 782711 w 1024040"/>
+              <a:gd name="connsiteY89" fmla="*/ 277460 h 1024042"/>
+              <a:gd name="connsiteX90" fmla="*/ 813957 w 1024040"/>
+              <a:gd name="connsiteY90" fmla="*/ 246198 h 1024042"/>
+              <a:gd name="connsiteX91" fmla="*/ 879793 w 1024040"/>
+              <a:gd name="connsiteY91" fmla="*/ 228151 h 1024042"/>
+              <a:gd name="connsiteX92" fmla="*/ 874073 w 1024040"/>
+              <a:gd name="connsiteY92" fmla="*/ 149968 h 1024042"/>
+              <a:gd name="connsiteX93" fmla="*/ 795889 w 1024040"/>
+              <a:gd name="connsiteY93" fmla="*/ 144246 h 1024042"/>
+              <a:gd name="connsiteX94" fmla="*/ 777877 w 1024040"/>
+              <a:gd name="connsiteY94" fmla="*/ 209824 h 1024042"/>
+              <a:gd name="connsiteX95" fmla="*/ 746449 w 1024040"/>
+              <a:gd name="connsiteY95" fmla="*/ 241266 h 1024042"/>
+              <a:gd name="connsiteX96" fmla="*/ 665779 w 1024040"/>
+              <a:gd name="connsiteY96" fmla="*/ 188407 h 1024042"/>
+              <a:gd name="connsiteX97" fmla="*/ 695536 w 1024040"/>
+              <a:gd name="connsiteY97" fmla="*/ 164235 h 1024042"/>
+              <a:gd name="connsiteX98" fmla="*/ 672980 w 1024040"/>
+              <a:gd name="connsiteY98" fmla="*/ 119636 h 1024042"/>
+              <a:gd name="connsiteX99" fmla="*/ 625574 w 1024040"/>
+              <a:gd name="connsiteY99" fmla="*/ 135461 h 1024042"/>
+              <a:gd name="connsiteX100" fmla="*/ 629738 w 1024040"/>
+              <a:gd name="connsiteY100" fmla="*/ 173652 h 1024042"/>
+              <a:gd name="connsiteX101" fmla="*/ 537570 w 1024040"/>
+              <a:gd name="connsiteY101" fmla="*/ 154726 h 1024042"/>
+              <a:gd name="connsiteX102" fmla="*/ 299926 w 1024040"/>
+              <a:gd name="connsiteY102" fmla="*/ 535954 h 1024042"/>
+              <a:gd name="connsiteX103" fmla="*/ 252792 w 1024040"/>
+              <a:gd name="connsiteY103" fmla="*/ 535954 h 1024042"/>
+              <a:gd name="connsiteX104" fmla="*/ 252793 w 1024040"/>
+              <a:gd name="connsiteY104" fmla="*/ 488818 h 1024042"/>
+              <a:gd name="connsiteX105" fmla="*/ 299926 w 1024040"/>
+              <a:gd name="connsiteY105" fmla="*/ 488818 h 1024042"/>
+              <a:gd name="connsiteX106" fmla="*/ 299929 w 1024040"/>
+              <a:gd name="connsiteY106" fmla="*/ 535951 h 1024042"/>
+              <a:gd name="connsiteX107" fmla="*/ 299926 w 1024040"/>
+              <a:gd name="connsiteY107" fmla="*/ 535954 h 1024042"/>
+              <a:gd name="connsiteX108" fmla="*/ 405980 w 1024040"/>
+              <a:gd name="connsiteY108" fmla="*/ 689142 h 1024042"/>
+              <a:gd name="connsiteX109" fmla="*/ 335277 w 1024040"/>
+              <a:gd name="connsiteY109" fmla="*/ 689142 h 1024042"/>
+              <a:gd name="connsiteX110" fmla="*/ 335277 w 1024040"/>
+              <a:gd name="connsiteY110" fmla="*/ 618440 h 1024042"/>
+              <a:gd name="connsiteX111" fmla="*/ 405979 w 1024040"/>
+              <a:gd name="connsiteY111" fmla="*/ 618439 h 1024042"/>
+              <a:gd name="connsiteX112" fmla="*/ 405980 w 1024040"/>
+              <a:gd name="connsiteY112" fmla="*/ 618440 h 1024042"/>
+              <a:gd name="connsiteX113" fmla="*/ 405980 w 1024040"/>
+              <a:gd name="connsiteY113" fmla="*/ 689142 h 1024042"/>
+              <a:gd name="connsiteX114" fmla="*/ 405980 w 1024040"/>
+              <a:gd name="connsiteY114" fmla="*/ 406334 h 1024042"/>
+              <a:gd name="connsiteX115" fmla="*/ 335276 w 1024040"/>
+              <a:gd name="connsiteY115" fmla="*/ 406334 h 1024042"/>
+              <a:gd name="connsiteX116" fmla="*/ 335276 w 1024040"/>
+              <a:gd name="connsiteY116" fmla="*/ 335631 h 1024042"/>
+              <a:gd name="connsiteX117" fmla="*/ 405980 w 1024040"/>
+              <a:gd name="connsiteY117" fmla="*/ 335631 h 1024042"/>
+              <a:gd name="connsiteX118" fmla="*/ 405980 w 1024040"/>
+              <a:gd name="connsiteY118" fmla="*/ 406334 h 1024042"/>
+              <a:gd name="connsiteX119" fmla="*/ 535600 w 1024040"/>
+              <a:gd name="connsiteY119" fmla="*/ 771628 h 1024042"/>
+              <a:gd name="connsiteX120" fmla="*/ 488464 w 1024040"/>
+              <a:gd name="connsiteY120" fmla="*/ 771628 h 1024042"/>
+              <a:gd name="connsiteX121" fmla="*/ 488465 w 1024040"/>
+              <a:gd name="connsiteY121" fmla="*/ 724493 h 1024042"/>
+              <a:gd name="connsiteX122" fmla="*/ 535600 w 1024040"/>
+              <a:gd name="connsiteY122" fmla="*/ 724493 h 1024042"/>
+              <a:gd name="connsiteX123" fmla="*/ 535600 w 1024040"/>
+              <a:gd name="connsiteY123" fmla="*/ 771628 h 1024042"/>
+              <a:gd name="connsiteX124" fmla="*/ 724139 w 1024040"/>
+              <a:gd name="connsiteY124" fmla="*/ 488818 h 1024042"/>
+              <a:gd name="connsiteX125" fmla="*/ 771274 w 1024040"/>
+              <a:gd name="connsiteY125" fmla="*/ 488818 h 1024042"/>
+              <a:gd name="connsiteX126" fmla="*/ 771274 w 1024040"/>
+              <a:gd name="connsiteY126" fmla="*/ 535954 h 1024042"/>
+              <a:gd name="connsiteX127" fmla="*/ 724139 w 1024040"/>
+              <a:gd name="connsiteY127" fmla="*/ 535954 h 1024042"/>
+              <a:gd name="connsiteX128" fmla="*/ 724139 w 1024040"/>
+              <a:gd name="connsiteY128" fmla="*/ 488818 h 1024042"/>
+              <a:gd name="connsiteX129" fmla="*/ 618088 w 1024040"/>
+              <a:gd name="connsiteY129" fmla="*/ 335631 h 1024042"/>
+              <a:gd name="connsiteX130" fmla="*/ 688789 w 1024040"/>
+              <a:gd name="connsiteY130" fmla="*/ 335632 h 1024042"/>
+              <a:gd name="connsiteX131" fmla="*/ 688788 w 1024040"/>
+              <a:gd name="connsiteY131" fmla="*/ 406334 h 1024042"/>
+              <a:gd name="connsiteX132" fmla="*/ 618088 w 1024040"/>
+              <a:gd name="connsiteY132" fmla="*/ 406334 h 1024042"/>
+              <a:gd name="connsiteX133" fmla="*/ 618081 w 1024040"/>
+              <a:gd name="connsiteY133" fmla="*/ 335636 h 1024042"/>
+              <a:gd name="connsiteX134" fmla="*/ 618086 w 1024040"/>
+              <a:gd name="connsiteY134" fmla="*/ 335631 h 1024042"/>
+              <a:gd name="connsiteX135" fmla="*/ 618088 w 1024040"/>
+              <a:gd name="connsiteY135" fmla="*/ 618440 h 1024042"/>
+              <a:gd name="connsiteX136" fmla="*/ 688788 w 1024040"/>
+              <a:gd name="connsiteY136" fmla="*/ 618440 h 1024042"/>
+              <a:gd name="connsiteX137" fmla="*/ 688788 w 1024040"/>
+              <a:gd name="connsiteY137" fmla="*/ 689142 h 1024042"/>
+              <a:gd name="connsiteX138" fmla="*/ 618088 w 1024040"/>
+              <a:gd name="connsiteY138" fmla="*/ 689142 h 1024042"/>
+              <a:gd name="connsiteX139" fmla="*/ 618084 w 1024040"/>
+              <a:gd name="connsiteY139" fmla="*/ 618443 h 1024042"/>
+              <a:gd name="connsiteX140" fmla="*/ 618086 w 1024040"/>
+              <a:gd name="connsiteY140" fmla="*/ 618440 h 1024042"/>
+              <a:gd name="connsiteX141" fmla="*/ 547383 w 1024040"/>
+              <a:gd name="connsiteY141" fmla="*/ 547737 h 1024042"/>
+              <a:gd name="connsiteX142" fmla="*/ 476680 w 1024040"/>
+              <a:gd name="connsiteY142" fmla="*/ 547737 h 1024042"/>
+              <a:gd name="connsiteX143" fmla="*/ 476682 w 1024040"/>
+              <a:gd name="connsiteY143" fmla="*/ 477034 h 1024042"/>
+              <a:gd name="connsiteX144" fmla="*/ 547383 w 1024040"/>
+              <a:gd name="connsiteY144" fmla="*/ 477034 h 1024042"/>
+              <a:gd name="connsiteX145" fmla="*/ 547386 w 1024040"/>
+              <a:gd name="connsiteY145" fmla="*/ 547736 h 1024042"/>
+              <a:gd name="connsiteX146" fmla="*/ 547383 w 1024040"/>
+              <a:gd name="connsiteY146" fmla="*/ 547737 h 1024042"/>
+              <a:gd name="connsiteX147" fmla="*/ 535600 w 1024040"/>
+              <a:gd name="connsiteY147" fmla="*/ 300279 h 1024042"/>
+              <a:gd name="connsiteX148" fmla="*/ 488465 w 1024040"/>
+              <a:gd name="connsiteY148" fmla="*/ 300279 h 1024042"/>
+              <a:gd name="connsiteX149" fmla="*/ 488465 w 1024040"/>
+              <a:gd name="connsiteY149" fmla="*/ 253146 h 1024042"/>
+              <a:gd name="connsiteX150" fmla="*/ 535600 w 1024040"/>
+              <a:gd name="connsiteY150" fmla="*/ 253146 h 1024042"/>
+              <a:gd name="connsiteX151" fmla="*/ 535601 w 1024040"/>
+              <a:gd name="connsiteY151" fmla="*/ 300278 h 1024042"/>
+              <a:gd name="connsiteX152" fmla="*/ 535600 w 1024040"/>
+              <a:gd name="connsiteY152" fmla="*/ 300279 h 1024042"/>
+            </a:gdLst>
+            <a:ahLst/>
+            <a:cxnLst>
+              <a:cxn ang="0">
+                <a:pos x="connsiteX0" y="connsiteY0"/>
+              </a:cxn>
+              <a:cxn ang="0">
+                <a:pos x="connsiteX1" y="connsiteY1"/>
+              </a:cxn>
+              <a:cxn ang="0">
+                <a:pos x="connsiteX2" y="connsiteY2"/>
+              </a:cxn>
+              <a:cxn ang="0">
+                <a:pos x="connsiteX3" y="connsiteY3"/>
+              </a:cxn>
+              <a:cxn ang="0">
+                <a:pos x="connsiteX4" y="connsiteY4"/>
+              </a:cxn>
+              <a:cxn ang="0">
+                <a:pos x="connsiteX5" y="connsiteY5"/>
+              </a:cxn>
+              <a:cxn ang="0">
+                <a:pos x="connsiteX6" y="connsiteY6"/>
+              </a:cxn>
+              <a:cxn ang="0">
+                <a:pos x="connsiteX7" y="connsiteY7"/>
+              </a:cxn>
+              <a:cxn ang="0">
+                <a:pos x="connsiteX8" y="connsiteY8"/>
+              </a:cxn>
+              <a:cxn ang="0">
+                <a:pos x="connsiteX9" y="connsiteY9"/>
+              </a:cxn>
+              <a:cxn ang="0">
+                <a:pos x="connsiteX10" y="connsiteY10"/>
+              </a:cxn>
+              <a:cxn ang="0">
+                <a:pos x="connsiteX11" y="connsiteY11"/>
+              </a:cxn>
+              <a:cxn ang="0">
+                <a:pos x="connsiteX12" y="connsiteY12"/>
+              </a:cxn>
+              <a:cxn ang="0">
+                <a:pos x="connsiteX13" y="connsiteY13"/>
+              </a:cxn>
+              <a:cxn ang="0">
+                <a:pos x="connsiteX14" y="connsiteY14"/>
+              </a:cxn>
+              <a:cxn ang="0">
+                <a:pos x="connsiteX15" y="connsiteY15"/>
+              </a:cxn>
+              <a:cxn ang="0">
+                <a:pos x="connsiteX16" y="connsiteY16"/>
+              </a:cxn>
+              <a:cxn ang="0">
+                <a:pos x="connsiteX17" y="connsiteY17"/>
+              </a:cxn>
+              <a:cxn ang="0">
+                <a:pos x="connsiteX18" y="connsiteY18"/>
+              </a:cxn>
+              <a:cxn ang="0">
+                <a:pos x="connsiteX19" y="connsiteY19"/>
+              </a:cxn>
+              <a:cxn ang="0">
+                <a:pos x="connsiteX20" y="connsiteY20"/>
+              </a:cxn>
+              <a:cxn ang="0">
+                <a:pos x="connsiteX21" y="connsiteY21"/>
+              </a:cxn>
+              <a:cxn ang="0">
+                <a:pos x="connsiteX22" y="connsiteY22"/>
+              </a:cxn>
+              <a:cxn ang="0">
+                <a:pos x="connsiteX23" y="connsiteY23"/>
+              </a:cxn>
+              <a:cxn ang="0">
+                <a:pos x="connsiteX24" y="connsiteY24"/>
+              </a:cxn>
+              <a:cxn ang="0">
+                <a:pos x="connsiteX25" y="connsiteY25"/>
+              </a:cxn>
+              <a:cxn ang="0">
+                <a:pos x="connsiteX26" y="connsiteY26"/>
+              </a:cxn>
+              <a:cxn ang="0">
+                <a:pos x="connsiteX27" y="connsiteY27"/>
+              </a:cxn>
+              <a:cxn ang="0">
+                <a:pos x="connsiteX28" y="connsiteY28"/>
+              </a:cxn>
+              <a:cxn ang="0">
+                <a:pos x="connsiteX29" y="connsiteY29"/>
+              </a:cxn>
+              <a:cxn ang="0">
+                <a:pos x="connsiteX30" y="connsiteY30"/>
+              </a:cxn>
+              <a:cxn ang="0">
+                <a:pos x="connsiteX31" y="connsiteY31"/>
+              </a:cxn>
+              <a:cxn ang="0">
+                <a:pos x="connsiteX32" y="connsiteY32"/>
+              </a:cxn>
+              <a:cxn ang="0">
+                <a:pos x="connsiteX33" y="connsiteY33"/>
+              </a:cxn>
+              <a:cxn ang="0">
+                <a:pos x="connsiteX34" y="connsiteY34"/>
+              </a:cxn>
+              <a:cxn ang="0">
+                <a:pos x="connsiteX35" y="connsiteY35"/>
+              </a:cxn>
+              <a:cxn ang="0">
+                <a:pos x="connsiteX36" y="connsiteY36"/>
+              </a:cxn>
+              <a:cxn ang="0">
+                <a:pos x="connsiteX37" y="connsiteY37"/>
+              </a:cxn>
+              <a:cxn ang="0">
+                <a:pos x="connsiteX38" y="connsiteY38"/>
+              </a:cxn>
+              <a:cxn ang="0">
+                <a:pos x="connsiteX39" y="connsiteY39"/>
+              </a:cxn>
+              <a:cxn ang="0">
+                <a:pos x="connsiteX40" y="connsiteY40"/>
+              </a:cxn>
+              <a:cxn ang="0">
+                <a:pos x="connsiteX41" y="connsiteY41"/>
+              </a:cxn>
+              <a:cxn ang="0">
+                <a:pos x="connsiteX42" y="connsiteY42"/>
+              </a:cxn>
+              <a:cxn ang="0">
+                <a:pos x="connsiteX43" y="connsiteY43"/>
+              </a:cxn>
+              <a:cxn ang="0">
+                <a:pos x="connsiteX44" y="connsiteY44"/>
+              </a:cxn>
+              <a:cxn ang="0">
+                <a:pos x="connsiteX45" y="connsiteY45"/>
+              </a:cxn>
+              <a:cxn ang="0">
+                <a:pos x="connsiteX46" y="connsiteY46"/>
+              </a:cxn>
+              <a:cxn ang="0">
+                <a:pos x="connsiteX47" y="connsiteY47"/>
+              </a:cxn>
+              <a:cxn ang="0">
+                <a:pos x="connsiteX48" y="connsiteY48"/>
+              </a:cxn>
+              <a:cxn ang="0">
+                <a:pos x="connsiteX49" y="connsiteY49"/>
+              </a:cxn>
+              <a:cxn ang="0">
+                <a:pos x="connsiteX50" y="connsiteY50"/>
+              </a:cxn>
+              <a:cxn ang="0">
+                <a:pos x="connsiteX51" y="connsiteY51"/>
+              </a:cxn>
+              <a:cxn ang="0">
+                <a:pos x="connsiteX52" y="connsiteY52"/>
+              </a:cxn>
+              <a:cxn ang="0">
+                <a:pos x="connsiteX53" y="connsiteY53"/>
+              </a:cxn>
+              <a:cxn ang="0">
+                <a:pos x="connsiteX54" y="connsiteY54"/>
+              </a:cxn>
+              <a:cxn ang="0">
+                <a:pos x="connsiteX55" y="connsiteY55"/>
+              </a:cxn>
+              <a:cxn ang="0">
+                <a:pos x="connsiteX56" y="connsiteY56"/>
+              </a:cxn>
+              <a:cxn ang="0">
+                <a:pos x="connsiteX57" y="connsiteY57"/>
+              </a:cxn>
+              <a:cxn ang="0">
+                <a:pos x="connsiteX58" y="connsiteY58"/>
+              </a:cxn>
+              <a:cxn ang="0">
+                <a:pos x="connsiteX59" y="connsiteY59"/>
+              </a:cxn>
+              <a:cxn ang="0">
+                <a:pos x="connsiteX60" y="connsiteY60"/>
+              </a:cxn>
+              <a:cxn ang="0">
+                <a:pos x="connsiteX61" y="connsiteY61"/>
+              </a:cxn>
+              <a:cxn ang="0">
+                <a:pos x="connsiteX62" y="connsiteY62"/>
+              </a:cxn>
+              <a:cxn ang="0">
+                <a:pos x="connsiteX63" y="connsiteY63"/>
+              </a:cxn>
+              <a:cxn ang="0">
+                <a:pos x="connsiteX64" y="connsiteY64"/>
+              </a:cxn>
+              <a:cxn ang="0">
+                <a:pos x="connsiteX65" y="connsiteY65"/>
+              </a:cxn>
+              <a:cxn ang="0">
+                <a:pos x="connsiteX66" y="connsiteY66"/>
+              </a:cxn>
+              <a:cxn ang="0">
+                <a:pos x="connsiteX67" y="connsiteY67"/>
+              </a:cxn>
+              <a:cxn ang="0">
+                <a:pos x="connsiteX68" y="connsiteY68"/>
+              </a:cxn>
+              <a:cxn ang="0">
+                <a:pos x="connsiteX69" y="connsiteY69"/>
+              </a:cxn>
+              <a:cxn ang="0">
+                <a:pos x="connsiteX70" y="connsiteY70"/>
+              </a:cxn>
+              <a:cxn ang="0">
+                <a:pos x="connsiteX71" y="connsiteY71"/>
+              </a:cxn>
+              <a:cxn ang="0">
+                <a:pos x="connsiteX72" y="connsiteY72"/>
+              </a:cxn>
+              <a:cxn ang="0">
+                <a:pos x="connsiteX73" y="connsiteY73"/>
+              </a:cxn>
+              <a:cxn ang="0">
+                <a:pos x="connsiteX74" y="connsiteY74"/>
+              </a:cxn>
+              <a:cxn ang="0">
+                <a:pos x="connsiteX75" y="connsiteY75"/>
+              </a:cxn>
+              <a:cxn ang="0">
+                <a:pos x="connsiteX76" y="connsiteY76"/>
+              </a:cxn>
+              <a:cxn ang="0">
+                <a:pos x="connsiteX77" y="connsiteY77"/>
+              </a:cxn>
+              <a:cxn ang="0">
+                <a:pos x="connsiteX78" y="connsiteY78"/>
+              </a:cxn>
+              <a:cxn ang="0">
+                <a:pos x="connsiteX79" y="connsiteY79"/>
+              </a:cxn>
+              <a:cxn ang="0">
+                <a:pos x="connsiteX80" y="connsiteY80"/>
+              </a:cxn>
+              <a:cxn ang="0">
+                <a:pos x="connsiteX81" y="connsiteY81"/>
+              </a:cxn>
+              <a:cxn ang="0">
+                <a:pos x="connsiteX82" y="connsiteY82"/>
+              </a:cxn>
+              <a:cxn ang="0">
+                <a:pos x="connsiteX83" y="connsiteY83"/>
+              </a:cxn>
+              <a:cxn ang="0">
+                <a:pos x="connsiteX84" y="connsiteY84"/>
+              </a:cxn>
+              <a:cxn ang="0">
+                <a:pos x="connsiteX85" y="connsiteY85"/>
+              </a:cxn>
+              <a:cxn ang="0">
+                <a:pos x="connsiteX86" y="connsiteY86"/>
+              </a:cxn>
+              <a:cxn ang="0">
+                <a:pos x="connsiteX87" y="connsiteY87"/>
+              </a:cxn>
+              <a:cxn ang="0">
+                <a:pos x="connsiteX88" y="connsiteY88"/>
+              </a:cxn>
+              <a:cxn ang="0">
+                <a:pos x="connsiteX89" y="connsiteY89"/>
+              </a:cxn>
+              <a:cxn ang="0">
+                <a:pos x="connsiteX90" y="connsiteY90"/>
+              </a:cxn>
+              <a:cxn ang="0">
+                <a:pos x="connsiteX91" y="connsiteY91"/>
+              </a:cxn>
+              <a:cxn ang="0">
+                <a:pos x="connsiteX92" y="connsiteY92"/>
+              </a:cxn>
+              <a:cxn ang="0">
+                <a:pos x="connsiteX93" y="connsiteY93"/>
+              </a:cxn>
+              <a:cxn ang="0">
+                <a:pos x="connsiteX94" y="connsiteY94"/>
+              </a:cxn>
+              <a:cxn ang="0">
+                <a:pos x="connsiteX95" y="connsiteY95"/>
+              </a:cxn>
+              <a:cxn ang="0">
+                <a:pos x="connsiteX96" y="connsiteY96"/>
+              </a:cxn>
+              <a:cxn ang="0">
+                <a:pos x="connsiteX97" y="connsiteY97"/>
+              </a:cxn>
+              <a:cxn ang="0">
+                <a:pos x="connsiteX98" y="connsiteY98"/>
+              </a:cxn>
+              <a:cxn ang="0">
+                <a:pos x="connsiteX99" y="connsiteY99"/>
+              </a:cxn>
+              <a:cxn ang="0">
+                <a:pos x="connsiteX100" y="connsiteY100"/>
+              </a:cxn>
+              <a:cxn ang="0">
+                <a:pos x="connsiteX101" y="connsiteY101"/>
+              </a:cxn>
+              <a:cxn ang="0">
+                <a:pos x="connsiteX102" y="connsiteY102"/>
+              </a:cxn>
+              <a:cxn ang="0">
+                <a:pos x="connsiteX103" y="connsiteY103"/>
+              </a:cxn>
+              <a:cxn ang="0">
+                <a:pos x="connsiteX104" y="connsiteY104"/>
+              </a:cxn>
+              <a:cxn ang="0">
+                <a:pos x="connsiteX105" y="connsiteY105"/>
+              </a:cxn>
+              <a:cxn ang="0">
+                <a:pos x="connsiteX106" y="connsiteY106"/>
+              </a:cxn>
+              <a:cxn ang="0">
+                <a:pos x="connsiteX107" y="connsiteY107"/>
+              </a:cxn>
+              <a:cxn ang="0">
+                <a:pos x="connsiteX108" y="connsiteY108"/>
+              </a:cxn>
+              <a:cxn ang="0">
+                <a:pos x="connsiteX109" y="connsiteY109"/>
+              </a:cxn>
+              <a:cxn ang="0">
+                <a:pos x="connsiteX110" y="connsiteY110"/>
+              </a:cxn>
+              <a:cxn ang="0">
+                <a:pos x="connsiteX111" y="connsiteY111"/>
+              </a:cxn>
+              <a:cxn ang="0">
+                <a:pos x="connsiteX112" y="connsiteY112"/>
+              </a:cxn>
+              <a:cxn ang="0">
+                <a:pos x="connsiteX113" y="connsiteY113"/>
+              </a:cxn>
+              <a:cxn ang="0">
+                <a:pos x="connsiteX114" y="connsiteY114"/>
+              </a:cxn>
+              <a:cxn ang="0">
+                <a:pos x="connsiteX115" y="connsiteY115"/>
+              </a:cxn>
+              <a:cxn ang="0">
+                <a:pos x="connsiteX116" y="connsiteY116"/>
+              </a:cxn>
+              <a:cxn ang="0">
+                <a:pos x="connsiteX117" y="connsiteY117"/>
+              </a:cxn>
+              <a:cxn ang="0">
+                <a:pos x="connsiteX118" y="connsiteY118"/>
+              </a:cxn>
+              <a:cxn ang="0">
+                <a:pos x="connsiteX119" y="connsiteY119"/>
+              </a:cxn>
+              <a:cxn ang="0">
+                <a:pos x="connsiteX120" y="connsiteY120"/>
+              </a:cxn>
+              <a:cxn ang="0">
+                <a:pos x="connsiteX121" y="connsiteY121"/>
+              </a:cxn>
+              <a:cxn ang="0">
+                <a:pos x="connsiteX122" y="connsiteY122"/>
+              </a:cxn>
+              <a:cxn ang="0">
+                <a:pos x="connsiteX123" y="connsiteY123"/>
+              </a:cxn>
+              <a:cxn ang="0">
+                <a:pos x="connsiteX124" y="connsiteY124"/>
+              </a:cxn>
+              <a:cxn ang="0">
+                <a:pos x="connsiteX125" y="connsiteY125"/>
+              </a:cxn>
+              <a:cxn ang="0">
+                <a:pos x="connsiteX126" y="connsiteY126"/>
+              </a:cxn>
+              <a:cxn ang="0">
+                <a:pos x="connsiteX127" y="connsiteY127"/>
+              </a:cxn>
+              <a:cxn ang="0">
+                <a:pos x="connsiteX128" y="connsiteY128"/>
+              </a:cxn>
+              <a:cxn ang="0">
+                <a:pos x="connsiteX129" y="connsiteY129"/>
+              </a:cxn>
+              <a:cxn ang="0">
+                <a:pos x="connsiteX130" y="connsiteY130"/>
+              </a:cxn>
+              <a:cxn ang="0">
+                <a:pos x="connsiteX131" y="connsiteY131"/>
+              </a:cxn>
+              <a:cxn ang="0">
+                <a:pos x="connsiteX132" y="connsiteY132"/>
+              </a:cxn>
+              <a:cxn ang="0">
+                <a:pos x="connsiteX133" y="connsiteY133"/>
+              </a:cxn>
+              <a:cxn ang="0">
+                <a:pos x="connsiteX134" y="connsiteY134"/>
+              </a:cxn>
+              <a:cxn ang="0">
+                <a:pos x="connsiteX135" y="connsiteY135"/>
+              </a:cxn>
+              <a:cxn ang="0">
+                <a:pos x="connsiteX136" y="connsiteY136"/>
+              </a:cxn>
+              <a:cxn ang="0">
+                <a:pos x="connsiteX137" y="connsiteY137"/>
+              </a:cxn>
+              <a:cxn ang="0">
+                <a:pos x="connsiteX138" y="connsiteY138"/>
+              </a:cxn>
+              <a:cxn ang="0">
+                <a:pos x="connsiteX139" y="connsiteY139"/>
+              </a:cxn>
+              <a:cxn ang="0">
+                <a:pos x="connsiteX140" y="connsiteY140"/>
+              </a:cxn>
+              <a:cxn ang="0">
+                <a:pos x="connsiteX141" y="connsiteY141"/>
+              </a:cxn>
+              <a:cxn ang="0">
+                <a:pos x="connsiteX142" y="connsiteY142"/>
+              </a:cxn>
+              <a:cxn ang="0">
+                <a:pos x="connsiteX143" y="connsiteY143"/>
+              </a:cxn>
+              <a:cxn ang="0">
+                <a:pos x="connsiteX144" y="connsiteY144"/>
+              </a:cxn>
+              <a:cxn ang="0">
+                <a:pos x="connsiteX145" y="connsiteY145"/>
+              </a:cxn>
+              <a:cxn ang="0">
+                <a:pos x="connsiteX146" y="connsiteY146"/>
+              </a:cxn>
+              <a:cxn ang="0">
+                <a:pos x="connsiteX147" y="connsiteY147"/>
+              </a:cxn>
+              <a:cxn ang="0">
+                <a:pos x="connsiteX148" y="connsiteY148"/>
+              </a:cxn>
+              <a:cxn ang="0">
+                <a:pos x="connsiteX149" y="connsiteY149"/>
+              </a:cxn>
+              <a:cxn ang="0">
+                <a:pos x="connsiteX150" y="connsiteY150"/>
+              </a:cxn>
+              <a:cxn ang="0">
+                <a:pos x="connsiteX151" y="connsiteY151"/>
+              </a:cxn>
+              <a:cxn ang="0">
+                <a:pos x="connsiteX152" y="connsiteY152"/>
+              </a:cxn>
+            </a:cxnLst>
+            <a:rect l="l" t="t" r="r" b="b"/>
+            <a:pathLst>
+              <a:path w="1024040" h="1024042">
+                <a:moveTo>
+                  <a:pt x="537561" y="110549"/>
+                </a:moveTo>
+                <a:cubicBezTo>
+                  <a:pt x="553992" y="88673"/>
+                  <a:pt x="571348" y="74715"/>
+                  <a:pt x="571348" y="51239"/>
+                </a:cubicBezTo>
+                <a:cubicBezTo>
+                  <a:pt x="571348" y="18473"/>
+                  <a:pt x="550449" y="0"/>
+                  <a:pt x="512020" y="0"/>
+                </a:cubicBezTo>
+                <a:cubicBezTo>
+                  <a:pt x="473591" y="0"/>
+                  <a:pt x="452691" y="18473"/>
+                  <a:pt x="452691" y="51239"/>
+                </a:cubicBezTo>
+                <a:cubicBezTo>
+                  <a:pt x="452691" y="74641"/>
+                  <a:pt x="469938" y="88587"/>
+                  <a:pt x="486322" y="110343"/>
+                </a:cubicBezTo>
+                <a:lnTo>
+                  <a:pt x="486331" y="154738"/>
+                </a:lnTo>
+                <a:cubicBezTo>
+                  <a:pt x="454506" y="156981"/>
+                  <a:pt x="423127" y="163490"/>
+                  <a:pt x="393036" y="174090"/>
+                </a:cubicBezTo>
+                <a:cubicBezTo>
+                  <a:pt x="397317" y="159448"/>
+                  <a:pt x="402505" y="148040"/>
+                  <a:pt x="397332" y="135461"/>
+                </a:cubicBezTo>
+                <a:cubicBezTo>
+                  <a:pt x="389388" y="116142"/>
+                  <a:pt x="372585" y="110320"/>
+                  <a:pt x="349926" y="119637"/>
+                </a:cubicBezTo>
+                <a:cubicBezTo>
+                  <a:pt x="327267" y="128955"/>
+                  <a:pt x="319424" y="144916"/>
+                  <a:pt x="327371" y="164237"/>
+                </a:cubicBezTo>
+                <a:cubicBezTo>
+                  <a:pt x="332518" y="176757"/>
+                  <a:pt x="344156" y="181234"/>
+                  <a:pt x="357425" y="188570"/>
+                </a:cubicBezTo>
+                <a:lnTo>
+                  <a:pt x="357503" y="188761"/>
+                </a:lnTo>
+                <a:cubicBezTo>
+                  <a:pt x="328609" y="202654"/>
+                  <a:pt x="301702" y="220347"/>
+                  <a:pt x="277495" y="241369"/>
+                </a:cubicBezTo>
+                <a:lnTo>
+                  <a:pt x="246196" y="210084"/>
+                </a:lnTo>
+                <a:cubicBezTo>
+                  <a:pt x="242344" y="182994"/>
+                  <a:pt x="244753" y="160850"/>
+                  <a:pt x="228149" y="144246"/>
+                </a:cubicBezTo>
+                <a:cubicBezTo>
+                  <a:pt x="204981" y="121078"/>
+                  <a:pt x="177139" y="122794"/>
+                  <a:pt x="149966" y="149968"/>
+                </a:cubicBezTo>
+                <a:cubicBezTo>
+                  <a:pt x="122793" y="177141"/>
+                  <a:pt x="121077" y="204983"/>
+                  <a:pt x="144246" y="228151"/>
+                </a:cubicBezTo>
+                <a:cubicBezTo>
+                  <a:pt x="160791" y="244697"/>
+                  <a:pt x="182842" y="242365"/>
+                  <a:pt x="209807" y="246161"/>
+                </a:cubicBezTo>
+                <a:lnTo>
+                  <a:pt x="241245" y="277586"/>
+                </a:lnTo>
+                <a:cubicBezTo>
+                  <a:pt x="219960" y="302052"/>
+                  <a:pt x="202082" y="329285"/>
+                  <a:pt x="188098" y="358545"/>
+                </a:cubicBezTo>
+                <a:lnTo>
+                  <a:pt x="187634" y="358354"/>
+                </a:lnTo>
+                <a:cubicBezTo>
+                  <a:pt x="180301" y="345089"/>
+                  <a:pt x="175823" y="333452"/>
+                  <a:pt x="163303" y="328303"/>
+                </a:cubicBezTo>
+                <a:cubicBezTo>
+                  <a:pt x="143983" y="320356"/>
+                  <a:pt x="128023" y="328200"/>
+                  <a:pt x="118704" y="350859"/>
+                </a:cubicBezTo>
+                <a:cubicBezTo>
+                  <a:pt x="109385" y="373517"/>
+                  <a:pt x="115209" y="390319"/>
+                  <a:pt x="134529" y="398265"/>
+                </a:cubicBezTo>
+                <a:cubicBezTo>
+                  <a:pt x="147110" y="403440"/>
+                  <a:pt x="158523" y="398246"/>
+                  <a:pt x="173171" y="393965"/>
+                </a:cubicBezTo>
+                <a:lnTo>
+                  <a:pt x="173498" y="394100"/>
+                </a:lnTo>
+                <a:cubicBezTo>
+                  <a:pt x="163063" y="423909"/>
+                  <a:pt x="156641" y="454974"/>
+                  <a:pt x="154401" y="486476"/>
+                </a:cubicBezTo>
+                <a:lnTo>
+                  <a:pt x="110554" y="486484"/>
+                </a:lnTo>
+                <a:cubicBezTo>
+                  <a:pt x="88675" y="470052"/>
+                  <a:pt x="74716" y="452691"/>
+                  <a:pt x="51239" y="452691"/>
+                </a:cubicBezTo>
+                <a:cubicBezTo>
+                  <a:pt x="18472" y="452691"/>
+                  <a:pt x="0" y="473591"/>
+                  <a:pt x="0" y="512020"/>
+                </a:cubicBezTo>
+                <a:cubicBezTo>
+                  <a:pt x="0" y="550449"/>
+                  <a:pt x="18472" y="571349"/>
+                  <a:pt x="51239" y="571349"/>
+                </a:cubicBezTo>
+                <a:cubicBezTo>
+                  <a:pt x="74638" y="571349"/>
+                  <a:pt x="88584" y="554105"/>
+                  <a:pt x="110338" y="537723"/>
+                </a:cubicBezTo>
+                <a:lnTo>
+                  <a:pt x="154356" y="537715"/>
+                </a:lnTo>
+                <a:cubicBezTo>
+                  <a:pt x="156561" y="569416"/>
+                  <a:pt x="162998" y="600680"/>
+                  <a:pt x="173498" y="630672"/>
+                </a:cubicBezTo>
+                <a:lnTo>
+                  <a:pt x="173171" y="630807"/>
+                </a:lnTo>
+                <a:cubicBezTo>
+                  <a:pt x="158523" y="626526"/>
+                  <a:pt x="147110" y="621331"/>
+                  <a:pt x="134528" y="626506"/>
+                </a:cubicBezTo>
+                <a:cubicBezTo>
+                  <a:pt x="115209" y="634452"/>
+                  <a:pt x="109385" y="651253"/>
+                  <a:pt x="118704" y="673912"/>
+                </a:cubicBezTo>
+                <a:cubicBezTo>
+                  <a:pt x="128023" y="696571"/>
+                  <a:pt x="143983" y="704415"/>
+                  <a:pt x="163303" y="696469"/>
+                </a:cubicBezTo>
+                <a:cubicBezTo>
+                  <a:pt x="175823" y="691321"/>
+                  <a:pt x="180300" y="679685"/>
+                  <a:pt x="187634" y="666418"/>
+                </a:cubicBezTo>
+                <a:lnTo>
+                  <a:pt x="188097" y="666227"/>
+                </a:lnTo>
+                <a:cubicBezTo>
+                  <a:pt x="202031" y="695378"/>
+                  <a:pt x="219829" y="722517"/>
+                  <a:pt x="241008" y="746916"/>
+                </a:cubicBezTo>
+                <a:lnTo>
+                  <a:pt x="210095" y="777842"/>
+                </a:lnTo>
+                <a:cubicBezTo>
+                  <a:pt x="183000" y="781697"/>
+                  <a:pt x="160851" y="779287"/>
+                  <a:pt x="144247" y="795891"/>
+                </a:cubicBezTo>
+                <a:cubicBezTo>
+                  <a:pt x="121077" y="819061"/>
+                  <a:pt x="122793" y="846900"/>
+                  <a:pt x="149968" y="874075"/>
+                </a:cubicBezTo>
+                <a:cubicBezTo>
+                  <a:pt x="177141" y="901248"/>
+                  <a:pt x="204981" y="902966"/>
+                  <a:pt x="228149" y="879794"/>
+                </a:cubicBezTo>
+                <a:cubicBezTo>
+                  <a:pt x="244696" y="863251"/>
+                  <a:pt x="242365" y="841195"/>
+                  <a:pt x="246160" y="814231"/>
+                </a:cubicBezTo>
+                <a:lnTo>
+                  <a:pt x="277218" y="783162"/>
+                </a:lnTo>
+                <a:cubicBezTo>
+                  <a:pt x="301494" y="804290"/>
+                  <a:pt x="328497" y="822065"/>
+                  <a:pt x="357503" y="836010"/>
+                </a:cubicBezTo>
+                <a:lnTo>
+                  <a:pt x="357421" y="836206"/>
+                </a:lnTo>
+                <a:cubicBezTo>
+                  <a:pt x="344156" y="843540"/>
+                  <a:pt x="332518" y="848018"/>
+                  <a:pt x="327370" y="860536"/>
+                </a:cubicBezTo>
+                <a:cubicBezTo>
+                  <a:pt x="319423" y="879857"/>
+                  <a:pt x="327266" y="895815"/>
+                  <a:pt x="349926" y="905136"/>
+                </a:cubicBezTo>
+                <a:cubicBezTo>
+                  <a:pt x="372585" y="914455"/>
+                  <a:pt x="389387" y="908631"/>
+                  <a:pt x="397332" y="889311"/>
+                </a:cubicBezTo>
+                <a:cubicBezTo>
+                  <a:pt x="402505" y="876734"/>
+                  <a:pt x="397317" y="865325"/>
+                  <a:pt x="393035" y="850682"/>
+                </a:cubicBezTo>
+                <a:cubicBezTo>
+                  <a:pt x="423172" y="861299"/>
+                  <a:pt x="454601" y="867812"/>
+                  <a:pt x="486475" y="870045"/>
+                </a:cubicBezTo>
+                <a:lnTo>
+                  <a:pt x="486482" y="913489"/>
+                </a:lnTo>
+                <a:cubicBezTo>
+                  <a:pt x="470049" y="935368"/>
+                  <a:pt x="452689" y="949325"/>
+                  <a:pt x="452689" y="972804"/>
+                </a:cubicBezTo>
+                <a:cubicBezTo>
+                  <a:pt x="452689" y="1005571"/>
+                  <a:pt x="473590" y="1024043"/>
+                  <a:pt x="512019" y="1024043"/>
+                </a:cubicBezTo>
+                <a:cubicBezTo>
+                  <a:pt x="550447" y="1024043"/>
+                  <a:pt x="571348" y="1005571"/>
+                  <a:pt x="571348" y="972804"/>
+                </a:cubicBezTo>
+                <a:cubicBezTo>
+                  <a:pt x="571348" y="949403"/>
+                  <a:pt x="554103" y="935459"/>
+                  <a:pt x="537721" y="913704"/>
+                </a:cubicBezTo>
+                <a:lnTo>
+                  <a:pt x="537713" y="870036"/>
+                </a:lnTo>
+                <a:cubicBezTo>
+                  <a:pt x="569088" y="867820"/>
+                  <a:pt x="600032" y="861460"/>
+                  <a:pt x="629738" y="851120"/>
+                </a:cubicBezTo>
+                <a:cubicBezTo>
+                  <a:pt x="625484" y="865548"/>
+                  <a:pt x="620452" y="876861"/>
+                  <a:pt x="625574" y="889311"/>
+                </a:cubicBezTo>
+                <a:cubicBezTo>
+                  <a:pt x="633518" y="908631"/>
+                  <a:pt x="650319" y="914455"/>
+                  <a:pt x="672980" y="905136"/>
+                </a:cubicBezTo>
+                <a:cubicBezTo>
+                  <a:pt x="695639" y="895815"/>
+                  <a:pt x="703482" y="879857"/>
+                  <a:pt x="695535" y="860536"/>
+                </a:cubicBezTo>
+                <a:cubicBezTo>
+                  <a:pt x="690425" y="848111"/>
+                  <a:pt x="678922" y="843605"/>
+                  <a:pt x="665778" y="836364"/>
+                </a:cubicBezTo>
+                <a:cubicBezTo>
+                  <a:pt x="695117" y="822352"/>
+                  <a:pt x="722421" y="804426"/>
+                  <a:pt x="746942" y="783078"/>
+                </a:cubicBezTo>
+                <a:lnTo>
+                  <a:pt x="777844" y="813967"/>
+                </a:lnTo>
+                <a:cubicBezTo>
+                  <a:pt x="781694" y="841053"/>
+                  <a:pt x="779289" y="863194"/>
+                  <a:pt x="795889" y="879794"/>
+                </a:cubicBezTo>
+                <a:cubicBezTo>
+                  <a:pt x="819060" y="902966"/>
+                  <a:pt x="846900" y="901248"/>
+                  <a:pt x="874073" y="874075"/>
+                </a:cubicBezTo>
+                <a:cubicBezTo>
+                  <a:pt x="901246" y="846902"/>
+                  <a:pt x="902964" y="819061"/>
+                  <a:pt x="879793" y="795891"/>
+                </a:cubicBezTo>
+                <a:cubicBezTo>
+                  <a:pt x="863246" y="779345"/>
+                  <a:pt x="841191" y="781676"/>
+                  <a:pt x="814224" y="777881"/>
+                </a:cubicBezTo>
+                <a:lnTo>
+                  <a:pt x="783145" y="746813"/>
+                </a:lnTo>
+                <a:cubicBezTo>
+                  <a:pt x="804099" y="722669"/>
+                  <a:pt x="821741" y="695837"/>
+                  <a:pt x="835603" y="667031"/>
+                </a:cubicBezTo>
+                <a:cubicBezTo>
+                  <a:pt x="842741" y="680041"/>
+                  <a:pt x="847278" y="691401"/>
+                  <a:pt x="859603" y="696469"/>
+                </a:cubicBezTo>
+                <a:cubicBezTo>
+                  <a:pt x="878924" y="704416"/>
+                  <a:pt x="894883" y="696573"/>
+                  <a:pt x="904203" y="673912"/>
+                </a:cubicBezTo>
+                <a:cubicBezTo>
+                  <a:pt x="913522" y="651253"/>
+                  <a:pt x="907697" y="634452"/>
+                  <a:pt x="888378" y="626506"/>
+                </a:cubicBezTo>
+                <a:cubicBezTo>
+                  <a:pt x="876052" y="621438"/>
+                  <a:pt x="864835" y="626318"/>
+                  <a:pt x="850612" y="630543"/>
+                </a:cubicBezTo>
+                <a:cubicBezTo>
+                  <a:pt x="861101" y="600544"/>
+                  <a:pt x="867527" y="569275"/>
+                  <a:pt x="869720" y="537572"/>
+                </a:cubicBezTo>
+                <a:lnTo>
+                  <a:pt x="913492" y="537561"/>
+                </a:lnTo>
+                <a:cubicBezTo>
+                  <a:pt x="935370" y="553992"/>
+                  <a:pt x="949327" y="571349"/>
+                  <a:pt x="972802" y="571349"/>
+                </a:cubicBezTo>
+                <a:cubicBezTo>
+                  <a:pt x="1005569" y="571349"/>
+                  <a:pt x="1024041" y="550449"/>
+                  <a:pt x="1024041" y="512020"/>
+                </a:cubicBezTo>
+                <a:cubicBezTo>
+                  <a:pt x="1024041" y="473591"/>
+                  <a:pt x="1005569" y="452691"/>
+                  <a:pt x="972802" y="452691"/>
+                </a:cubicBezTo>
+                <a:cubicBezTo>
+                  <a:pt x="949402" y="452691"/>
+                  <a:pt x="935455" y="469939"/>
+                  <a:pt x="913699" y="486323"/>
+                </a:cubicBezTo>
+                <a:lnTo>
+                  <a:pt x="869655" y="486333"/>
+                </a:lnTo>
+                <a:cubicBezTo>
+                  <a:pt x="867407" y="454925"/>
+                  <a:pt x="861003" y="423954"/>
+                  <a:pt x="850612" y="394230"/>
+                </a:cubicBezTo>
+                <a:cubicBezTo>
+                  <a:pt x="864835" y="398455"/>
+                  <a:pt x="876054" y="403335"/>
+                  <a:pt x="888378" y="398267"/>
+                </a:cubicBezTo>
+                <a:cubicBezTo>
+                  <a:pt x="907697" y="390321"/>
+                  <a:pt x="913521" y="373520"/>
+                  <a:pt x="904203" y="350861"/>
+                </a:cubicBezTo>
+                <a:cubicBezTo>
+                  <a:pt x="894884" y="328200"/>
+                  <a:pt x="878924" y="320357"/>
+                  <a:pt x="859603" y="328304"/>
+                </a:cubicBezTo>
+                <a:cubicBezTo>
+                  <a:pt x="847278" y="333373"/>
+                  <a:pt x="842741" y="344734"/>
+                  <a:pt x="835606" y="357743"/>
+                </a:cubicBezTo>
+                <a:cubicBezTo>
+                  <a:pt x="821645" y="328736"/>
+                  <a:pt x="803855" y="301734"/>
+                  <a:pt x="782711" y="277460"/>
+                </a:cubicBezTo>
+                <a:lnTo>
+                  <a:pt x="813957" y="246198"/>
+                </a:lnTo>
+                <a:cubicBezTo>
+                  <a:pt x="841049" y="242345"/>
+                  <a:pt x="863193" y="244753"/>
+                  <a:pt x="879793" y="228151"/>
+                </a:cubicBezTo>
+                <a:cubicBezTo>
+                  <a:pt x="902964" y="204983"/>
+                  <a:pt x="901246" y="177141"/>
+                  <a:pt x="874073" y="149968"/>
+                </a:cubicBezTo>
+                <a:cubicBezTo>
+                  <a:pt x="846900" y="122795"/>
+                  <a:pt x="819060" y="121078"/>
+                  <a:pt x="795889" y="144246"/>
+                </a:cubicBezTo>
+                <a:cubicBezTo>
+                  <a:pt x="779342" y="160795"/>
+                  <a:pt x="781677" y="182853"/>
+                  <a:pt x="777877" y="209824"/>
+                </a:cubicBezTo>
+                <a:lnTo>
+                  <a:pt x="746449" y="241266"/>
+                </a:lnTo>
+                <a:cubicBezTo>
+                  <a:pt x="722053" y="220105"/>
+                  <a:pt x="694920" y="202326"/>
+                  <a:pt x="665779" y="188407"/>
+                </a:cubicBezTo>
+                <a:cubicBezTo>
+                  <a:pt x="678923" y="181169"/>
+                  <a:pt x="690425" y="176661"/>
+                  <a:pt x="695536" y="164235"/>
+                </a:cubicBezTo>
+                <a:cubicBezTo>
+                  <a:pt x="703482" y="144915"/>
+                  <a:pt x="695639" y="128955"/>
+                  <a:pt x="672980" y="119636"/>
+                </a:cubicBezTo>
+                <a:cubicBezTo>
+                  <a:pt x="650321" y="110317"/>
+                  <a:pt x="633518" y="116142"/>
+                  <a:pt x="625574" y="135461"/>
+                </a:cubicBezTo>
+                <a:cubicBezTo>
+                  <a:pt x="620454" y="147911"/>
+                  <a:pt x="625484" y="159224"/>
+                  <a:pt x="629738" y="173652"/>
+                </a:cubicBezTo>
+                <a:cubicBezTo>
+                  <a:pt x="599988" y="163295"/>
+                  <a:pt x="568995" y="156930"/>
+                  <a:pt x="537570" y="154726"/>
+                </a:cubicBezTo>
+                <a:close/>
+                <a:moveTo>
+                  <a:pt x="299926" y="535954"/>
+                </a:moveTo>
+                <a:cubicBezTo>
+                  <a:pt x="286911" y="548970"/>
+                  <a:pt x="265808" y="548970"/>
+                  <a:pt x="252792" y="535954"/>
+                </a:cubicBezTo>
+                <a:cubicBezTo>
+                  <a:pt x="239776" y="522937"/>
+                  <a:pt x="239776" y="501834"/>
+                  <a:pt x="252793" y="488818"/>
+                </a:cubicBezTo>
+                <a:cubicBezTo>
+                  <a:pt x="265808" y="475803"/>
+                  <a:pt x="286911" y="475803"/>
+                  <a:pt x="299926" y="488818"/>
+                </a:cubicBezTo>
+                <a:cubicBezTo>
+                  <a:pt x="312942" y="501833"/>
+                  <a:pt x="312944" y="522935"/>
+                  <a:pt x="299929" y="535951"/>
+                </a:cubicBezTo>
+                <a:cubicBezTo>
+                  <a:pt x="299928" y="535952"/>
+                  <a:pt x="299928" y="535952"/>
+                  <a:pt x="299926" y="535954"/>
+                </a:cubicBezTo>
+                <a:close/>
+                <a:moveTo>
+                  <a:pt x="405980" y="689142"/>
+                </a:moveTo>
+                <a:cubicBezTo>
+                  <a:pt x="386456" y="708665"/>
+                  <a:pt x="354802" y="708666"/>
+                  <a:pt x="335277" y="689142"/>
+                </a:cubicBezTo>
+                <a:cubicBezTo>
+                  <a:pt x="315753" y="669619"/>
+                  <a:pt x="315753" y="637963"/>
+                  <a:pt x="335277" y="618440"/>
+                </a:cubicBezTo>
+                <a:cubicBezTo>
+                  <a:pt x="354800" y="598916"/>
+                  <a:pt x="386456" y="598916"/>
+                  <a:pt x="405979" y="618439"/>
+                </a:cubicBezTo>
+                <a:cubicBezTo>
+                  <a:pt x="405979" y="618439"/>
+                  <a:pt x="405980" y="618439"/>
+                  <a:pt x="405980" y="618440"/>
+                </a:cubicBezTo>
+                <a:cubicBezTo>
+                  <a:pt x="425503" y="637963"/>
+                  <a:pt x="425503" y="669617"/>
+                  <a:pt x="405980" y="689142"/>
+                </a:cubicBezTo>
+                <a:close/>
+                <a:moveTo>
+                  <a:pt x="405980" y="406334"/>
+                </a:moveTo>
+                <a:cubicBezTo>
+                  <a:pt x="386456" y="425859"/>
+                  <a:pt x="354800" y="425859"/>
+                  <a:pt x="335276" y="406334"/>
+                </a:cubicBezTo>
+                <a:cubicBezTo>
+                  <a:pt x="315753" y="386811"/>
+                  <a:pt x="315753" y="355156"/>
+                  <a:pt x="335276" y="335631"/>
+                </a:cubicBezTo>
+                <a:cubicBezTo>
+                  <a:pt x="354800" y="316107"/>
+                  <a:pt x="386456" y="316107"/>
+                  <a:pt x="405980" y="335631"/>
+                </a:cubicBezTo>
+                <a:cubicBezTo>
+                  <a:pt x="425502" y="355156"/>
+                  <a:pt x="425502" y="386810"/>
+                  <a:pt x="405980" y="406334"/>
+                </a:cubicBezTo>
+                <a:close/>
+                <a:moveTo>
+                  <a:pt x="535600" y="771628"/>
+                </a:moveTo>
+                <a:cubicBezTo>
+                  <a:pt x="522584" y="784644"/>
+                  <a:pt x="501480" y="784644"/>
+                  <a:pt x="488464" y="771628"/>
+                </a:cubicBezTo>
+                <a:cubicBezTo>
+                  <a:pt x="475449" y="758611"/>
+                  <a:pt x="475449" y="737509"/>
+                  <a:pt x="488465" y="724493"/>
+                </a:cubicBezTo>
+                <a:cubicBezTo>
+                  <a:pt x="501481" y="711478"/>
+                  <a:pt x="522584" y="711478"/>
+                  <a:pt x="535600" y="724493"/>
+                </a:cubicBezTo>
+                <a:cubicBezTo>
+                  <a:pt x="548616" y="737510"/>
+                  <a:pt x="548616" y="758613"/>
+                  <a:pt x="535600" y="771628"/>
+                </a:cubicBezTo>
+                <a:close/>
+                <a:moveTo>
+                  <a:pt x="724139" y="488818"/>
+                </a:moveTo>
+                <a:cubicBezTo>
+                  <a:pt x="737155" y="475802"/>
+                  <a:pt x="758257" y="475802"/>
+                  <a:pt x="771274" y="488818"/>
+                </a:cubicBezTo>
+                <a:cubicBezTo>
+                  <a:pt x="784290" y="501835"/>
+                  <a:pt x="784290" y="522938"/>
+                  <a:pt x="771274" y="535954"/>
+                </a:cubicBezTo>
+                <a:cubicBezTo>
+                  <a:pt x="758259" y="548970"/>
+                  <a:pt x="737155" y="548970"/>
+                  <a:pt x="724139" y="535954"/>
+                </a:cubicBezTo>
+                <a:cubicBezTo>
+                  <a:pt x="711123" y="522938"/>
+                  <a:pt x="711123" y="501835"/>
+                  <a:pt x="724139" y="488818"/>
+                </a:cubicBezTo>
+                <a:close/>
+                <a:moveTo>
+                  <a:pt x="618088" y="335631"/>
+                </a:moveTo>
+                <a:cubicBezTo>
+                  <a:pt x="637612" y="316108"/>
+                  <a:pt x="669266" y="316108"/>
+                  <a:pt x="688789" y="335632"/>
+                </a:cubicBezTo>
+                <a:cubicBezTo>
+                  <a:pt x="708312" y="355157"/>
+                  <a:pt x="708311" y="386811"/>
+                  <a:pt x="688788" y="406334"/>
+                </a:cubicBezTo>
+                <a:cubicBezTo>
+                  <a:pt x="669263" y="425857"/>
+                  <a:pt x="637611" y="425857"/>
+                  <a:pt x="618088" y="406334"/>
+                </a:cubicBezTo>
+                <a:cubicBezTo>
+                  <a:pt x="598563" y="386813"/>
+                  <a:pt x="598561" y="355161"/>
+                  <a:pt x="618081" y="335636"/>
+                </a:cubicBezTo>
+                <a:cubicBezTo>
+                  <a:pt x="618084" y="335635"/>
+                  <a:pt x="618085" y="335632"/>
+                  <a:pt x="618086" y="335631"/>
+                </a:cubicBezTo>
+                <a:close/>
+                <a:moveTo>
+                  <a:pt x="618088" y="618440"/>
+                </a:moveTo>
+                <a:cubicBezTo>
+                  <a:pt x="637611" y="598916"/>
+                  <a:pt x="669265" y="598917"/>
+                  <a:pt x="688788" y="618440"/>
+                </a:cubicBezTo>
+                <a:cubicBezTo>
+                  <a:pt x="708311" y="637965"/>
+                  <a:pt x="708311" y="669619"/>
+                  <a:pt x="688788" y="689142"/>
+                </a:cubicBezTo>
+                <a:cubicBezTo>
+                  <a:pt x="669265" y="708664"/>
+                  <a:pt x="637611" y="708664"/>
+                  <a:pt x="618088" y="689142"/>
+                </a:cubicBezTo>
+                <a:cubicBezTo>
+                  <a:pt x="598563" y="669620"/>
+                  <a:pt x="598562" y="637967"/>
+                  <a:pt x="618084" y="618443"/>
+                </a:cubicBezTo>
+                <a:cubicBezTo>
+                  <a:pt x="618085" y="618443"/>
+                  <a:pt x="618086" y="618442"/>
+                  <a:pt x="618086" y="618440"/>
+                </a:cubicBezTo>
+                <a:close/>
+                <a:moveTo>
+                  <a:pt x="547383" y="547737"/>
+                </a:moveTo>
+                <a:cubicBezTo>
+                  <a:pt x="527859" y="567262"/>
+                  <a:pt x="496205" y="567261"/>
+                  <a:pt x="476680" y="547737"/>
+                </a:cubicBezTo>
+                <a:cubicBezTo>
+                  <a:pt x="457157" y="528213"/>
+                  <a:pt x="457157" y="496559"/>
+                  <a:pt x="476682" y="477034"/>
+                </a:cubicBezTo>
+                <a:cubicBezTo>
+                  <a:pt x="496206" y="457511"/>
+                  <a:pt x="527859" y="457511"/>
+                  <a:pt x="547383" y="477034"/>
+                </a:cubicBezTo>
+                <a:cubicBezTo>
+                  <a:pt x="566908" y="496558"/>
+                  <a:pt x="566909" y="528212"/>
+                  <a:pt x="547386" y="547736"/>
+                </a:cubicBezTo>
+                <a:cubicBezTo>
+                  <a:pt x="547385" y="547736"/>
+                  <a:pt x="547385" y="547737"/>
+                  <a:pt x="547383" y="547737"/>
+                </a:cubicBezTo>
+                <a:close/>
+                <a:moveTo>
+                  <a:pt x="535600" y="300279"/>
+                </a:moveTo>
+                <a:cubicBezTo>
+                  <a:pt x="522584" y="313295"/>
+                  <a:pt x="501481" y="313295"/>
+                  <a:pt x="488465" y="300279"/>
+                </a:cubicBezTo>
+                <a:cubicBezTo>
+                  <a:pt x="475449" y="287263"/>
+                  <a:pt x="475449" y="266161"/>
+                  <a:pt x="488465" y="253146"/>
+                </a:cubicBezTo>
+                <a:cubicBezTo>
+                  <a:pt x="501481" y="240130"/>
+                  <a:pt x="522584" y="240130"/>
+                  <a:pt x="535600" y="253146"/>
+                </a:cubicBezTo>
+                <a:cubicBezTo>
+                  <a:pt x="548616" y="266161"/>
+                  <a:pt x="548616" y="287263"/>
+                  <a:pt x="535601" y="300278"/>
+                </a:cubicBezTo>
+                <a:cubicBezTo>
+                  <a:pt x="535600" y="300279"/>
+                  <a:pt x="535600" y="300279"/>
+                  <a:pt x="535600" y="300279"/>
+                </a:cubicBezTo>
+                <a:close/>
+              </a:path>
+            </a:pathLst>
+          </a:custGeom>
+          <a:solidFill>
+            <a:srgbClr val="000F86"/>
+          </a:solidFill>
+          <a:ln w="12799" cap="flat">
+            <a:noFill/>
+            <a:prstDash val="solid"/>
+            <a:miter/>
+          </a:ln>
+        </p:spPr>
+        <p:txBody>
+          <a:bodyPr rtlCol="0" anchor="ctr"/>
+          <a:lstStyle/>
+          <a:p>
+            <a:endParaRPr lang="en-GB"/>
+          </a:p>
+        </p:txBody>
+      </p:sp>
+      <p:grpSp>
+        <p:nvGrpSpPr>
+          <p:cNvPr id="42" name="Group 41">
+            <a:extLst>
+              <a:ext uri="{FF2B5EF4-FFF2-40B4-BE49-F238E27FC236}">
+                <a16:creationId xmlns:a16="http://schemas.microsoft.com/office/drawing/2014/main" id="{FA7E8D46-4B1B-4D2A-9825-9E799E82F6C9}"/>
+              </a:ext>
+            </a:extLst>
+          </p:cNvPr>
+          <p:cNvGrpSpPr/>
+          <p:nvPr/>
+        </p:nvGrpSpPr>
+        <p:grpSpPr>
+          <a:xfrm>
+            <a:off x="7271872" y="208700"/>
+            <a:ext cx="1246950" cy="1467000"/>
+            <a:chOff x="7271872" y="208700"/>
+            <a:chExt cx="1246950" cy="1467000"/>
+          </a:xfrm>
+        </p:grpSpPr>
+        <p:sp>
+          <p:nvSpPr>
+            <p:cNvPr id="33" name="Freeform: Shape 32">
+              <a:extLst>
+                <a:ext uri="{FF2B5EF4-FFF2-40B4-BE49-F238E27FC236}">
+                  <a16:creationId xmlns:a16="http://schemas.microsoft.com/office/drawing/2014/main" id="{BCB447A3-23BB-4D6E-9F47-4D960F0EDB8F}"/>
+                </a:ext>
+              </a:extLst>
+            </p:cNvPr>
+            <p:cNvSpPr/>
+            <p:nvPr/>
+          </p:nvSpPr>
+          <p:spPr>
+            <a:xfrm>
+              <a:off x="7271872" y="208700"/>
+              <a:ext cx="1246950" cy="366750"/>
+            </a:xfrm>
+            <a:custGeom>
+              <a:avLst/>
+              <a:gdLst>
+                <a:gd name="connsiteX0" fmla="*/ 1173600 w 1246950"/>
+                <a:gd name="connsiteY0" fmla="*/ 220050 h 366750"/>
+                <a:gd name="connsiteX1" fmla="*/ 861863 w 1246950"/>
+                <a:gd name="connsiteY1" fmla="*/ 220050 h 366750"/>
+                <a:gd name="connsiteX2" fmla="*/ 861863 w 1246950"/>
+                <a:gd name="connsiteY2" fmla="*/ 128363 h 366750"/>
+                <a:gd name="connsiteX3" fmla="*/ 733500 w 1246950"/>
+                <a:gd name="connsiteY3" fmla="*/ 0 h 366750"/>
+                <a:gd name="connsiteX4" fmla="*/ 513450 w 1246950"/>
+                <a:gd name="connsiteY4" fmla="*/ 0 h 366750"/>
+                <a:gd name="connsiteX5" fmla="*/ 385088 w 1246950"/>
+                <a:gd name="connsiteY5" fmla="*/ 128363 h 366750"/>
+                <a:gd name="connsiteX6" fmla="*/ 385088 w 1246950"/>
+                <a:gd name="connsiteY6" fmla="*/ 220050 h 366750"/>
+                <a:gd name="connsiteX7" fmla="*/ 73350 w 1246950"/>
+                <a:gd name="connsiteY7" fmla="*/ 220050 h 366750"/>
+                <a:gd name="connsiteX8" fmla="*/ 0 w 1246950"/>
+                <a:gd name="connsiteY8" fmla="*/ 293400 h 366750"/>
+                <a:gd name="connsiteX9" fmla="*/ 0 w 1246950"/>
+                <a:gd name="connsiteY9" fmla="*/ 366750 h 366750"/>
+                <a:gd name="connsiteX10" fmla="*/ 1246950 w 1246950"/>
+                <a:gd name="connsiteY10" fmla="*/ 366750 h 366750"/>
+                <a:gd name="connsiteX11" fmla="*/ 1246950 w 1246950"/>
+                <a:gd name="connsiteY11" fmla="*/ 293400 h 366750"/>
+                <a:gd name="connsiteX12" fmla="*/ 1173600 w 1246950"/>
+                <a:gd name="connsiteY12" fmla="*/ 220050 h 366750"/>
+                <a:gd name="connsiteX13" fmla="*/ 495113 w 1246950"/>
+                <a:gd name="connsiteY13" fmla="*/ 128363 h 366750"/>
+                <a:gd name="connsiteX14" fmla="*/ 513450 w 1246950"/>
+                <a:gd name="connsiteY14" fmla="*/ 110025 h 366750"/>
+                <a:gd name="connsiteX15" fmla="*/ 733500 w 1246950"/>
+                <a:gd name="connsiteY15" fmla="*/ 110025 h 366750"/>
+                <a:gd name="connsiteX16" fmla="*/ 751838 w 1246950"/>
+                <a:gd name="connsiteY16" fmla="*/ 128363 h 366750"/>
+                <a:gd name="connsiteX17" fmla="*/ 751838 w 1246950"/>
+                <a:gd name="connsiteY17" fmla="*/ 220050 h 366750"/>
+                <a:gd name="connsiteX18" fmla="*/ 495113 w 1246950"/>
+                <a:gd name="connsiteY18" fmla="*/ 220050 h 366750"/>
+                <a:gd name="connsiteX19" fmla="*/ 495113 w 1246950"/>
+                <a:gd name="connsiteY19" fmla="*/ 128363 h 366750"/>
+              </a:gdLst>
+              <a:ahLst/>
+              <a:cxnLst>
+                <a:cxn ang="0">
+                  <a:pos x="connsiteX0" y="connsiteY0"/>
+                </a:cxn>
+                <a:cxn ang="0">
+                  <a:pos x="connsiteX1" y="connsiteY1"/>
+                </a:cxn>
+                <a:cxn ang="0">
+                  <a:pos x="connsiteX2" y="connsiteY2"/>
+                </a:cxn>
+                <a:cxn ang="0">
+                  <a:pos x="connsiteX3" y="connsiteY3"/>
+                </a:cxn>
+                <a:cxn ang="0">
+                  <a:pos x="connsiteX4" y="connsiteY4"/>
+                </a:cxn>
+                <a:cxn ang="0">
+                  <a:pos x="connsiteX5" y="connsiteY5"/>
+                </a:cxn>
+                <a:cxn ang="0">
+                  <a:pos x="connsiteX6" y="connsiteY6"/>
+                </a:cxn>
+                <a:cxn ang="0">
+                  <a:pos x="connsiteX7" y="connsiteY7"/>
+                </a:cxn>
+                <a:cxn ang="0">
+                  <a:pos x="connsiteX8" y="connsiteY8"/>
+                </a:cxn>
+                <a:cxn ang="0">
+                  <a:pos x="connsiteX9" y="connsiteY9"/>
+                </a:cxn>
+                <a:cxn ang="0">
+                  <a:pos x="connsiteX10" y="connsiteY10"/>
+                </a:cxn>
+                <a:cxn ang="0">
+                  <a:pos x="connsiteX11" y="connsiteY11"/>
+                </a:cxn>
+                <a:cxn ang="0">
+                  <a:pos x="connsiteX12" y="connsiteY12"/>
+                </a:cxn>
+                <a:cxn ang="0">
+                  <a:pos x="connsiteX13" y="connsiteY13"/>
+                </a:cxn>
+                <a:cxn ang="0">
+                  <a:pos x="connsiteX14" y="connsiteY14"/>
+                </a:cxn>
+                <a:cxn ang="0">
+                  <a:pos x="connsiteX15" y="connsiteY15"/>
+                </a:cxn>
+                <a:cxn ang="0">
+                  <a:pos x="connsiteX16" y="connsiteY16"/>
+                </a:cxn>
+                <a:cxn ang="0">
+                  <a:pos x="connsiteX17" y="connsiteY17"/>
+                </a:cxn>
+                <a:cxn ang="0">
+                  <a:pos x="connsiteX18" y="connsiteY18"/>
+                </a:cxn>
+                <a:cxn ang="0">
+                  <a:pos x="connsiteX19" y="connsiteY19"/>
+                </a:cxn>
+              </a:cxnLst>
+              <a:rect l="l" t="t" r="r" b="b"/>
+              <a:pathLst>
+                <a:path w="1246950" h="366750">
+                  <a:moveTo>
+                    <a:pt x="1173600" y="220050"/>
+                  </a:moveTo>
+                  <a:lnTo>
+                    <a:pt x="861863" y="220050"/>
+                  </a:lnTo>
+                  <a:lnTo>
+                    <a:pt x="861863" y="128363"/>
+                  </a:lnTo>
+                  <a:cubicBezTo>
+                    <a:pt x="861863" y="56846"/>
+                    <a:pt x="805016" y="0"/>
+                    <a:pt x="733500" y="0"/>
+                  </a:cubicBezTo>
+                  <a:lnTo>
+                    <a:pt x="513450" y="0"/>
+                  </a:lnTo>
+                  <a:cubicBezTo>
+                    <a:pt x="441934" y="0"/>
+                    <a:pt x="385088" y="56846"/>
+                    <a:pt x="385088" y="128363"/>
+                  </a:cubicBezTo>
+                  <a:lnTo>
+                    <a:pt x="385088" y="220050"/>
+                  </a:lnTo>
+                  <a:lnTo>
+                    <a:pt x="73350" y="220050"/>
+                  </a:lnTo>
+                  <a:cubicBezTo>
+                    <a:pt x="33008" y="220050"/>
+                    <a:pt x="0" y="253057"/>
+                    <a:pt x="0" y="293400"/>
+                  </a:cubicBezTo>
+                  <a:lnTo>
+                    <a:pt x="0" y="366750"/>
+                  </a:lnTo>
+                  <a:lnTo>
+                    <a:pt x="1246950" y="366750"/>
+                  </a:lnTo>
+                  <a:lnTo>
+                    <a:pt x="1246950" y="293400"/>
+                  </a:lnTo>
+                  <a:cubicBezTo>
+                    <a:pt x="1246950" y="253057"/>
+                    <a:pt x="1213943" y="220050"/>
+                    <a:pt x="1173600" y="220050"/>
+                  </a:cubicBezTo>
+                  <a:close/>
+                  <a:moveTo>
+                    <a:pt x="495113" y="128363"/>
+                  </a:moveTo>
+                  <a:cubicBezTo>
+                    <a:pt x="495113" y="117360"/>
+                    <a:pt x="502448" y="110025"/>
+                    <a:pt x="513450" y="110025"/>
+                  </a:cubicBezTo>
+                  <a:lnTo>
+                    <a:pt x="733500" y="110025"/>
+                  </a:lnTo>
+                  <a:cubicBezTo>
+                    <a:pt x="744503" y="110025"/>
+                    <a:pt x="751838" y="117360"/>
+                    <a:pt x="751838" y="128363"/>
+                  </a:cubicBezTo>
+                  <a:lnTo>
+                    <a:pt x="751838" y="220050"/>
+                  </a:lnTo>
+                  <a:lnTo>
+                    <a:pt x="495113" y="220050"/>
+                  </a:lnTo>
+                  <a:lnTo>
+                    <a:pt x="495113" y="128363"/>
+                  </a:lnTo>
+                  <a:close/>
+                </a:path>
+              </a:pathLst>
+            </a:custGeom>
+            <a:solidFill>
+              <a:srgbClr val="000F86"/>
+            </a:solidFill>
+            <a:ln w="18256" cap="flat">
+              <a:noFill/>
+              <a:prstDash val="solid"/>
+              <a:miter/>
+            </a:ln>
+          </p:spPr>
+          <p:txBody>
+            <a:bodyPr rtlCol="0" anchor="ctr"/>
+            <a:lstStyle/>
+            <a:p>
+              <a:endParaRPr lang="en-GB"/>
+            </a:p>
+          </p:txBody>
+        </p:sp>
+        <p:sp>
+          <p:nvSpPr>
+            <p:cNvPr id="34" name="Freeform: Shape 33">
+              <a:extLst>
+                <a:ext uri="{FF2B5EF4-FFF2-40B4-BE49-F238E27FC236}">
+                  <a16:creationId xmlns:a16="http://schemas.microsoft.com/office/drawing/2014/main" id="{EE8CAB9B-9727-4BEA-B4B9-DE7995A275C9}"/>
+                </a:ext>
+              </a:extLst>
+            </p:cNvPr>
+            <p:cNvSpPr/>
+            <p:nvPr/>
+          </p:nvSpPr>
+          <p:spPr>
+            <a:xfrm>
+              <a:off x="7381897" y="648800"/>
+              <a:ext cx="1026900" cy="1026900"/>
+            </a:xfrm>
+            <a:custGeom>
+              <a:avLst/>
+              <a:gdLst>
+                <a:gd name="connsiteX0" fmla="*/ 0 w 1026900"/>
+                <a:gd name="connsiteY0" fmla="*/ 953550 h 1026900"/>
+                <a:gd name="connsiteX1" fmla="*/ 73350 w 1026900"/>
+                <a:gd name="connsiteY1" fmla="*/ 1026900 h 1026900"/>
+                <a:gd name="connsiteX2" fmla="*/ 953550 w 1026900"/>
+                <a:gd name="connsiteY2" fmla="*/ 1026900 h 1026900"/>
+                <a:gd name="connsiteX3" fmla="*/ 1026900 w 1026900"/>
+                <a:gd name="connsiteY3" fmla="*/ 953550 h 1026900"/>
+                <a:gd name="connsiteX4" fmla="*/ 1026900 w 1026900"/>
+                <a:gd name="connsiteY4" fmla="*/ 0 h 1026900"/>
+                <a:gd name="connsiteX5" fmla="*/ 0 w 1026900"/>
+                <a:gd name="connsiteY5" fmla="*/ 0 h 1026900"/>
+                <a:gd name="connsiteX6" fmla="*/ 0 w 1026900"/>
+                <a:gd name="connsiteY6" fmla="*/ 953550 h 1026900"/>
+                <a:gd name="connsiteX7" fmla="*/ 751838 w 1026900"/>
+                <a:gd name="connsiteY7" fmla="*/ 110025 h 1026900"/>
+                <a:gd name="connsiteX8" fmla="*/ 861863 w 1026900"/>
+                <a:gd name="connsiteY8" fmla="*/ 110025 h 1026900"/>
+                <a:gd name="connsiteX9" fmla="*/ 861863 w 1026900"/>
+                <a:gd name="connsiteY9" fmla="*/ 916875 h 1026900"/>
+                <a:gd name="connsiteX10" fmla="*/ 751838 w 1026900"/>
+                <a:gd name="connsiteY10" fmla="*/ 916875 h 1026900"/>
+                <a:gd name="connsiteX11" fmla="*/ 751838 w 1026900"/>
+                <a:gd name="connsiteY11" fmla="*/ 110025 h 1026900"/>
+                <a:gd name="connsiteX12" fmla="*/ 458438 w 1026900"/>
+                <a:gd name="connsiteY12" fmla="*/ 110025 h 1026900"/>
+                <a:gd name="connsiteX13" fmla="*/ 568463 w 1026900"/>
+                <a:gd name="connsiteY13" fmla="*/ 110025 h 1026900"/>
+                <a:gd name="connsiteX14" fmla="*/ 568463 w 1026900"/>
+                <a:gd name="connsiteY14" fmla="*/ 916875 h 1026900"/>
+                <a:gd name="connsiteX15" fmla="*/ 458438 w 1026900"/>
+                <a:gd name="connsiteY15" fmla="*/ 916875 h 1026900"/>
+                <a:gd name="connsiteX16" fmla="*/ 458438 w 1026900"/>
+                <a:gd name="connsiteY16" fmla="*/ 110025 h 1026900"/>
+                <a:gd name="connsiteX17" fmla="*/ 165038 w 1026900"/>
+                <a:gd name="connsiteY17" fmla="*/ 110025 h 1026900"/>
+                <a:gd name="connsiteX18" fmla="*/ 275063 w 1026900"/>
+                <a:gd name="connsiteY18" fmla="*/ 110025 h 1026900"/>
+                <a:gd name="connsiteX19" fmla="*/ 275063 w 1026900"/>
+                <a:gd name="connsiteY19" fmla="*/ 916875 h 1026900"/>
+                <a:gd name="connsiteX20" fmla="*/ 165038 w 1026900"/>
+                <a:gd name="connsiteY20" fmla="*/ 916875 h 1026900"/>
+                <a:gd name="connsiteX21" fmla="*/ 165038 w 1026900"/>
+                <a:gd name="connsiteY21" fmla="*/ 110025 h 1026900"/>
+              </a:gdLst>
+              <a:ahLst/>
+              <a:cxnLst>
+                <a:cxn ang="0">
+                  <a:pos x="connsiteX0" y="connsiteY0"/>
+                </a:cxn>
+                <a:cxn ang="0">
+                  <a:pos x="connsiteX1" y="connsiteY1"/>
+                </a:cxn>
+                <a:cxn ang="0">
+                  <a:pos x="connsiteX2" y="connsiteY2"/>
+                </a:cxn>
+                <a:cxn ang="0">
+                  <a:pos x="connsiteX3" y="connsiteY3"/>
+                </a:cxn>
+                <a:cxn ang="0">
+                  <a:pos x="connsiteX4" y="connsiteY4"/>
+                </a:cxn>
+                <a:cxn ang="0">
+                  <a:pos x="connsiteX5" y="connsiteY5"/>
+                </a:cxn>
+                <a:cxn ang="0">
+                  <a:pos x="connsiteX6" y="connsiteY6"/>
+                </a:cxn>
+                <a:cxn ang="0">
+                  <a:pos x="connsiteX7" y="connsiteY7"/>
+                </a:cxn>
+                <a:cxn ang="0">
+                  <a:pos x="connsiteX8" y="connsiteY8"/>
+                </a:cxn>
+                <a:cxn ang="0">
+                  <a:pos x="connsiteX9" y="connsiteY9"/>
+                </a:cxn>
+                <a:cxn ang="0">
+                  <a:pos x="connsiteX10" y="connsiteY10"/>
+                </a:cxn>
+                <a:cxn ang="0">
+                  <a:pos x="connsiteX11" y="connsiteY11"/>
+                </a:cxn>
+                <a:cxn ang="0">
+                  <a:pos x="connsiteX12" y="connsiteY12"/>
+                </a:cxn>
+                <a:cxn ang="0">
+                  <a:pos x="connsiteX13" y="connsiteY13"/>
+                </a:cxn>
+                <a:cxn ang="0">
+                  <a:pos x="connsiteX14" y="connsiteY14"/>
+                </a:cxn>
+                <a:cxn ang="0">
+                  <a:pos x="connsiteX15" y="connsiteY15"/>
+                </a:cxn>
+                <a:cxn ang="0">
+                  <a:pos x="connsiteX16" y="connsiteY16"/>
+                </a:cxn>
+                <a:cxn ang="0">
+                  <a:pos x="connsiteX17" y="connsiteY17"/>
+                </a:cxn>
+                <a:cxn ang="0">
+                  <a:pos x="connsiteX18" y="connsiteY18"/>
+                </a:cxn>
+                <a:cxn ang="0">
+                  <a:pos x="connsiteX19" y="connsiteY19"/>
+                </a:cxn>
+                <a:cxn ang="0">
+                  <a:pos x="connsiteX20" y="connsiteY20"/>
+                </a:cxn>
+                <a:cxn ang="0">
+                  <a:pos x="connsiteX21" y="connsiteY21"/>
+                </a:cxn>
+              </a:cxnLst>
+              <a:rect l="l" t="t" r="r" b="b"/>
+              <a:pathLst>
+                <a:path w="1026900" h="1026900">
+                  <a:moveTo>
+                    <a:pt x="0" y="953550"/>
+                  </a:moveTo>
+                  <a:cubicBezTo>
+                    <a:pt x="0" y="993892"/>
+                    <a:pt x="33007" y="1026900"/>
+                    <a:pt x="73350" y="1026900"/>
+                  </a:cubicBezTo>
+                  <a:lnTo>
+                    <a:pt x="953550" y="1026900"/>
+                  </a:lnTo>
+                  <a:cubicBezTo>
+                    <a:pt x="993892" y="1026900"/>
+                    <a:pt x="1026900" y="993892"/>
+                    <a:pt x="1026900" y="953550"/>
+                  </a:cubicBezTo>
+                  <a:lnTo>
+                    <a:pt x="1026900" y="0"/>
+                  </a:lnTo>
+                  <a:lnTo>
+                    <a:pt x="0" y="0"/>
+                  </a:lnTo>
+                  <a:lnTo>
+                    <a:pt x="0" y="953550"/>
+                  </a:lnTo>
+                  <a:close/>
+                  <a:moveTo>
+                    <a:pt x="751838" y="110025"/>
+                  </a:moveTo>
+                  <a:lnTo>
+                    <a:pt x="861863" y="110025"/>
+                  </a:lnTo>
+                  <a:lnTo>
+                    <a:pt x="861863" y="916875"/>
+                  </a:lnTo>
+                  <a:lnTo>
+                    <a:pt x="751838" y="916875"/>
+                  </a:lnTo>
+                  <a:lnTo>
+                    <a:pt x="751838" y="110025"/>
+                  </a:lnTo>
+                  <a:close/>
+                  <a:moveTo>
+                    <a:pt x="458438" y="110025"/>
+                  </a:moveTo>
+                  <a:lnTo>
+                    <a:pt x="568463" y="110025"/>
+                  </a:lnTo>
+                  <a:lnTo>
+                    <a:pt x="568463" y="916875"/>
+                  </a:lnTo>
+                  <a:lnTo>
+                    <a:pt x="458438" y="916875"/>
+                  </a:lnTo>
+                  <a:lnTo>
+                    <a:pt x="458438" y="110025"/>
+                  </a:lnTo>
+                  <a:close/>
+                  <a:moveTo>
+                    <a:pt x="165038" y="110025"/>
+                  </a:moveTo>
+                  <a:lnTo>
+                    <a:pt x="275063" y="110025"/>
+                  </a:lnTo>
+                  <a:lnTo>
+                    <a:pt x="275063" y="916875"/>
+                  </a:lnTo>
+                  <a:lnTo>
+                    <a:pt x="165038" y="916875"/>
+                  </a:lnTo>
+                  <a:lnTo>
+                    <a:pt x="165038" y="110025"/>
+                  </a:lnTo>
+                  <a:close/>
+                </a:path>
+              </a:pathLst>
+            </a:custGeom>
+            <a:solidFill>
+              <a:srgbClr val="000F86"/>
+            </a:solidFill>
+            <a:ln w="18256" cap="flat">
+              <a:noFill/>
+              <a:prstDash val="solid"/>
+              <a:miter/>
+            </a:ln>
+          </p:spPr>
+          <p:txBody>
+            <a:bodyPr rtlCol="0" anchor="ctr"/>
+            <a:lstStyle/>
+            <a:p>
+              <a:endParaRPr lang="en-GB"/>
+            </a:p>
+          </p:txBody>
+        </p:sp>
+      </p:grpSp>
+      <p:grpSp>
+        <p:nvGrpSpPr>
+          <p:cNvPr id="48" name="Group 47">
+            <a:extLst>
+              <a:ext uri="{FF2B5EF4-FFF2-40B4-BE49-F238E27FC236}">
+                <a16:creationId xmlns:a16="http://schemas.microsoft.com/office/drawing/2014/main" id="{6D31EB81-8949-48A3-B383-14A3F8CE5A08}"/>
+              </a:ext>
+            </a:extLst>
+          </p:cNvPr>
+          <p:cNvGrpSpPr/>
+          <p:nvPr/>
+        </p:nvGrpSpPr>
+        <p:grpSpPr>
+          <a:xfrm>
+            <a:off x="9567904" y="1102012"/>
+            <a:ext cx="1687050" cy="1026900"/>
+            <a:chOff x="9567904" y="1102012"/>
+            <a:chExt cx="1687050" cy="1026900"/>
+          </a:xfrm>
+        </p:grpSpPr>
+        <p:sp>
+          <p:nvSpPr>
+            <p:cNvPr id="45" name="Freeform: Shape 44">
+              <a:extLst>
+                <a:ext uri="{FF2B5EF4-FFF2-40B4-BE49-F238E27FC236}">
+                  <a16:creationId xmlns:a16="http://schemas.microsoft.com/office/drawing/2014/main" id="{4CCB6DFB-B2F6-496A-A194-9C241EF72AD3}"/>
+                </a:ext>
+              </a:extLst>
+            </p:cNvPr>
+            <p:cNvSpPr/>
+            <p:nvPr/>
+          </p:nvSpPr>
+          <p:spPr>
+            <a:xfrm>
+              <a:off x="9787954" y="1102012"/>
+              <a:ext cx="1246950" cy="843525"/>
+            </a:xfrm>
+            <a:custGeom>
+              <a:avLst/>
+              <a:gdLst>
+                <a:gd name="connsiteX0" fmla="*/ 1136925 w 1246950"/>
+                <a:gd name="connsiteY0" fmla="*/ 733500 h 843525"/>
+                <a:gd name="connsiteX1" fmla="*/ 110025 w 1246950"/>
+                <a:gd name="connsiteY1" fmla="*/ 733500 h 843525"/>
+                <a:gd name="connsiteX2" fmla="*/ 110025 w 1246950"/>
+                <a:gd name="connsiteY2" fmla="*/ 110025 h 843525"/>
+                <a:gd name="connsiteX3" fmla="*/ 1136925 w 1246950"/>
+                <a:gd name="connsiteY3" fmla="*/ 110025 h 843525"/>
+                <a:gd name="connsiteX4" fmla="*/ 1246950 w 1246950"/>
+                <a:gd name="connsiteY4" fmla="*/ 73350 h 843525"/>
+                <a:gd name="connsiteX5" fmla="*/ 1173600 w 1246950"/>
+                <a:gd name="connsiteY5" fmla="*/ 0 h 843525"/>
+                <a:gd name="connsiteX6" fmla="*/ 73350 w 1246950"/>
+                <a:gd name="connsiteY6" fmla="*/ 0 h 843525"/>
+                <a:gd name="connsiteX7" fmla="*/ 0 w 1246950"/>
+                <a:gd name="connsiteY7" fmla="*/ 73350 h 843525"/>
+                <a:gd name="connsiteX8" fmla="*/ 0 w 1246950"/>
+                <a:gd name="connsiteY8" fmla="*/ 843525 h 843525"/>
+                <a:gd name="connsiteX9" fmla="*/ 1246950 w 1246950"/>
+                <a:gd name="connsiteY9" fmla="*/ 843525 h 843525"/>
+              </a:gdLst>
+              <a:ahLst/>
+              <a:cxnLst>
+                <a:cxn ang="0">
+                  <a:pos x="connsiteX0" y="connsiteY0"/>
+                </a:cxn>
+                <a:cxn ang="0">
+                  <a:pos x="connsiteX1" y="connsiteY1"/>
+                </a:cxn>
+                <a:cxn ang="0">
+                  <a:pos x="connsiteX2" y="connsiteY2"/>
+                </a:cxn>
+                <a:cxn ang="0">
+                  <a:pos x="connsiteX3" y="connsiteY3"/>
+                </a:cxn>
+                <a:cxn ang="0">
+                  <a:pos x="connsiteX4" y="connsiteY4"/>
+                </a:cxn>
+                <a:cxn ang="0">
+                  <a:pos x="connsiteX5" y="connsiteY5"/>
+                </a:cxn>
+                <a:cxn ang="0">
+                  <a:pos x="connsiteX6" y="connsiteY6"/>
+                </a:cxn>
+                <a:cxn ang="0">
+                  <a:pos x="connsiteX7" y="connsiteY7"/>
+                </a:cxn>
+                <a:cxn ang="0">
+                  <a:pos x="connsiteX8" y="connsiteY8"/>
+                </a:cxn>
+                <a:cxn ang="0">
+                  <a:pos x="connsiteX9" y="connsiteY9"/>
+                </a:cxn>
+              </a:cxnLst>
+              <a:rect l="l" t="t" r="r" b="b"/>
+              <a:pathLst>
+                <a:path w="1246950" h="843525">
+                  <a:moveTo>
+                    <a:pt x="1136925" y="733500"/>
+                  </a:moveTo>
+                  <a:lnTo>
+                    <a:pt x="110025" y="733500"/>
+                  </a:lnTo>
+                  <a:lnTo>
+                    <a:pt x="110025" y="110025"/>
+                  </a:lnTo>
+                  <a:lnTo>
+                    <a:pt x="1136925" y="110025"/>
+                  </a:lnTo>
+                  <a:close/>
+                  <a:moveTo>
+                    <a:pt x="1246950" y="73350"/>
+                  </a:moveTo>
+                  <a:cubicBezTo>
+                    <a:pt x="1246950" y="32841"/>
+                    <a:pt x="1214109" y="0"/>
+                    <a:pt x="1173600" y="0"/>
+                  </a:cubicBezTo>
+                  <a:lnTo>
+                    <a:pt x="73350" y="0"/>
+                  </a:lnTo>
+                  <a:cubicBezTo>
+                    <a:pt x="32841" y="0"/>
+                    <a:pt x="0" y="32841"/>
+                    <a:pt x="0" y="73350"/>
+                  </a:cubicBezTo>
+                  <a:lnTo>
+                    <a:pt x="0" y="843525"/>
+                  </a:lnTo>
+                  <a:lnTo>
+                    <a:pt x="1246950" y="843525"/>
+                  </a:lnTo>
+                  <a:close/>
+                </a:path>
+              </a:pathLst>
+            </a:custGeom>
+            <a:solidFill>
+              <a:srgbClr val="000F86"/>
+            </a:solidFill>
+            <a:ln w="18256" cap="flat">
+              <a:noFill/>
+              <a:prstDash val="solid"/>
+              <a:miter/>
+            </a:ln>
+          </p:spPr>
+          <p:txBody>
+            <a:bodyPr rtlCol="0" anchor="ctr"/>
+            <a:lstStyle/>
+            <a:p>
+              <a:endParaRPr lang="en-GB"/>
+            </a:p>
+          </p:txBody>
+        </p:sp>
+        <p:sp>
+          <p:nvSpPr>
+            <p:cNvPr id="46" name="Freeform: Shape 45">
+              <a:extLst>
+                <a:ext uri="{FF2B5EF4-FFF2-40B4-BE49-F238E27FC236}">
+                  <a16:creationId xmlns:a16="http://schemas.microsoft.com/office/drawing/2014/main" id="{874BEF68-6915-4E5F-ACE6-2E45415AAD55}"/>
+                </a:ext>
+              </a:extLst>
+            </p:cNvPr>
+            <p:cNvSpPr/>
+            <p:nvPr/>
+          </p:nvSpPr>
+          <p:spPr>
+            <a:xfrm>
+              <a:off x="9567904" y="2018887"/>
+              <a:ext cx="1687050" cy="110025"/>
+            </a:xfrm>
+            <a:custGeom>
+              <a:avLst/>
+              <a:gdLst>
+                <a:gd name="connsiteX0" fmla="*/ 953550 w 1687050"/>
+                <a:gd name="connsiteY0" fmla="*/ 0 h 110025"/>
+                <a:gd name="connsiteX1" fmla="*/ 953550 w 1687050"/>
+                <a:gd name="connsiteY1" fmla="*/ 18338 h 110025"/>
+                <a:gd name="connsiteX2" fmla="*/ 937488 w 1687050"/>
+                <a:gd name="connsiteY2" fmla="*/ 36675 h 110025"/>
+                <a:gd name="connsiteX3" fmla="*/ 935213 w 1687050"/>
+                <a:gd name="connsiteY3" fmla="*/ 36675 h 110025"/>
+                <a:gd name="connsiteX4" fmla="*/ 751838 w 1687050"/>
+                <a:gd name="connsiteY4" fmla="*/ 36675 h 110025"/>
+                <a:gd name="connsiteX5" fmla="*/ 733500 w 1687050"/>
+                <a:gd name="connsiteY5" fmla="*/ 20613 h 110025"/>
+                <a:gd name="connsiteX6" fmla="*/ 733500 w 1687050"/>
+                <a:gd name="connsiteY6" fmla="*/ 18338 h 110025"/>
+                <a:gd name="connsiteX7" fmla="*/ 733500 w 1687050"/>
+                <a:gd name="connsiteY7" fmla="*/ 0 h 110025"/>
+                <a:gd name="connsiteX8" fmla="*/ 0 w 1687050"/>
+                <a:gd name="connsiteY8" fmla="*/ 0 h 110025"/>
+                <a:gd name="connsiteX9" fmla="*/ 0 w 1687050"/>
+                <a:gd name="connsiteY9" fmla="*/ 36675 h 110025"/>
+                <a:gd name="connsiteX10" fmla="*/ 73350 w 1687050"/>
+                <a:gd name="connsiteY10" fmla="*/ 110025 h 110025"/>
+                <a:gd name="connsiteX11" fmla="*/ 1613700 w 1687050"/>
+                <a:gd name="connsiteY11" fmla="*/ 110025 h 110025"/>
+                <a:gd name="connsiteX12" fmla="*/ 1687050 w 1687050"/>
+                <a:gd name="connsiteY12" fmla="*/ 36675 h 110025"/>
+                <a:gd name="connsiteX13" fmla="*/ 1687050 w 1687050"/>
+                <a:gd name="connsiteY13" fmla="*/ 0 h 110025"/>
+              </a:gdLst>
+              <a:ahLst/>
+              <a:cxnLst>
+                <a:cxn ang="0">
+                  <a:pos x="connsiteX0" y="connsiteY0"/>
+                </a:cxn>
+                <a:cxn ang="0">
+                  <a:pos x="connsiteX1" y="connsiteY1"/>
+                </a:cxn>
+                <a:cxn ang="0">
+                  <a:pos x="connsiteX2" y="connsiteY2"/>
+                </a:cxn>
+                <a:cxn ang="0">
+                  <a:pos x="connsiteX3" y="connsiteY3"/>
+                </a:cxn>
+                <a:cxn ang="0">
+                  <a:pos x="connsiteX4" y="connsiteY4"/>
+                </a:cxn>
+                <a:cxn ang="0">
+                  <a:pos x="connsiteX5" y="connsiteY5"/>
+                </a:cxn>
+                <a:cxn ang="0">
+                  <a:pos x="connsiteX6" y="connsiteY6"/>
+                </a:cxn>
+                <a:cxn ang="0">
+                  <a:pos x="connsiteX7" y="connsiteY7"/>
+                </a:cxn>
+                <a:cxn ang="0">
+                  <a:pos x="connsiteX8" y="connsiteY8"/>
+                </a:cxn>
+                <a:cxn ang="0">
+                  <a:pos x="connsiteX9" y="connsiteY9"/>
+                </a:cxn>
+                <a:cxn ang="0">
+                  <a:pos x="connsiteX10" y="connsiteY10"/>
+                </a:cxn>
+                <a:cxn ang="0">
+                  <a:pos x="connsiteX11" y="connsiteY11"/>
+                </a:cxn>
+                <a:cxn ang="0">
+                  <a:pos x="connsiteX12" y="connsiteY12"/>
+                </a:cxn>
+                <a:cxn ang="0">
+                  <a:pos x="connsiteX13" y="connsiteY13"/>
+                </a:cxn>
+              </a:cxnLst>
+              <a:rect l="l" t="t" r="r" b="b"/>
+              <a:pathLst>
+                <a:path w="1687050" h="110025">
+                  <a:moveTo>
+                    <a:pt x="953550" y="0"/>
+                  </a:moveTo>
+                  <a:lnTo>
+                    <a:pt x="953550" y="18338"/>
+                  </a:lnTo>
+                  <a:cubicBezTo>
+                    <a:pt x="954179" y="27836"/>
+                    <a:pt x="946987" y="36046"/>
+                    <a:pt x="937488" y="36675"/>
+                  </a:cubicBezTo>
+                  <a:cubicBezTo>
+                    <a:pt x="936731" y="36725"/>
+                    <a:pt x="935970" y="36725"/>
+                    <a:pt x="935213" y="36675"/>
+                  </a:cubicBezTo>
+                  <a:lnTo>
+                    <a:pt x="751838" y="36675"/>
+                  </a:lnTo>
+                  <a:cubicBezTo>
+                    <a:pt x="742339" y="37304"/>
+                    <a:pt x="734129" y="30112"/>
+                    <a:pt x="733500" y="20613"/>
+                  </a:cubicBezTo>
+                  <a:cubicBezTo>
+                    <a:pt x="733451" y="19856"/>
+                    <a:pt x="733451" y="19095"/>
+                    <a:pt x="733500" y="18338"/>
+                  </a:cubicBezTo>
+                  <a:lnTo>
+                    <a:pt x="733500" y="0"/>
+                  </a:lnTo>
+                  <a:lnTo>
+                    <a:pt x="0" y="0"/>
+                  </a:lnTo>
+                  <a:lnTo>
+                    <a:pt x="0" y="36675"/>
+                  </a:lnTo>
+                  <a:cubicBezTo>
+                    <a:pt x="0" y="77184"/>
+                    <a:pt x="32840" y="110025"/>
+                    <a:pt x="73350" y="110025"/>
+                  </a:cubicBezTo>
+                  <a:lnTo>
+                    <a:pt x="1613700" y="110025"/>
+                  </a:lnTo>
+                  <a:cubicBezTo>
+                    <a:pt x="1654209" y="110025"/>
+                    <a:pt x="1687050" y="77184"/>
+                    <a:pt x="1687050" y="36675"/>
+                  </a:cubicBezTo>
+                  <a:lnTo>
+                    <a:pt x="1687050" y="0"/>
+                  </a:lnTo>
+                  <a:close/>
+                </a:path>
+              </a:pathLst>
+            </a:custGeom>
+            <a:solidFill>
+              <a:srgbClr val="000F86"/>
+            </a:solidFill>
+            <a:ln w="18256" cap="flat">
+              <a:noFill/>
+              <a:prstDash val="solid"/>
+              <a:miter/>
+            </a:ln>
+          </p:spPr>
+          <p:txBody>
+            <a:bodyPr rtlCol="0" anchor="ctr"/>
+            <a:lstStyle/>
+            <a:p>
+              <a:endParaRPr lang="en-GB"/>
+            </a:p>
+          </p:txBody>
+        </p:sp>
+        <p:sp>
+          <p:nvSpPr>
+            <p:cNvPr id="47" name="Freeform: Shape 46">
+              <a:extLst>
+                <a:ext uri="{FF2B5EF4-FFF2-40B4-BE49-F238E27FC236}">
+                  <a16:creationId xmlns:a16="http://schemas.microsoft.com/office/drawing/2014/main" id="{9AD6CE78-ADFA-4916-9641-6AD524E85108}"/>
+                </a:ext>
+              </a:extLst>
+            </p:cNvPr>
+            <p:cNvSpPr/>
+            <p:nvPr/>
+          </p:nvSpPr>
+          <p:spPr>
+            <a:xfrm>
+              <a:off x="10154704" y="1267049"/>
+              <a:ext cx="513450" cy="513450"/>
+            </a:xfrm>
+            <a:custGeom>
+              <a:avLst/>
+              <a:gdLst>
+                <a:gd name="connsiteX0" fmla="*/ 256725 w 513450"/>
+                <a:gd name="connsiteY0" fmla="*/ 0 h 513450"/>
+                <a:gd name="connsiteX1" fmla="*/ 0 w 513450"/>
+                <a:gd name="connsiteY1" fmla="*/ 256725 h 513450"/>
+                <a:gd name="connsiteX2" fmla="*/ 256725 w 513450"/>
+                <a:gd name="connsiteY2" fmla="*/ 513450 h 513450"/>
+                <a:gd name="connsiteX3" fmla="*/ 513450 w 513450"/>
+                <a:gd name="connsiteY3" fmla="*/ 256725 h 513450"/>
+                <a:gd name="connsiteX4" fmla="*/ 256725 w 513450"/>
+                <a:gd name="connsiteY4" fmla="*/ 0 h 513450"/>
+                <a:gd name="connsiteX5" fmla="*/ 275063 w 513450"/>
+                <a:gd name="connsiteY5" fmla="*/ 275063 h 513450"/>
+                <a:gd name="connsiteX6" fmla="*/ 359232 w 513450"/>
+                <a:gd name="connsiteY6" fmla="*/ 275063 h 513450"/>
+                <a:gd name="connsiteX7" fmla="*/ 275063 w 513450"/>
+                <a:gd name="connsiteY7" fmla="*/ 442117 h 513450"/>
+                <a:gd name="connsiteX8" fmla="*/ 275063 w 513450"/>
+                <a:gd name="connsiteY8" fmla="*/ 238388 h 513450"/>
+                <a:gd name="connsiteX9" fmla="*/ 275063 w 513450"/>
+                <a:gd name="connsiteY9" fmla="*/ 71150 h 513450"/>
+                <a:gd name="connsiteX10" fmla="*/ 359232 w 513450"/>
+                <a:gd name="connsiteY10" fmla="*/ 238388 h 513450"/>
+                <a:gd name="connsiteX11" fmla="*/ 238388 w 513450"/>
+                <a:gd name="connsiteY11" fmla="*/ 238388 h 513450"/>
+                <a:gd name="connsiteX12" fmla="*/ 156969 w 513450"/>
+                <a:gd name="connsiteY12" fmla="*/ 238388 h 513450"/>
+                <a:gd name="connsiteX13" fmla="*/ 238388 w 513450"/>
+                <a:gd name="connsiteY13" fmla="*/ 73350 h 513450"/>
+                <a:gd name="connsiteX14" fmla="*/ 238388 w 513450"/>
+                <a:gd name="connsiteY14" fmla="*/ 275063 h 513450"/>
+                <a:gd name="connsiteX15" fmla="*/ 238388 w 513450"/>
+                <a:gd name="connsiteY15" fmla="*/ 440100 h 513450"/>
+                <a:gd name="connsiteX16" fmla="*/ 156969 w 513450"/>
+                <a:gd name="connsiteY16" fmla="*/ 275063 h 513450"/>
+                <a:gd name="connsiteX17" fmla="*/ 120111 w 513450"/>
+                <a:gd name="connsiteY17" fmla="*/ 238388 h 513450"/>
+                <a:gd name="connsiteX18" fmla="*/ 41626 w 513450"/>
+                <a:gd name="connsiteY18" fmla="*/ 238388 h 513450"/>
+                <a:gd name="connsiteX19" fmla="*/ 215282 w 513450"/>
+                <a:gd name="connsiteY19" fmla="*/ 44927 h 513450"/>
+                <a:gd name="connsiteX20" fmla="*/ 120111 w 513450"/>
+                <a:gd name="connsiteY20" fmla="*/ 238388 h 513450"/>
+                <a:gd name="connsiteX21" fmla="*/ 120111 w 513450"/>
+                <a:gd name="connsiteY21" fmla="*/ 275063 h 513450"/>
+                <a:gd name="connsiteX22" fmla="*/ 215649 w 513450"/>
+                <a:gd name="connsiteY22" fmla="*/ 468707 h 513450"/>
+                <a:gd name="connsiteX23" fmla="*/ 41626 w 513450"/>
+                <a:gd name="connsiteY23" fmla="*/ 275063 h 513450"/>
+                <a:gd name="connsiteX24" fmla="*/ 396090 w 513450"/>
+                <a:gd name="connsiteY24" fmla="*/ 275063 h 513450"/>
+                <a:gd name="connsiteX25" fmla="*/ 471824 w 513450"/>
+                <a:gd name="connsiteY25" fmla="*/ 275063 h 513450"/>
+                <a:gd name="connsiteX26" fmla="*/ 301102 w 513450"/>
+                <a:gd name="connsiteY26" fmla="*/ 467973 h 513450"/>
+                <a:gd name="connsiteX27" fmla="*/ 396090 w 513450"/>
+                <a:gd name="connsiteY27" fmla="*/ 275063 h 513450"/>
+                <a:gd name="connsiteX28" fmla="*/ 396090 w 513450"/>
+                <a:gd name="connsiteY28" fmla="*/ 238388 h 513450"/>
+                <a:gd name="connsiteX29" fmla="*/ 301652 w 513450"/>
+                <a:gd name="connsiteY29" fmla="*/ 45660 h 513450"/>
+                <a:gd name="connsiteX30" fmla="*/ 471824 w 513450"/>
+                <a:gd name="connsiteY30" fmla="*/ 238388 h 513450"/>
+              </a:gdLst>
+              <a:ahLst/>
+              <a:cxnLst>
+                <a:cxn ang="0">
+                  <a:pos x="connsiteX0" y="connsiteY0"/>
+                </a:cxn>
+                <a:cxn ang="0">
+                  <a:pos x="connsiteX1" y="connsiteY1"/>
+                </a:cxn>
+                <a:cxn ang="0">
+                  <a:pos x="connsiteX2" y="connsiteY2"/>
+                </a:cxn>
+                <a:cxn ang="0">
+                  <a:pos x="connsiteX3" y="connsiteY3"/>
+                </a:cxn>
+                <a:cxn ang="0">
+                  <a:pos x="connsiteX4" y="connsiteY4"/>
+                </a:cxn>
+                <a:cxn ang="0">
+                  <a:pos x="connsiteX5" y="connsiteY5"/>
+                </a:cxn>
+                <a:cxn ang="0">
+                  <a:pos x="connsiteX6" y="connsiteY6"/>
+                </a:cxn>
+                <a:cxn ang="0">
+                  <a:pos x="connsiteX7" y="connsiteY7"/>
+                </a:cxn>
+                <a:cxn ang="0">
+                  <a:pos x="connsiteX8" y="connsiteY8"/>
+                </a:cxn>
+                <a:cxn ang="0">
+                  <a:pos x="connsiteX9" y="connsiteY9"/>
+                </a:cxn>
+                <a:cxn ang="0">
+                  <a:pos x="connsiteX10" y="connsiteY10"/>
+                </a:cxn>
+                <a:cxn ang="0">
+                  <a:pos x="connsiteX11" y="connsiteY11"/>
+                </a:cxn>
+                <a:cxn ang="0">
+                  <a:pos x="connsiteX12" y="connsiteY12"/>
+                </a:cxn>
+                <a:cxn ang="0">
+                  <a:pos x="connsiteX13" y="connsiteY13"/>
+                </a:cxn>
+                <a:cxn ang="0">
+                  <a:pos x="connsiteX14" y="connsiteY14"/>
+                </a:cxn>
+                <a:cxn ang="0">
+                  <a:pos x="connsiteX15" y="connsiteY15"/>
+                </a:cxn>
+                <a:cxn ang="0">
+                  <a:pos x="connsiteX16" y="connsiteY16"/>
+                </a:cxn>
+                <a:cxn ang="0">
+                  <a:pos x="connsiteX17" y="connsiteY17"/>
+                </a:cxn>
+                <a:cxn ang="0">
+                  <a:pos x="connsiteX18" y="connsiteY18"/>
+                </a:cxn>
+                <a:cxn ang="0">
+                  <a:pos x="connsiteX19" y="connsiteY19"/>
+                </a:cxn>
+                <a:cxn ang="0">
+                  <a:pos x="connsiteX20" y="connsiteY20"/>
+                </a:cxn>
+                <a:cxn ang="0">
+                  <a:pos x="connsiteX21" y="connsiteY21"/>
+                </a:cxn>
+                <a:cxn ang="0">
+                  <a:pos x="connsiteX22" y="connsiteY22"/>
+                </a:cxn>
+                <a:cxn ang="0">
+                  <a:pos x="connsiteX23" y="connsiteY23"/>
+                </a:cxn>
+                <a:cxn ang="0">
+                  <a:pos x="connsiteX24" y="connsiteY24"/>
+                </a:cxn>
+                <a:cxn ang="0">
+                  <a:pos x="connsiteX25" y="connsiteY25"/>
+                </a:cxn>
+                <a:cxn ang="0">
+                  <a:pos x="connsiteX26" y="connsiteY26"/>
+                </a:cxn>
+                <a:cxn ang="0">
+                  <a:pos x="connsiteX27" y="connsiteY27"/>
+                </a:cxn>
+                <a:cxn ang="0">
+                  <a:pos x="connsiteX28" y="connsiteY28"/>
+                </a:cxn>
+                <a:cxn ang="0">
+                  <a:pos x="connsiteX29" y="connsiteY29"/>
+                </a:cxn>
+                <a:cxn ang="0">
+                  <a:pos x="connsiteX30" y="connsiteY30"/>
+                </a:cxn>
+              </a:cxnLst>
+              <a:rect l="l" t="t" r="r" b="b"/>
+              <a:pathLst>
+                <a:path w="513450" h="513450">
+                  <a:moveTo>
+                    <a:pt x="256725" y="0"/>
+                  </a:moveTo>
+                  <a:cubicBezTo>
+                    <a:pt x="114939" y="0"/>
+                    <a:pt x="0" y="114939"/>
+                    <a:pt x="0" y="256725"/>
+                  </a:cubicBezTo>
+                  <a:cubicBezTo>
+                    <a:pt x="0" y="398511"/>
+                    <a:pt x="114939" y="513450"/>
+                    <a:pt x="256725" y="513450"/>
+                  </a:cubicBezTo>
+                  <a:cubicBezTo>
+                    <a:pt x="398511" y="513450"/>
+                    <a:pt x="513450" y="398511"/>
+                    <a:pt x="513450" y="256725"/>
+                  </a:cubicBezTo>
+                  <a:cubicBezTo>
+                    <a:pt x="513450" y="114939"/>
+                    <a:pt x="398511" y="0"/>
+                    <a:pt x="256725" y="0"/>
+                  </a:cubicBezTo>
+                  <a:close/>
+                  <a:moveTo>
+                    <a:pt x="275063" y="275063"/>
+                  </a:moveTo>
+                  <a:lnTo>
+                    <a:pt x="359232" y="275063"/>
+                  </a:lnTo>
+                  <a:cubicBezTo>
+                    <a:pt x="349647" y="338279"/>
+                    <a:pt x="320164" y="396796"/>
+                    <a:pt x="275063" y="442117"/>
+                  </a:cubicBezTo>
+                  <a:close/>
+                  <a:moveTo>
+                    <a:pt x="275063" y="238388"/>
+                  </a:moveTo>
+                  <a:lnTo>
+                    <a:pt x="275063" y="71150"/>
+                  </a:lnTo>
+                  <a:cubicBezTo>
+                    <a:pt x="320209" y="116513"/>
+                    <a:pt x="349696" y="175101"/>
+                    <a:pt x="359232" y="238388"/>
+                  </a:cubicBezTo>
+                  <a:close/>
+                  <a:moveTo>
+                    <a:pt x="238388" y="238388"/>
+                  </a:moveTo>
+                  <a:lnTo>
+                    <a:pt x="156969" y="238388"/>
+                  </a:lnTo>
+                  <a:cubicBezTo>
+                    <a:pt x="166088" y="176185"/>
+                    <a:pt x="194577" y="118438"/>
+                    <a:pt x="238388" y="73350"/>
+                  </a:cubicBezTo>
+                  <a:close/>
+                  <a:moveTo>
+                    <a:pt x="238388" y="275063"/>
+                  </a:moveTo>
+                  <a:lnTo>
+                    <a:pt x="238388" y="440100"/>
+                  </a:lnTo>
+                  <a:cubicBezTo>
+                    <a:pt x="194660" y="394953"/>
+                    <a:pt x="166184" y="337236"/>
+                    <a:pt x="156969" y="275063"/>
+                  </a:cubicBezTo>
+                  <a:close/>
+                  <a:moveTo>
+                    <a:pt x="120111" y="238388"/>
+                  </a:moveTo>
+                  <a:lnTo>
+                    <a:pt x="41626" y="238388"/>
+                  </a:lnTo>
+                  <a:cubicBezTo>
+                    <a:pt x="49766" y="142336"/>
+                    <a:pt x="120664" y="63354"/>
+                    <a:pt x="215282" y="44927"/>
+                  </a:cubicBezTo>
+                  <a:cubicBezTo>
+                    <a:pt x="163006" y="97092"/>
+                    <a:pt x="129531" y="165138"/>
+                    <a:pt x="120111" y="238388"/>
+                  </a:cubicBezTo>
+                  <a:close/>
+                  <a:moveTo>
+                    <a:pt x="120111" y="275063"/>
+                  </a:moveTo>
+                  <a:cubicBezTo>
+                    <a:pt x="129538" y="348438"/>
+                    <a:pt x="163156" y="416579"/>
+                    <a:pt x="215649" y="468707"/>
+                  </a:cubicBezTo>
+                  <a:cubicBezTo>
+                    <a:pt x="120890" y="450292"/>
+                    <a:pt x="49850" y="371243"/>
+                    <a:pt x="41626" y="275063"/>
+                  </a:cubicBezTo>
+                  <a:close/>
+                  <a:moveTo>
+                    <a:pt x="396090" y="275063"/>
+                  </a:moveTo>
+                  <a:lnTo>
+                    <a:pt x="471824" y="275063"/>
+                  </a:lnTo>
+                  <a:cubicBezTo>
+                    <a:pt x="463794" y="370025"/>
+                    <a:pt x="394385" y="448456"/>
+                    <a:pt x="301102" y="467973"/>
+                  </a:cubicBezTo>
+                  <a:cubicBezTo>
+                    <a:pt x="353351" y="416034"/>
+                    <a:pt x="386778" y="348145"/>
+                    <a:pt x="396090" y="275063"/>
+                  </a:cubicBezTo>
+                  <a:close/>
+                  <a:moveTo>
+                    <a:pt x="396090" y="238388"/>
+                  </a:moveTo>
+                  <a:cubicBezTo>
+                    <a:pt x="386703" y="165496"/>
+                    <a:pt x="353503" y="97744"/>
+                    <a:pt x="301652" y="45660"/>
+                  </a:cubicBezTo>
+                  <a:cubicBezTo>
+                    <a:pt x="394658" y="65370"/>
+                    <a:pt x="463783" y="143658"/>
+                    <a:pt x="471824" y="238388"/>
+                  </a:cubicBezTo>
+                  <a:close/>
+                </a:path>
+              </a:pathLst>
+            </a:custGeom>
+            <a:solidFill>
+              <a:srgbClr val="000F86"/>
+            </a:solidFill>
+            <a:ln w="18256" cap="flat">
               <a:noFill/>
               <a:prstDash val="solid"/>
               <a:miter/>

</xml_diff>

<commit_message>
Adding new support activities
</commit_message>
<xml_diff>
--- a/HelpMyStreetFE/HelpMyStreetFE/src/pptx/Icons.pptx
+++ b/HelpMyStreetFE/HelpMyStreetFE/src/pptx/Icons.pptx
@@ -9,7 +9,8 @@
     <p:sldId id="257" r:id="rId3"/>
     <p:sldId id="258" r:id="rId4"/>
     <p:sldId id="259" r:id="rId5"/>
-    <p:sldId id="260" r:id="rId6"/>
+    <p:sldId id="261" r:id="rId6"/>
+    <p:sldId id="260" r:id="rId7"/>
   </p:sldIdLst>
   <p:sldSz cx="12192000" cy="6858000"/>
   <p:notesSz cx="6858000" cy="9144000"/>
@@ -265,7 +266,7 @@
           <a:p>
             <a:fld id="{B2EC5630-BBBD-40F6-B459-AD74AAD6AD00}" type="datetimeFigureOut">
               <a:rPr lang="en-GB" smtClean="0"/>
-              <a:t>17/03/2021</a:t>
+              <a:t>23/03/2021</a:t>
             </a:fld>
             <a:endParaRPr lang="en-GB"/>
           </a:p>
@@ -465,7 +466,7 @@
           <a:p>
             <a:fld id="{B2EC5630-BBBD-40F6-B459-AD74AAD6AD00}" type="datetimeFigureOut">
               <a:rPr lang="en-GB" smtClean="0"/>
-              <a:t>17/03/2021</a:t>
+              <a:t>23/03/2021</a:t>
             </a:fld>
             <a:endParaRPr lang="en-GB"/>
           </a:p>
@@ -675,7 +676,7 @@
           <a:p>
             <a:fld id="{B2EC5630-BBBD-40F6-B459-AD74AAD6AD00}" type="datetimeFigureOut">
               <a:rPr lang="en-GB" smtClean="0"/>
-              <a:t>17/03/2021</a:t>
+              <a:t>23/03/2021</a:t>
             </a:fld>
             <a:endParaRPr lang="en-GB"/>
           </a:p>
@@ -875,7 +876,7 @@
           <a:p>
             <a:fld id="{B2EC5630-BBBD-40F6-B459-AD74AAD6AD00}" type="datetimeFigureOut">
               <a:rPr lang="en-GB" smtClean="0"/>
-              <a:t>17/03/2021</a:t>
+              <a:t>23/03/2021</a:t>
             </a:fld>
             <a:endParaRPr lang="en-GB"/>
           </a:p>
@@ -1151,7 +1152,7 @@
           <a:p>
             <a:fld id="{B2EC5630-BBBD-40F6-B459-AD74AAD6AD00}" type="datetimeFigureOut">
               <a:rPr lang="en-GB" smtClean="0"/>
-              <a:t>17/03/2021</a:t>
+              <a:t>23/03/2021</a:t>
             </a:fld>
             <a:endParaRPr lang="en-GB"/>
           </a:p>
@@ -1419,7 +1420,7 @@
           <a:p>
             <a:fld id="{B2EC5630-BBBD-40F6-B459-AD74AAD6AD00}" type="datetimeFigureOut">
               <a:rPr lang="en-GB" smtClean="0"/>
-              <a:t>17/03/2021</a:t>
+              <a:t>23/03/2021</a:t>
             </a:fld>
             <a:endParaRPr lang="en-GB"/>
           </a:p>
@@ -1834,7 +1835,7 @@
           <a:p>
             <a:fld id="{B2EC5630-BBBD-40F6-B459-AD74AAD6AD00}" type="datetimeFigureOut">
               <a:rPr lang="en-GB" smtClean="0"/>
-              <a:t>17/03/2021</a:t>
+              <a:t>23/03/2021</a:t>
             </a:fld>
             <a:endParaRPr lang="en-GB"/>
           </a:p>
@@ -1976,7 +1977,7 @@
           <a:p>
             <a:fld id="{B2EC5630-BBBD-40F6-B459-AD74AAD6AD00}" type="datetimeFigureOut">
               <a:rPr lang="en-GB" smtClean="0"/>
-              <a:t>17/03/2021</a:t>
+              <a:t>23/03/2021</a:t>
             </a:fld>
             <a:endParaRPr lang="en-GB"/>
           </a:p>
@@ -2089,7 +2090,7 @@
           <a:p>
             <a:fld id="{B2EC5630-BBBD-40F6-B459-AD74AAD6AD00}" type="datetimeFigureOut">
               <a:rPr lang="en-GB" smtClean="0"/>
-              <a:t>17/03/2021</a:t>
+              <a:t>23/03/2021</a:t>
             </a:fld>
             <a:endParaRPr lang="en-GB"/>
           </a:p>
@@ -2402,7 +2403,7 @@
           <a:p>
             <a:fld id="{B2EC5630-BBBD-40F6-B459-AD74AAD6AD00}" type="datetimeFigureOut">
               <a:rPr lang="en-GB" smtClean="0"/>
-              <a:t>17/03/2021</a:t>
+              <a:t>23/03/2021</a:t>
             </a:fld>
             <a:endParaRPr lang="en-GB"/>
           </a:p>
@@ -2691,7 +2692,7 @@
           <a:p>
             <a:fld id="{B2EC5630-BBBD-40F6-B459-AD74AAD6AD00}" type="datetimeFigureOut">
               <a:rPr lang="en-GB" smtClean="0"/>
-              <a:t>17/03/2021</a:t>
+              <a:t>23/03/2021</a:t>
             </a:fld>
             <a:endParaRPr lang="en-GB"/>
           </a:p>
@@ -2934,7 +2935,7 @@
           <a:p>
             <a:fld id="{B2EC5630-BBBD-40F6-B459-AD74AAD6AD00}" type="datetimeFigureOut">
               <a:rPr lang="en-GB" smtClean="0"/>
-              <a:t>17/03/2021</a:t>
+              <a:t>23/03/2021</a:t>
             </a:fld>
             <a:endParaRPr lang="en-GB"/>
           </a:p>
@@ -14899,6 +14900,701 @@
           </p:txBody>
         </p:sp>
       </p:grpSp>
+      <p:grpSp>
+        <p:nvGrpSpPr>
+          <p:cNvPr id="43" name="Group 42">
+            <a:extLst>
+              <a:ext uri="{FF2B5EF4-FFF2-40B4-BE49-F238E27FC236}">
+                <a16:creationId xmlns:a16="http://schemas.microsoft.com/office/drawing/2014/main" id="{45A7485A-EA21-4D79-B82A-44F988C71684}"/>
+              </a:ext>
+            </a:extLst>
+          </p:cNvPr>
+          <p:cNvGrpSpPr/>
+          <p:nvPr/>
+        </p:nvGrpSpPr>
+        <p:grpSpPr>
+          <a:xfrm>
+            <a:off x="10184701" y="3265275"/>
+            <a:ext cx="1500151" cy="1285874"/>
+            <a:chOff x="10184701" y="3265275"/>
+            <a:chExt cx="1500151" cy="1285874"/>
+          </a:xfrm>
+          <a:solidFill>
+            <a:srgbClr val="574AE2">
+              <a:alpha val="70980"/>
+            </a:srgbClr>
+          </a:solidFill>
+        </p:grpSpPr>
+        <p:sp>
+          <p:nvSpPr>
+            <p:cNvPr id="40" name="Freeform: Shape 39">
+              <a:extLst>
+                <a:ext uri="{FF2B5EF4-FFF2-40B4-BE49-F238E27FC236}">
+                  <a16:creationId xmlns:a16="http://schemas.microsoft.com/office/drawing/2014/main" id="{B277C2AF-FA89-4F92-B157-0E9AD638377C}"/>
+                </a:ext>
+              </a:extLst>
+            </p:cNvPr>
+            <p:cNvSpPr/>
+            <p:nvPr/>
+          </p:nvSpPr>
+          <p:spPr>
+            <a:xfrm>
+              <a:off x="10184701" y="3265275"/>
+              <a:ext cx="1500151" cy="782829"/>
+            </a:xfrm>
+            <a:custGeom>
+              <a:avLst/>
+              <a:gdLst>
+                <a:gd name="connsiteX0" fmla="*/ 750094 w 1500151"/>
+                <a:gd name="connsiteY0" fmla="*/ 0 h 782829"/>
+                <a:gd name="connsiteX1" fmla="*/ 750058 w 1500151"/>
+                <a:gd name="connsiteY1" fmla="*/ 0 h 782829"/>
+                <a:gd name="connsiteX2" fmla="*/ 0 w 1500151"/>
+                <a:gd name="connsiteY2" fmla="*/ 713536 h 782829"/>
+                <a:gd name="connsiteX3" fmla="*/ 81082 w 1500151"/>
+                <a:gd name="connsiteY3" fmla="*/ 782830 h 782829"/>
+                <a:gd name="connsiteX4" fmla="*/ 750058 w 1500151"/>
+                <a:gd name="connsiteY4" fmla="*/ 147340 h 782829"/>
+                <a:gd name="connsiteX5" fmla="*/ 750094 w 1500151"/>
+                <a:gd name="connsiteY5" fmla="*/ 147340 h 782829"/>
+                <a:gd name="connsiteX6" fmla="*/ 1419070 w 1500151"/>
+                <a:gd name="connsiteY6" fmla="*/ 782830 h 782829"/>
+                <a:gd name="connsiteX7" fmla="*/ 1500152 w 1500151"/>
+                <a:gd name="connsiteY7" fmla="*/ 713536 h 782829"/>
+                <a:gd name="connsiteX8" fmla="*/ 750094 w 1500151"/>
+                <a:gd name="connsiteY8" fmla="*/ 0 h 782829"/>
+              </a:gdLst>
+              <a:ahLst/>
+              <a:cxnLst>
+                <a:cxn ang="0">
+                  <a:pos x="connsiteX0" y="connsiteY0"/>
+                </a:cxn>
+                <a:cxn ang="0">
+                  <a:pos x="connsiteX1" y="connsiteY1"/>
+                </a:cxn>
+                <a:cxn ang="0">
+                  <a:pos x="connsiteX2" y="connsiteY2"/>
+                </a:cxn>
+                <a:cxn ang="0">
+                  <a:pos x="connsiteX3" y="connsiteY3"/>
+                </a:cxn>
+                <a:cxn ang="0">
+                  <a:pos x="connsiteX4" y="connsiteY4"/>
+                </a:cxn>
+                <a:cxn ang="0">
+                  <a:pos x="connsiteX5" y="connsiteY5"/>
+                </a:cxn>
+                <a:cxn ang="0">
+                  <a:pos x="connsiteX6" y="connsiteY6"/>
+                </a:cxn>
+                <a:cxn ang="0">
+                  <a:pos x="connsiteX7" y="connsiteY7"/>
+                </a:cxn>
+                <a:cxn ang="0">
+                  <a:pos x="connsiteX8" y="connsiteY8"/>
+                </a:cxn>
+              </a:cxnLst>
+              <a:rect l="l" t="t" r="r" b="b"/>
+              <a:pathLst>
+                <a:path w="1500151" h="782829">
+                  <a:moveTo>
+                    <a:pt x="750094" y="0"/>
+                  </a:moveTo>
+                  <a:lnTo>
+                    <a:pt x="750058" y="0"/>
+                  </a:lnTo>
+                  <a:lnTo>
+                    <a:pt x="0" y="713536"/>
+                  </a:lnTo>
+                  <a:lnTo>
+                    <a:pt x="81082" y="782830"/>
+                  </a:lnTo>
+                  <a:lnTo>
+                    <a:pt x="750058" y="147340"/>
+                  </a:lnTo>
+                  <a:lnTo>
+                    <a:pt x="750094" y="147340"/>
+                  </a:lnTo>
+                  <a:lnTo>
+                    <a:pt x="1419070" y="782830"/>
+                  </a:lnTo>
+                  <a:lnTo>
+                    <a:pt x="1500152" y="713536"/>
+                  </a:lnTo>
+                  <a:lnTo>
+                    <a:pt x="750094" y="0"/>
+                  </a:lnTo>
+                  <a:close/>
+                </a:path>
+              </a:pathLst>
+            </a:custGeom>
+            <a:grpFill/>
+            <a:ln w="17859" cap="flat">
+              <a:noFill/>
+              <a:prstDash val="solid"/>
+              <a:miter/>
+            </a:ln>
+          </p:spPr>
+          <p:txBody>
+            <a:bodyPr rtlCol="0" anchor="ctr"/>
+            <a:lstStyle/>
+            <a:p>
+              <a:endParaRPr lang="en-GB"/>
+            </a:p>
+          </p:txBody>
+        </p:sp>
+        <p:sp>
+          <p:nvSpPr>
+            <p:cNvPr id="41" name="Freeform: Shape 40">
+              <a:extLst>
+                <a:ext uri="{FF2B5EF4-FFF2-40B4-BE49-F238E27FC236}">
+                  <a16:creationId xmlns:a16="http://schemas.microsoft.com/office/drawing/2014/main" id="{85A2D0AA-4053-4AE3-B3C8-60B1EECF1A37}"/>
+                </a:ext>
+              </a:extLst>
+            </p:cNvPr>
+            <p:cNvSpPr/>
+            <p:nvPr/>
+          </p:nvSpPr>
+          <p:spPr>
+            <a:xfrm>
+              <a:off x="10398978" y="3511127"/>
+              <a:ext cx="1071562" cy="1040022"/>
+            </a:xfrm>
+            <a:custGeom>
+              <a:avLst/>
+              <a:gdLst>
+                <a:gd name="connsiteX0" fmla="*/ 535781 w 1071562"/>
+                <a:gd name="connsiteY0" fmla="*/ 0 h 1040022"/>
+                <a:gd name="connsiteX1" fmla="*/ 0 w 1071562"/>
+                <a:gd name="connsiteY1" fmla="*/ 508992 h 1040022"/>
+                <a:gd name="connsiteX2" fmla="*/ 0 w 1071562"/>
+                <a:gd name="connsiteY2" fmla="*/ 1040023 h 1040022"/>
+                <a:gd name="connsiteX3" fmla="*/ 1071563 w 1071562"/>
+                <a:gd name="connsiteY3" fmla="*/ 1040023 h 1040022"/>
+                <a:gd name="connsiteX4" fmla="*/ 1071563 w 1071562"/>
+                <a:gd name="connsiteY4" fmla="*/ 508956 h 1040022"/>
+                <a:gd name="connsiteX5" fmla="*/ 535781 w 1071562"/>
+                <a:gd name="connsiteY5" fmla="*/ 888754 h 1040022"/>
+                <a:gd name="connsiteX6" fmla="*/ 285750 w 1071562"/>
+                <a:gd name="connsiteY6" fmla="*/ 543121 h 1040022"/>
+                <a:gd name="connsiteX7" fmla="*/ 535781 w 1071562"/>
+                <a:gd name="connsiteY7" fmla="*/ 513707 h 1040022"/>
+                <a:gd name="connsiteX8" fmla="*/ 785813 w 1071562"/>
+                <a:gd name="connsiteY8" fmla="*/ 543121 h 1040022"/>
+                <a:gd name="connsiteX9" fmla="*/ 535781 w 1071562"/>
+                <a:gd name="connsiteY9" fmla="*/ 888754 h 1040022"/>
+              </a:gdLst>
+              <a:ahLst/>
+              <a:cxnLst>
+                <a:cxn ang="0">
+                  <a:pos x="connsiteX0" y="connsiteY0"/>
+                </a:cxn>
+                <a:cxn ang="0">
+                  <a:pos x="connsiteX1" y="connsiteY1"/>
+                </a:cxn>
+                <a:cxn ang="0">
+                  <a:pos x="connsiteX2" y="connsiteY2"/>
+                </a:cxn>
+                <a:cxn ang="0">
+                  <a:pos x="connsiteX3" y="connsiteY3"/>
+                </a:cxn>
+                <a:cxn ang="0">
+                  <a:pos x="connsiteX4" y="connsiteY4"/>
+                </a:cxn>
+                <a:cxn ang="0">
+                  <a:pos x="connsiteX5" y="connsiteY5"/>
+                </a:cxn>
+                <a:cxn ang="0">
+                  <a:pos x="connsiteX6" y="connsiteY6"/>
+                </a:cxn>
+                <a:cxn ang="0">
+                  <a:pos x="connsiteX7" y="connsiteY7"/>
+                </a:cxn>
+                <a:cxn ang="0">
+                  <a:pos x="connsiteX8" y="connsiteY8"/>
+                </a:cxn>
+                <a:cxn ang="0">
+                  <a:pos x="connsiteX9" y="connsiteY9"/>
+                </a:cxn>
+              </a:cxnLst>
+              <a:rect l="l" t="t" r="r" b="b"/>
+              <a:pathLst>
+                <a:path w="1071562" h="1040022">
+                  <a:moveTo>
+                    <a:pt x="535781" y="0"/>
+                  </a:moveTo>
+                  <a:lnTo>
+                    <a:pt x="0" y="508992"/>
+                  </a:lnTo>
+                  <a:lnTo>
+                    <a:pt x="0" y="1040023"/>
+                  </a:lnTo>
+                  <a:lnTo>
+                    <a:pt x="1071563" y="1040023"/>
+                  </a:lnTo>
+                  <a:lnTo>
+                    <a:pt x="1071563" y="508956"/>
+                  </a:lnTo>
+                  <a:close/>
+                  <a:moveTo>
+                    <a:pt x="535781" y="888754"/>
+                  </a:moveTo>
+                  <a:cubicBezTo>
+                    <a:pt x="535781" y="888754"/>
+                    <a:pt x="285750" y="697551"/>
+                    <a:pt x="285750" y="543121"/>
+                  </a:cubicBezTo>
+                  <a:cubicBezTo>
+                    <a:pt x="285750" y="440162"/>
+                    <a:pt x="443109" y="329863"/>
+                    <a:pt x="535781" y="513707"/>
+                  </a:cubicBezTo>
+                  <a:cubicBezTo>
+                    <a:pt x="628436" y="329863"/>
+                    <a:pt x="785813" y="440162"/>
+                    <a:pt x="785813" y="543121"/>
+                  </a:cubicBezTo>
+                  <a:cubicBezTo>
+                    <a:pt x="785813" y="697551"/>
+                    <a:pt x="535781" y="888754"/>
+                    <a:pt x="535781" y="888754"/>
+                  </a:cubicBezTo>
+                  <a:close/>
+                </a:path>
+              </a:pathLst>
+            </a:custGeom>
+            <a:grpFill/>
+            <a:ln w="17859" cap="flat">
+              <a:noFill/>
+              <a:prstDash val="solid"/>
+              <a:miter/>
+            </a:ln>
+          </p:spPr>
+          <p:txBody>
+            <a:bodyPr rtlCol="0" anchor="ctr"/>
+            <a:lstStyle/>
+            <a:p>
+              <a:endParaRPr lang="en-GB"/>
+            </a:p>
+          </p:txBody>
+        </p:sp>
+      </p:grpSp>
+      <p:grpSp>
+        <p:nvGrpSpPr>
+          <p:cNvPr id="53" name="Group 52">
+            <a:extLst>
+              <a:ext uri="{FF2B5EF4-FFF2-40B4-BE49-F238E27FC236}">
+                <a16:creationId xmlns:a16="http://schemas.microsoft.com/office/drawing/2014/main" id="{9B8695B1-0F06-4D9F-84FB-BAD251B871BE}"/>
+              </a:ext>
+            </a:extLst>
+          </p:cNvPr>
+          <p:cNvGrpSpPr/>
+          <p:nvPr/>
+        </p:nvGrpSpPr>
+        <p:grpSpPr>
+          <a:xfrm>
+            <a:off x="9956247" y="5372319"/>
+            <a:ext cx="1642199" cy="1163818"/>
+            <a:chOff x="9956247" y="5372319"/>
+            <a:chExt cx="1642199" cy="1163818"/>
+          </a:xfrm>
+          <a:solidFill>
+            <a:srgbClr val="1E91D6"/>
+          </a:solidFill>
+        </p:grpSpPr>
+        <p:sp>
+          <p:nvSpPr>
+            <p:cNvPr id="51" name="Freeform: Shape 50">
+              <a:extLst>
+                <a:ext uri="{FF2B5EF4-FFF2-40B4-BE49-F238E27FC236}">
+                  <a16:creationId xmlns:a16="http://schemas.microsoft.com/office/drawing/2014/main" id="{3B204E25-0BEE-40BE-BC8C-688B5047BD43}"/>
+                </a:ext>
+              </a:extLst>
+            </p:cNvPr>
+            <p:cNvSpPr/>
+            <p:nvPr/>
+          </p:nvSpPr>
+          <p:spPr>
+            <a:xfrm>
+              <a:off x="10318601" y="5602583"/>
+              <a:ext cx="1279845" cy="933554"/>
+            </a:xfrm>
+            <a:custGeom>
+              <a:avLst/>
+              <a:gdLst>
+                <a:gd name="connsiteX0" fmla="*/ 492660 w 1279845"/>
+                <a:gd name="connsiteY0" fmla="*/ 933555 h 933554"/>
+                <a:gd name="connsiteX1" fmla="*/ 526575 w 1279845"/>
+                <a:gd name="connsiteY1" fmla="*/ 926415 h 933554"/>
+                <a:gd name="connsiteX2" fmla="*/ 862155 w 1279845"/>
+                <a:gd name="connsiteY2" fmla="*/ 769335 h 933554"/>
+                <a:gd name="connsiteX3" fmla="*/ 1144185 w 1279845"/>
+                <a:gd name="connsiteY3" fmla="*/ 506940 h 933554"/>
+                <a:gd name="connsiteX4" fmla="*/ 1033515 w 1279845"/>
+                <a:gd name="connsiteY4" fmla="*/ 412335 h 933554"/>
+                <a:gd name="connsiteX5" fmla="*/ 822885 w 1279845"/>
+                <a:gd name="connsiteY5" fmla="*/ 387345 h 933554"/>
+                <a:gd name="connsiteX6" fmla="*/ 797895 w 1279845"/>
+                <a:gd name="connsiteY6" fmla="*/ 385560 h 933554"/>
+                <a:gd name="connsiteX7" fmla="*/ 817530 w 1279845"/>
+                <a:gd name="connsiteY7" fmla="*/ 371280 h 933554"/>
+                <a:gd name="connsiteX8" fmla="*/ 1251285 w 1279845"/>
+                <a:gd name="connsiteY8" fmla="*/ 99960 h 933554"/>
+                <a:gd name="connsiteX9" fmla="*/ 1279845 w 1279845"/>
+                <a:gd name="connsiteY9" fmla="*/ 53550 h 933554"/>
+                <a:gd name="connsiteX10" fmla="*/ 1226295 w 1279845"/>
+                <a:gd name="connsiteY10" fmla="*/ 0 h 933554"/>
+                <a:gd name="connsiteX11" fmla="*/ 1201305 w 1279845"/>
+                <a:gd name="connsiteY11" fmla="*/ 7140 h 933554"/>
+                <a:gd name="connsiteX12" fmla="*/ 690795 w 1279845"/>
+                <a:gd name="connsiteY12" fmla="*/ 335580 h 933554"/>
+                <a:gd name="connsiteX13" fmla="*/ 642600 w 1279845"/>
+                <a:gd name="connsiteY13" fmla="*/ 435540 h 933554"/>
+                <a:gd name="connsiteX14" fmla="*/ 788970 w 1279845"/>
+                <a:gd name="connsiteY14" fmla="*/ 492660 h 933554"/>
+                <a:gd name="connsiteX15" fmla="*/ 1012095 w 1279845"/>
+                <a:gd name="connsiteY15" fmla="*/ 517650 h 933554"/>
+                <a:gd name="connsiteX16" fmla="*/ 1029945 w 1279845"/>
+                <a:gd name="connsiteY16" fmla="*/ 521220 h 933554"/>
+                <a:gd name="connsiteX17" fmla="*/ 1017450 w 1279845"/>
+                <a:gd name="connsiteY17" fmla="*/ 533715 h 933554"/>
+                <a:gd name="connsiteX18" fmla="*/ 481950 w 1279845"/>
+                <a:gd name="connsiteY18" fmla="*/ 828240 h 933554"/>
+                <a:gd name="connsiteX19" fmla="*/ 473025 w 1279845"/>
+                <a:gd name="connsiteY19" fmla="*/ 831810 h 933554"/>
+                <a:gd name="connsiteX20" fmla="*/ 401625 w 1279845"/>
+                <a:gd name="connsiteY20" fmla="*/ 733635 h 933554"/>
+                <a:gd name="connsiteX21" fmla="*/ 401625 w 1279845"/>
+                <a:gd name="connsiteY21" fmla="*/ 674730 h 933554"/>
+                <a:gd name="connsiteX22" fmla="*/ 217770 w 1279845"/>
+                <a:gd name="connsiteY22" fmla="*/ 419475 h 933554"/>
+                <a:gd name="connsiteX23" fmla="*/ 0 w 1279845"/>
+                <a:gd name="connsiteY23" fmla="*/ 637245 h 933554"/>
+                <a:gd name="connsiteX24" fmla="*/ 260610 w 1279845"/>
+                <a:gd name="connsiteY24" fmla="*/ 819315 h 933554"/>
+                <a:gd name="connsiteX25" fmla="*/ 317730 w 1279845"/>
+                <a:gd name="connsiteY25" fmla="*/ 819315 h 933554"/>
+                <a:gd name="connsiteX26" fmla="*/ 467670 w 1279845"/>
+                <a:gd name="connsiteY26" fmla="*/ 928200 h 933554"/>
+                <a:gd name="connsiteX27" fmla="*/ 483735 w 1279845"/>
+                <a:gd name="connsiteY27" fmla="*/ 933555 h 933554"/>
+                <a:gd name="connsiteX28" fmla="*/ 492660 w 1279845"/>
+                <a:gd name="connsiteY28" fmla="*/ 933555 h 933554"/>
+              </a:gdLst>
+              <a:ahLst/>
+              <a:cxnLst>
+                <a:cxn ang="0">
+                  <a:pos x="connsiteX0" y="connsiteY0"/>
+                </a:cxn>
+                <a:cxn ang="0">
+                  <a:pos x="connsiteX1" y="connsiteY1"/>
+                </a:cxn>
+                <a:cxn ang="0">
+                  <a:pos x="connsiteX2" y="connsiteY2"/>
+                </a:cxn>
+                <a:cxn ang="0">
+                  <a:pos x="connsiteX3" y="connsiteY3"/>
+                </a:cxn>
+                <a:cxn ang="0">
+                  <a:pos x="connsiteX4" y="connsiteY4"/>
+                </a:cxn>
+                <a:cxn ang="0">
+                  <a:pos x="connsiteX5" y="connsiteY5"/>
+                </a:cxn>
+                <a:cxn ang="0">
+                  <a:pos x="connsiteX6" y="connsiteY6"/>
+                </a:cxn>
+                <a:cxn ang="0">
+                  <a:pos x="connsiteX7" y="connsiteY7"/>
+                </a:cxn>
+                <a:cxn ang="0">
+                  <a:pos x="connsiteX8" y="connsiteY8"/>
+                </a:cxn>
+                <a:cxn ang="0">
+                  <a:pos x="connsiteX9" y="connsiteY9"/>
+                </a:cxn>
+                <a:cxn ang="0">
+                  <a:pos x="connsiteX10" y="connsiteY10"/>
+                </a:cxn>
+                <a:cxn ang="0">
+                  <a:pos x="connsiteX11" y="connsiteY11"/>
+                </a:cxn>
+                <a:cxn ang="0">
+                  <a:pos x="connsiteX12" y="connsiteY12"/>
+                </a:cxn>
+                <a:cxn ang="0">
+                  <a:pos x="connsiteX13" y="connsiteY13"/>
+                </a:cxn>
+                <a:cxn ang="0">
+                  <a:pos x="connsiteX14" y="connsiteY14"/>
+                </a:cxn>
+                <a:cxn ang="0">
+                  <a:pos x="connsiteX15" y="connsiteY15"/>
+                </a:cxn>
+                <a:cxn ang="0">
+                  <a:pos x="connsiteX16" y="connsiteY16"/>
+                </a:cxn>
+                <a:cxn ang="0">
+                  <a:pos x="connsiteX17" y="connsiteY17"/>
+                </a:cxn>
+                <a:cxn ang="0">
+                  <a:pos x="connsiteX18" y="connsiteY18"/>
+                </a:cxn>
+                <a:cxn ang="0">
+                  <a:pos x="connsiteX19" y="connsiteY19"/>
+                </a:cxn>
+                <a:cxn ang="0">
+                  <a:pos x="connsiteX20" y="connsiteY20"/>
+                </a:cxn>
+                <a:cxn ang="0">
+                  <a:pos x="connsiteX21" y="connsiteY21"/>
+                </a:cxn>
+                <a:cxn ang="0">
+                  <a:pos x="connsiteX22" y="connsiteY22"/>
+                </a:cxn>
+                <a:cxn ang="0">
+                  <a:pos x="connsiteX23" y="connsiteY23"/>
+                </a:cxn>
+                <a:cxn ang="0">
+                  <a:pos x="connsiteX24" y="connsiteY24"/>
+                </a:cxn>
+                <a:cxn ang="0">
+                  <a:pos x="connsiteX25" y="connsiteY25"/>
+                </a:cxn>
+                <a:cxn ang="0">
+                  <a:pos x="connsiteX26" y="connsiteY26"/>
+                </a:cxn>
+                <a:cxn ang="0">
+                  <a:pos x="connsiteX27" y="connsiteY27"/>
+                </a:cxn>
+                <a:cxn ang="0">
+                  <a:pos x="connsiteX28" y="connsiteY28"/>
+                </a:cxn>
+              </a:cxnLst>
+              <a:rect l="l" t="t" r="r" b="b"/>
+              <a:pathLst>
+                <a:path w="1279845" h="933554">
+                  <a:moveTo>
+                    <a:pt x="492660" y="933555"/>
+                  </a:moveTo>
+                  <a:cubicBezTo>
+                    <a:pt x="505155" y="931770"/>
+                    <a:pt x="515865" y="929985"/>
+                    <a:pt x="526575" y="926415"/>
+                  </a:cubicBezTo>
+                  <a:cubicBezTo>
+                    <a:pt x="642600" y="883575"/>
+                    <a:pt x="755055" y="831810"/>
+                    <a:pt x="862155" y="769335"/>
+                  </a:cubicBezTo>
+                  <a:cubicBezTo>
+                    <a:pt x="1115625" y="628320"/>
+                    <a:pt x="1145970" y="555135"/>
+                    <a:pt x="1144185" y="506940"/>
+                  </a:cubicBezTo>
+                  <a:cubicBezTo>
+                    <a:pt x="1142400" y="478380"/>
+                    <a:pt x="1126335" y="428400"/>
+                    <a:pt x="1033515" y="412335"/>
+                  </a:cubicBezTo>
+                  <a:cubicBezTo>
+                    <a:pt x="947835" y="398055"/>
+                    <a:pt x="880005" y="390915"/>
+                    <a:pt x="822885" y="387345"/>
+                  </a:cubicBezTo>
+                  <a:lnTo>
+                    <a:pt x="797895" y="385560"/>
+                  </a:lnTo>
+                  <a:lnTo>
+                    <a:pt x="817530" y="371280"/>
+                  </a:lnTo>
+                  <a:cubicBezTo>
+                    <a:pt x="983535" y="248115"/>
+                    <a:pt x="1240575" y="107100"/>
+                    <a:pt x="1251285" y="99960"/>
+                  </a:cubicBezTo>
+                  <a:cubicBezTo>
+                    <a:pt x="1269135" y="91035"/>
+                    <a:pt x="1279845" y="73185"/>
+                    <a:pt x="1279845" y="53550"/>
+                  </a:cubicBezTo>
+                  <a:cubicBezTo>
+                    <a:pt x="1279845" y="23205"/>
+                    <a:pt x="1254855" y="0"/>
+                    <a:pt x="1226295" y="0"/>
+                  </a:cubicBezTo>
+                  <a:cubicBezTo>
+                    <a:pt x="1217370" y="0"/>
+                    <a:pt x="1208445" y="1785"/>
+                    <a:pt x="1201305" y="7140"/>
+                  </a:cubicBezTo>
+                  <a:cubicBezTo>
+                    <a:pt x="1187025" y="14280"/>
+                    <a:pt x="858585" y="194565"/>
+                    <a:pt x="690795" y="335580"/>
+                  </a:cubicBezTo>
+                  <a:cubicBezTo>
+                    <a:pt x="660450" y="362355"/>
+                    <a:pt x="628320" y="392700"/>
+                    <a:pt x="642600" y="435540"/>
+                  </a:cubicBezTo>
+                  <a:cubicBezTo>
+                    <a:pt x="656880" y="480165"/>
+                    <a:pt x="699720" y="485520"/>
+                    <a:pt x="788970" y="492660"/>
+                  </a:cubicBezTo>
+                  <a:cubicBezTo>
+                    <a:pt x="844305" y="496230"/>
+                    <a:pt x="919275" y="503370"/>
+                    <a:pt x="1012095" y="517650"/>
+                  </a:cubicBezTo>
+                  <a:lnTo>
+                    <a:pt x="1029945" y="521220"/>
+                  </a:lnTo>
+                  <a:lnTo>
+                    <a:pt x="1017450" y="533715"/>
+                  </a:lnTo>
+                  <a:cubicBezTo>
+                    <a:pt x="937125" y="610470"/>
+                    <a:pt x="642600" y="785400"/>
+                    <a:pt x="481950" y="828240"/>
+                  </a:cubicBezTo>
+                  <a:cubicBezTo>
+                    <a:pt x="478380" y="830025"/>
+                    <a:pt x="474810" y="830025"/>
+                    <a:pt x="473025" y="831810"/>
+                  </a:cubicBezTo>
+                  <a:lnTo>
+                    <a:pt x="401625" y="733635"/>
+                  </a:lnTo>
+                  <a:cubicBezTo>
+                    <a:pt x="423045" y="712215"/>
+                    <a:pt x="414120" y="692580"/>
+                    <a:pt x="401625" y="674730"/>
+                  </a:cubicBezTo>
+                  <a:lnTo>
+                    <a:pt x="217770" y="419475"/>
+                  </a:lnTo>
+                  <a:lnTo>
+                    <a:pt x="0" y="637245"/>
+                  </a:lnTo>
+                  <a:lnTo>
+                    <a:pt x="260610" y="819315"/>
+                  </a:lnTo>
+                  <a:cubicBezTo>
+                    <a:pt x="278460" y="831810"/>
+                    <a:pt x="299880" y="840735"/>
+                    <a:pt x="317730" y="819315"/>
+                  </a:cubicBezTo>
+                  <a:lnTo>
+                    <a:pt x="467670" y="928200"/>
+                  </a:lnTo>
+                  <a:cubicBezTo>
+                    <a:pt x="473025" y="931770"/>
+                    <a:pt x="478380" y="933555"/>
+                    <a:pt x="483735" y="933555"/>
+                  </a:cubicBezTo>
+                  <a:lnTo>
+                    <a:pt x="492660" y="933555"/>
+                  </a:lnTo>
+                  <a:close/>
+                </a:path>
+              </a:pathLst>
+            </a:custGeom>
+            <a:grpFill/>
+            <a:ln w="17760" cap="flat">
+              <a:noFill/>
+              <a:prstDash val="solid"/>
+              <a:miter/>
+            </a:ln>
+          </p:spPr>
+          <p:txBody>
+            <a:bodyPr rtlCol="0" anchor="ctr"/>
+            <a:lstStyle/>
+            <a:p>
+              <a:endParaRPr lang="en-GB"/>
+            </a:p>
+          </p:txBody>
+        </p:sp>
+        <p:sp>
+          <p:nvSpPr>
+            <p:cNvPr id="52" name="Freeform: Shape 51">
+              <a:extLst>
+                <a:ext uri="{FF2B5EF4-FFF2-40B4-BE49-F238E27FC236}">
+                  <a16:creationId xmlns:a16="http://schemas.microsoft.com/office/drawing/2014/main" id="{03BC96AF-9B8C-48D4-9AE6-60A81C1F838E}"/>
+                </a:ext>
+              </a:extLst>
+            </p:cNvPr>
+            <p:cNvSpPr/>
+            <p:nvPr/>
+          </p:nvSpPr>
+          <p:spPr>
+            <a:xfrm>
+              <a:off x="9956247" y="5372319"/>
+              <a:ext cx="539070" cy="826454"/>
+            </a:xfrm>
+            <a:custGeom>
+              <a:avLst/>
+              <a:gdLst>
+                <a:gd name="connsiteX0" fmla="*/ 0 w 539070"/>
+                <a:gd name="connsiteY0" fmla="*/ 0 h 826454"/>
+                <a:gd name="connsiteX1" fmla="*/ 0 w 539070"/>
+                <a:gd name="connsiteY1" fmla="*/ 553350 h 826454"/>
+                <a:gd name="connsiteX2" fmla="*/ 308805 w 539070"/>
+                <a:gd name="connsiteY2" fmla="*/ 826455 h 826454"/>
+                <a:gd name="connsiteX3" fmla="*/ 539070 w 539070"/>
+                <a:gd name="connsiteY3" fmla="*/ 597975 h 826454"/>
+              </a:gdLst>
+              <a:ahLst/>
+              <a:cxnLst>
+                <a:cxn ang="0">
+                  <a:pos x="connsiteX0" y="connsiteY0"/>
+                </a:cxn>
+                <a:cxn ang="0">
+                  <a:pos x="connsiteX1" y="connsiteY1"/>
+                </a:cxn>
+                <a:cxn ang="0">
+                  <a:pos x="connsiteX2" y="connsiteY2"/>
+                </a:cxn>
+                <a:cxn ang="0">
+                  <a:pos x="connsiteX3" y="connsiteY3"/>
+                </a:cxn>
+              </a:cxnLst>
+              <a:rect l="l" t="t" r="r" b="b"/>
+              <a:pathLst>
+                <a:path w="539070" h="826454">
+                  <a:moveTo>
+                    <a:pt x="0" y="0"/>
+                  </a:moveTo>
+                  <a:lnTo>
+                    <a:pt x="0" y="553350"/>
+                  </a:lnTo>
+                  <a:lnTo>
+                    <a:pt x="308805" y="826455"/>
+                  </a:lnTo>
+                  <a:lnTo>
+                    <a:pt x="539070" y="597975"/>
+                  </a:lnTo>
+                  <a:close/>
+                </a:path>
+              </a:pathLst>
+            </a:custGeom>
+            <a:grpFill/>
+            <a:ln w="17760" cap="flat">
+              <a:noFill/>
+              <a:prstDash val="solid"/>
+              <a:miter/>
+            </a:ln>
+          </p:spPr>
+          <p:txBody>
+            <a:bodyPr rtlCol="0" anchor="ctr"/>
+            <a:lstStyle/>
+            <a:p>
+              <a:endParaRPr lang="en-GB"/>
+            </a:p>
+          </p:txBody>
+        </p:sp>
+      </p:grpSp>
     </p:spTree>
     <p:extLst>
       <p:ext uri="{BB962C8B-B14F-4D97-AF65-F5344CB8AC3E}">
@@ -14913,6 +15609,549 @@
 </file>
 
 <file path=ppt/slides/slide5.xml><?xml version="1.0" encoding="utf-8"?>
+<p:sld xmlns:a="http://schemas.openxmlformats.org/drawingml/2006/main" xmlns:r="http://schemas.openxmlformats.org/officeDocument/2006/relationships" xmlns:p="http://schemas.openxmlformats.org/presentationml/2006/main">
+  <p:cSld>
+    <p:spTree>
+      <p:nvGrpSpPr>
+        <p:cNvPr id="1" name=""/>
+        <p:cNvGrpSpPr/>
+        <p:nvPr/>
+      </p:nvGrpSpPr>
+      <p:grpSpPr>
+        <a:xfrm>
+          <a:off x="0" y="0"/>
+          <a:ext cx="0" cy="0"/>
+          <a:chOff x="0" y="0"/>
+          <a:chExt cx="0" cy="0"/>
+        </a:xfrm>
+      </p:grpSpPr>
+      <p:graphicFrame>
+        <p:nvGraphicFramePr>
+          <p:cNvPr id="4" name="Content Placeholder 3">
+            <a:extLst>
+              <a:ext uri="{FF2B5EF4-FFF2-40B4-BE49-F238E27FC236}">
+                <a16:creationId xmlns:a16="http://schemas.microsoft.com/office/drawing/2014/main" id="{00C1513F-AA95-442E-B209-E5169A0BF60B}"/>
+              </a:ext>
+            </a:extLst>
+          </p:cNvPr>
+          <p:cNvGraphicFramePr>
+            <a:graphicFrameLocks noGrp="1"/>
+          </p:cNvGraphicFramePr>
+          <p:nvPr>
+            <p:ph idx="1"/>
+          </p:nvPr>
+        </p:nvGraphicFramePr>
+        <p:xfrm>
+          <a:off x="838200" y="3269774"/>
+          <a:ext cx="10515600" cy="1463040"/>
+        </p:xfrm>
+        <a:graphic>
+          <a:graphicData uri="http://schemas.openxmlformats.org/drawingml/2006/table">
+            <a:tbl>
+              <a:tblPr/>
+              <a:tblGrid>
+                <a:gridCol w="2628900">
+                  <a:extLst>
+                    <a:ext uri="{9D8B030D-6E8A-4147-A177-3AD203B41FA5}">
+                      <a16:colId xmlns:a16="http://schemas.microsoft.com/office/drawing/2014/main" val="3342120626"/>
+                    </a:ext>
+                  </a:extLst>
+                </a:gridCol>
+                <a:gridCol w="2628900">
+                  <a:extLst>
+                    <a:ext uri="{9D8B030D-6E8A-4147-A177-3AD203B41FA5}">
+                      <a16:colId xmlns:a16="http://schemas.microsoft.com/office/drawing/2014/main" val="2836923470"/>
+                    </a:ext>
+                  </a:extLst>
+                </a:gridCol>
+                <a:gridCol w="2628900">
+                  <a:extLst>
+                    <a:ext uri="{9D8B030D-6E8A-4147-A177-3AD203B41FA5}">
+                      <a16:colId xmlns:a16="http://schemas.microsoft.com/office/drawing/2014/main" val="145285366"/>
+                    </a:ext>
+                  </a:extLst>
+                </a:gridCol>
+                <a:gridCol w="2628900">
+                  <a:extLst>
+                    <a:ext uri="{9D8B030D-6E8A-4147-A177-3AD203B41FA5}">
+                      <a16:colId xmlns:a16="http://schemas.microsoft.com/office/drawing/2014/main" val="3606555231"/>
+                    </a:ext>
+                  </a:extLst>
+                </a:gridCol>
+              </a:tblGrid>
+              <a:tr h="0">
+                <a:tc>
+                  <a:txBody>
+                    <a:bodyPr/>
+                    <a:lstStyle/>
+                    <a:p>
+                      <a:r>
+                        <a:rPr lang="en-GB" b="1"/>
+                        <a:t>Activity</a:t>
+                      </a:r>
+                      <a:endParaRPr lang="en-GB"/>
+                    </a:p>
+                  </a:txBody>
+                  <a:tcPr anchor="ctr">
+                    <a:lnL>
+                      <a:noFill/>
+                    </a:lnL>
+                    <a:lnR>
+                      <a:noFill/>
+                    </a:lnR>
+                    <a:lnT>
+                      <a:noFill/>
+                    </a:lnT>
+                    <a:lnB>
+                      <a:noFill/>
+                    </a:lnB>
+                  </a:tcPr>
+                </a:tc>
+                <a:tc>
+                  <a:txBody>
+                    <a:bodyPr/>
+                    <a:lstStyle/>
+                    <a:p>
+                      <a:r>
+                        <a:rPr lang="en-GB" b="1"/>
+                        <a:t>General (Light Blue)</a:t>
+                      </a:r>
+                      <a:endParaRPr lang="en-GB"/>
+                    </a:p>
+                  </a:txBody>
+                  <a:tcPr anchor="ctr">
+                    <a:lnL>
+                      <a:noFill/>
+                    </a:lnL>
+                    <a:lnR>
+                      <a:noFill/>
+                    </a:lnR>
+                    <a:lnT>
+                      <a:noFill/>
+                    </a:lnT>
+                    <a:lnB>
+                      <a:noFill/>
+                    </a:lnB>
+                  </a:tcPr>
+                </a:tc>
+                <a:tc>
+                  <a:txBody>
+                    <a:bodyPr/>
+                    <a:lstStyle/>
+                    <a:p>
+                      <a:r>
+                        <a:rPr lang="en-GB" b="1"/>
+                        <a:t>Specialist (Dark Blue)</a:t>
+                      </a:r>
+                      <a:endParaRPr lang="en-GB"/>
+                    </a:p>
+                  </a:txBody>
+                  <a:tcPr anchor="ctr">
+                    <a:lnL>
+                      <a:noFill/>
+                    </a:lnL>
+                    <a:lnR>
+                      <a:noFill/>
+                    </a:lnR>
+                    <a:lnT>
+                      <a:noFill/>
+                    </a:lnT>
+                    <a:lnB>
+                      <a:noFill/>
+                    </a:lnB>
+                  </a:tcPr>
+                </a:tc>
+                <a:tc>
+                  <a:txBody>
+                    <a:bodyPr/>
+                    <a:lstStyle/>
+                    <a:p>
+                      <a:r>
+                        <a:rPr lang="en-GB" b="1"/>
+                        <a:t>Befriending (Purple)</a:t>
+                      </a:r>
+                      <a:endParaRPr lang="en-GB"/>
+                    </a:p>
+                  </a:txBody>
+                  <a:tcPr anchor="ctr">
+                    <a:lnL>
+                      <a:noFill/>
+                    </a:lnL>
+                    <a:lnR>
+                      <a:noFill/>
+                    </a:lnR>
+                    <a:lnT>
+                      <a:noFill/>
+                    </a:lnT>
+                    <a:lnB>
+                      <a:noFill/>
+                    </a:lnB>
+                  </a:tcPr>
+                </a:tc>
+                <a:extLst>
+                  <a:ext uri="{0D108BD9-81ED-4DB2-BD59-A6C34878D82A}">
+                    <a16:rowId xmlns:a16="http://schemas.microsoft.com/office/drawing/2014/main" val="3612176200"/>
+                  </a:ext>
+                </a:extLst>
+              </a:tr>
+              <a:tr h="0">
+                <a:tc>
+                  <a:txBody>
+                    <a:bodyPr/>
+                    <a:lstStyle/>
+                    <a:p>
+                      <a:r>
+                        <a:rPr lang="en-GB" b="1"/>
+                        <a:t>CSS class</a:t>
+                      </a:r>
+                      <a:endParaRPr lang="en-GB"/>
+                    </a:p>
+                  </a:txBody>
+                  <a:tcPr anchor="ctr">
+                    <a:lnL>
+                      <a:noFill/>
+                    </a:lnL>
+                    <a:lnR>
+                      <a:noFill/>
+                    </a:lnR>
+                    <a:lnT>
+                      <a:noFill/>
+                    </a:lnT>
+                    <a:lnB>
+                      <a:noFill/>
+                    </a:lnB>
+                  </a:tcPr>
+                </a:tc>
+                <a:tc>
+                  <a:txBody>
+                    <a:bodyPr/>
+                    <a:lstStyle/>
+                    <a:p>
+                      <a:r>
+                        <a:rPr lang="en-GB"/>
+                        <a:t>blue</a:t>
+                      </a:r>
+                    </a:p>
+                  </a:txBody>
+                  <a:tcPr anchor="ctr">
+                    <a:lnL>
+                      <a:noFill/>
+                    </a:lnL>
+                    <a:lnR>
+                      <a:noFill/>
+                    </a:lnR>
+                    <a:lnT>
+                      <a:noFill/>
+                    </a:lnT>
+                    <a:lnB>
+                      <a:noFill/>
+                    </a:lnB>
+                  </a:tcPr>
+                </a:tc>
+                <a:tc>
+                  <a:txBody>
+                    <a:bodyPr/>
+                    <a:lstStyle/>
+                    <a:p>
+                      <a:r>
+                        <a:rPr lang="en-GB"/>
+                        <a:t>dark-blue</a:t>
+                      </a:r>
+                    </a:p>
+                  </a:txBody>
+                  <a:tcPr anchor="ctr">
+                    <a:lnL>
+                      <a:noFill/>
+                    </a:lnL>
+                    <a:lnR>
+                      <a:noFill/>
+                    </a:lnR>
+                    <a:lnT>
+                      <a:noFill/>
+                    </a:lnT>
+                    <a:lnB>
+                      <a:noFill/>
+                    </a:lnB>
+                  </a:tcPr>
+                </a:tc>
+                <a:tc>
+                  <a:txBody>
+                    <a:bodyPr/>
+                    <a:lstStyle/>
+                    <a:p>
+                      <a:r>
+                        <a:rPr lang="en-GB"/>
+                        <a:t>light-purple</a:t>
+                      </a:r>
+                    </a:p>
+                  </a:txBody>
+                  <a:tcPr anchor="ctr">
+                    <a:lnL>
+                      <a:noFill/>
+                    </a:lnL>
+                    <a:lnR>
+                      <a:noFill/>
+                    </a:lnR>
+                    <a:lnT>
+                      <a:noFill/>
+                    </a:lnT>
+                    <a:lnB>
+                      <a:noFill/>
+                    </a:lnB>
+                  </a:tcPr>
+                </a:tc>
+                <a:extLst>
+                  <a:ext uri="{0D108BD9-81ED-4DB2-BD59-A6C34878D82A}">
+                    <a16:rowId xmlns:a16="http://schemas.microsoft.com/office/drawing/2014/main" val="1376013076"/>
+                  </a:ext>
+                </a:extLst>
+              </a:tr>
+              <a:tr h="0">
+                <a:tc>
+                  <a:txBody>
+                    <a:bodyPr/>
+                    <a:lstStyle/>
+                    <a:p>
+                      <a:r>
+                        <a:rPr lang="en-GB" b="1"/>
+                        <a:t>Text colour</a:t>
+                      </a:r>
+                      <a:endParaRPr lang="en-GB"/>
+                    </a:p>
+                  </a:txBody>
+                  <a:tcPr anchor="ctr">
+                    <a:lnL>
+                      <a:noFill/>
+                    </a:lnL>
+                    <a:lnR>
+                      <a:noFill/>
+                    </a:lnR>
+                    <a:lnT>
+                      <a:noFill/>
+                    </a:lnT>
+                    <a:lnB>
+                      <a:noFill/>
+                    </a:lnB>
+                  </a:tcPr>
+                </a:tc>
+                <a:tc>
+                  <a:txBody>
+                    <a:bodyPr/>
+                    <a:lstStyle/>
+                    <a:p>
+                      <a:r>
+                        <a:rPr lang="en-GB"/>
+                        <a:t>#1e91d6</a:t>
+                      </a:r>
+                    </a:p>
+                  </a:txBody>
+                  <a:tcPr anchor="ctr">
+                    <a:lnL>
+                      <a:noFill/>
+                    </a:lnL>
+                    <a:lnR>
+                      <a:noFill/>
+                    </a:lnR>
+                    <a:lnT>
+                      <a:noFill/>
+                    </a:lnT>
+                    <a:lnB>
+                      <a:noFill/>
+                    </a:lnB>
+                  </a:tcPr>
+                </a:tc>
+                <a:tc>
+                  <a:txBody>
+                    <a:bodyPr/>
+                    <a:lstStyle/>
+                    <a:p>
+                      <a:r>
+                        <a:rPr lang="en-GB"/>
+                        <a:t>#001489</a:t>
+                      </a:r>
+                    </a:p>
+                  </a:txBody>
+                  <a:tcPr anchor="ctr">
+                    <a:lnL>
+                      <a:noFill/>
+                    </a:lnL>
+                    <a:lnR>
+                      <a:noFill/>
+                    </a:lnR>
+                    <a:lnT>
+                      <a:noFill/>
+                    </a:lnT>
+                    <a:lnB>
+                      <a:noFill/>
+                    </a:lnB>
+                  </a:tcPr>
+                </a:tc>
+                <a:tc>
+                  <a:txBody>
+                    <a:bodyPr/>
+                    <a:lstStyle/>
+                    <a:p>
+                      <a:r>
+                        <a:rPr lang="en-GB"/>
+                        <a:t>#574AE2</a:t>
+                      </a:r>
+                    </a:p>
+                  </a:txBody>
+                  <a:tcPr anchor="ctr">
+                    <a:lnL>
+                      <a:noFill/>
+                    </a:lnL>
+                    <a:lnR>
+                      <a:noFill/>
+                    </a:lnR>
+                    <a:lnT>
+                      <a:noFill/>
+                    </a:lnT>
+                    <a:lnB>
+                      <a:noFill/>
+                    </a:lnB>
+                  </a:tcPr>
+                </a:tc>
+                <a:extLst>
+                  <a:ext uri="{0D108BD9-81ED-4DB2-BD59-A6C34878D82A}">
+                    <a16:rowId xmlns:a16="http://schemas.microsoft.com/office/drawing/2014/main" val="653300945"/>
+                  </a:ext>
+                </a:extLst>
+              </a:tr>
+              <a:tr h="0">
+                <a:tc>
+                  <a:txBody>
+                    <a:bodyPr/>
+                    <a:lstStyle/>
+                    <a:p>
+                      <a:r>
+                        <a:rPr lang="en-GB" b="1"/>
+                        <a:t>Icon colour</a:t>
+                      </a:r>
+                      <a:endParaRPr lang="en-GB"/>
+                    </a:p>
+                  </a:txBody>
+                  <a:tcPr anchor="ctr">
+                    <a:lnL>
+                      <a:noFill/>
+                    </a:lnL>
+                    <a:lnR>
+                      <a:noFill/>
+                    </a:lnR>
+                    <a:lnT>
+                      <a:noFill/>
+                    </a:lnT>
+                    <a:lnB>
+                      <a:noFill/>
+                    </a:lnB>
+                  </a:tcPr>
+                </a:tc>
+                <a:tc>
+                  <a:txBody>
+                    <a:bodyPr/>
+                    <a:lstStyle/>
+                    <a:p>
+                      <a:r>
+                        <a:rPr lang="en-GB" dirty="0"/>
+                        <a:t>#1e91d6</a:t>
+                      </a:r>
+                    </a:p>
+                  </a:txBody>
+                  <a:tcPr anchor="ctr">
+                    <a:lnL>
+                      <a:noFill/>
+                    </a:lnL>
+                    <a:lnR>
+                      <a:noFill/>
+                    </a:lnR>
+                    <a:lnT>
+                      <a:noFill/>
+                    </a:lnT>
+                    <a:lnB>
+                      <a:noFill/>
+                    </a:lnB>
+                  </a:tcPr>
+                </a:tc>
+                <a:tc>
+                  <a:txBody>
+                    <a:bodyPr/>
+                    <a:lstStyle/>
+                    <a:p>
+                      <a:r>
+                        <a:rPr lang="en-GB"/>
+                        <a:t>#001489</a:t>
+                      </a:r>
+                    </a:p>
+                  </a:txBody>
+                  <a:tcPr anchor="ctr">
+                    <a:lnL>
+                      <a:noFill/>
+                    </a:lnL>
+                    <a:lnR>
+                      <a:noFill/>
+                    </a:lnR>
+                    <a:lnT>
+                      <a:noFill/>
+                    </a:lnT>
+                    <a:lnB>
+                      <a:noFill/>
+                    </a:lnB>
+                  </a:tcPr>
+                </a:tc>
+                <a:tc>
+                  <a:txBody>
+                    <a:bodyPr/>
+                    <a:lstStyle/>
+                    <a:p>
+                      <a:r>
+                        <a:rPr lang="en-GB" dirty="0" err="1"/>
+                        <a:t>rgba</a:t>
+                      </a:r>
+                      <a:r>
+                        <a:rPr lang="en-GB" dirty="0"/>
+                        <a:t>(87,74,226,0.71)</a:t>
+                      </a:r>
+                    </a:p>
+                  </a:txBody>
+                  <a:tcPr anchor="ctr">
+                    <a:lnL>
+                      <a:noFill/>
+                    </a:lnL>
+                    <a:lnR>
+                      <a:noFill/>
+                    </a:lnR>
+                    <a:lnT>
+                      <a:noFill/>
+                    </a:lnT>
+                    <a:lnB>
+                      <a:noFill/>
+                    </a:lnB>
+                  </a:tcPr>
+                </a:tc>
+                <a:extLst>
+                  <a:ext uri="{0D108BD9-81ED-4DB2-BD59-A6C34878D82A}">
+                    <a16:rowId xmlns:a16="http://schemas.microsoft.com/office/drawing/2014/main" val="3593653849"/>
+                  </a:ext>
+                </a:extLst>
+              </a:tr>
+            </a:tbl>
+          </a:graphicData>
+        </a:graphic>
+      </p:graphicFrame>
+    </p:spTree>
+    <p:extLst>
+      <p:ext uri="{BB962C8B-B14F-4D97-AF65-F5344CB8AC3E}">
+        <p14:creationId xmlns:p14="http://schemas.microsoft.com/office/powerpoint/2010/main" val="1576127057"/>
+      </p:ext>
+    </p:extLst>
+  </p:cSld>
+  <p:clrMapOvr>
+    <a:masterClrMapping/>
+  </p:clrMapOvr>
+</p:sld>
+</file>
+
+<file path=ppt/slides/slide6.xml><?xml version="1.0" encoding="utf-8"?>
 <p:sld xmlns:a="http://schemas.openxmlformats.org/drawingml/2006/main" xmlns:r="http://schemas.openxmlformats.org/officeDocument/2006/relationships" xmlns:p="http://schemas.openxmlformats.org/presentationml/2006/main">
   <p:cSld>
     <p:spTree>

</xml_diff>

<commit_message>
Adding repeat information to Review Stage
</commit_message>
<xml_diff>
--- a/HelpMyStreetFE/HelpMyStreetFE/src/pptx/Icons.pptx
+++ b/HelpMyStreetFE/HelpMyStreetFE/src/pptx/Icons.pptx
@@ -266,7 +266,7 @@
           <a:p>
             <a:fld id="{B2EC5630-BBBD-40F6-B459-AD74AAD6AD00}" type="datetimeFigureOut">
               <a:rPr lang="en-GB" smtClean="0"/>
-              <a:t>23/03/2021</a:t>
+              <a:t>25/03/2021</a:t>
             </a:fld>
             <a:endParaRPr lang="en-GB"/>
           </a:p>
@@ -466,7 +466,7 @@
           <a:p>
             <a:fld id="{B2EC5630-BBBD-40F6-B459-AD74AAD6AD00}" type="datetimeFigureOut">
               <a:rPr lang="en-GB" smtClean="0"/>
-              <a:t>23/03/2021</a:t>
+              <a:t>25/03/2021</a:t>
             </a:fld>
             <a:endParaRPr lang="en-GB"/>
           </a:p>
@@ -676,7 +676,7 @@
           <a:p>
             <a:fld id="{B2EC5630-BBBD-40F6-B459-AD74AAD6AD00}" type="datetimeFigureOut">
               <a:rPr lang="en-GB" smtClean="0"/>
-              <a:t>23/03/2021</a:t>
+              <a:t>25/03/2021</a:t>
             </a:fld>
             <a:endParaRPr lang="en-GB"/>
           </a:p>
@@ -876,7 +876,7 @@
           <a:p>
             <a:fld id="{B2EC5630-BBBD-40F6-B459-AD74AAD6AD00}" type="datetimeFigureOut">
               <a:rPr lang="en-GB" smtClean="0"/>
-              <a:t>23/03/2021</a:t>
+              <a:t>25/03/2021</a:t>
             </a:fld>
             <a:endParaRPr lang="en-GB"/>
           </a:p>
@@ -1152,7 +1152,7 @@
           <a:p>
             <a:fld id="{B2EC5630-BBBD-40F6-B459-AD74AAD6AD00}" type="datetimeFigureOut">
               <a:rPr lang="en-GB" smtClean="0"/>
-              <a:t>23/03/2021</a:t>
+              <a:t>25/03/2021</a:t>
             </a:fld>
             <a:endParaRPr lang="en-GB"/>
           </a:p>
@@ -1420,7 +1420,7 @@
           <a:p>
             <a:fld id="{B2EC5630-BBBD-40F6-B459-AD74AAD6AD00}" type="datetimeFigureOut">
               <a:rPr lang="en-GB" smtClean="0"/>
-              <a:t>23/03/2021</a:t>
+              <a:t>25/03/2021</a:t>
             </a:fld>
             <a:endParaRPr lang="en-GB"/>
           </a:p>
@@ -1835,7 +1835,7 @@
           <a:p>
             <a:fld id="{B2EC5630-BBBD-40F6-B459-AD74AAD6AD00}" type="datetimeFigureOut">
               <a:rPr lang="en-GB" smtClean="0"/>
-              <a:t>23/03/2021</a:t>
+              <a:t>25/03/2021</a:t>
             </a:fld>
             <a:endParaRPr lang="en-GB"/>
           </a:p>
@@ -1977,7 +1977,7 @@
           <a:p>
             <a:fld id="{B2EC5630-BBBD-40F6-B459-AD74AAD6AD00}" type="datetimeFigureOut">
               <a:rPr lang="en-GB" smtClean="0"/>
-              <a:t>23/03/2021</a:t>
+              <a:t>25/03/2021</a:t>
             </a:fld>
             <a:endParaRPr lang="en-GB"/>
           </a:p>
@@ -2090,7 +2090,7 @@
           <a:p>
             <a:fld id="{B2EC5630-BBBD-40F6-B459-AD74AAD6AD00}" type="datetimeFigureOut">
               <a:rPr lang="en-GB" smtClean="0"/>
-              <a:t>23/03/2021</a:t>
+              <a:t>25/03/2021</a:t>
             </a:fld>
             <a:endParaRPr lang="en-GB"/>
           </a:p>
@@ -2403,7 +2403,7 @@
           <a:p>
             <a:fld id="{B2EC5630-BBBD-40F6-B459-AD74AAD6AD00}" type="datetimeFigureOut">
               <a:rPr lang="en-GB" smtClean="0"/>
-              <a:t>23/03/2021</a:t>
+              <a:t>25/03/2021</a:t>
             </a:fld>
             <a:endParaRPr lang="en-GB"/>
           </a:p>
@@ -2692,7 +2692,7 @@
           <a:p>
             <a:fld id="{B2EC5630-BBBD-40F6-B459-AD74AAD6AD00}" type="datetimeFigureOut">
               <a:rPr lang="en-GB" smtClean="0"/>
-              <a:t>23/03/2021</a:t>
+              <a:t>25/03/2021</a:t>
             </a:fld>
             <a:endParaRPr lang="en-GB"/>
           </a:p>
@@ -2935,7 +2935,7 @@
           <a:p>
             <a:fld id="{B2EC5630-BBBD-40F6-B459-AD74AAD6AD00}" type="datetimeFigureOut">
               <a:rPr lang="en-GB" smtClean="0"/>
-              <a:t>23/03/2021</a:t>
+              <a:t>25/03/2021</a:t>
             </a:fld>
             <a:endParaRPr lang="en-GB"/>
           </a:p>
@@ -6552,6 +6552,182 @@
           </p:txBody>
         </p:sp>
       </p:grpSp>
+      <p:sp>
+        <p:nvSpPr>
+          <p:cNvPr id="4" name="Graphic 2" descr="Refresh with solid fill">
+            <a:extLst>
+              <a:ext uri="{FF2B5EF4-FFF2-40B4-BE49-F238E27FC236}">
+                <a16:creationId xmlns:a16="http://schemas.microsoft.com/office/drawing/2014/main" id="{7BF3778A-2E06-409B-BFAD-E38E4A98F2DB}"/>
+              </a:ext>
+            </a:extLst>
+          </p:cNvPr>
+          <p:cNvSpPr/>
+          <p:nvPr/>
+        </p:nvSpPr>
+        <p:spPr>
+          <a:xfrm>
+            <a:off x="1816583" y="3205002"/>
+            <a:ext cx="666750" cy="723900"/>
+          </a:xfrm>
+          <a:custGeom>
+            <a:avLst/>
+            <a:gdLst>
+              <a:gd name="connsiteX0" fmla="*/ 0 w 666750"/>
+              <a:gd name="connsiteY0" fmla="*/ 228600 h 723900"/>
+              <a:gd name="connsiteX1" fmla="*/ 0 w 666750"/>
+              <a:gd name="connsiteY1" fmla="*/ 28575 h 723900"/>
+              <a:gd name="connsiteX2" fmla="*/ 63818 w 666750"/>
+              <a:gd name="connsiteY2" fmla="*/ 92393 h 723900"/>
+              <a:gd name="connsiteX3" fmla="*/ 304800 w 666750"/>
+              <a:gd name="connsiteY3" fmla="*/ 0 h 723900"/>
+              <a:gd name="connsiteX4" fmla="*/ 666750 w 666750"/>
+              <a:gd name="connsiteY4" fmla="*/ 361950 h 723900"/>
+              <a:gd name="connsiteX5" fmla="*/ 304800 w 666750"/>
+              <a:gd name="connsiteY5" fmla="*/ 723900 h 723900"/>
+              <a:gd name="connsiteX6" fmla="*/ 48578 w 666750"/>
+              <a:gd name="connsiteY6" fmla="*/ 618173 h 723900"/>
+              <a:gd name="connsiteX7" fmla="*/ 129540 w 666750"/>
+              <a:gd name="connsiteY7" fmla="*/ 537210 h 723900"/>
+              <a:gd name="connsiteX8" fmla="*/ 304800 w 666750"/>
+              <a:gd name="connsiteY8" fmla="*/ 609600 h 723900"/>
+              <a:gd name="connsiteX9" fmla="*/ 552450 w 666750"/>
+              <a:gd name="connsiteY9" fmla="*/ 361950 h 723900"/>
+              <a:gd name="connsiteX10" fmla="*/ 304800 w 666750"/>
+              <a:gd name="connsiteY10" fmla="*/ 114300 h 723900"/>
+              <a:gd name="connsiteX11" fmla="*/ 144780 w 666750"/>
+              <a:gd name="connsiteY11" fmla="*/ 173355 h 723900"/>
+              <a:gd name="connsiteX12" fmla="*/ 200025 w 666750"/>
+              <a:gd name="connsiteY12" fmla="*/ 228600 h 723900"/>
+              <a:gd name="connsiteX13" fmla="*/ 0 w 666750"/>
+              <a:gd name="connsiteY13" fmla="*/ 228600 h 723900"/>
+            </a:gdLst>
+            <a:ahLst/>
+            <a:cxnLst>
+              <a:cxn ang="0">
+                <a:pos x="connsiteX0" y="connsiteY0"/>
+              </a:cxn>
+              <a:cxn ang="0">
+                <a:pos x="connsiteX1" y="connsiteY1"/>
+              </a:cxn>
+              <a:cxn ang="0">
+                <a:pos x="connsiteX2" y="connsiteY2"/>
+              </a:cxn>
+              <a:cxn ang="0">
+                <a:pos x="connsiteX3" y="connsiteY3"/>
+              </a:cxn>
+              <a:cxn ang="0">
+                <a:pos x="connsiteX4" y="connsiteY4"/>
+              </a:cxn>
+              <a:cxn ang="0">
+                <a:pos x="connsiteX5" y="connsiteY5"/>
+              </a:cxn>
+              <a:cxn ang="0">
+                <a:pos x="connsiteX6" y="connsiteY6"/>
+              </a:cxn>
+              <a:cxn ang="0">
+                <a:pos x="connsiteX7" y="connsiteY7"/>
+              </a:cxn>
+              <a:cxn ang="0">
+                <a:pos x="connsiteX8" y="connsiteY8"/>
+              </a:cxn>
+              <a:cxn ang="0">
+                <a:pos x="connsiteX9" y="connsiteY9"/>
+              </a:cxn>
+              <a:cxn ang="0">
+                <a:pos x="connsiteX10" y="connsiteY10"/>
+              </a:cxn>
+              <a:cxn ang="0">
+                <a:pos x="connsiteX11" y="connsiteY11"/>
+              </a:cxn>
+              <a:cxn ang="0">
+                <a:pos x="connsiteX12" y="connsiteY12"/>
+              </a:cxn>
+              <a:cxn ang="0">
+                <a:pos x="connsiteX13" y="connsiteY13"/>
+              </a:cxn>
+            </a:cxnLst>
+            <a:rect l="l" t="t" r="r" b="b"/>
+            <a:pathLst>
+              <a:path w="666750" h="723900">
+                <a:moveTo>
+                  <a:pt x="0" y="228600"/>
+                </a:moveTo>
+                <a:lnTo>
+                  <a:pt x="0" y="28575"/>
+                </a:lnTo>
+                <a:lnTo>
+                  <a:pt x="63818" y="92393"/>
+                </a:lnTo>
+                <a:cubicBezTo>
+                  <a:pt x="127635" y="35243"/>
+                  <a:pt x="212408" y="0"/>
+                  <a:pt x="304800" y="0"/>
+                </a:cubicBezTo>
+                <a:cubicBezTo>
+                  <a:pt x="504825" y="0"/>
+                  <a:pt x="666750" y="161925"/>
+                  <a:pt x="666750" y="361950"/>
+                </a:cubicBezTo>
+                <a:cubicBezTo>
+                  <a:pt x="666750" y="561975"/>
+                  <a:pt x="504825" y="723900"/>
+                  <a:pt x="304800" y="723900"/>
+                </a:cubicBezTo>
+                <a:cubicBezTo>
+                  <a:pt x="204788" y="723900"/>
+                  <a:pt x="114300" y="682943"/>
+                  <a:pt x="48578" y="618173"/>
+                </a:cubicBezTo>
+                <a:lnTo>
+                  <a:pt x="129540" y="537210"/>
+                </a:lnTo>
+                <a:cubicBezTo>
+                  <a:pt x="174308" y="581978"/>
+                  <a:pt x="236220" y="609600"/>
+                  <a:pt x="304800" y="609600"/>
+                </a:cubicBezTo>
+                <a:cubicBezTo>
+                  <a:pt x="441008" y="609600"/>
+                  <a:pt x="552450" y="498158"/>
+                  <a:pt x="552450" y="361950"/>
+                </a:cubicBezTo>
+                <a:cubicBezTo>
+                  <a:pt x="552450" y="225743"/>
+                  <a:pt x="441008" y="114300"/>
+                  <a:pt x="304800" y="114300"/>
+                </a:cubicBezTo>
+                <a:cubicBezTo>
+                  <a:pt x="243840" y="114300"/>
+                  <a:pt x="187643" y="136208"/>
+                  <a:pt x="144780" y="173355"/>
+                </a:cubicBezTo>
+                <a:lnTo>
+                  <a:pt x="200025" y="228600"/>
+                </a:lnTo>
+                <a:lnTo>
+                  <a:pt x="0" y="228600"/>
+                </a:lnTo>
+                <a:close/>
+              </a:path>
+            </a:pathLst>
+          </a:custGeom>
+          <a:solidFill>
+            <a:srgbClr val="001489"/>
+          </a:solidFill>
+          <a:ln w="9525" cap="flat">
+            <a:noFill/>
+            <a:prstDash val="solid"/>
+            <a:miter/>
+          </a:ln>
+        </p:spPr>
+        <p:txBody>
+          <a:bodyPr rtlCol="0" anchor="ctr"/>
+          <a:lstStyle/>
+          <a:p>
+            <a:endParaRPr lang="en-GB"/>
+          </a:p>
+        </p:txBody>
+      </p:sp>
     </p:spTree>
     <p:extLst>
       <p:ext uri="{BB962C8B-B14F-4D97-AF65-F5344CB8AC3E}">

</xml_diff>

<commit_message>
Crop face covering icon
</commit_message>
<xml_diff>
--- a/HelpMyStreetFE/HelpMyStreetFE/src/pptx/Icons.pptx
+++ b/HelpMyStreetFE/HelpMyStreetFE/src/pptx/Icons.pptx
@@ -9,9 +9,10 @@
     <p:sldId id="257" r:id="rId3"/>
     <p:sldId id="258" r:id="rId4"/>
     <p:sldId id="259" r:id="rId5"/>
-    <p:sldId id="261" r:id="rId6"/>
-    <p:sldId id="260" r:id="rId7"/>
-    <p:sldId id="262" r:id="rId8"/>
+    <p:sldId id="263" r:id="rId6"/>
+    <p:sldId id="261" r:id="rId7"/>
+    <p:sldId id="260" r:id="rId8"/>
+    <p:sldId id="262" r:id="rId9"/>
   </p:sldIdLst>
   <p:sldSz cx="12192000" cy="6858000"/>
   <p:notesSz cx="6858000" cy="9144000"/>
@@ -267,7 +268,7 @@
           <a:p>
             <a:fld id="{B2EC5630-BBBD-40F6-B459-AD74AAD6AD00}" type="datetimeFigureOut">
               <a:rPr lang="en-GB" smtClean="0"/>
-              <a:t>17/08/2021</a:t>
+              <a:t>15/12/2021</a:t>
             </a:fld>
             <a:endParaRPr lang="en-GB"/>
           </a:p>
@@ -467,7 +468,7 @@
           <a:p>
             <a:fld id="{B2EC5630-BBBD-40F6-B459-AD74AAD6AD00}" type="datetimeFigureOut">
               <a:rPr lang="en-GB" smtClean="0"/>
-              <a:t>17/08/2021</a:t>
+              <a:t>15/12/2021</a:t>
             </a:fld>
             <a:endParaRPr lang="en-GB"/>
           </a:p>
@@ -677,7 +678,7 @@
           <a:p>
             <a:fld id="{B2EC5630-BBBD-40F6-B459-AD74AAD6AD00}" type="datetimeFigureOut">
               <a:rPr lang="en-GB" smtClean="0"/>
-              <a:t>17/08/2021</a:t>
+              <a:t>15/12/2021</a:t>
             </a:fld>
             <a:endParaRPr lang="en-GB"/>
           </a:p>
@@ -877,7 +878,7 @@
           <a:p>
             <a:fld id="{B2EC5630-BBBD-40F6-B459-AD74AAD6AD00}" type="datetimeFigureOut">
               <a:rPr lang="en-GB" smtClean="0"/>
-              <a:t>17/08/2021</a:t>
+              <a:t>15/12/2021</a:t>
             </a:fld>
             <a:endParaRPr lang="en-GB"/>
           </a:p>
@@ -1153,7 +1154,7 @@
           <a:p>
             <a:fld id="{B2EC5630-BBBD-40F6-B459-AD74AAD6AD00}" type="datetimeFigureOut">
               <a:rPr lang="en-GB" smtClean="0"/>
-              <a:t>17/08/2021</a:t>
+              <a:t>15/12/2021</a:t>
             </a:fld>
             <a:endParaRPr lang="en-GB"/>
           </a:p>
@@ -1421,7 +1422,7 @@
           <a:p>
             <a:fld id="{B2EC5630-BBBD-40F6-B459-AD74AAD6AD00}" type="datetimeFigureOut">
               <a:rPr lang="en-GB" smtClean="0"/>
-              <a:t>17/08/2021</a:t>
+              <a:t>15/12/2021</a:t>
             </a:fld>
             <a:endParaRPr lang="en-GB"/>
           </a:p>
@@ -1836,7 +1837,7 @@
           <a:p>
             <a:fld id="{B2EC5630-BBBD-40F6-B459-AD74AAD6AD00}" type="datetimeFigureOut">
               <a:rPr lang="en-GB" smtClean="0"/>
-              <a:t>17/08/2021</a:t>
+              <a:t>15/12/2021</a:t>
             </a:fld>
             <a:endParaRPr lang="en-GB"/>
           </a:p>
@@ -1978,7 +1979,7 @@
           <a:p>
             <a:fld id="{B2EC5630-BBBD-40F6-B459-AD74AAD6AD00}" type="datetimeFigureOut">
               <a:rPr lang="en-GB" smtClean="0"/>
-              <a:t>17/08/2021</a:t>
+              <a:t>15/12/2021</a:t>
             </a:fld>
             <a:endParaRPr lang="en-GB"/>
           </a:p>
@@ -2091,7 +2092,7 @@
           <a:p>
             <a:fld id="{B2EC5630-BBBD-40F6-B459-AD74AAD6AD00}" type="datetimeFigureOut">
               <a:rPr lang="en-GB" smtClean="0"/>
-              <a:t>17/08/2021</a:t>
+              <a:t>15/12/2021</a:t>
             </a:fld>
             <a:endParaRPr lang="en-GB"/>
           </a:p>
@@ -2404,7 +2405,7 @@
           <a:p>
             <a:fld id="{B2EC5630-BBBD-40F6-B459-AD74AAD6AD00}" type="datetimeFigureOut">
               <a:rPr lang="en-GB" smtClean="0"/>
-              <a:t>17/08/2021</a:t>
+              <a:t>15/12/2021</a:t>
             </a:fld>
             <a:endParaRPr lang="en-GB"/>
           </a:p>
@@ -2693,7 +2694,7 @@
           <a:p>
             <a:fld id="{B2EC5630-BBBD-40F6-B459-AD74AAD6AD00}" type="datetimeFigureOut">
               <a:rPr lang="en-GB" smtClean="0"/>
-              <a:t>17/08/2021</a:t>
+              <a:t>15/12/2021</a:t>
             </a:fld>
             <a:endParaRPr lang="en-GB"/>
           </a:p>
@@ -2936,7 +2937,7 @@
           <a:p>
             <a:fld id="{B2EC5630-BBBD-40F6-B459-AD74AAD6AD00}" type="datetimeFigureOut">
               <a:rPr lang="en-GB" smtClean="0"/>
-              <a:t>17/08/2021</a:t>
+              <a:t>15/12/2021</a:t>
             </a:fld>
             <a:endParaRPr lang="en-GB"/>
           </a:p>
@@ -15802,6 +15803,745 @@
           <a:chExt cx="0" cy="0"/>
         </a:xfrm>
       </p:grpSpPr>
+      <p:grpSp>
+        <p:nvGrpSpPr>
+          <p:cNvPr id="6" name="Graphic 4">
+            <a:extLst>
+              <a:ext uri="{FF2B5EF4-FFF2-40B4-BE49-F238E27FC236}">
+                <a16:creationId xmlns:a16="http://schemas.microsoft.com/office/drawing/2014/main" id="{32FFD390-3FA3-4B99-9AFC-A525985DA6B7}"/>
+              </a:ext>
+            </a:extLst>
+          </p:cNvPr>
+          <p:cNvGrpSpPr/>
+          <p:nvPr/>
+        </p:nvGrpSpPr>
+        <p:grpSpPr>
+          <a:xfrm>
+            <a:off x="3657600" y="2666980"/>
+            <a:ext cx="4876800" cy="2590847"/>
+            <a:chOff x="3657600" y="2666980"/>
+            <a:chExt cx="4876800" cy="2590847"/>
+          </a:xfrm>
+          <a:solidFill>
+            <a:srgbClr val="001489"/>
+          </a:solidFill>
+        </p:grpSpPr>
+        <p:sp>
+          <p:nvSpPr>
+            <p:cNvPr id="7" name="Freeform: Shape 6">
+              <a:extLst>
+                <a:ext uri="{FF2B5EF4-FFF2-40B4-BE49-F238E27FC236}">
+                  <a16:creationId xmlns:a16="http://schemas.microsoft.com/office/drawing/2014/main" id="{B7520C4C-3347-4945-B00F-A5C0EC55871B}"/>
+                </a:ext>
+              </a:extLst>
+            </p:cNvPr>
+            <p:cNvSpPr/>
+            <p:nvPr/>
+          </p:nvSpPr>
+          <p:spPr>
+            <a:xfrm>
+              <a:off x="5330626" y="4201155"/>
+              <a:ext cx="1532412" cy="485182"/>
+            </a:xfrm>
+            <a:custGeom>
+              <a:avLst/>
+              <a:gdLst>
+                <a:gd name="connsiteX0" fmla="*/ 1328072 w 1532412"/>
+                <a:gd name="connsiteY0" fmla="*/ 13924 h 485182"/>
+                <a:gd name="connsiteX1" fmla="*/ 765373 w 1532412"/>
+                <a:gd name="connsiteY1" fmla="*/ 199423 h 485182"/>
+                <a:gd name="connsiteX2" fmla="*/ 204494 w 1532412"/>
+                <a:gd name="connsiteY2" fmla="*/ 15115 h 485182"/>
+                <a:gd name="connsiteX3" fmla="*/ 13984 w 1532412"/>
+                <a:gd name="connsiteY3" fmla="*/ 82447 h 485182"/>
+                <a:gd name="connsiteX4" fmla="*/ 81317 w 1532412"/>
+                <a:gd name="connsiteY4" fmla="*/ 272956 h 485182"/>
+                <a:gd name="connsiteX5" fmla="*/ 765364 w 1532412"/>
+                <a:gd name="connsiteY5" fmla="*/ 485183 h 485182"/>
+                <a:gd name="connsiteX6" fmla="*/ 1450945 w 1532412"/>
+                <a:gd name="connsiteY6" fmla="*/ 271918 h 485182"/>
+                <a:gd name="connsiteX7" fmla="*/ 1518496 w 1532412"/>
+                <a:gd name="connsiteY7" fmla="*/ 81494 h 485182"/>
+                <a:gd name="connsiteX8" fmla="*/ 1328072 w 1532412"/>
+                <a:gd name="connsiteY8" fmla="*/ 13924 h 485182"/>
+              </a:gdLst>
+              <a:ahLst/>
+              <a:cxnLst>
+                <a:cxn ang="0">
+                  <a:pos x="connsiteX0" y="connsiteY0"/>
+                </a:cxn>
+                <a:cxn ang="0">
+                  <a:pos x="connsiteX1" y="connsiteY1"/>
+                </a:cxn>
+                <a:cxn ang="0">
+                  <a:pos x="connsiteX2" y="connsiteY2"/>
+                </a:cxn>
+                <a:cxn ang="0">
+                  <a:pos x="connsiteX3" y="connsiteY3"/>
+                </a:cxn>
+                <a:cxn ang="0">
+                  <a:pos x="connsiteX4" y="connsiteY4"/>
+                </a:cxn>
+                <a:cxn ang="0">
+                  <a:pos x="connsiteX5" y="connsiteY5"/>
+                </a:cxn>
+                <a:cxn ang="0">
+                  <a:pos x="connsiteX6" y="connsiteY6"/>
+                </a:cxn>
+                <a:cxn ang="0">
+                  <a:pos x="connsiteX7" y="connsiteY7"/>
+                </a:cxn>
+                <a:cxn ang="0">
+                  <a:pos x="connsiteX8" y="connsiteY8"/>
+                </a:cxn>
+              </a:cxnLst>
+              <a:rect l="l" t="t" r="r" b="b"/>
+              <a:pathLst>
+                <a:path w="1532412" h="485182">
+                  <a:moveTo>
+                    <a:pt x="1328072" y="13924"/>
+                  </a:moveTo>
+                  <a:cubicBezTo>
+                    <a:pt x="1091471" y="126614"/>
+                    <a:pt x="870606" y="199423"/>
+                    <a:pt x="765373" y="199423"/>
+                  </a:cubicBezTo>
+                  <a:cubicBezTo>
+                    <a:pt x="657379" y="199423"/>
+                    <a:pt x="442476" y="128795"/>
+                    <a:pt x="204494" y="15115"/>
+                  </a:cubicBezTo>
+                  <a:cubicBezTo>
+                    <a:pt x="133275" y="-18899"/>
+                    <a:pt x="48008" y="11247"/>
+                    <a:pt x="13984" y="82447"/>
+                  </a:cubicBezTo>
+                  <a:cubicBezTo>
+                    <a:pt x="-20020" y="153646"/>
+                    <a:pt x="10117" y="238943"/>
+                    <a:pt x="81317" y="272956"/>
+                  </a:cubicBezTo>
+                  <a:cubicBezTo>
+                    <a:pt x="247223" y="352214"/>
+                    <a:pt x="556700" y="485183"/>
+                    <a:pt x="765364" y="485183"/>
+                  </a:cubicBezTo>
+                  <a:cubicBezTo>
+                    <a:pt x="972266" y="485183"/>
+                    <a:pt x="1283705" y="351566"/>
+                    <a:pt x="1450945" y="271918"/>
+                  </a:cubicBezTo>
+                  <a:cubicBezTo>
+                    <a:pt x="1522182" y="237990"/>
+                    <a:pt x="1552424" y="152732"/>
+                    <a:pt x="1518496" y="81494"/>
+                  </a:cubicBezTo>
+                  <a:cubicBezTo>
+                    <a:pt x="1484578" y="10238"/>
+                    <a:pt x="1399329" y="-20023"/>
+                    <a:pt x="1328072" y="13924"/>
+                  </a:cubicBezTo>
+                  <a:close/>
+                </a:path>
+              </a:pathLst>
+            </a:custGeom>
+            <a:solidFill>
+              <a:srgbClr val="001489"/>
+            </a:solidFill>
+            <a:ln w="9525" cap="flat">
+              <a:noFill/>
+              <a:prstDash val="solid"/>
+              <a:miter/>
+            </a:ln>
+          </p:spPr>
+          <p:txBody>
+            <a:bodyPr rtlCol="0" anchor="ctr"/>
+            <a:lstStyle/>
+            <a:p>
+              <a:endParaRPr lang="en-GB"/>
+            </a:p>
+          </p:txBody>
+        </p:sp>
+        <p:sp>
+          <p:nvSpPr>
+            <p:cNvPr id="8" name="Freeform: Shape 7">
+              <a:extLst>
+                <a:ext uri="{FF2B5EF4-FFF2-40B4-BE49-F238E27FC236}">
+                  <a16:creationId xmlns:a16="http://schemas.microsoft.com/office/drawing/2014/main" id="{114E4F2F-246A-4752-AE45-D6A88F550A67}"/>
+                </a:ext>
+              </a:extLst>
+            </p:cNvPr>
+            <p:cNvSpPr/>
+            <p:nvPr/>
+          </p:nvSpPr>
+          <p:spPr>
+            <a:xfrm>
+              <a:off x="5275239" y="3257578"/>
+              <a:ext cx="1643489" cy="443458"/>
+            </a:xfrm>
+            <a:custGeom>
+              <a:avLst/>
+              <a:gdLst>
+                <a:gd name="connsiteX0" fmla="*/ 185472 w 1643489"/>
+                <a:gd name="connsiteY0" fmla="*/ 436226 h 443458"/>
+                <a:gd name="connsiteX1" fmla="*/ 820761 w 1643489"/>
+                <a:gd name="connsiteY1" fmla="*/ 285750 h 443458"/>
+                <a:gd name="connsiteX2" fmla="*/ 1457841 w 1643489"/>
+                <a:gd name="connsiteY2" fmla="*/ 436874 h 443458"/>
+                <a:gd name="connsiteX3" fmla="*/ 1636911 w 1643489"/>
+                <a:gd name="connsiteY3" fmla="*/ 343272 h 443458"/>
+                <a:gd name="connsiteX4" fmla="*/ 1543308 w 1643489"/>
+                <a:gd name="connsiteY4" fmla="*/ 164201 h 443458"/>
+                <a:gd name="connsiteX5" fmla="*/ 820770 w 1643489"/>
+                <a:gd name="connsiteY5" fmla="*/ 0 h 443458"/>
+                <a:gd name="connsiteX6" fmla="*/ 100347 w 1643489"/>
+                <a:gd name="connsiteY6" fmla="*/ 163458 h 443458"/>
+                <a:gd name="connsiteX7" fmla="*/ 6526 w 1643489"/>
+                <a:gd name="connsiteY7" fmla="*/ 342414 h 443458"/>
+                <a:gd name="connsiteX8" fmla="*/ 185472 w 1643489"/>
+                <a:gd name="connsiteY8" fmla="*/ 436226 h 443458"/>
+              </a:gdLst>
+              <a:ahLst/>
+              <a:cxnLst>
+                <a:cxn ang="0">
+                  <a:pos x="connsiteX0" y="connsiteY0"/>
+                </a:cxn>
+                <a:cxn ang="0">
+                  <a:pos x="connsiteX1" y="connsiteY1"/>
+                </a:cxn>
+                <a:cxn ang="0">
+                  <a:pos x="connsiteX2" y="connsiteY2"/>
+                </a:cxn>
+                <a:cxn ang="0">
+                  <a:pos x="connsiteX3" y="connsiteY3"/>
+                </a:cxn>
+                <a:cxn ang="0">
+                  <a:pos x="connsiteX4" y="connsiteY4"/>
+                </a:cxn>
+                <a:cxn ang="0">
+                  <a:pos x="connsiteX5" y="connsiteY5"/>
+                </a:cxn>
+                <a:cxn ang="0">
+                  <a:pos x="connsiteX6" y="connsiteY6"/>
+                </a:cxn>
+                <a:cxn ang="0">
+                  <a:pos x="connsiteX7" y="connsiteY7"/>
+                </a:cxn>
+                <a:cxn ang="0">
+                  <a:pos x="connsiteX8" y="connsiteY8"/>
+                </a:cxn>
+              </a:cxnLst>
+              <a:rect l="l" t="t" r="r" b="b"/>
+              <a:pathLst>
+                <a:path w="1643489" h="443458">
+                  <a:moveTo>
+                    <a:pt x="185472" y="436226"/>
+                  </a:moveTo>
+                  <a:cubicBezTo>
+                    <a:pt x="426616" y="360959"/>
+                    <a:pt x="609039" y="285750"/>
+                    <a:pt x="820761" y="285750"/>
+                  </a:cubicBezTo>
+                  <a:cubicBezTo>
+                    <a:pt x="1031273" y="285750"/>
+                    <a:pt x="1212381" y="359931"/>
+                    <a:pt x="1457841" y="436874"/>
+                  </a:cubicBezTo>
+                  <a:cubicBezTo>
+                    <a:pt x="1533393" y="460553"/>
+                    <a:pt x="1613384" y="418309"/>
+                    <a:pt x="1636911" y="343272"/>
+                  </a:cubicBezTo>
+                  <a:cubicBezTo>
+                    <a:pt x="1660513" y="267976"/>
+                    <a:pt x="1618603" y="187804"/>
+                    <a:pt x="1543308" y="164201"/>
+                  </a:cubicBezTo>
+                  <a:cubicBezTo>
+                    <a:pt x="1291305" y="85220"/>
+                    <a:pt x="1082117" y="0"/>
+                    <a:pt x="820770" y="0"/>
+                  </a:cubicBezTo>
+                  <a:cubicBezTo>
+                    <a:pt x="558881" y="0"/>
+                    <a:pt x="350159" y="85487"/>
+                    <a:pt x="100347" y="163458"/>
+                  </a:cubicBezTo>
+                  <a:cubicBezTo>
+                    <a:pt x="25023" y="186966"/>
+                    <a:pt x="-16982" y="267091"/>
+                    <a:pt x="6526" y="342414"/>
+                  </a:cubicBezTo>
+                  <a:cubicBezTo>
+                    <a:pt x="30033" y="417738"/>
+                    <a:pt x="110177" y="459724"/>
+                    <a:pt x="185472" y="436226"/>
+                  </a:cubicBezTo>
+                  <a:close/>
+                </a:path>
+              </a:pathLst>
+            </a:custGeom>
+            <a:solidFill>
+              <a:srgbClr val="001489"/>
+            </a:solidFill>
+            <a:ln w="9525" cap="flat">
+              <a:noFill/>
+              <a:prstDash val="solid"/>
+              <a:miter/>
+            </a:ln>
+          </p:spPr>
+          <p:txBody>
+            <a:bodyPr rtlCol="0" anchor="ctr"/>
+            <a:lstStyle/>
+            <a:p>
+              <a:endParaRPr lang="en-GB"/>
+            </a:p>
+          </p:txBody>
+        </p:sp>
+        <p:sp>
+          <p:nvSpPr>
+            <p:cNvPr id="9" name="Freeform: Shape 8">
+              <a:extLst>
+                <a:ext uri="{FF2B5EF4-FFF2-40B4-BE49-F238E27FC236}">
+                  <a16:creationId xmlns:a16="http://schemas.microsoft.com/office/drawing/2014/main" id="{96C8A980-82A0-40D0-A49E-DD76CAC1CDA2}"/>
+                </a:ext>
+              </a:extLst>
+            </p:cNvPr>
+            <p:cNvSpPr/>
+            <p:nvPr/>
+          </p:nvSpPr>
+          <p:spPr>
+            <a:xfrm>
+              <a:off x="3657600" y="2666980"/>
+              <a:ext cx="4876800" cy="2590847"/>
+            </a:xfrm>
+            <a:custGeom>
+              <a:avLst/>
+              <a:gdLst>
+                <a:gd name="connsiteX0" fmla="*/ 920848 w 4876800"/>
+                <a:gd name="connsiteY0" fmla="*/ 1995326 h 2590847"/>
+                <a:gd name="connsiteX1" fmla="*/ 922144 w 4876800"/>
+                <a:gd name="connsiteY1" fmla="*/ 1996174 h 2590847"/>
+                <a:gd name="connsiteX2" fmla="*/ 2438400 w 4876800"/>
+                <a:gd name="connsiteY2" fmla="*/ 2590848 h 2590847"/>
+                <a:gd name="connsiteX3" fmla="*/ 3955942 w 4876800"/>
+                <a:gd name="connsiteY3" fmla="*/ 1995345 h 2590847"/>
+                <a:gd name="connsiteX4" fmla="*/ 4876800 w 4876800"/>
+                <a:gd name="connsiteY4" fmla="*/ 586883 h 2590847"/>
+                <a:gd name="connsiteX5" fmla="*/ 4297861 w 4876800"/>
+                <a:gd name="connsiteY5" fmla="*/ 67 h 2590847"/>
+                <a:gd name="connsiteX6" fmla="*/ 3785149 w 4876800"/>
+                <a:gd name="connsiteY6" fmla="*/ 301990 h 2590847"/>
+                <a:gd name="connsiteX7" fmla="*/ 3201648 w 4876800"/>
+                <a:gd name="connsiteY7" fmla="*/ 168964 h 2590847"/>
+                <a:gd name="connsiteX8" fmla="*/ 2438400 w 4876800"/>
+                <a:gd name="connsiteY8" fmla="*/ 19107 h 2590847"/>
+                <a:gd name="connsiteX9" fmla="*/ 1675152 w 4876800"/>
+                <a:gd name="connsiteY9" fmla="*/ 168964 h 2590847"/>
+                <a:gd name="connsiteX10" fmla="*/ 1091651 w 4876800"/>
+                <a:gd name="connsiteY10" fmla="*/ 301990 h 2590847"/>
+                <a:gd name="connsiteX11" fmla="*/ 578939 w 4876800"/>
+                <a:gd name="connsiteY11" fmla="*/ 67 h 2590847"/>
+                <a:gd name="connsiteX12" fmla="*/ 0 w 4876800"/>
+                <a:gd name="connsiteY12" fmla="*/ 586883 h 2590847"/>
+                <a:gd name="connsiteX13" fmla="*/ 920848 w 4876800"/>
+                <a:gd name="connsiteY13" fmla="*/ 1995326 h 2590847"/>
+                <a:gd name="connsiteX14" fmla="*/ 4293689 w 4876800"/>
+                <a:gd name="connsiteY14" fmla="*/ 285779 h 2590847"/>
+                <a:gd name="connsiteX15" fmla="*/ 4591050 w 4876800"/>
+                <a:gd name="connsiteY15" fmla="*/ 586883 h 2590847"/>
+                <a:gd name="connsiteX16" fmla="*/ 3949865 w 4876800"/>
+                <a:gd name="connsiteY16" fmla="*/ 1640691 h 2590847"/>
+                <a:gd name="connsiteX17" fmla="*/ 3876675 w 4876800"/>
+                <a:gd name="connsiteY17" fmla="*/ 1162098 h 2590847"/>
+                <a:gd name="connsiteX18" fmla="*/ 4016178 w 4876800"/>
+                <a:gd name="connsiteY18" fmla="*/ 482632 h 2590847"/>
+                <a:gd name="connsiteX19" fmla="*/ 4293689 w 4876800"/>
+                <a:gd name="connsiteY19" fmla="*/ 285779 h 2590847"/>
+                <a:gd name="connsiteX20" fmla="*/ 1763373 w 4876800"/>
+                <a:gd name="connsiteY20" fmla="*/ 440741 h 2590847"/>
+                <a:gd name="connsiteX21" fmla="*/ 2438400 w 4876800"/>
+                <a:gd name="connsiteY21" fmla="*/ 304848 h 2590847"/>
+                <a:gd name="connsiteX22" fmla="*/ 3113427 w 4876800"/>
+                <a:gd name="connsiteY22" fmla="*/ 440741 h 2590847"/>
+                <a:gd name="connsiteX23" fmla="*/ 3682194 w 4876800"/>
+                <a:gd name="connsiteY23" fmla="*/ 579882 h 2590847"/>
+                <a:gd name="connsiteX24" fmla="*/ 3590925 w 4876800"/>
+                <a:gd name="connsiteY24" fmla="*/ 1162098 h 2590847"/>
+                <a:gd name="connsiteX25" fmla="*/ 3704006 w 4876800"/>
+                <a:gd name="connsiteY25" fmla="*/ 1815770 h 2590847"/>
+                <a:gd name="connsiteX26" fmla="*/ 2438400 w 4876800"/>
+                <a:gd name="connsiteY26" fmla="*/ 2305098 h 2590847"/>
+                <a:gd name="connsiteX27" fmla="*/ 1172956 w 4876800"/>
+                <a:gd name="connsiteY27" fmla="*/ 1815265 h 2590847"/>
+                <a:gd name="connsiteX28" fmla="*/ 1285875 w 4876800"/>
+                <a:gd name="connsiteY28" fmla="*/ 1162098 h 2590847"/>
+                <a:gd name="connsiteX29" fmla="*/ 1194607 w 4876800"/>
+                <a:gd name="connsiteY29" fmla="*/ 579882 h 2590847"/>
+                <a:gd name="connsiteX30" fmla="*/ 1763373 w 4876800"/>
+                <a:gd name="connsiteY30" fmla="*/ 440741 h 2590847"/>
+                <a:gd name="connsiteX31" fmla="*/ 583111 w 4876800"/>
+                <a:gd name="connsiteY31" fmla="*/ 285779 h 2590847"/>
+                <a:gd name="connsiteX32" fmla="*/ 860631 w 4876800"/>
+                <a:gd name="connsiteY32" fmla="*/ 482642 h 2590847"/>
+                <a:gd name="connsiteX33" fmla="*/ 1000125 w 4876800"/>
+                <a:gd name="connsiteY33" fmla="*/ 1162098 h 2590847"/>
+                <a:gd name="connsiteX34" fmla="*/ 926697 w 4876800"/>
+                <a:gd name="connsiteY34" fmla="*/ 1640891 h 2590847"/>
+                <a:gd name="connsiteX35" fmla="*/ 285750 w 4876800"/>
+                <a:gd name="connsiteY35" fmla="*/ 586883 h 2590847"/>
+                <a:gd name="connsiteX36" fmla="*/ 583111 w 4876800"/>
+                <a:gd name="connsiteY36" fmla="*/ 285779 h 2590847"/>
+              </a:gdLst>
+              <a:ahLst/>
+              <a:cxnLst>
+                <a:cxn ang="0">
+                  <a:pos x="connsiteX0" y="connsiteY0"/>
+                </a:cxn>
+                <a:cxn ang="0">
+                  <a:pos x="connsiteX1" y="connsiteY1"/>
+                </a:cxn>
+                <a:cxn ang="0">
+                  <a:pos x="connsiteX2" y="connsiteY2"/>
+                </a:cxn>
+                <a:cxn ang="0">
+                  <a:pos x="connsiteX3" y="connsiteY3"/>
+                </a:cxn>
+                <a:cxn ang="0">
+                  <a:pos x="connsiteX4" y="connsiteY4"/>
+                </a:cxn>
+                <a:cxn ang="0">
+                  <a:pos x="connsiteX5" y="connsiteY5"/>
+                </a:cxn>
+                <a:cxn ang="0">
+                  <a:pos x="connsiteX6" y="connsiteY6"/>
+                </a:cxn>
+                <a:cxn ang="0">
+                  <a:pos x="connsiteX7" y="connsiteY7"/>
+                </a:cxn>
+                <a:cxn ang="0">
+                  <a:pos x="connsiteX8" y="connsiteY8"/>
+                </a:cxn>
+                <a:cxn ang="0">
+                  <a:pos x="connsiteX9" y="connsiteY9"/>
+                </a:cxn>
+                <a:cxn ang="0">
+                  <a:pos x="connsiteX10" y="connsiteY10"/>
+                </a:cxn>
+                <a:cxn ang="0">
+                  <a:pos x="connsiteX11" y="connsiteY11"/>
+                </a:cxn>
+                <a:cxn ang="0">
+                  <a:pos x="connsiteX12" y="connsiteY12"/>
+                </a:cxn>
+                <a:cxn ang="0">
+                  <a:pos x="connsiteX13" y="connsiteY13"/>
+                </a:cxn>
+                <a:cxn ang="0">
+                  <a:pos x="connsiteX14" y="connsiteY14"/>
+                </a:cxn>
+                <a:cxn ang="0">
+                  <a:pos x="connsiteX15" y="connsiteY15"/>
+                </a:cxn>
+                <a:cxn ang="0">
+                  <a:pos x="connsiteX16" y="connsiteY16"/>
+                </a:cxn>
+                <a:cxn ang="0">
+                  <a:pos x="connsiteX17" y="connsiteY17"/>
+                </a:cxn>
+                <a:cxn ang="0">
+                  <a:pos x="connsiteX18" y="connsiteY18"/>
+                </a:cxn>
+                <a:cxn ang="0">
+                  <a:pos x="connsiteX19" y="connsiteY19"/>
+                </a:cxn>
+                <a:cxn ang="0">
+                  <a:pos x="connsiteX20" y="connsiteY20"/>
+                </a:cxn>
+                <a:cxn ang="0">
+                  <a:pos x="connsiteX21" y="connsiteY21"/>
+                </a:cxn>
+                <a:cxn ang="0">
+                  <a:pos x="connsiteX22" y="connsiteY22"/>
+                </a:cxn>
+                <a:cxn ang="0">
+                  <a:pos x="connsiteX23" y="connsiteY23"/>
+                </a:cxn>
+                <a:cxn ang="0">
+                  <a:pos x="connsiteX24" y="connsiteY24"/>
+                </a:cxn>
+                <a:cxn ang="0">
+                  <a:pos x="connsiteX25" y="connsiteY25"/>
+                </a:cxn>
+                <a:cxn ang="0">
+                  <a:pos x="connsiteX26" y="connsiteY26"/>
+                </a:cxn>
+                <a:cxn ang="0">
+                  <a:pos x="connsiteX27" y="connsiteY27"/>
+                </a:cxn>
+                <a:cxn ang="0">
+                  <a:pos x="connsiteX28" y="connsiteY28"/>
+                </a:cxn>
+                <a:cxn ang="0">
+                  <a:pos x="connsiteX29" y="connsiteY29"/>
+                </a:cxn>
+                <a:cxn ang="0">
+                  <a:pos x="connsiteX30" y="connsiteY30"/>
+                </a:cxn>
+                <a:cxn ang="0">
+                  <a:pos x="connsiteX31" y="connsiteY31"/>
+                </a:cxn>
+                <a:cxn ang="0">
+                  <a:pos x="connsiteX32" y="connsiteY32"/>
+                </a:cxn>
+                <a:cxn ang="0">
+                  <a:pos x="connsiteX33" y="connsiteY33"/>
+                </a:cxn>
+                <a:cxn ang="0">
+                  <a:pos x="connsiteX34" y="connsiteY34"/>
+                </a:cxn>
+                <a:cxn ang="0">
+                  <a:pos x="connsiteX35" y="connsiteY35"/>
+                </a:cxn>
+                <a:cxn ang="0">
+                  <a:pos x="connsiteX36" y="connsiteY36"/>
+                </a:cxn>
+              </a:cxnLst>
+              <a:rect l="l" t="t" r="r" b="b"/>
+              <a:pathLst>
+                <a:path w="4876800" h="2590847">
+                  <a:moveTo>
+                    <a:pt x="920848" y="1995326"/>
+                  </a:moveTo>
+                  <a:cubicBezTo>
+                    <a:pt x="921277" y="1995612"/>
+                    <a:pt x="921715" y="1995888"/>
+                    <a:pt x="922144" y="1996174"/>
+                  </a:cubicBezTo>
+                  <a:cubicBezTo>
+                    <a:pt x="1291400" y="2236394"/>
+                    <a:pt x="1980876" y="2590848"/>
+                    <a:pt x="2438400" y="2590848"/>
+                  </a:cubicBezTo>
+                  <a:cubicBezTo>
+                    <a:pt x="2892324" y="2590848"/>
+                    <a:pt x="3609499" y="2225821"/>
+                    <a:pt x="3955942" y="1995345"/>
+                  </a:cubicBezTo>
+                  <a:cubicBezTo>
+                    <a:pt x="3993690" y="1970170"/>
+                    <a:pt x="4876800" y="1372334"/>
+                    <a:pt x="4876800" y="586883"/>
+                  </a:cubicBezTo>
+                  <a:cubicBezTo>
+                    <a:pt x="4876800" y="247126"/>
+                    <a:pt x="4612843" y="4658"/>
+                    <a:pt x="4297861" y="67"/>
+                  </a:cubicBezTo>
+                  <a:cubicBezTo>
+                    <a:pt x="4078119" y="-3143"/>
+                    <a:pt x="3888400" y="110633"/>
+                    <a:pt x="3785149" y="301990"/>
+                  </a:cubicBezTo>
+                  <a:cubicBezTo>
+                    <a:pt x="3570551" y="288665"/>
+                    <a:pt x="3390691" y="230324"/>
+                    <a:pt x="3201648" y="168964"/>
+                  </a:cubicBezTo>
+                  <a:cubicBezTo>
+                    <a:pt x="2974686" y="95288"/>
+                    <a:pt x="2739990" y="19107"/>
+                    <a:pt x="2438400" y="19107"/>
+                  </a:cubicBezTo>
+                  <a:cubicBezTo>
+                    <a:pt x="2136810" y="19107"/>
+                    <a:pt x="1902114" y="95288"/>
+                    <a:pt x="1675152" y="168964"/>
+                  </a:cubicBezTo>
+                  <a:cubicBezTo>
+                    <a:pt x="1486110" y="230324"/>
+                    <a:pt x="1306249" y="288674"/>
+                    <a:pt x="1091651" y="301990"/>
+                  </a:cubicBezTo>
+                  <a:cubicBezTo>
+                    <a:pt x="988400" y="110633"/>
+                    <a:pt x="798700" y="-3162"/>
+                    <a:pt x="578939" y="67"/>
+                  </a:cubicBezTo>
+                  <a:cubicBezTo>
+                    <a:pt x="265024" y="4639"/>
+                    <a:pt x="0" y="245993"/>
+                    <a:pt x="0" y="586883"/>
+                  </a:cubicBezTo>
+                  <a:cubicBezTo>
+                    <a:pt x="0" y="1372257"/>
+                    <a:pt x="882929" y="1970056"/>
+                    <a:pt x="920848" y="1995326"/>
+                  </a:cubicBezTo>
+                  <a:close/>
+                  <a:moveTo>
+                    <a:pt x="4293689" y="285779"/>
+                  </a:moveTo>
+                  <a:cubicBezTo>
+                    <a:pt x="4441460" y="287932"/>
+                    <a:pt x="4591050" y="392049"/>
+                    <a:pt x="4591050" y="586883"/>
+                  </a:cubicBezTo>
+                  <a:cubicBezTo>
+                    <a:pt x="4591050" y="1043817"/>
+                    <a:pt x="4180389" y="1449162"/>
+                    <a:pt x="3949865" y="1640691"/>
+                  </a:cubicBezTo>
+                  <a:cubicBezTo>
+                    <a:pt x="3914575" y="1513971"/>
+                    <a:pt x="3876675" y="1337177"/>
+                    <a:pt x="3876675" y="1162098"/>
+                  </a:cubicBezTo>
+                  <a:cubicBezTo>
+                    <a:pt x="3876675" y="986314"/>
+                    <a:pt x="3918499" y="739426"/>
+                    <a:pt x="4016178" y="482632"/>
+                  </a:cubicBezTo>
+                  <a:cubicBezTo>
+                    <a:pt x="4063089" y="357512"/>
+                    <a:pt x="4167226" y="283836"/>
+                    <a:pt x="4293689" y="285779"/>
+                  </a:cubicBezTo>
+                  <a:close/>
+                  <a:moveTo>
+                    <a:pt x="1763373" y="440741"/>
+                  </a:moveTo>
+                  <a:cubicBezTo>
+                    <a:pt x="1978676" y="370856"/>
+                    <a:pt x="2182025" y="304848"/>
+                    <a:pt x="2438400" y="304848"/>
+                  </a:cubicBezTo>
+                  <a:cubicBezTo>
+                    <a:pt x="2694775" y="304848"/>
+                    <a:pt x="2898134" y="370856"/>
+                    <a:pt x="3113427" y="440741"/>
+                  </a:cubicBezTo>
+                  <a:cubicBezTo>
+                    <a:pt x="3289221" y="497805"/>
+                    <a:pt x="3469624" y="556365"/>
+                    <a:pt x="3682194" y="579882"/>
+                  </a:cubicBezTo>
+                  <a:cubicBezTo>
+                    <a:pt x="3639674" y="726767"/>
+                    <a:pt x="3590925" y="942966"/>
+                    <a:pt x="3590925" y="1162098"/>
+                  </a:cubicBezTo>
+                  <a:cubicBezTo>
+                    <a:pt x="3590925" y="1420311"/>
+                    <a:pt x="3658581" y="1674305"/>
+                    <a:pt x="3704006" y="1815770"/>
+                  </a:cubicBezTo>
+                  <a:cubicBezTo>
+                    <a:pt x="3410903" y="1992449"/>
+                    <a:pt x="2814323" y="2305098"/>
+                    <a:pt x="2438400" y="2305098"/>
+                  </a:cubicBezTo>
+                  <a:cubicBezTo>
+                    <a:pt x="2030759" y="2305098"/>
+                    <a:pt x="1408709" y="1956712"/>
+                    <a:pt x="1172956" y="1815265"/>
+                  </a:cubicBezTo>
+                  <a:cubicBezTo>
+                    <a:pt x="1218381" y="1673695"/>
+                    <a:pt x="1285875" y="1420006"/>
+                    <a:pt x="1285875" y="1162098"/>
+                  </a:cubicBezTo>
+                  <a:cubicBezTo>
+                    <a:pt x="1285875" y="942966"/>
+                    <a:pt x="1237126" y="726767"/>
+                    <a:pt x="1194607" y="579882"/>
+                  </a:cubicBezTo>
+                  <a:cubicBezTo>
+                    <a:pt x="1407166" y="556365"/>
+                    <a:pt x="1587579" y="497805"/>
+                    <a:pt x="1763373" y="440741"/>
+                  </a:cubicBezTo>
+                  <a:close/>
+                  <a:moveTo>
+                    <a:pt x="583111" y="285779"/>
+                  </a:moveTo>
+                  <a:cubicBezTo>
+                    <a:pt x="709689" y="283855"/>
+                    <a:pt x="813702" y="357512"/>
+                    <a:pt x="860631" y="482642"/>
+                  </a:cubicBezTo>
+                  <a:cubicBezTo>
+                    <a:pt x="939622" y="695344"/>
+                    <a:pt x="1000125" y="936222"/>
+                    <a:pt x="1000125" y="1162098"/>
+                  </a:cubicBezTo>
+                  <a:cubicBezTo>
+                    <a:pt x="1000125" y="1336567"/>
+                    <a:pt x="962063" y="1513809"/>
+                    <a:pt x="926697" y="1640891"/>
+                  </a:cubicBezTo>
+                  <a:cubicBezTo>
+                    <a:pt x="696125" y="1449810"/>
+                    <a:pt x="285750" y="1045312"/>
+                    <a:pt x="285750" y="586883"/>
+                  </a:cubicBezTo>
+                  <a:cubicBezTo>
+                    <a:pt x="285750" y="392049"/>
+                    <a:pt x="435340" y="287932"/>
+                    <a:pt x="583111" y="285779"/>
+                  </a:cubicBezTo>
+                  <a:close/>
+                </a:path>
+              </a:pathLst>
+            </a:custGeom>
+            <a:solidFill>
+              <a:srgbClr val="001489"/>
+            </a:solidFill>
+            <a:ln w="9525" cap="flat">
+              <a:noFill/>
+              <a:prstDash val="solid"/>
+              <a:miter/>
+            </a:ln>
+          </p:spPr>
+          <p:txBody>
+            <a:bodyPr rtlCol="0" anchor="ctr"/>
+            <a:lstStyle/>
+            <a:p>
+              <a:endParaRPr lang="en-GB"/>
+            </a:p>
+          </p:txBody>
+        </p:sp>
+      </p:grpSp>
+    </p:spTree>
+    <p:extLst>
+      <p:ext uri="{BB962C8B-B14F-4D97-AF65-F5344CB8AC3E}">
+        <p14:creationId xmlns:p14="http://schemas.microsoft.com/office/powerpoint/2010/main" val="1291089930"/>
+      </p:ext>
+    </p:extLst>
+  </p:cSld>
+  <p:clrMapOvr>
+    <a:masterClrMapping/>
+  </p:clrMapOvr>
+</p:sld>
+</file>
+
+<file path=ppt/slides/slide6.xml><?xml version="1.0" encoding="utf-8"?>
+<p:sld xmlns:a="http://schemas.openxmlformats.org/drawingml/2006/main" xmlns:r="http://schemas.openxmlformats.org/officeDocument/2006/relationships" xmlns:p="http://schemas.openxmlformats.org/presentationml/2006/main">
+  <p:cSld>
+    <p:spTree>
+      <p:nvGrpSpPr>
+        <p:cNvPr id="1" name=""/>
+        <p:cNvGrpSpPr/>
+        <p:nvPr/>
+      </p:nvGrpSpPr>
+      <p:grpSpPr>
+        <a:xfrm>
+          <a:off x="0" y="0"/>
+          <a:ext cx="0" cy="0"/>
+          <a:chOff x="0" y="0"/>
+          <a:chExt cx="0" cy="0"/>
+        </a:xfrm>
+      </p:grpSpPr>
       <p:graphicFrame>
         <p:nvGraphicFramePr>
           <p:cNvPr id="4" name="Content Placeholder 3">
@@ -16328,7 +17068,7 @@
 </p:sld>
 </file>
 
-<file path=ppt/slides/slide6.xml><?xml version="1.0" encoding="utf-8"?>
+<file path=ppt/slides/slide7.xml><?xml version="1.0" encoding="utf-8"?>
 <p:sld xmlns:a="http://schemas.openxmlformats.org/drawingml/2006/main" xmlns:r="http://schemas.openxmlformats.org/officeDocument/2006/relationships" xmlns:p="http://schemas.openxmlformats.org/presentationml/2006/main">
   <p:cSld>
     <p:spTree>
@@ -16499,7 +17239,7 @@
 </p:sld>
 </file>
 
-<file path=ppt/slides/slide7.xml><?xml version="1.0" encoding="utf-8"?>
+<file path=ppt/slides/slide8.xml><?xml version="1.0" encoding="utf-8"?>
 <p:sld xmlns:a="http://schemas.openxmlformats.org/drawingml/2006/main" xmlns:r="http://schemas.openxmlformats.org/officeDocument/2006/relationships" xmlns:p="http://schemas.openxmlformats.org/presentationml/2006/main">
   <p:cSld>
     <p:spTree>

</xml_diff>

<commit_message>
Tweaks based on feedback
</commit_message>
<xml_diff>
--- a/HelpMyStreetFE/HelpMyStreetFE/src/pptx/Icons.pptx
+++ b/HelpMyStreetFE/HelpMyStreetFE/src/pptx/Icons.pptx
@@ -268,7 +268,7 @@
           <a:p>
             <a:fld id="{B2EC5630-BBBD-40F6-B459-AD74AAD6AD00}" type="datetimeFigureOut">
               <a:rPr lang="en-GB" smtClean="0"/>
-              <a:t>15/12/2021</a:t>
+              <a:t>07/02/2022</a:t>
             </a:fld>
             <a:endParaRPr lang="en-GB"/>
           </a:p>
@@ -468,7 +468,7 @@
           <a:p>
             <a:fld id="{B2EC5630-BBBD-40F6-B459-AD74AAD6AD00}" type="datetimeFigureOut">
               <a:rPr lang="en-GB" smtClean="0"/>
-              <a:t>15/12/2021</a:t>
+              <a:t>07/02/2022</a:t>
             </a:fld>
             <a:endParaRPr lang="en-GB"/>
           </a:p>
@@ -678,7 +678,7 @@
           <a:p>
             <a:fld id="{B2EC5630-BBBD-40F6-B459-AD74AAD6AD00}" type="datetimeFigureOut">
               <a:rPr lang="en-GB" smtClean="0"/>
-              <a:t>15/12/2021</a:t>
+              <a:t>07/02/2022</a:t>
             </a:fld>
             <a:endParaRPr lang="en-GB"/>
           </a:p>
@@ -878,7 +878,7 @@
           <a:p>
             <a:fld id="{B2EC5630-BBBD-40F6-B459-AD74AAD6AD00}" type="datetimeFigureOut">
               <a:rPr lang="en-GB" smtClean="0"/>
-              <a:t>15/12/2021</a:t>
+              <a:t>07/02/2022</a:t>
             </a:fld>
             <a:endParaRPr lang="en-GB"/>
           </a:p>
@@ -1154,7 +1154,7 @@
           <a:p>
             <a:fld id="{B2EC5630-BBBD-40F6-B459-AD74AAD6AD00}" type="datetimeFigureOut">
               <a:rPr lang="en-GB" smtClean="0"/>
-              <a:t>15/12/2021</a:t>
+              <a:t>07/02/2022</a:t>
             </a:fld>
             <a:endParaRPr lang="en-GB"/>
           </a:p>
@@ -1422,7 +1422,7 @@
           <a:p>
             <a:fld id="{B2EC5630-BBBD-40F6-B459-AD74AAD6AD00}" type="datetimeFigureOut">
               <a:rPr lang="en-GB" smtClean="0"/>
-              <a:t>15/12/2021</a:t>
+              <a:t>07/02/2022</a:t>
             </a:fld>
             <a:endParaRPr lang="en-GB"/>
           </a:p>
@@ -1837,7 +1837,7 @@
           <a:p>
             <a:fld id="{B2EC5630-BBBD-40F6-B459-AD74AAD6AD00}" type="datetimeFigureOut">
               <a:rPr lang="en-GB" smtClean="0"/>
-              <a:t>15/12/2021</a:t>
+              <a:t>07/02/2022</a:t>
             </a:fld>
             <a:endParaRPr lang="en-GB"/>
           </a:p>
@@ -1979,7 +1979,7 @@
           <a:p>
             <a:fld id="{B2EC5630-BBBD-40F6-B459-AD74AAD6AD00}" type="datetimeFigureOut">
               <a:rPr lang="en-GB" smtClean="0"/>
-              <a:t>15/12/2021</a:t>
+              <a:t>07/02/2022</a:t>
             </a:fld>
             <a:endParaRPr lang="en-GB"/>
           </a:p>
@@ -2092,7 +2092,7 @@
           <a:p>
             <a:fld id="{B2EC5630-BBBD-40F6-B459-AD74AAD6AD00}" type="datetimeFigureOut">
               <a:rPr lang="en-GB" smtClean="0"/>
-              <a:t>15/12/2021</a:t>
+              <a:t>07/02/2022</a:t>
             </a:fld>
             <a:endParaRPr lang="en-GB"/>
           </a:p>
@@ -2405,7 +2405,7 @@
           <a:p>
             <a:fld id="{B2EC5630-BBBD-40F6-B459-AD74AAD6AD00}" type="datetimeFigureOut">
               <a:rPr lang="en-GB" smtClean="0"/>
-              <a:t>15/12/2021</a:t>
+              <a:t>07/02/2022</a:t>
             </a:fld>
             <a:endParaRPr lang="en-GB"/>
           </a:p>
@@ -2694,7 +2694,7 @@
           <a:p>
             <a:fld id="{B2EC5630-BBBD-40F6-B459-AD74AAD6AD00}" type="datetimeFigureOut">
               <a:rPr lang="en-GB" smtClean="0"/>
-              <a:t>15/12/2021</a:t>
+              <a:t>07/02/2022</a:t>
             </a:fld>
             <a:endParaRPr lang="en-GB"/>
           </a:p>
@@ -2937,7 +2937,7 @@
           <a:p>
             <a:fld id="{B2EC5630-BBBD-40F6-B459-AD74AAD6AD00}" type="datetimeFigureOut">
               <a:rPr lang="en-GB" smtClean="0"/>
-              <a:t>15/12/2021</a:t>
+              <a:t>07/02/2022</a:t>
             </a:fld>
             <a:endParaRPr lang="en-GB"/>
           </a:p>
@@ -16909,7 +16909,7 @@
                     <a:lstStyle/>
                     <a:p>
                       <a:r>
-                        <a:rPr lang="en-GB"/>
+                        <a:rPr lang="en-GB" dirty="0"/>
                         <a:t>#574AE2</a:t>
                       </a:r>
                     </a:p>
@@ -17525,6 +17525,1755 @@
           </p:txBody>
         </p:sp>
       </p:grpSp>
+      <p:grpSp>
+        <p:nvGrpSpPr>
+          <p:cNvPr id="11" name="Group 10">
+            <a:extLst>
+              <a:ext uri="{FF2B5EF4-FFF2-40B4-BE49-F238E27FC236}">
+                <a16:creationId xmlns:a16="http://schemas.microsoft.com/office/drawing/2014/main" id="{37439A5B-6107-482F-9920-08F625A4398B}"/>
+              </a:ext>
+            </a:extLst>
+          </p:cNvPr>
+          <p:cNvGrpSpPr/>
+          <p:nvPr/>
+        </p:nvGrpSpPr>
+        <p:grpSpPr>
+          <a:xfrm>
+            <a:off x="1805445" y="3609277"/>
+            <a:ext cx="595312" cy="704850"/>
+            <a:chOff x="1805445" y="3609277"/>
+            <a:chExt cx="595312" cy="704850"/>
+          </a:xfrm>
+        </p:grpSpPr>
+        <p:sp>
+          <p:nvSpPr>
+            <p:cNvPr id="3" name="Freeform: Shape 2">
+              <a:extLst>
+                <a:ext uri="{FF2B5EF4-FFF2-40B4-BE49-F238E27FC236}">
+                  <a16:creationId xmlns:a16="http://schemas.microsoft.com/office/drawing/2014/main" id="{8028FCAC-7065-4C62-B72E-CFF2090678C7}"/>
+                </a:ext>
+              </a:extLst>
+            </p:cNvPr>
+            <p:cNvSpPr/>
+            <p:nvPr/>
+          </p:nvSpPr>
+          <p:spPr>
+            <a:xfrm>
+              <a:off x="1996659" y="3609277"/>
+              <a:ext cx="65246" cy="172402"/>
+            </a:xfrm>
+            <a:custGeom>
+              <a:avLst/>
+              <a:gdLst>
+                <a:gd name="connsiteX0" fmla="*/ 19288 w 65246"/>
+                <a:gd name="connsiteY0" fmla="*/ 140018 h 172402"/>
+                <a:gd name="connsiteX1" fmla="*/ 19288 w 65246"/>
+                <a:gd name="connsiteY1" fmla="*/ 166688 h 172402"/>
+                <a:gd name="connsiteX2" fmla="*/ 32623 w 65246"/>
+                <a:gd name="connsiteY2" fmla="*/ 172403 h 172402"/>
+                <a:gd name="connsiteX3" fmla="*/ 45958 w 65246"/>
+                <a:gd name="connsiteY3" fmla="*/ 166688 h 172402"/>
+                <a:gd name="connsiteX4" fmla="*/ 45958 w 65246"/>
+                <a:gd name="connsiteY4" fmla="*/ 72390 h 172402"/>
+                <a:gd name="connsiteX5" fmla="*/ 45958 w 65246"/>
+                <a:gd name="connsiteY5" fmla="*/ 32385 h 172402"/>
+                <a:gd name="connsiteX6" fmla="*/ 45958 w 65246"/>
+                <a:gd name="connsiteY6" fmla="*/ 5715 h 172402"/>
+                <a:gd name="connsiteX7" fmla="*/ 19288 w 65246"/>
+                <a:gd name="connsiteY7" fmla="*/ 5715 h 172402"/>
+                <a:gd name="connsiteX8" fmla="*/ 19288 w 65246"/>
+                <a:gd name="connsiteY8" fmla="*/ 100013 h 172402"/>
+                <a:gd name="connsiteX9" fmla="*/ 19288 w 65246"/>
+                <a:gd name="connsiteY9" fmla="*/ 140018 h 172402"/>
+              </a:gdLst>
+              <a:ahLst/>
+              <a:cxnLst>
+                <a:cxn ang="0">
+                  <a:pos x="connsiteX0" y="connsiteY0"/>
+                </a:cxn>
+                <a:cxn ang="0">
+                  <a:pos x="connsiteX1" y="connsiteY1"/>
+                </a:cxn>
+                <a:cxn ang="0">
+                  <a:pos x="connsiteX2" y="connsiteY2"/>
+                </a:cxn>
+                <a:cxn ang="0">
+                  <a:pos x="connsiteX3" y="connsiteY3"/>
+                </a:cxn>
+                <a:cxn ang="0">
+                  <a:pos x="connsiteX4" y="connsiteY4"/>
+                </a:cxn>
+                <a:cxn ang="0">
+                  <a:pos x="connsiteX5" y="connsiteY5"/>
+                </a:cxn>
+                <a:cxn ang="0">
+                  <a:pos x="connsiteX6" y="connsiteY6"/>
+                </a:cxn>
+                <a:cxn ang="0">
+                  <a:pos x="connsiteX7" y="connsiteY7"/>
+                </a:cxn>
+                <a:cxn ang="0">
+                  <a:pos x="connsiteX8" y="connsiteY8"/>
+                </a:cxn>
+                <a:cxn ang="0">
+                  <a:pos x="connsiteX9" y="connsiteY9"/>
+                </a:cxn>
+              </a:cxnLst>
+              <a:rect l="l" t="t" r="r" b="b"/>
+              <a:pathLst>
+                <a:path w="65246" h="172402">
+                  <a:moveTo>
+                    <a:pt x="19288" y="140018"/>
+                  </a:moveTo>
+                  <a:cubicBezTo>
+                    <a:pt x="11668" y="147638"/>
+                    <a:pt x="11668" y="159068"/>
+                    <a:pt x="19288" y="166688"/>
+                  </a:cubicBezTo>
+                  <a:cubicBezTo>
+                    <a:pt x="23098" y="170498"/>
+                    <a:pt x="27861" y="172403"/>
+                    <a:pt x="32623" y="172403"/>
+                  </a:cubicBezTo>
+                  <a:cubicBezTo>
+                    <a:pt x="37386" y="172403"/>
+                    <a:pt x="42148" y="170498"/>
+                    <a:pt x="45958" y="166688"/>
+                  </a:cubicBezTo>
+                  <a:cubicBezTo>
+                    <a:pt x="71676" y="140970"/>
+                    <a:pt x="71676" y="98107"/>
+                    <a:pt x="45958" y="72390"/>
+                  </a:cubicBezTo>
+                  <a:cubicBezTo>
+                    <a:pt x="34528" y="60960"/>
+                    <a:pt x="34528" y="42862"/>
+                    <a:pt x="45958" y="32385"/>
+                  </a:cubicBezTo>
+                  <a:cubicBezTo>
+                    <a:pt x="53578" y="24765"/>
+                    <a:pt x="53578" y="13335"/>
+                    <a:pt x="45958" y="5715"/>
+                  </a:cubicBezTo>
+                  <a:cubicBezTo>
+                    <a:pt x="38338" y="-1905"/>
+                    <a:pt x="26908" y="-1905"/>
+                    <a:pt x="19288" y="5715"/>
+                  </a:cubicBezTo>
+                  <a:cubicBezTo>
+                    <a:pt x="-6429" y="31433"/>
+                    <a:pt x="-6429" y="74295"/>
+                    <a:pt x="19288" y="100013"/>
+                  </a:cubicBezTo>
+                  <a:cubicBezTo>
+                    <a:pt x="29766" y="111443"/>
+                    <a:pt x="29766" y="129540"/>
+                    <a:pt x="19288" y="140018"/>
+                  </a:cubicBezTo>
+                  <a:close/>
+                </a:path>
+              </a:pathLst>
+            </a:custGeom>
+            <a:solidFill>
+              <a:srgbClr val="574AE2"/>
+            </a:solidFill>
+            <a:ln w="9525" cap="flat">
+              <a:noFill/>
+              <a:prstDash val="solid"/>
+              <a:miter/>
+            </a:ln>
+          </p:spPr>
+          <p:txBody>
+            <a:bodyPr rtlCol="0" anchor="ctr"/>
+            <a:lstStyle/>
+            <a:p>
+              <a:endParaRPr lang="en-GB"/>
+            </a:p>
+          </p:txBody>
+        </p:sp>
+        <p:sp>
+          <p:nvSpPr>
+            <p:cNvPr id="4" name="Freeform: Shape 3">
+              <a:extLst>
+                <a:ext uri="{FF2B5EF4-FFF2-40B4-BE49-F238E27FC236}">
+                  <a16:creationId xmlns:a16="http://schemas.microsoft.com/office/drawing/2014/main" id="{4FB55279-B804-4AA8-A3B5-68432427E213}"/>
+                </a:ext>
+              </a:extLst>
+            </p:cNvPr>
+            <p:cNvSpPr/>
+            <p:nvPr/>
+          </p:nvSpPr>
+          <p:spPr>
+            <a:xfrm>
+              <a:off x="2100481" y="3665474"/>
+              <a:ext cx="65246" cy="172402"/>
+            </a:xfrm>
+            <a:custGeom>
+              <a:avLst/>
+              <a:gdLst>
+                <a:gd name="connsiteX0" fmla="*/ 19288 w 65246"/>
+                <a:gd name="connsiteY0" fmla="*/ 140018 h 172402"/>
+                <a:gd name="connsiteX1" fmla="*/ 19288 w 65246"/>
+                <a:gd name="connsiteY1" fmla="*/ 166688 h 172402"/>
+                <a:gd name="connsiteX2" fmla="*/ 32623 w 65246"/>
+                <a:gd name="connsiteY2" fmla="*/ 172403 h 172402"/>
+                <a:gd name="connsiteX3" fmla="*/ 45958 w 65246"/>
+                <a:gd name="connsiteY3" fmla="*/ 166688 h 172402"/>
+                <a:gd name="connsiteX4" fmla="*/ 45958 w 65246"/>
+                <a:gd name="connsiteY4" fmla="*/ 72390 h 172402"/>
+                <a:gd name="connsiteX5" fmla="*/ 45958 w 65246"/>
+                <a:gd name="connsiteY5" fmla="*/ 32385 h 172402"/>
+                <a:gd name="connsiteX6" fmla="*/ 45958 w 65246"/>
+                <a:gd name="connsiteY6" fmla="*/ 5715 h 172402"/>
+                <a:gd name="connsiteX7" fmla="*/ 19288 w 65246"/>
+                <a:gd name="connsiteY7" fmla="*/ 5715 h 172402"/>
+                <a:gd name="connsiteX8" fmla="*/ 19288 w 65246"/>
+                <a:gd name="connsiteY8" fmla="*/ 100012 h 172402"/>
+                <a:gd name="connsiteX9" fmla="*/ 19288 w 65246"/>
+                <a:gd name="connsiteY9" fmla="*/ 140018 h 172402"/>
+              </a:gdLst>
+              <a:ahLst/>
+              <a:cxnLst>
+                <a:cxn ang="0">
+                  <a:pos x="connsiteX0" y="connsiteY0"/>
+                </a:cxn>
+                <a:cxn ang="0">
+                  <a:pos x="connsiteX1" y="connsiteY1"/>
+                </a:cxn>
+                <a:cxn ang="0">
+                  <a:pos x="connsiteX2" y="connsiteY2"/>
+                </a:cxn>
+                <a:cxn ang="0">
+                  <a:pos x="connsiteX3" y="connsiteY3"/>
+                </a:cxn>
+                <a:cxn ang="0">
+                  <a:pos x="connsiteX4" y="connsiteY4"/>
+                </a:cxn>
+                <a:cxn ang="0">
+                  <a:pos x="connsiteX5" y="connsiteY5"/>
+                </a:cxn>
+                <a:cxn ang="0">
+                  <a:pos x="connsiteX6" y="connsiteY6"/>
+                </a:cxn>
+                <a:cxn ang="0">
+                  <a:pos x="connsiteX7" y="connsiteY7"/>
+                </a:cxn>
+                <a:cxn ang="0">
+                  <a:pos x="connsiteX8" y="connsiteY8"/>
+                </a:cxn>
+                <a:cxn ang="0">
+                  <a:pos x="connsiteX9" y="connsiteY9"/>
+                </a:cxn>
+              </a:cxnLst>
+              <a:rect l="l" t="t" r="r" b="b"/>
+              <a:pathLst>
+                <a:path w="65246" h="172402">
+                  <a:moveTo>
+                    <a:pt x="19288" y="140018"/>
+                  </a:moveTo>
+                  <a:cubicBezTo>
+                    <a:pt x="11668" y="147638"/>
+                    <a:pt x="11668" y="159067"/>
+                    <a:pt x="19288" y="166688"/>
+                  </a:cubicBezTo>
+                  <a:cubicBezTo>
+                    <a:pt x="23098" y="170497"/>
+                    <a:pt x="27861" y="172403"/>
+                    <a:pt x="32623" y="172403"/>
+                  </a:cubicBezTo>
+                  <a:cubicBezTo>
+                    <a:pt x="37386" y="172403"/>
+                    <a:pt x="42148" y="170497"/>
+                    <a:pt x="45958" y="166688"/>
+                  </a:cubicBezTo>
+                  <a:cubicBezTo>
+                    <a:pt x="71676" y="140970"/>
+                    <a:pt x="71676" y="98108"/>
+                    <a:pt x="45958" y="72390"/>
+                  </a:cubicBezTo>
+                  <a:cubicBezTo>
+                    <a:pt x="34528" y="60960"/>
+                    <a:pt x="34528" y="42862"/>
+                    <a:pt x="45958" y="32385"/>
+                  </a:cubicBezTo>
+                  <a:cubicBezTo>
+                    <a:pt x="53578" y="24765"/>
+                    <a:pt x="53578" y="13335"/>
+                    <a:pt x="45958" y="5715"/>
+                  </a:cubicBezTo>
+                  <a:cubicBezTo>
+                    <a:pt x="38338" y="-1905"/>
+                    <a:pt x="26908" y="-1905"/>
+                    <a:pt x="19288" y="5715"/>
+                  </a:cubicBezTo>
+                  <a:cubicBezTo>
+                    <a:pt x="-6429" y="31433"/>
+                    <a:pt x="-6429" y="74295"/>
+                    <a:pt x="19288" y="100012"/>
+                  </a:cubicBezTo>
+                  <a:cubicBezTo>
+                    <a:pt x="30718" y="110490"/>
+                    <a:pt x="30718" y="128587"/>
+                    <a:pt x="19288" y="140018"/>
+                  </a:cubicBezTo>
+                  <a:close/>
+                </a:path>
+              </a:pathLst>
+            </a:custGeom>
+            <a:solidFill>
+              <a:srgbClr val="574AE2"/>
+            </a:solidFill>
+            <a:ln w="9525" cap="flat">
+              <a:noFill/>
+              <a:prstDash val="solid"/>
+              <a:miter/>
+            </a:ln>
+          </p:spPr>
+          <p:txBody>
+            <a:bodyPr rtlCol="0" anchor="ctr"/>
+            <a:lstStyle/>
+            <a:p>
+              <a:endParaRPr lang="en-GB"/>
+            </a:p>
+          </p:txBody>
+        </p:sp>
+        <p:sp>
+          <p:nvSpPr>
+            <p:cNvPr id="9" name="Freeform: Shape 8">
+              <a:extLst>
+                <a:ext uri="{FF2B5EF4-FFF2-40B4-BE49-F238E27FC236}">
+                  <a16:creationId xmlns:a16="http://schemas.microsoft.com/office/drawing/2014/main" id="{C4ED162E-05B8-4F45-8359-0E1EB55E18A7}"/>
+                </a:ext>
+              </a:extLst>
+            </p:cNvPr>
+            <p:cNvSpPr/>
+            <p:nvPr/>
+          </p:nvSpPr>
+          <p:spPr>
+            <a:xfrm>
+              <a:off x="1901409" y="3665474"/>
+              <a:ext cx="65246" cy="172402"/>
+            </a:xfrm>
+            <a:custGeom>
+              <a:avLst/>
+              <a:gdLst>
+                <a:gd name="connsiteX0" fmla="*/ 19288 w 65246"/>
+                <a:gd name="connsiteY0" fmla="*/ 140018 h 172402"/>
+                <a:gd name="connsiteX1" fmla="*/ 19288 w 65246"/>
+                <a:gd name="connsiteY1" fmla="*/ 166688 h 172402"/>
+                <a:gd name="connsiteX2" fmla="*/ 32623 w 65246"/>
+                <a:gd name="connsiteY2" fmla="*/ 172403 h 172402"/>
+                <a:gd name="connsiteX3" fmla="*/ 45958 w 65246"/>
+                <a:gd name="connsiteY3" fmla="*/ 166688 h 172402"/>
+                <a:gd name="connsiteX4" fmla="*/ 45958 w 65246"/>
+                <a:gd name="connsiteY4" fmla="*/ 72390 h 172402"/>
+                <a:gd name="connsiteX5" fmla="*/ 45958 w 65246"/>
+                <a:gd name="connsiteY5" fmla="*/ 32385 h 172402"/>
+                <a:gd name="connsiteX6" fmla="*/ 45958 w 65246"/>
+                <a:gd name="connsiteY6" fmla="*/ 5715 h 172402"/>
+                <a:gd name="connsiteX7" fmla="*/ 19288 w 65246"/>
+                <a:gd name="connsiteY7" fmla="*/ 5715 h 172402"/>
+                <a:gd name="connsiteX8" fmla="*/ 19288 w 65246"/>
+                <a:gd name="connsiteY8" fmla="*/ 100012 h 172402"/>
+                <a:gd name="connsiteX9" fmla="*/ 19288 w 65246"/>
+                <a:gd name="connsiteY9" fmla="*/ 140018 h 172402"/>
+              </a:gdLst>
+              <a:ahLst/>
+              <a:cxnLst>
+                <a:cxn ang="0">
+                  <a:pos x="connsiteX0" y="connsiteY0"/>
+                </a:cxn>
+                <a:cxn ang="0">
+                  <a:pos x="connsiteX1" y="connsiteY1"/>
+                </a:cxn>
+                <a:cxn ang="0">
+                  <a:pos x="connsiteX2" y="connsiteY2"/>
+                </a:cxn>
+                <a:cxn ang="0">
+                  <a:pos x="connsiteX3" y="connsiteY3"/>
+                </a:cxn>
+                <a:cxn ang="0">
+                  <a:pos x="connsiteX4" y="connsiteY4"/>
+                </a:cxn>
+                <a:cxn ang="0">
+                  <a:pos x="connsiteX5" y="connsiteY5"/>
+                </a:cxn>
+                <a:cxn ang="0">
+                  <a:pos x="connsiteX6" y="connsiteY6"/>
+                </a:cxn>
+                <a:cxn ang="0">
+                  <a:pos x="connsiteX7" y="connsiteY7"/>
+                </a:cxn>
+                <a:cxn ang="0">
+                  <a:pos x="connsiteX8" y="connsiteY8"/>
+                </a:cxn>
+                <a:cxn ang="0">
+                  <a:pos x="connsiteX9" y="connsiteY9"/>
+                </a:cxn>
+              </a:cxnLst>
+              <a:rect l="l" t="t" r="r" b="b"/>
+              <a:pathLst>
+                <a:path w="65246" h="172402">
+                  <a:moveTo>
+                    <a:pt x="19288" y="140018"/>
+                  </a:moveTo>
+                  <a:cubicBezTo>
+                    <a:pt x="11668" y="147638"/>
+                    <a:pt x="11668" y="159067"/>
+                    <a:pt x="19288" y="166688"/>
+                  </a:cubicBezTo>
+                  <a:cubicBezTo>
+                    <a:pt x="23098" y="170497"/>
+                    <a:pt x="27861" y="172403"/>
+                    <a:pt x="32623" y="172403"/>
+                  </a:cubicBezTo>
+                  <a:cubicBezTo>
+                    <a:pt x="37386" y="172403"/>
+                    <a:pt x="42148" y="170497"/>
+                    <a:pt x="45958" y="166688"/>
+                  </a:cubicBezTo>
+                  <a:cubicBezTo>
+                    <a:pt x="71676" y="140970"/>
+                    <a:pt x="71676" y="98108"/>
+                    <a:pt x="45958" y="72390"/>
+                  </a:cubicBezTo>
+                  <a:cubicBezTo>
+                    <a:pt x="34528" y="60960"/>
+                    <a:pt x="34528" y="42862"/>
+                    <a:pt x="45958" y="32385"/>
+                  </a:cubicBezTo>
+                  <a:cubicBezTo>
+                    <a:pt x="53578" y="24765"/>
+                    <a:pt x="53578" y="13335"/>
+                    <a:pt x="45958" y="5715"/>
+                  </a:cubicBezTo>
+                  <a:cubicBezTo>
+                    <a:pt x="38338" y="-1905"/>
+                    <a:pt x="26908" y="-1905"/>
+                    <a:pt x="19288" y="5715"/>
+                  </a:cubicBezTo>
+                  <a:cubicBezTo>
+                    <a:pt x="-6429" y="31433"/>
+                    <a:pt x="-6429" y="74295"/>
+                    <a:pt x="19288" y="100012"/>
+                  </a:cubicBezTo>
+                  <a:cubicBezTo>
+                    <a:pt x="29766" y="110490"/>
+                    <a:pt x="29766" y="128587"/>
+                    <a:pt x="19288" y="140018"/>
+                  </a:cubicBezTo>
+                  <a:close/>
+                </a:path>
+              </a:pathLst>
+            </a:custGeom>
+            <a:solidFill>
+              <a:srgbClr val="574AE2"/>
+            </a:solidFill>
+            <a:ln w="9525" cap="flat">
+              <a:noFill/>
+              <a:prstDash val="solid"/>
+              <a:miter/>
+            </a:ln>
+          </p:spPr>
+          <p:txBody>
+            <a:bodyPr rtlCol="0" anchor="ctr"/>
+            <a:lstStyle/>
+            <a:p>
+              <a:endParaRPr lang="en-GB"/>
+            </a:p>
+          </p:txBody>
+        </p:sp>
+        <p:sp>
+          <p:nvSpPr>
+            <p:cNvPr id="10" name="Freeform: Shape 9">
+              <a:extLst>
+                <a:ext uri="{FF2B5EF4-FFF2-40B4-BE49-F238E27FC236}">
+                  <a16:creationId xmlns:a16="http://schemas.microsoft.com/office/drawing/2014/main" id="{854443E9-309A-48C5-ADB1-07BFA061BD10}"/>
+                </a:ext>
+              </a:extLst>
+            </p:cNvPr>
+            <p:cNvSpPr/>
+            <p:nvPr/>
+          </p:nvSpPr>
+          <p:spPr>
+            <a:xfrm>
+              <a:off x="1805445" y="3895027"/>
+              <a:ext cx="595312" cy="419100"/>
+            </a:xfrm>
+            <a:custGeom>
+              <a:avLst/>
+              <a:gdLst>
+                <a:gd name="connsiteX0" fmla="*/ 346710 w 595312"/>
+                <a:gd name="connsiteY0" fmla="*/ 419100 h 419100"/>
+                <a:gd name="connsiteX1" fmla="*/ 401003 w 595312"/>
+                <a:gd name="connsiteY1" fmla="*/ 339090 h 419100"/>
+                <a:gd name="connsiteX2" fmla="*/ 450533 w 595312"/>
+                <a:gd name="connsiteY2" fmla="*/ 347663 h 419100"/>
+                <a:gd name="connsiteX3" fmla="*/ 595313 w 595312"/>
+                <a:gd name="connsiteY3" fmla="*/ 202883 h 419100"/>
+                <a:gd name="connsiteX4" fmla="*/ 457200 w 595312"/>
+                <a:gd name="connsiteY4" fmla="*/ 57150 h 419100"/>
+                <a:gd name="connsiteX5" fmla="*/ 457200 w 595312"/>
+                <a:gd name="connsiteY5" fmla="*/ 0 h 419100"/>
+                <a:gd name="connsiteX6" fmla="*/ 0 w 595312"/>
+                <a:gd name="connsiteY6" fmla="*/ 0 h 419100"/>
+                <a:gd name="connsiteX7" fmla="*/ 0 w 595312"/>
+                <a:gd name="connsiteY7" fmla="*/ 76200 h 419100"/>
+                <a:gd name="connsiteX8" fmla="*/ 110490 w 595312"/>
+                <a:gd name="connsiteY8" fmla="*/ 419100 h 419100"/>
+                <a:gd name="connsiteX9" fmla="*/ 346710 w 595312"/>
+                <a:gd name="connsiteY9" fmla="*/ 419100 h 419100"/>
+                <a:gd name="connsiteX10" fmla="*/ 456248 w 595312"/>
+                <a:gd name="connsiteY10" fmla="*/ 115252 h 419100"/>
+                <a:gd name="connsiteX11" fmla="*/ 538163 w 595312"/>
+                <a:gd name="connsiteY11" fmla="*/ 202883 h 419100"/>
+                <a:gd name="connsiteX12" fmla="*/ 449580 w 595312"/>
+                <a:gd name="connsiteY12" fmla="*/ 290513 h 419100"/>
+                <a:gd name="connsiteX13" fmla="*/ 422910 w 595312"/>
+                <a:gd name="connsiteY13" fmla="*/ 286703 h 419100"/>
+                <a:gd name="connsiteX14" fmla="*/ 456248 w 595312"/>
+                <a:gd name="connsiteY14" fmla="*/ 115252 h 419100"/>
+                <a:gd name="connsiteX15" fmla="*/ 95250 w 595312"/>
+                <a:gd name="connsiteY15" fmla="*/ 85725 h 419100"/>
+                <a:gd name="connsiteX16" fmla="*/ 142875 w 595312"/>
+                <a:gd name="connsiteY16" fmla="*/ 38100 h 419100"/>
+                <a:gd name="connsiteX17" fmla="*/ 190500 w 595312"/>
+                <a:gd name="connsiteY17" fmla="*/ 38100 h 419100"/>
+                <a:gd name="connsiteX18" fmla="*/ 238125 w 595312"/>
+                <a:gd name="connsiteY18" fmla="*/ 85725 h 419100"/>
+                <a:gd name="connsiteX19" fmla="*/ 238125 w 595312"/>
+                <a:gd name="connsiteY19" fmla="*/ 228600 h 419100"/>
+                <a:gd name="connsiteX20" fmla="*/ 95250 w 595312"/>
+                <a:gd name="connsiteY20" fmla="*/ 228600 h 419100"/>
+                <a:gd name="connsiteX21" fmla="*/ 95250 w 595312"/>
+                <a:gd name="connsiteY21" fmla="*/ 85725 h 419100"/>
+              </a:gdLst>
+              <a:ahLst/>
+              <a:cxnLst>
+                <a:cxn ang="0">
+                  <a:pos x="connsiteX0" y="connsiteY0"/>
+                </a:cxn>
+                <a:cxn ang="0">
+                  <a:pos x="connsiteX1" y="connsiteY1"/>
+                </a:cxn>
+                <a:cxn ang="0">
+                  <a:pos x="connsiteX2" y="connsiteY2"/>
+                </a:cxn>
+                <a:cxn ang="0">
+                  <a:pos x="connsiteX3" y="connsiteY3"/>
+                </a:cxn>
+                <a:cxn ang="0">
+                  <a:pos x="connsiteX4" y="connsiteY4"/>
+                </a:cxn>
+                <a:cxn ang="0">
+                  <a:pos x="connsiteX5" y="connsiteY5"/>
+                </a:cxn>
+                <a:cxn ang="0">
+                  <a:pos x="connsiteX6" y="connsiteY6"/>
+                </a:cxn>
+                <a:cxn ang="0">
+                  <a:pos x="connsiteX7" y="connsiteY7"/>
+                </a:cxn>
+                <a:cxn ang="0">
+                  <a:pos x="connsiteX8" y="connsiteY8"/>
+                </a:cxn>
+                <a:cxn ang="0">
+                  <a:pos x="connsiteX9" y="connsiteY9"/>
+                </a:cxn>
+                <a:cxn ang="0">
+                  <a:pos x="connsiteX10" y="connsiteY10"/>
+                </a:cxn>
+                <a:cxn ang="0">
+                  <a:pos x="connsiteX11" y="connsiteY11"/>
+                </a:cxn>
+                <a:cxn ang="0">
+                  <a:pos x="connsiteX12" y="connsiteY12"/>
+                </a:cxn>
+                <a:cxn ang="0">
+                  <a:pos x="connsiteX13" y="connsiteY13"/>
+                </a:cxn>
+                <a:cxn ang="0">
+                  <a:pos x="connsiteX14" y="connsiteY14"/>
+                </a:cxn>
+                <a:cxn ang="0">
+                  <a:pos x="connsiteX15" y="connsiteY15"/>
+                </a:cxn>
+                <a:cxn ang="0">
+                  <a:pos x="connsiteX16" y="connsiteY16"/>
+                </a:cxn>
+                <a:cxn ang="0">
+                  <a:pos x="connsiteX17" y="connsiteY17"/>
+                </a:cxn>
+                <a:cxn ang="0">
+                  <a:pos x="connsiteX18" y="connsiteY18"/>
+                </a:cxn>
+                <a:cxn ang="0">
+                  <a:pos x="connsiteX19" y="connsiteY19"/>
+                </a:cxn>
+                <a:cxn ang="0">
+                  <a:pos x="connsiteX20" y="connsiteY20"/>
+                </a:cxn>
+                <a:cxn ang="0">
+                  <a:pos x="connsiteX21" y="connsiteY21"/>
+                </a:cxn>
+              </a:cxnLst>
+              <a:rect l="l" t="t" r="r" b="b"/>
+              <a:pathLst>
+                <a:path w="595312" h="419100">
+                  <a:moveTo>
+                    <a:pt x="346710" y="419100"/>
+                  </a:moveTo>
+                  <a:cubicBezTo>
+                    <a:pt x="367665" y="397192"/>
+                    <a:pt x="385763" y="370523"/>
+                    <a:pt x="401003" y="339090"/>
+                  </a:cubicBezTo>
+                  <a:cubicBezTo>
+                    <a:pt x="416243" y="344805"/>
+                    <a:pt x="432435" y="347663"/>
+                    <a:pt x="450533" y="347663"/>
+                  </a:cubicBezTo>
+                  <a:cubicBezTo>
+                    <a:pt x="530543" y="347663"/>
+                    <a:pt x="595313" y="282892"/>
+                    <a:pt x="595313" y="202883"/>
+                  </a:cubicBezTo>
+                  <a:cubicBezTo>
+                    <a:pt x="594360" y="124777"/>
+                    <a:pt x="533400" y="60960"/>
+                    <a:pt x="457200" y="57150"/>
+                  </a:cubicBezTo>
+                  <a:lnTo>
+                    <a:pt x="457200" y="0"/>
+                  </a:lnTo>
+                  <a:lnTo>
+                    <a:pt x="0" y="0"/>
+                  </a:lnTo>
+                  <a:lnTo>
+                    <a:pt x="0" y="76200"/>
+                  </a:lnTo>
+                  <a:cubicBezTo>
+                    <a:pt x="0" y="221933"/>
+                    <a:pt x="43815" y="349567"/>
+                    <a:pt x="110490" y="419100"/>
+                  </a:cubicBezTo>
+                  <a:lnTo>
+                    <a:pt x="346710" y="419100"/>
+                  </a:lnTo>
+                  <a:close/>
+                  <a:moveTo>
+                    <a:pt x="456248" y="115252"/>
+                  </a:moveTo>
+                  <a:cubicBezTo>
+                    <a:pt x="501967" y="118110"/>
+                    <a:pt x="538163" y="156210"/>
+                    <a:pt x="538163" y="202883"/>
+                  </a:cubicBezTo>
+                  <a:cubicBezTo>
+                    <a:pt x="537210" y="251460"/>
+                    <a:pt x="498158" y="290513"/>
+                    <a:pt x="449580" y="290513"/>
+                  </a:cubicBezTo>
+                  <a:cubicBezTo>
+                    <a:pt x="440055" y="290513"/>
+                    <a:pt x="431483" y="288608"/>
+                    <a:pt x="422910" y="286703"/>
+                  </a:cubicBezTo>
+                  <a:cubicBezTo>
+                    <a:pt x="441008" y="236220"/>
+                    <a:pt x="452438" y="177165"/>
+                    <a:pt x="456248" y="115252"/>
+                  </a:cubicBezTo>
+                  <a:close/>
+                  <a:moveTo>
+                    <a:pt x="95250" y="85725"/>
+                  </a:moveTo>
+                  <a:lnTo>
+                    <a:pt x="142875" y="38100"/>
+                  </a:lnTo>
+                  <a:lnTo>
+                    <a:pt x="190500" y="38100"/>
+                  </a:lnTo>
+                  <a:lnTo>
+                    <a:pt x="238125" y="85725"/>
+                  </a:lnTo>
+                  <a:lnTo>
+                    <a:pt x="238125" y="228600"/>
+                  </a:lnTo>
+                  <a:lnTo>
+                    <a:pt x="95250" y="228600"/>
+                  </a:lnTo>
+                  <a:lnTo>
+                    <a:pt x="95250" y="85725"/>
+                  </a:lnTo>
+                  <a:close/>
+                </a:path>
+              </a:pathLst>
+            </a:custGeom>
+            <a:solidFill>
+              <a:srgbClr val="574AE2"/>
+            </a:solidFill>
+            <a:ln w="9525" cap="flat">
+              <a:noFill/>
+              <a:prstDash val="solid"/>
+              <a:miter/>
+            </a:ln>
+          </p:spPr>
+          <p:txBody>
+            <a:bodyPr rtlCol="0" anchor="ctr"/>
+            <a:lstStyle/>
+            <a:p>
+              <a:endParaRPr lang="en-GB"/>
+            </a:p>
+          </p:txBody>
+        </p:sp>
+      </p:grpSp>
+      <p:grpSp>
+        <p:nvGrpSpPr>
+          <p:cNvPr id="19" name="Group 18">
+            <a:extLst>
+              <a:ext uri="{FF2B5EF4-FFF2-40B4-BE49-F238E27FC236}">
+                <a16:creationId xmlns:a16="http://schemas.microsoft.com/office/drawing/2014/main" id="{CBEBE146-842F-421C-B82E-8DE367E08339}"/>
+              </a:ext>
+            </a:extLst>
+          </p:cNvPr>
+          <p:cNvGrpSpPr/>
+          <p:nvPr/>
+        </p:nvGrpSpPr>
+        <p:grpSpPr>
+          <a:xfrm>
+            <a:off x="4800513" y="2281075"/>
+            <a:ext cx="761280" cy="685800"/>
+            <a:chOff x="4800513" y="2281075"/>
+            <a:chExt cx="761280" cy="685800"/>
+          </a:xfrm>
+        </p:grpSpPr>
+        <p:sp>
+          <p:nvSpPr>
+            <p:cNvPr id="14" name="Freeform: Shape 13">
+              <a:extLst>
+                <a:ext uri="{FF2B5EF4-FFF2-40B4-BE49-F238E27FC236}">
+                  <a16:creationId xmlns:a16="http://schemas.microsoft.com/office/drawing/2014/main" id="{9AC1F0DC-86BB-4E85-9E07-B5466D81BFFE}"/>
+                </a:ext>
+              </a:extLst>
+            </p:cNvPr>
+            <p:cNvSpPr/>
+            <p:nvPr/>
+          </p:nvSpPr>
+          <p:spPr>
+            <a:xfrm rot="16391460">
+              <a:off x="4752266" y="2700175"/>
+              <a:ext cx="343433" cy="38100"/>
+            </a:xfrm>
+            <a:custGeom>
+              <a:avLst/>
+              <a:gdLst>
+                <a:gd name="connsiteX0" fmla="*/ 0 w 343433"/>
+                <a:gd name="connsiteY0" fmla="*/ 0 h 38100"/>
+                <a:gd name="connsiteX1" fmla="*/ 343434 w 343433"/>
+                <a:gd name="connsiteY1" fmla="*/ 0 h 38100"/>
+                <a:gd name="connsiteX2" fmla="*/ 343434 w 343433"/>
+                <a:gd name="connsiteY2" fmla="*/ 38100 h 38100"/>
+                <a:gd name="connsiteX3" fmla="*/ 0 w 343433"/>
+                <a:gd name="connsiteY3" fmla="*/ 38100 h 38100"/>
+              </a:gdLst>
+              <a:ahLst/>
+              <a:cxnLst>
+                <a:cxn ang="0">
+                  <a:pos x="connsiteX0" y="connsiteY0"/>
+                </a:cxn>
+                <a:cxn ang="0">
+                  <a:pos x="connsiteX1" y="connsiteY1"/>
+                </a:cxn>
+                <a:cxn ang="0">
+                  <a:pos x="connsiteX2" y="connsiteY2"/>
+                </a:cxn>
+                <a:cxn ang="0">
+                  <a:pos x="connsiteX3" y="connsiteY3"/>
+                </a:cxn>
+              </a:cxnLst>
+              <a:rect l="l" t="t" r="r" b="b"/>
+              <a:pathLst>
+                <a:path w="343433" h="38100">
+                  <a:moveTo>
+                    <a:pt x="0" y="0"/>
+                  </a:moveTo>
+                  <a:lnTo>
+                    <a:pt x="343434" y="0"/>
+                  </a:lnTo>
+                  <a:lnTo>
+                    <a:pt x="343434" y="38100"/>
+                  </a:lnTo>
+                  <a:lnTo>
+                    <a:pt x="0" y="38100"/>
+                  </a:lnTo>
+                  <a:close/>
+                </a:path>
+              </a:pathLst>
+            </a:custGeom>
+            <a:solidFill>
+              <a:srgbClr val="574AE2"/>
+            </a:solidFill>
+            <a:ln w="9525" cap="flat">
+              <a:noFill/>
+              <a:prstDash val="solid"/>
+              <a:miter/>
+            </a:ln>
+          </p:spPr>
+          <p:txBody>
+            <a:bodyPr rtlCol="0" anchor="ctr"/>
+            <a:lstStyle/>
+            <a:p>
+              <a:endParaRPr lang="en-GB"/>
+            </a:p>
+          </p:txBody>
+        </p:sp>
+        <p:sp>
+          <p:nvSpPr>
+            <p:cNvPr id="15" name="Freeform: Shape 14">
+              <a:extLst>
+                <a:ext uri="{FF2B5EF4-FFF2-40B4-BE49-F238E27FC236}">
+                  <a16:creationId xmlns:a16="http://schemas.microsoft.com/office/drawing/2014/main" id="{B8965206-4E47-4616-86DF-C45A299B8334}"/>
+                </a:ext>
+              </a:extLst>
+            </p:cNvPr>
+            <p:cNvSpPr/>
+            <p:nvPr/>
+          </p:nvSpPr>
+          <p:spPr>
+            <a:xfrm>
+              <a:off x="4800513" y="2281075"/>
+              <a:ext cx="351705" cy="685800"/>
+            </a:xfrm>
+            <a:custGeom>
+              <a:avLst/>
+              <a:gdLst>
+                <a:gd name="connsiteX0" fmla="*/ 333182 w 351705"/>
+                <a:gd name="connsiteY0" fmla="*/ 259861 h 685800"/>
+                <a:gd name="connsiteX1" fmla="*/ 324847 w 351705"/>
+                <a:gd name="connsiteY1" fmla="*/ 241106 h 685800"/>
+                <a:gd name="connsiteX2" fmla="*/ 285395 w 351705"/>
+                <a:gd name="connsiteY2" fmla="*/ 201663 h 685800"/>
+                <a:gd name="connsiteX3" fmla="*/ 285395 w 351705"/>
+                <a:gd name="connsiteY3" fmla="*/ 187862 h 685800"/>
+                <a:gd name="connsiteX4" fmla="*/ 292437 w 351705"/>
+                <a:gd name="connsiteY4" fmla="*/ 162081 h 685800"/>
+                <a:gd name="connsiteX5" fmla="*/ 285395 w 351705"/>
+                <a:gd name="connsiteY5" fmla="*/ 155038 h 685800"/>
+                <a:gd name="connsiteX6" fmla="*/ 285395 w 351705"/>
+                <a:gd name="connsiteY6" fmla="*/ 133350 h 685800"/>
+                <a:gd name="connsiteX7" fmla="*/ 284090 w 351705"/>
+                <a:gd name="connsiteY7" fmla="*/ 126549 h 685800"/>
+                <a:gd name="connsiteX8" fmla="*/ 298968 w 351705"/>
+                <a:gd name="connsiteY8" fmla="*/ 111719 h 685800"/>
+                <a:gd name="connsiteX9" fmla="*/ 311798 w 351705"/>
+                <a:gd name="connsiteY9" fmla="*/ 70999 h 685800"/>
+                <a:gd name="connsiteX10" fmla="*/ 175857 w 351705"/>
+                <a:gd name="connsiteY10" fmla="*/ 0 h 685800"/>
+                <a:gd name="connsiteX11" fmla="*/ 39916 w 351705"/>
+                <a:gd name="connsiteY11" fmla="*/ 70999 h 685800"/>
+                <a:gd name="connsiteX12" fmla="*/ 52756 w 351705"/>
+                <a:gd name="connsiteY12" fmla="*/ 111719 h 685800"/>
+                <a:gd name="connsiteX13" fmla="*/ 67625 w 351705"/>
+                <a:gd name="connsiteY13" fmla="*/ 126549 h 685800"/>
+                <a:gd name="connsiteX14" fmla="*/ 66320 w 351705"/>
+                <a:gd name="connsiteY14" fmla="*/ 133350 h 685800"/>
+                <a:gd name="connsiteX15" fmla="*/ 66320 w 351705"/>
+                <a:gd name="connsiteY15" fmla="*/ 155038 h 685800"/>
+                <a:gd name="connsiteX16" fmla="*/ 59277 w 351705"/>
+                <a:gd name="connsiteY16" fmla="*/ 180819 h 685800"/>
+                <a:gd name="connsiteX17" fmla="*/ 66320 w 351705"/>
+                <a:gd name="connsiteY17" fmla="*/ 187862 h 685800"/>
+                <a:gd name="connsiteX18" fmla="*/ 66320 w 351705"/>
+                <a:gd name="connsiteY18" fmla="*/ 201663 h 685800"/>
+                <a:gd name="connsiteX19" fmla="*/ 26867 w 351705"/>
+                <a:gd name="connsiteY19" fmla="*/ 241106 h 685800"/>
+                <a:gd name="connsiteX20" fmla="*/ 18533 w 351705"/>
+                <a:gd name="connsiteY20" fmla="*/ 259890 h 685800"/>
+                <a:gd name="connsiteX21" fmla="*/ 35 w 351705"/>
+                <a:gd name="connsiteY21" fmla="*/ 629793 h 685800"/>
+                <a:gd name="connsiteX22" fmla="*/ 20381 w 351705"/>
+                <a:gd name="connsiteY22" fmla="*/ 658578 h 685800"/>
+                <a:gd name="connsiteX23" fmla="*/ 103096 w 351705"/>
+                <a:gd name="connsiteY23" fmla="*/ 683343 h 685800"/>
+                <a:gd name="connsiteX24" fmla="*/ 119536 w 351705"/>
+                <a:gd name="connsiteY24" fmla="*/ 685800 h 685800"/>
+                <a:gd name="connsiteX25" fmla="*/ 232178 w 351705"/>
+                <a:gd name="connsiteY25" fmla="*/ 685800 h 685800"/>
+                <a:gd name="connsiteX26" fmla="*/ 248600 w 351705"/>
+                <a:gd name="connsiteY26" fmla="*/ 683390 h 685800"/>
+                <a:gd name="connsiteX27" fmla="*/ 331353 w 351705"/>
+                <a:gd name="connsiteY27" fmla="*/ 658568 h 685800"/>
+                <a:gd name="connsiteX28" fmla="*/ 351670 w 351705"/>
+                <a:gd name="connsiteY28" fmla="*/ 629774 h 685800"/>
+                <a:gd name="connsiteX29" fmla="*/ 247295 w 351705"/>
+                <a:gd name="connsiteY29" fmla="*/ 133350 h 685800"/>
+                <a:gd name="connsiteX30" fmla="*/ 247295 w 351705"/>
+                <a:gd name="connsiteY30" fmla="*/ 152400 h 685800"/>
+                <a:gd name="connsiteX31" fmla="*/ 104420 w 351705"/>
+                <a:gd name="connsiteY31" fmla="*/ 152400 h 685800"/>
+                <a:gd name="connsiteX32" fmla="*/ 104420 w 351705"/>
+                <a:gd name="connsiteY32" fmla="*/ 133350 h 685800"/>
+                <a:gd name="connsiteX33" fmla="*/ 237636 w 351705"/>
+                <a:gd name="connsiteY33" fmla="*/ 646900 h 685800"/>
+                <a:gd name="connsiteX34" fmla="*/ 232178 w 351705"/>
+                <a:gd name="connsiteY34" fmla="*/ 647700 h 685800"/>
+                <a:gd name="connsiteX35" fmla="*/ 119536 w 351705"/>
+                <a:gd name="connsiteY35" fmla="*/ 647700 h 685800"/>
+                <a:gd name="connsiteX36" fmla="*/ 114059 w 351705"/>
+                <a:gd name="connsiteY36" fmla="*/ 646890 h 685800"/>
+                <a:gd name="connsiteX37" fmla="*/ 38468 w 351705"/>
+                <a:gd name="connsiteY37" fmla="*/ 624221 h 685800"/>
+                <a:gd name="connsiteX38" fmla="*/ 56404 w 351705"/>
+                <a:gd name="connsiteY38" fmla="*/ 265462 h 685800"/>
+                <a:gd name="connsiteX39" fmla="*/ 104420 w 351705"/>
+                <a:gd name="connsiteY39" fmla="*/ 217437 h 685800"/>
+                <a:gd name="connsiteX40" fmla="*/ 104420 w 351705"/>
+                <a:gd name="connsiteY40" fmla="*/ 190500 h 685800"/>
+                <a:gd name="connsiteX41" fmla="*/ 247295 w 351705"/>
+                <a:gd name="connsiteY41" fmla="*/ 190500 h 685800"/>
+                <a:gd name="connsiteX42" fmla="*/ 247295 w 351705"/>
+                <a:gd name="connsiteY42" fmla="*/ 217437 h 685800"/>
+                <a:gd name="connsiteX43" fmla="*/ 295310 w 351705"/>
+                <a:gd name="connsiteY43" fmla="*/ 265462 h 685800"/>
+                <a:gd name="connsiteX44" fmla="*/ 313246 w 351705"/>
+                <a:gd name="connsiteY44" fmla="*/ 624221 h 685800"/>
+              </a:gdLst>
+              <a:ahLst/>
+              <a:cxnLst>
+                <a:cxn ang="0">
+                  <a:pos x="connsiteX0" y="connsiteY0"/>
+                </a:cxn>
+                <a:cxn ang="0">
+                  <a:pos x="connsiteX1" y="connsiteY1"/>
+                </a:cxn>
+                <a:cxn ang="0">
+                  <a:pos x="connsiteX2" y="connsiteY2"/>
+                </a:cxn>
+                <a:cxn ang="0">
+                  <a:pos x="connsiteX3" y="connsiteY3"/>
+                </a:cxn>
+                <a:cxn ang="0">
+                  <a:pos x="connsiteX4" y="connsiteY4"/>
+                </a:cxn>
+                <a:cxn ang="0">
+                  <a:pos x="connsiteX5" y="connsiteY5"/>
+                </a:cxn>
+                <a:cxn ang="0">
+                  <a:pos x="connsiteX6" y="connsiteY6"/>
+                </a:cxn>
+                <a:cxn ang="0">
+                  <a:pos x="connsiteX7" y="connsiteY7"/>
+                </a:cxn>
+                <a:cxn ang="0">
+                  <a:pos x="connsiteX8" y="connsiteY8"/>
+                </a:cxn>
+                <a:cxn ang="0">
+                  <a:pos x="connsiteX9" y="connsiteY9"/>
+                </a:cxn>
+                <a:cxn ang="0">
+                  <a:pos x="connsiteX10" y="connsiteY10"/>
+                </a:cxn>
+                <a:cxn ang="0">
+                  <a:pos x="connsiteX11" y="connsiteY11"/>
+                </a:cxn>
+                <a:cxn ang="0">
+                  <a:pos x="connsiteX12" y="connsiteY12"/>
+                </a:cxn>
+                <a:cxn ang="0">
+                  <a:pos x="connsiteX13" y="connsiteY13"/>
+                </a:cxn>
+                <a:cxn ang="0">
+                  <a:pos x="connsiteX14" y="connsiteY14"/>
+                </a:cxn>
+                <a:cxn ang="0">
+                  <a:pos x="connsiteX15" y="connsiteY15"/>
+                </a:cxn>
+                <a:cxn ang="0">
+                  <a:pos x="connsiteX16" y="connsiteY16"/>
+                </a:cxn>
+                <a:cxn ang="0">
+                  <a:pos x="connsiteX17" y="connsiteY17"/>
+                </a:cxn>
+                <a:cxn ang="0">
+                  <a:pos x="connsiteX18" y="connsiteY18"/>
+                </a:cxn>
+                <a:cxn ang="0">
+                  <a:pos x="connsiteX19" y="connsiteY19"/>
+                </a:cxn>
+                <a:cxn ang="0">
+                  <a:pos x="connsiteX20" y="connsiteY20"/>
+                </a:cxn>
+                <a:cxn ang="0">
+                  <a:pos x="connsiteX21" y="connsiteY21"/>
+                </a:cxn>
+                <a:cxn ang="0">
+                  <a:pos x="connsiteX22" y="connsiteY22"/>
+                </a:cxn>
+                <a:cxn ang="0">
+                  <a:pos x="connsiteX23" y="connsiteY23"/>
+                </a:cxn>
+                <a:cxn ang="0">
+                  <a:pos x="connsiteX24" y="connsiteY24"/>
+                </a:cxn>
+                <a:cxn ang="0">
+                  <a:pos x="connsiteX25" y="connsiteY25"/>
+                </a:cxn>
+                <a:cxn ang="0">
+                  <a:pos x="connsiteX26" y="connsiteY26"/>
+                </a:cxn>
+                <a:cxn ang="0">
+                  <a:pos x="connsiteX27" y="connsiteY27"/>
+                </a:cxn>
+                <a:cxn ang="0">
+                  <a:pos x="connsiteX28" y="connsiteY28"/>
+                </a:cxn>
+                <a:cxn ang="0">
+                  <a:pos x="connsiteX29" y="connsiteY29"/>
+                </a:cxn>
+                <a:cxn ang="0">
+                  <a:pos x="connsiteX30" y="connsiteY30"/>
+                </a:cxn>
+                <a:cxn ang="0">
+                  <a:pos x="connsiteX31" y="connsiteY31"/>
+                </a:cxn>
+                <a:cxn ang="0">
+                  <a:pos x="connsiteX32" y="connsiteY32"/>
+                </a:cxn>
+                <a:cxn ang="0">
+                  <a:pos x="connsiteX33" y="connsiteY33"/>
+                </a:cxn>
+                <a:cxn ang="0">
+                  <a:pos x="connsiteX34" y="connsiteY34"/>
+                </a:cxn>
+                <a:cxn ang="0">
+                  <a:pos x="connsiteX35" y="connsiteY35"/>
+                </a:cxn>
+                <a:cxn ang="0">
+                  <a:pos x="connsiteX36" y="connsiteY36"/>
+                </a:cxn>
+                <a:cxn ang="0">
+                  <a:pos x="connsiteX37" y="connsiteY37"/>
+                </a:cxn>
+                <a:cxn ang="0">
+                  <a:pos x="connsiteX38" y="connsiteY38"/>
+                </a:cxn>
+                <a:cxn ang="0">
+                  <a:pos x="connsiteX39" y="connsiteY39"/>
+                </a:cxn>
+                <a:cxn ang="0">
+                  <a:pos x="connsiteX40" y="connsiteY40"/>
+                </a:cxn>
+                <a:cxn ang="0">
+                  <a:pos x="connsiteX41" y="connsiteY41"/>
+                </a:cxn>
+                <a:cxn ang="0">
+                  <a:pos x="connsiteX42" y="connsiteY42"/>
+                </a:cxn>
+                <a:cxn ang="0">
+                  <a:pos x="connsiteX43" y="connsiteY43"/>
+                </a:cxn>
+                <a:cxn ang="0">
+                  <a:pos x="connsiteX44" y="connsiteY44"/>
+                </a:cxn>
+              </a:cxnLst>
+              <a:rect l="l" t="t" r="r" b="b"/>
+              <a:pathLst>
+                <a:path w="351705" h="685800">
+                  <a:moveTo>
+                    <a:pt x="333182" y="259861"/>
+                  </a:moveTo>
+                  <a:cubicBezTo>
+                    <a:pt x="332821" y="252794"/>
+                    <a:pt x="329852" y="246110"/>
+                    <a:pt x="324847" y="241106"/>
+                  </a:cubicBezTo>
+                  <a:lnTo>
+                    <a:pt x="285395" y="201663"/>
+                  </a:lnTo>
+                  <a:lnTo>
+                    <a:pt x="285395" y="187862"/>
+                  </a:lnTo>
+                  <a:cubicBezTo>
+                    <a:pt x="294459" y="182688"/>
+                    <a:pt x="297611" y="171145"/>
+                    <a:pt x="292437" y="162081"/>
+                  </a:cubicBezTo>
+                  <a:cubicBezTo>
+                    <a:pt x="290762" y="159146"/>
+                    <a:pt x="288329" y="156714"/>
+                    <a:pt x="285395" y="155038"/>
+                  </a:cubicBezTo>
+                  <a:lnTo>
+                    <a:pt x="285395" y="133350"/>
+                  </a:lnTo>
+                  <a:cubicBezTo>
+                    <a:pt x="285380" y="131022"/>
+                    <a:pt x="284938" y="128717"/>
+                    <a:pt x="284090" y="126549"/>
+                  </a:cubicBezTo>
+                  <a:cubicBezTo>
+                    <a:pt x="290162" y="122865"/>
+                    <a:pt x="295263" y="117779"/>
+                    <a:pt x="298968" y="111719"/>
+                  </a:cubicBezTo>
+                  <a:cubicBezTo>
+                    <a:pt x="306569" y="99426"/>
+                    <a:pt x="310979" y="85429"/>
+                    <a:pt x="311798" y="70999"/>
+                  </a:cubicBezTo>
+                  <a:cubicBezTo>
+                    <a:pt x="311798" y="49654"/>
+                    <a:pt x="298558" y="0"/>
+                    <a:pt x="175857" y="0"/>
+                  </a:cubicBezTo>
+                  <a:cubicBezTo>
+                    <a:pt x="53156" y="0"/>
+                    <a:pt x="39916" y="49654"/>
+                    <a:pt x="39916" y="70999"/>
+                  </a:cubicBezTo>
+                  <a:cubicBezTo>
+                    <a:pt x="40734" y="85431"/>
+                    <a:pt x="45147" y="99429"/>
+                    <a:pt x="52756" y="111719"/>
+                  </a:cubicBezTo>
+                  <a:cubicBezTo>
+                    <a:pt x="56456" y="117779"/>
+                    <a:pt x="61555" y="122864"/>
+                    <a:pt x="67625" y="126549"/>
+                  </a:cubicBezTo>
+                  <a:cubicBezTo>
+                    <a:pt x="66776" y="128717"/>
+                    <a:pt x="66334" y="131022"/>
+                    <a:pt x="66320" y="133350"/>
+                  </a:cubicBezTo>
+                  <a:lnTo>
+                    <a:pt x="66320" y="155038"/>
+                  </a:lnTo>
+                  <a:cubicBezTo>
+                    <a:pt x="57256" y="160212"/>
+                    <a:pt x="54103" y="171755"/>
+                    <a:pt x="59277" y="180819"/>
+                  </a:cubicBezTo>
+                  <a:cubicBezTo>
+                    <a:pt x="60952" y="183754"/>
+                    <a:pt x="63385" y="186186"/>
+                    <a:pt x="66320" y="187862"/>
+                  </a:cubicBezTo>
+                  <a:lnTo>
+                    <a:pt x="66320" y="201663"/>
+                  </a:lnTo>
+                  <a:lnTo>
+                    <a:pt x="26867" y="241106"/>
+                  </a:lnTo>
+                  <a:cubicBezTo>
+                    <a:pt x="21856" y="246117"/>
+                    <a:pt x="18885" y="252812"/>
+                    <a:pt x="18533" y="259890"/>
+                  </a:cubicBezTo>
+                  <a:lnTo>
+                    <a:pt x="35" y="629793"/>
+                  </a:lnTo>
+                  <a:cubicBezTo>
+                    <a:pt x="-614" y="642926"/>
+                    <a:pt x="7784" y="654807"/>
+                    <a:pt x="20381" y="658578"/>
+                  </a:cubicBezTo>
+                  <a:lnTo>
+                    <a:pt x="103096" y="683343"/>
+                  </a:lnTo>
+                  <a:cubicBezTo>
+                    <a:pt x="108426" y="684963"/>
+                    <a:pt x="113965" y="685791"/>
+                    <a:pt x="119536" y="685800"/>
+                  </a:cubicBezTo>
+                  <a:lnTo>
+                    <a:pt x="232178" y="685800"/>
+                  </a:lnTo>
+                  <a:cubicBezTo>
+                    <a:pt x="237740" y="685804"/>
+                    <a:pt x="243273" y="684991"/>
+                    <a:pt x="248600" y="683390"/>
+                  </a:cubicBezTo>
+                  <a:lnTo>
+                    <a:pt x="331353" y="658568"/>
+                  </a:lnTo>
+                  <a:cubicBezTo>
+                    <a:pt x="343942" y="654786"/>
+                    <a:pt x="352327" y="642902"/>
+                    <a:pt x="351670" y="629774"/>
+                  </a:cubicBezTo>
+                  <a:close/>
+                  <a:moveTo>
+                    <a:pt x="247295" y="133350"/>
+                  </a:moveTo>
+                  <a:lnTo>
+                    <a:pt x="247295" y="152400"/>
+                  </a:lnTo>
+                  <a:lnTo>
+                    <a:pt x="104420" y="152400"/>
+                  </a:lnTo>
+                  <a:lnTo>
+                    <a:pt x="104420" y="133350"/>
+                  </a:lnTo>
+                  <a:close/>
+                  <a:moveTo>
+                    <a:pt x="237636" y="646900"/>
+                  </a:moveTo>
+                  <a:cubicBezTo>
+                    <a:pt x="235867" y="647433"/>
+                    <a:pt x="234027" y="647703"/>
+                    <a:pt x="232178" y="647700"/>
+                  </a:cubicBezTo>
+                  <a:lnTo>
+                    <a:pt x="119536" y="647700"/>
+                  </a:lnTo>
+                  <a:cubicBezTo>
+                    <a:pt x="117680" y="647703"/>
+                    <a:pt x="115834" y="647430"/>
+                    <a:pt x="114059" y="646890"/>
+                  </a:cubicBezTo>
+                  <a:lnTo>
+                    <a:pt x="38468" y="624221"/>
+                  </a:lnTo>
+                  <a:lnTo>
+                    <a:pt x="56404" y="265462"/>
+                  </a:lnTo>
+                  <a:lnTo>
+                    <a:pt x="104420" y="217437"/>
+                  </a:lnTo>
+                  <a:lnTo>
+                    <a:pt x="104420" y="190500"/>
+                  </a:lnTo>
+                  <a:lnTo>
+                    <a:pt x="247295" y="190500"/>
+                  </a:lnTo>
+                  <a:lnTo>
+                    <a:pt x="247295" y="217437"/>
+                  </a:lnTo>
+                  <a:lnTo>
+                    <a:pt x="295310" y="265462"/>
+                  </a:lnTo>
+                  <a:lnTo>
+                    <a:pt x="313246" y="624221"/>
+                  </a:lnTo>
+                  <a:close/>
+                </a:path>
+              </a:pathLst>
+            </a:custGeom>
+            <a:solidFill>
+              <a:srgbClr val="574AE2"/>
+            </a:solidFill>
+            <a:ln w="9525" cap="flat">
+              <a:noFill/>
+              <a:prstDash val="solid"/>
+              <a:miter/>
+            </a:ln>
+          </p:spPr>
+          <p:txBody>
+            <a:bodyPr rtlCol="0" anchor="ctr"/>
+            <a:lstStyle/>
+            <a:p>
+              <a:endParaRPr lang="en-GB"/>
+            </a:p>
+          </p:txBody>
+        </p:sp>
+        <p:sp>
+          <p:nvSpPr>
+            <p:cNvPr id="16" name="Freeform: Shape 15">
+              <a:extLst>
+                <a:ext uri="{FF2B5EF4-FFF2-40B4-BE49-F238E27FC236}">
+                  <a16:creationId xmlns:a16="http://schemas.microsoft.com/office/drawing/2014/main" id="{3F82FAA0-4BB3-452E-A1F7-5589D35AAF70}"/>
+                </a:ext>
+              </a:extLst>
+            </p:cNvPr>
+            <p:cNvSpPr/>
+            <p:nvPr/>
+          </p:nvSpPr>
+          <p:spPr>
+            <a:xfrm rot="21409200">
+              <a:off x="5009709" y="2547503"/>
+              <a:ext cx="38099" cy="343433"/>
+            </a:xfrm>
+            <a:custGeom>
+              <a:avLst/>
+              <a:gdLst>
+                <a:gd name="connsiteX0" fmla="*/ 0 w 38099"/>
+                <a:gd name="connsiteY0" fmla="*/ 0 h 343433"/>
+                <a:gd name="connsiteX1" fmla="*/ 38100 w 38099"/>
+                <a:gd name="connsiteY1" fmla="*/ 0 h 343433"/>
+                <a:gd name="connsiteX2" fmla="*/ 38100 w 38099"/>
+                <a:gd name="connsiteY2" fmla="*/ 343433 h 343433"/>
+                <a:gd name="connsiteX3" fmla="*/ 0 w 38099"/>
+                <a:gd name="connsiteY3" fmla="*/ 343433 h 343433"/>
+              </a:gdLst>
+              <a:ahLst/>
+              <a:cxnLst>
+                <a:cxn ang="0">
+                  <a:pos x="connsiteX0" y="connsiteY0"/>
+                </a:cxn>
+                <a:cxn ang="0">
+                  <a:pos x="connsiteX1" y="connsiteY1"/>
+                </a:cxn>
+                <a:cxn ang="0">
+                  <a:pos x="connsiteX2" y="connsiteY2"/>
+                </a:cxn>
+                <a:cxn ang="0">
+                  <a:pos x="connsiteX3" y="connsiteY3"/>
+                </a:cxn>
+              </a:cxnLst>
+              <a:rect l="l" t="t" r="r" b="b"/>
+              <a:pathLst>
+                <a:path w="38099" h="343433">
+                  <a:moveTo>
+                    <a:pt x="0" y="0"/>
+                  </a:moveTo>
+                  <a:lnTo>
+                    <a:pt x="38100" y="0"/>
+                  </a:lnTo>
+                  <a:lnTo>
+                    <a:pt x="38100" y="343433"/>
+                  </a:lnTo>
+                  <a:lnTo>
+                    <a:pt x="0" y="343433"/>
+                  </a:lnTo>
+                  <a:close/>
+                </a:path>
+              </a:pathLst>
+            </a:custGeom>
+            <a:solidFill>
+              <a:srgbClr val="574AE2"/>
+            </a:solidFill>
+            <a:ln w="9525" cap="flat">
+              <a:noFill/>
+              <a:prstDash val="solid"/>
+              <a:miter/>
+            </a:ln>
+          </p:spPr>
+          <p:txBody>
+            <a:bodyPr rtlCol="0" anchor="ctr"/>
+            <a:lstStyle/>
+            <a:p>
+              <a:endParaRPr lang="en-GB"/>
+            </a:p>
+          </p:txBody>
+        </p:sp>
+        <p:sp>
+          <p:nvSpPr>
+            <p:cNvPr id="17" name="Freeform: Shape 16">
+              <a:extLst>
+                <a:ext uri="{FF2B5EF4-FFF2-40B4-BE49-F238E27FC236}">
+                  <a16:creationId xmlns:a16="http://schemas.microsoft.com/office/drawing/2014/main" id="{631F086A-E37D-4C06-8ACA-A727507402FA}"/>
+                </a:ext>
+              </a:extLst>
+            </p:cNvPr>
+            <p:cNvSpPr/>
+            <p:nvPr/>
+          </p:nvSpPr>
+          <p:spPr>
+            <a:xfrm>
+              <a:off x="5210095" y="2281075"/>
+              <a:ext cx="351698" cy="685800"/>
+            </a:xfrm>
+            <a:custGeom>
+              <a:avLst/>
+              <a:gdLst>
+                <a:gd name="connsiteX0" fmla="*/ 333174 w 351698"/>
+                <a:gd name="connsiteY0" fmla="*/ 259861 h 685800"/>
+                <a:gd name="connsiteX1" fmla="*/ 324840 w 351698"/>
+                <a:gd name="connsiteY1" fmla="*/ 241106 h 685800"/>
+                <a:gd name="connsiteX2" fmla="*/ 285387 w 351698"/>
+                <a:gd name="connsiteY2" fmla="*/ 201663 h 685800"/>
+                <a:gd name="connsiteX3" fmla="*/ 285387 w 351698"/>
+                <a:gd name="connsiteY3" fmla="*/ 187862 h 685800"/>
+                <a:gd name="connsiteX4" fmla="*/ 292430 w 351698"/>
+                <a:gd name="connsiteY4" fmla="*/ 162081 h 685800"/>
+                <a:gd name="connsiteX5" fmla="*/ 285387 w 351698"/>
+                <a:gd name="connsiteY5" fmla="*/ 155038 h 685800"/>
+                <a:gd name="connsiteX6" fmla="*/ 285387 w 351698"/>
+                <a:gd name="connsiteY6" fmla="*/ 133350 h 685800"/>
+                <a:gd name="connsiteX7" fmla="*/ 284082 w 351698"/>
+                <a:gd name="connsiteY7" fmla="*/ 126549 h 685800"/>
+                <a:gd name="connsiteX8" fmla="*/ 298960 w 351698"/>
+                <a:gd name="connsiteY8" fmla="*/ 111719 h 685800"/>
+                <a:gd name="connsiteX9" fmla="*/ 311790 w 351698"/>
+                <a:gd name="connsiteY9" fmla="*/ 70999 h 685800"/>
+                <a:gd name="connsiteX10" fmla="*/ 175850 w 351698"/>
+                <a:gd name="connsiteY10" fmla="*/ 0 h 685800"/>
+                <a:gd name="connsiteX11" fmla="*/ 39909 w 351698"/>
+                <a:gd name="connsiteY11" fmla="*/ 70999 h 685800"/>
+                <a:gd name="connsiteX12" fmla="*/ 52748 w 351698"/>
+                <a:gd name="connsiteY12" fmla="*/ 111719 h 685800"/>
+                <a:gd name="connsiteX13" fmla="*/ 67617 w 351698"/>
+                <a:gd name="connsiteY13" fmla="*/ 126549 h 685800"/>
+                <a:gd name="connsiteX14" fmla="*/ 66312 w 351698"/>
+                <a:gd name="connsiteY14" fmla="*/ 133350 h 685800"/>
+                <a:gd name="connsiteX15" fmla="*/ 66312 w 351698"/>
+                <a:gd name="connsiteY15" fmla="*/ 155038 h 685800"/>
+                <a:gd name="connsiteX16" fmla="*/ 59269 w 351698"/>
+                <a:gd name="connsiteY16" fmla="*/ 180819 h 685800"/>
+                <a:gd name="connsiteX17" fmla="*/ 66312 w 351698"/>
+                <a:gd name="connsiteY17" fmla="*/ 187862 h 685800"/>
+                <a:gd name="connsiteX18" fmla="*/ 66312 w 351698"/>
+                <a:gd name="connsiteY18" fmla="*/ 201663 h 685800"/>
+                <a:gd name="connsiteX19" fmla="*/ 26860 w 351698"/>
+                <a:gd name="connsiteY19" fmla="*/ 241106 h 685800"/>
+                <a:gd name="connsiteX20" fmla="*/ 18525 w 351698"/>
+                <a:gd name="connsiteY20" fmla="*/ 259890 h 685800"/>
+                <a:gd name="connsiteX21" fmla="*/ 37 w 351698"/>
+                <a:gd name="connsiteY21" fmla="*/ 629755 h 685800"/>
+                <a:gd name="connsiteX22" fmla="*/ 20373 w 351698"/>
+                <a:gd name="connsiteY22" fmla="*/ 658578 h 685800"/>
+                <a:gd name="connsiteX23" fmla="*/ 103088 w 351698"/>
+                <a:gd name="connsiteY23" fmla="*/ 683343 h 685800"/>
+                <a:gd name="connsiteX24" fmla="*/ 119528 w 351698"/>
+                <a:gd name="connsiteY24" fmla="*/ 685800 h 685800"/>
+                <a:gd name="connsiteX25" fmla="*/ 232171 w 351698"/>
+                <a:gd name="connsiteY25" fmla="*/ 685800 h 685800"/>
+                <a:gd name="connsiteX26" fmla="*/ 248592 w 351698"/>
+                <a:gd name="connsiteY26" fmla="*/ 683390 h 685800"/>
+                <a:gd name="connsiteX27" fmla="*/ 331345 w 351698"/>
+                <a:gd name="connsiteY27" fmla="*/ 658568 h 685800"/>
+                <a:gd name="connsiteX28" fmla="*/ 351662 w 351698"/>
+                <a:gd name="connsiteY28" fmla="*/ 629774 h 685800"/>
+                <a:gd name="connsiteX29" fmla="*/ 104412 w 351698"/>
+                <a:gd name="connsiteY29" fmla="*/ 133350 h 685800"/>
+                <a:gd name="connsiteX30" fmla="*/ 247287 w 351698"/>
+                <a:gd name="connsiteY30" fmla="*/ 133350 h 685800"/>
+                <a:gd name="connsiteX31" fmla="*/ 247287 w 351698"/>
+                <a:gd name="connsiteY31" fmla="*/ 152400 h 685800"/>
+                <a:gd name="connsiteX32" fmla="*/ 104412 w 351698"/>
+                <a:gd name="connsiteY32" fmla="*/ 152400 h 685800"/>
+                <a:gd name="connsiteX33" fmla="*/ 128225 w 351698"/>
+                <a:gd name="connsiteY33" fmla="*/ 610391 h 685800"/>
+                <a:gd name="connsiteX34" fmla="*/ 99650 w 351698"/>
+                <a:gd name="connsiteY34" fmla="*/ 608809 h 685800"/>
+                <a:gd name="connsiteX35" fmla="*/ 118700 w 351698"/>
+                <a:gd name="connsiteY35" fmla="*/ 265909 h 685800"/>
+                <a:gd name="connsiteX36" fmla="*/ 147275 w 351698"/>
+                <a:gd name="connsiteY36" fmla="*/ 267491 h 685800"/>
+                <a:gd name="connsiteX37" fmla="*/ 223475 w 351698"/>
+                <a:gd name="connsiteY37" fmla="*/ 610391 h 685800"/>
+                <a:gd name="connsiteX38" fmla="*/ 204425 w 351698"/>
+                <a:gd name="connsiteY38" fmla="*/ 267491 h 685800"/>
+                <a:gd name="connsiteX39" fmla="*/ 233000 w 351698"/>
+                <a:gd name="connsiteY39" fmla="*/ 265909 h 685800"/>
+                <a:gd name="connsiteX40" fmla="*/ 252050 w 351698"/>
+                <a:gd name="connsiteY40" fmla="*/ 608809 h 685800"/>
+              </a:gdLst>
+              <a:ahLst/>
+              <a:cxnLst>
+                <a:cxn ang="0">
+                  <a:pos x="connsiteX0" y="connsiteY0"/>
+                </a:cxn>
+                <a:cxn ang="0">
+                  <a:pos x="connsiteX1" y="connsiteY1"/>
+                </a:cxn>
+                <a:cxn ang="0">
+                  <a:pos x="connsiteX2" y="connsiteY2"/>
+                </a:cxn>
+                <a:cxn ang="0">
+                  <a:pos x="connsiteX3" y="connsiteY3"/>
+                </a:cxn>
+                <a:cxn ang="0">
+                  <a:pos x="connsiteX4" y="connsiteY4"/>
+                </a:cxn>
+                <a:cxn ang="0">
+                  <a:pos x="connsiteX5" y="connsiteY5"/>
+                </a:cxn>
+                <a:cxn ang="0">
+                  <a:pos x="connsiteX6" y="connsiteY6"/>
+                </a:cxn>
+                <a:cxn ang="0">
+                  <a:pos x="connsiteX7" y="connsiteY7"/>
+                </a:cxn>
+                <a:cxn ang="0">
+                  <a:pos x="connsiteX8" y="connsiteY8"/>
+                </a:cxn>
+                <a:cxn ang="0">
+                  <a:pos x="connsiteX9" y="connsiteY9"/>
+                </a:cxn>
+                <a:cxn ang="0">
+                  <a:pos x="connsiteX10" y="connsiteY10"/>
+                </a:cxn>
+                <a:cxn ang="0">
+                  <a:pos x="connsiteX11" y="connsiteY11"/>
+                </a:cxn>
+                <a:cxn ang="0">
+                  <a:pos x="connsiteX12" y="connsiteY12"/>
+                </a:cxn>
+                <a:cxn ang="0">
+                  <a:pos x="connsiteX13" y="connsiteY13"/>
+                </a:cxn>
+                <a:cxn ang="0">
+                  <a:pos x="connsiteX14" y="connsiteY14"/>
+                </a:cxn>
+                <a:cxn ang="0">
+                  <a:pos x="connsiteX15" y="connsiteY15"/>
+                </a:cxn>
+                <a:cxn ang="0">
+                  <a:pos x="connsiteX16" y="connsiteY16"/>
+                </a:cxn>
+                <a:cxn ang="0">
+                  <a:pos x="connsiteX17" y="connsiteY17"/>
+                </a:cxn>
+                <a:cxn ang="0">
+                  <a:pos x="connsiteX18" y="connsiteY18"/>
+                </a:cxn>
+                <a:cxn ang="0">
+                  <a:pos x="connsiteX19" y="connsiteY19"/>
+                </a:cxn>
+                <a:cxn ang="0">
+                  <a:pos x="connsiteX20" y="connsiteY20"/>
+                </a:cxn>
+                <a:cxn ang="0">
+                  <a:pos x="connsiteX21" y="connsiteY21"/>
+                </a:cxn>
+                <a:cxn ang="0">
+                  <a:pos x="connsiteX22" y="connsiteY22"/>
+                </a:cxn>
+                <a:cxn ang="0">
+                  <a:pos x="connsiteX23" y="connsiteY23"/>
+                </a:cxn>
+                <a:cxn ang="0">
+                  <a:pos x="connsiteX24" y="connsiteY24"/>
+                </a:cxn>
+                <a:cxn ang="0">
+                  <a:pos x="connsiteX25" y="connsiteY25"/>
+                </a:cxn>
+                <a:cxn ang="0">
+                  <a:pos x="connsiteX26" y="connsiteY26"/>
+                </a:cxn>
+                <a:cxn ang="0">
+                  <a:pos x="connsiteX27" y="connsiteY27"/>
+                </a:cxn>
+                <a:cxn ang="0">
+                  <a:pos x="connsiteX28" y="connsiteY28"/>
+                </a:cxn>
+                <a:cxn ang="0">
+                  <a:pos x="connsiteX29" y="connsiteY29"/>
+                </a:cxn>
+                <a:cxn ang="0">
+                  <a:pos x="connsiteX30" y="connsiteY30"/>
+                </a:cxn>
+                <a:cxn ang="0">
+                  <a:pos x="connsiteX31" y="connsiteY31"/>
+                </a:cxn>
+                <a:cxn ang="0">
+                  <a:pos x="connsiteX32" y="connsiteY32"/>
+                </a:cxn>
+                <a:cxn ang="0">
+                  <a:pos x="connsiteX33" y="connsiteY33"/>
+                </a:cxn>
+                <a:cxn ang="0">
+                  <a:pos x="connsiteX34" y="connsiteY34"/>
+                </a:cxn>
+                <a:cxn ang="0">
+                  <a:pos x="connsiteX35" y="connsiteY35"/>
+                </a:cxn>
+                <a:cxn ang="0">
+                  <a:pos x="connsiteX36" y="connsiteY36"/>
+                </a:cxn>
+                <a:cxn ang="0">
+                  <a:pos x="connsiteX37" y="connsiteY37"/>
+                </a:cxn>
+                <a:cxn ang="0">
+                  <a:pos x="connsiteX38" y="connsiteY38"/>
+                </a:cxn>
+                <a:cxn ang="0">
+                  <a:pos x="connsiteX39" y="connsiteY39"/>
+                </a:cxn>
+                <a:cxn ang="0">
+                  <a:pos x="connsiteX40" y="connsiteY40"/>
+                </a:cxn>
+              </a:cxnLst>
+              <a:rect l="l" t="t" r="r" b="b"/>
+              <a:pathLst>
+                <a:path w="351698" h="685800">
+                  <a:moveTo>
+                    <a:pt x="333174" y="259861"/>
+                  </a:moveTo>
+                  <a:cubicBezTo>
+                    <a:pt x="332814" y="252794"/>
+                    <a:pt x="329844" y="246110"/>
+                    <a:pt x="324840" y="241106"/>
+                  </a:cubicBezTo>
+                  <a:lnTo>
+                    <a:pt x="285387" y="201663"/>
+                  </a:lnTo>
+                  <a:lnTo>
+                    <a:pt x="285387" y="187862"/>
+                  </a:lnTo>
+                  <a:cubicBezTo>
+                    <a:pt x="294451" y="182688"/>
+                    <a:pt x="297604" y="171145"/>
+                    <a:pt x="292430" y="162081"/>
+                  </a:cubicBezTo>
+                  <a:cubicBezTo>
+                    <a:pt x="290754" y="159146"/>
+                    <a:pt x="288322" y="156714"/>
+                    <a:pt x="285387" y="155038"/>
+                  </a:cubicBezTo>
+                  <a:lnTo>
+                    <a:pt x="285387" y="133350"/>
+                  </a:lnTo>
+                  <a:cubicBezTo>
+                    <a:pt x="285373" y="131022"/>
+                    <a:pt x="284931" y="128717"/>
+                    <a:pt x="284082" y="126549"/>
+                  </a:cubicBezTo>
+                  <a:cubicBezTo>
+                    <a:pt x="290154" y="122865"/>
+                    <a:pt x="295256" y="117779"/>
+                    <a:pt x="298960" y="111719"/>
+                  </a:cubicBezTo>
+                  <a:cubicBezTo>
+                    <a:pt x="306561" y="99426"/>
+                    <a:pt x="310971" y="85429"/>
+                    <a:pt x="311790" y="70999"/>
+                  </a:cubicBezTo>
+                  <a:cubicBezTo>
+                    <a:pt x="311790" y="49654"/>
+                    <a:pt x="298551" y="0"/>
+                    <a:pt x="175850" y="0"/>
+                  </a:cubicBezTo>
+                  <a:cubicBezTo>
+                    <a:pt x="53149" y="0"/>
+                    <a:pt x="39909" y="49654"/>
+                    <a:pt x="39909" y="70999"/>
+                  </a:cubicBezTo>
+                  <a:cubicBezTo>
+                    <a:pt x="40727" y="85431"/>
+                    <a:pt x="45140" y="99429"/>
+                    <a:pt x="52748" y="111719"/>
+                  </a:cubicBezTo>
+                  <a:cubicBezTo>
+                    <a:pt x="56449" y="117779"/>
+                    <a:pt x="61548" y="122864"/>
+                    <a:pt x="67617" y="126549"/>
+                  </a:cubicBezTo>
+                  <a:cubicBezTo>
+                    <a:pt x="66768" y="128717"/>
+                    <a:pt x="66326" y="131022"/>
+                    <a:pt x="66312" y="133350"/>
+                  </a:cubicBezTo>
+                  <a:lnTo>
+                    <a:pt x="66312" y="155038"/>
+                  </a:lnTo>
+                  <a:cubicBezTo>
+                    <a:pt x="57248" y="160212"/>
+                    <a:pt x="54095" y="171755"/>
+                    <a:pt x="59269" y="180819"/>
+                  </a:cubicBezTo>
+                  <a:cubicBezTo>
+                    <a:pt x="60945" y="183754"/>
+                    <a:pt x="63377" y="186186"/>
+                    <a:pt x="66312" y="187862"/>
+                  </a:cubicBezTo>
+                  <a:lnTo>
+                    <a:pt x="66312" y="201663"/>
+                  </a:lnTo>
+                  <a:lnTo>
+                    <a:pt x="26860" y="241106"/>
+                  </a:lnTo>
+                  <a:cubicBezTo>
+                    <a:pt x="21848" y="246117"/>
+                    <a:pt x="18878" y="252812"/>
+                    <a:pt x="18525" y="259890"/>
+                  </a:cubicBezTo>
+                  <a:lnTo>
+                    <a:pt x="37" y="629755"/>
+                  </a:lnTo>
+                  <a:cubicBezTo>
+                    <a:pt x="-631" y="642899"/>
+                    <a:pt x="7766" y="654800"/>
+                    <a:pt x="20373" y="658578"/>
+                  </a:cubicBezTo>
+                  <a:lnTo>
+                    <a:pt x="103088" y="683343"/>
+                  </a:lnTo>
+                  <a:cubicBezTo>
+                    <a:pt x="108418" y="684963"/>
+                    <a:pt x="113957" y="685791"/>
+                    <a:pt x="119528" y="685800"/>
+                  </a:cubicBezTo>
+                  <a:lnTo>
+                    <a:pt x="232171" y="685800"/>
+                  </a:lnTo>
+                  <a:cubicBezTo>
+                    <a:pt x="237733" y="685804"/>
+                    <a:pt x="243266" y="684991"/>
+                    <a:pt x="248592" y="683390"/>
+                  </a:cubicBezTo>
+                  <a:lnTo>
+                    <a:pt x="331345" y="658568"/>
+                  </a:lnTo>
+                  <a:cubicBezTo>
+                    <a:pt x="343934" y="654786"/>
+                    <a:pt x="352318" y="642902"/>
+                    <a:pt x="351662" y="629774"/>
+                  </a:cubicBezTo>
+                  <a:close/>
+                  <a:moveTo>
+                    <a:pt x="104412" y="133350"/>
+                  </a:moveTo>
+                  <a:lnTo>
+                    <a:pt x="247287" y="133350"/>
+                  </a:lnTo>
+                  <a:lnTo>
+                    <a:pt x="247287" y="152400"/>
+                  </a:lnTo>
+                  <a:lnTo>
+                    <a:pt x="104412" y="152400"/>
+                  </a:lnTo>
+                  <a:close/>
+                  <a:moveTo>
+                    <a:pt x="128225" y="610391"/>
+                  </a:moveTo>
+                  <a:lnTo>
+                    <a:pt x="99650" y="608809"/>
+                  </a:lnTo>
+                  <a:lnTo>
+                    <a:pt x="118700" y="265909"/>
+                  </a:lnTo>
+                  <a:lnTo>
+                    <a:pt x="147275" y="267491"/>
+                  </a:lnTo>
+                  <a:close/>
+                  <a:moveTo>
+                    <a:pt x="223475" y="610391"/>
+                  </a:moveTo>
+                  <a:lnTo>
+                    <a:pt x="204425" y="267491"/>
+                  </a:lnTo>
+                  <a:lnTo>
+                    <a:pt x="233000" y="265909"/>
+                  </a:lnTo>
+                  <a:lnTo>
+                    <a:pt x="252050" y="608809"/>
+                  </a:lnTo>
+                  <a:close/>
+                </a:path>
+              </a:pathLst>
+            </a:custGeom>
+            <a:solidFill>
+              <a:srgbClr val="574AE2"/>
+            </a:solidFill>
+            <a:ln w="9525" cap="flat">
+              <a:noFill/>
+              <a:prstDash val="solid"/>
+              <a:miter/>
+            </a:ln>
+          </p:spPr>
+          <p:txBody>
+            <a:bodyPr rtlCol="0" anchor="ctr"/>
+            <a:lstStyle/>
+            <a:p>
+              <a:endParaRPr lang="en-GB"/>
+            </a:p>
+          </p:txBody>
+        </p:sp>
+      </p:grpSp>
     </p:spTree>
     <p:extLst>
       <p:ext uri="{BB962C8B-B14F-4D97-AF65-F5344CB8AC3E}">

</xml_diff>

<commit_message>
Add applied for status
</commit_message>
<xml_diff>
--- a/HelpMyStreetFE/HelpMyStreetFE/src/pptx/Icons.pptx
+++ b/HelpMyStreetFE/HelpMyStreetFE/src/pptx/Icons.pptx
@@ -268,7 +268,7 @@
           <a:p>
             <a:fld id="{B2EC5630-BBBD-40F6-B459-AD74AAD6AD00}" type="datetimeFigureOut">
               <a:rPr lang="en-GB" smtClean="0"/>
-              <a:t>15/12/2021</a:t>
+              <a:t>02/03/2022</a:t>
             </a:fld>
             <a:endParaRPr lang="en-GB"/>
           </a:p>
@@ -468,7 +468,7 @@
           <a:p>
             <a:fld id="{B2EC5630-BBBD-40F6-B459-AD74AAD6AD00}" type="datetimeFigureOut">
               <a:rPr lang="en-GB" smtClean="0"/>
-              <a:t>15/12/2021</a:t>
+              <a:t>02/03/2022</a:t>
             </a:fld>
             <a:endParaRPr lang="en-GB"/>
           </a:p>
@@ -678,7 +678,7 @@
           <a:p>
             <a:fld id="{B2EC5630-BBBD-40F6-B459-AD74AAD6AD00}" type="datetimeFigureOut">
               <a:rPr lang="en-GB" smtClean="0"/>
-              <a:t>15/12/2021</a:t>
+              <a:t>02/03/2022</a:t>
             </a:fld>
             <a:endParaRPr lang="en-GB"/>
           </a:p>
@@ -878,7 +878,7 @@
           <a:p>
             <a:fld id="{B2EC5630-BBBD-40F6-B459-AD74AAD6AD00}" type="datetimeFigureOut">
               <a:rPr lang="en-GB" smtClean="0"/>
-              <a:t>15/12/2021</a:t>
+              <a:t>02/03/2022</a:t>
             </a:fld>
             <a:endParaRPr lang="en-GB"/>
           </a:p>
@@ -1154,7 +1154,7 @@
           <a:p>
             <a:fld id="{B2EC5630-BBBD-40F6-B459-AD74AAD6AD00}" type="datetimeFigureOut">
               <a:rPr lang="en-GB" smtClean="0"/>
-              <a:t>15/12/2021</a:t>
+              <a:t>02/03/2022</a:t>
             </a:fld>
             <a:endParaRPr lang="en-GB"/>
           </a:p>
@@ -1422,7 +1422,7 @@
           <a:p>
             <a:fld id="{B2EC5630-BBBD-40F6-B459-AD74AAD6AD00}" type="datetimeFigureOut">
               <a:rPr lang="en-GB" smtClean="0"/>
-              <a:t>15/12/2021</a:t>
+              <a:t>02/03/2022</a:t>
             </a:fld>
             <a:endParaRPr lang="en-GB"/>
           </a:p>
@@ -1837,7 +1837,7 @@
           <a:p>
             <a:fld id="{B2EC5630-BBBD-40F6-B459-AD74AAD6AD00}" type="datetimeFigureOut">
               <a:rPr lang="en-GB" smtClean="0"/>
-              <a:t>15/12/2021</a:t>
+              <a:t>02/03/2022</a:t>
             </a:fld>
             <a:endParaRPr lang="en-GB"/>
           </a:p>
@@ -1979,7 +1979,7 @@
           <a:p>
             <a:fld id="{B2EC5630-BBBD-40F6-B459-AD74AAD6AD00}" type="datetimeFigureOut">
               <a:rPr lang="en-GB" smtClean="0"/>
-              <a:t>15/12/2021</a:t>
+              <a:t>02/03/2022</a:t>
             </a:fld>
             <a:endParaRPr lang="en-GB"/>
           </a:p>
@@ -2092,7 +2092,7 @@
           <a:p>
             <a:fld id="{B2EC5630-BBBD-40F6-B459-AD74AAD6AD00}" type="datetimeFigureOut">
               <a:rPr lang="en-GB" smtClean="0"/>
-              <a:t>15/12/2021</a:t>
+              <a:t>02/03/2022</a:t>
             </a:fld>
             <a:endParaRPr lang="en-GB"/>
           </a:p>
@@ -2405,7 +2405,7 @@
           <a:p>
             <a:fld id="{B2EC5630-BBBD-40F6-B459-AD74AAD6AD00}" type="datetimeFigureOut">
               <a:rPr lang="en-GB" smtClean="0"/>
-              <a:t>15/12/2021</a:t>
+              <a:t>02/03/2022</a:t>
             </a:fld>
             <a:endParaRPr lang="en-GB"/>
           </a:p>
@@ -2694,7 +2694,7 @@
           <a:p>
             <a:fld id="{B2EC5630-BBBD-40F6-B459-AD74AAD6AD00}" type="datetimeFigureOut">
               <a:rPr lang="en-GB" smtClean="0"/>
-              <a:t>15/12/2021</a:t>
+              <a:t>02/03/2022</a:t>
             </a:fld>
             <a:endParaRPr lang="en-GB"/>
           </a:p>
@@ -2937,7 +2937,7 @@
           <a:p>
             <a:fld id="{B2EC5630-BBBD-40F6-B459-AD74AAD6AD00}" type="datetimeFigureOut">
               <a:rPr lang="en-GB" smtClean="0"/>
-              <a:t>15/12/2021</a:t>
+              <a:t>02/03/2022</a:t>
             </a:fld>
             <a:endParaRPr lang="en-GB"/>
           </a:p>
@@ -17525,6 +17525,334 @@
           </p:txBody>
         </p:sp>
       </p:grpSp>
+      <p:pic>
+        <p:nvPicPr>
+          <p:cNvPr id="5" name="Graphic 4" descr="Checkmark">
+            <a:extLst>
+              <a:ext uri="{FF2B5EF4-FFF2-40B4-BE49-F238E27FC236}">
+                <a16:creationId xmlns:a16="http://schemas.microsoft.com/office/drawing/2014/main" id="{49C2ED8B-71F8-48A6-80DA-D92F33647837}"/>
+              </a:ext>
+            </a:extLst>
+          </p:cNvPr>
+          <p:cNvPicPr>
+            <a:picLocks noChangeAspect="1"/>
+          </p:cNvPicPr>
+          <p:nvPr/>
+        </p:nvPicPr>
+        <p:blipFill>
+          <a:blip r:embed="rId2">
+            <a:extLst>
+              <a:ext uri="{28A0092B-C50C-407E-A947-70E740481C1C}">
+                <a14:useLocalDpi xmlns:a14="http://schemas.microsoft.com/office/drawing/2010/main" val="0"/>
+              </a:ext>
+              <a:ext uri="{96DAC541-7B7A-43D3-8B79-37D633B846F1}">
+                <asvg:svgBlip xmlns:asvg="http://schemas.microsoft.com/office/drawing/2016/SVG/main" r:embed="rId3"/>
+              </a:ext>
+            </a:extLst>
+          </a:blip>
+          <a:stretch>
+            <a:fillRect/>
+          </a:stretch>
+        </p:blipFill>
+        <p:spPr>
+          <a:xfrm>
+            <a:off x="6951060" y="1294726"/>
+            <a:ext cx="1197620" cy="1197620"/>
+          </a:xfrm>
+          <a:prstGeom prst="rect">
+            <a:avLst/>
+          </a:prstGeom>
+        </p:spPr>
+      </p:pic>
+      <p:sp>
+        <p:nvSpPr>
+          <p:cNvPr id="9" name="Oval 8">
+            <a:extLst>
+              <a:ext uri="{FF2B5EF4-FFF2-40B4-BE49-F238E27FC236}">
+                <a16:creationId xmlns:a16="http://schemas.microsoft.com/office/drawing/2014/main" id="{E801711A-106D-44F7-B1A4-77859AC6B08D}"/>
+              </a:ext>
+            </a:extLst>
+          </p:cNvPr>
+          <p:cNvSpPr/>
+          <p:nvPr/>
+        </p:nvSpPr>
+        <p:spPr>
+          <a:xfrm rot="5941593">
+            <a:off x="6619286" y="962952"/>
+            <a:ext cx="1861168" cy="1861168"/>
+          </a:xfrm>
+          <a:prstGeom prst="ellipse">
+            <a:avLst/>
+          </a:prstGeom>
+          <a:noFill/>
+          <a:ln w="174625">
+            <a:solidFill>
+              <a:srgbClr val="001489"/>
+            </a:solidFill>
+            <a:prstDash val="sysDot"/>
+          </a:ln>
+        </p:spPr>
+        <p:style>
+          <a:lnRef idx="2">
+            <a:schemeClr val="accent1">
+              <a:shade val="50000"/>
+            </a:schemeClr>
+          </a:lnRef>
+          <a:fillRef idx="1">
+            <a:schemeClr val="accent1"/>
+          </a:fillRef>
+          <a:effectRef idx="0">
+            <a:schemeClr val="accent1"/>
+          </a:effectRef>
+          <a:fontRef idx="minor">
+            <a:schemeClr val="lt1"/>
+          </a:fontRef>
+        </p:style>
+        <p:txBody>
+          <a:bodyPr rtlCol="0" anchor="ctr"/>
+          <a:lstStyle/>
+          <a:p>
+            <a:pPr algn="ctr"/>
+            <a:endParaRPr lang="en-GB"/>
+          </a:p>
+        </p:txBody>
+      </p:sp>
+      <p:sp>
+        <p:nvSpPr>
+          <p:cNvPr id="10" name="Oval 12">
+            <a:extLst>
+              <a:ext uri="{FF2B5EF4-FFF2-40B4-BE49-F238E27FC236}">
+                <a16:creationId xmlns:a16="http://schemas.microsoft.com/office/drawing/2014/main" id="{978D280C-7194-4B85-A34E-996B68101B1C}"/>
+              </a:ext>
+            </a:extLst>
+          </p:cNvPr>
+          <p:cNvSpPr/>
+          <p:nvPr/>
+        </p:nvSpPr>
+        <p:spPr>
+          <a:xfrm>
+            <a:off x="7549870" y="962952"/>
+            <a:ext cx="930584" cy="1861168"/>
+          </a:xfrm>
+          <a:custGeom>
+            <a:avLst/>
+            <a:gdLst>
+              <a:gd name="connsiteX0" fmla="*/ 0 w 1861168"/>
+              <a:gd name="connsiteY0" fmla="*/ 930584 h 1861168"/>
+              <a:gd name="connsiteX1" fmla="*/ 930584 w 1861168"/>
+              <a:gd name="connsiteY1" fmla="*/ 0 h 1861168"/>
+              <a:gd name="connsiteX2" fmla="*/ 1861168 w 1861168"/>
+              <a:gd name="connsiteY2" fmla="*/ 930584 h 1861168"/>
+              <a:gd name="connsiteX3" fmla="*/ 930584 w 1861168"/>
+              <a:gd name="connsiteY3" fmla="*/ 1861168 h 1861168"/>
+              <a:gd name="connsiteX4" fmla="*/ 0 w 1861168"/>
+              <a:gd name="connsiteY4" fmla="*/ 930584 h 1861168"/>
+              <a:gd name="connsiteX0" fmla="*/ 0 w 1861168"/>
+              <a:gd name="connsiteY0" fmla="*/ 930584 h 1861168"/>
+              <a:gd name="connsiteX1" fmla="*/ 930584 w 1861168"/>
+              <a:gd name="connsiteY1" fmla="*/ 0 h 1861168"/>
+              <a:gd name="connsiteX2" fmla="*/ 1861168 w 1861168"/>
+              <a:gd name="connsiteY2" fmla="*/ 930584 h 1861168"/>
+              <a:gd name="connsiteX3" fmla="*/ 930584 w 1861168"/>
+              <a:gd name="connsiteY3" fmla="*/ 1861168 h 1861168"/>
+              <a:gd name="connsiteX4" fmla="*/ 91440 w 1861168"/>
+              <a:gd name="connsiteY4" fmla="*/ 1022024 h 1861168"/>
+              <a:gd name="connsiteX0" fmla="*/ 0 w 1861168"/>
+              <a:gd name="connsiteY0" fmla="*/ 930584 h 1861168"/>
+              <a:gd name="connsiteX1" fmla="*/ 930584 w 1861168"/>
+              <a:gd name="connsiteY1" fmla="*/ 0 h 1861168"/>
+              <a:gd name="connsiteX2" fmla="*/ 1861168 w 1861168"/>
+              <a:gd name="connsiteY2" fmla="*/ 930584 h 1861168"/>
+              <a:gd name="connsiteX3" fmla="*/ 930584 w 1861168"/>
+              <a:gd name="connsiteY3" fmla="*/ 1861168 h 1861168"/>
+              <a:gd name="connsiteX0" fmla="*/ 0 w 930584"/>
+              <a:gd name="connsiteY0" fmla="*/ 0 h 1861168"/>
+              <a:gd name="connsiteX1" fmla="*/ 930584 w 930584"/>
+              <a:gd name="connsiteY1" fmla="*/ 930584 h 1861168"/>
+              <a:gd name="connsiteX2" fmla="*/ 0 w 930584"/>
+              <a:gd name="connsiteY2" fmla="*/ 1861168 h 1861168"/>
+            </a:gdLst>
+            <a:ahLst/>
+            <a:cxnLst>
+              <a:cxn ang="0">
+                <a:pos x="connsiteX0" y="connsiteY0"/>
+              </a:cxn>
+              <a:cxn ang="0">
+                <a:pos x="connsiteX1" y="connsiteY1"/>
+              </a:cxn>
+              <a:cxn ang="0">
+                <a:pos x="connsiteX2" y="connsiteY2"/>
+              </a:cxn>
+            </a:cxnLst>
+            <a:rect l="l" t="t" r="r" b="b"/>
+            <a:pathLst>
+              <a:path w="930584" h="1861168">
+                <a:moveTo>
+                  <a:pt x="0" y="0"/>
+                </a:moveTo>
+                <a:cubicBezTo>
+                  <a:pt x="513947" y="0"/>
+                  <a:pt x="930584" y="416637"/>
+                  <a:pt x="930584" y="930584"/>
+                </a:cubicBezTo>
+                <a:cubicBezTo>
+                  <a:pt x="930584" y="1444531"/>
+                  <a:pt x="513947" y="1861168"/>
+                  <a:pt x="0" y="1861168"/>
+                </a:cubicBezTo>
+              </a:path>
+            </a:pathLst>
+          </a:custGeom>
+          <a:noFill/>
+          <a:ln w="174625">
+            <a:solidFill>
+              <a:srgbClr val="001489"/>
+            </a:solidFill>
+          </a:ln>
+        </p:spPr>
+        <p:style>
+          <a:lnRef idx="2">
+            <a:schemeClr val="accent1">
+              <a:shade val="50000"/>
+            </a:schemeClr>
+          </a:lnRef>
+          <a:fillRef idx="1">
+            <a:schemeClr val="accent1"/>
+          </a:fillRef>
+          <a:effectRef idx="0">
+            <a:schemeClr val="accent1"/>
+          </a:effectRef>
+          <a:fontRef idx="minor">
+            <a:schemeClr val="lt1"/>
+          </a:fontRef>
+        </p:style>
+        <p:txBody>
+          <a:bodyPr rtlCol="0" anchor="ctr"/>
+          <a:lstStyle/>
+          <a:p>
+            <a:pPr algn="ctr"/>
+            <a:endParaRPr lang="en-GB"/>
+          </a:p>
+        </p:txBody>
+      </p:sp>
+      <p:sp>
+        <p:nvSpPr>
+          <p:cNvPr id="11" name="Oval 12">
+            <a:extLst>
+              <a:ext uri="{FF2B5EF4-FFF2-40B4-BE49-F238E27FC236}">
+                <a16:creationId xmlns:a16="http://schemas.microsoft.com/office/drawing/2014/main" id="{C5162DA2-C53E-4E45-B64C-E1871F8BD12B}"/>
+              </a:ext>
+            </a:extLst>
+          </p:cNvPr>
+          <p:cNvSpPr/>
+          <p:nvPr/>
+        </p:nvSpPr>
+        <p:spPr>
+          <a:xfrm rot="1399668">
+            <a:off x="7515603" y="1147797"/>
+            <a:ext cx="930584" cy="1861168"/>
+          </a:xfrm>
+          <a:custGeom>
+            <a:avLst/>
+            <a:gdLst>
+              <a:gd name="connsiteX0" fmla="*/ 0 w 1861168"/>
+              <a:gd name="connsiteY0" fmla="*/ 930584 h 1861168"/>
+              <a:gd name="connsiteX1" fmla="*/ 930584 w 1861168"/>
+              <a:gd name="connsiteY1" fmla="*/ 0 h 1861168"/>
+              <a:gd name="connsiteX2" fmla="*/ 1861168 w 1861168"/>
+              <a:gd name="connsiteY2" fmla="*/ 930584 h 1861168"/>
+              <a:gd name="connsiteX3" fmla="*/ 930584 w 1861168"/>
+              <a:gd name="connsiteY3" fmla="*/ 1861168 h 1861168"/>
+              <a:gd name="connsiteX4" fmla="*/ 0 w 1861168"/>
+              <a:gd name="connsiteY4" fmla="*/ 930584 h 1861168"/>
+              <a:gd name="connsiteX0" fmla="*/ 0 w 1861168"/>
+              <a:gd name="connsiteY0" fmla="*/ 930584 h 1861168"/>
+              <a:gd name="connsiteX1" fmla="*/ 930584 w 1861168"/>
+              <a:gd name="connsiteY1" fmla="*/ 0 h 1861168"/>
+              <a:gd name="connsiteX2" fmla="*/ 1861168 w 1861168"/>
+              <a:gd name="connsiteY2" fmla="*/ 930584 h 1861168"/>
+              <a:gd name="connsiteX3" fmla="*/ 930584 w 1861168"/>
+              <a:gd name="connsiteY3" fmla="*/ 1861168 h 1861168"/>
+              <a:gd name="connsiteX4" fmla="*/ 91440 w 1861168"/>
+              <a:gd name="connsiteY4" fmla="*/ 1022024 h 1861168"/>
+              <a:gd name="connsiteX0" fmla="*/ 0 w 1861168"/>
+              <a:gd name="connsiteY0" fmla="*/ 930584 h 1861168"/>
+              <a:gd name="connsiteX1" fmla="*/ 930584 w 1861168"/>
+              <a:gd name="connsiteY1" fmla="*/ 0 h 1861168"/>
+              <a:gd name="connsiteX2" fmla="*/ 1861168 w 1861168"/>
+              <a:gd name="connsiteY2" fmla="*/ 930584 h 1861168"/>
+              <a:gd name="connsiteX3" fmla="*/ 930584 w 1861168"/>
+              <a:gd name="connsiteY3" fmla="*/ 1861168 h 1861168"/>
+              <a:gd name="connsiteX0" fmla="*/ 0 w 930584"/>
+              <a:gd name="connsiteY0" fmla="*/ 0 h 1861168"/>
+              <a:gd name="connsiteX1" fmla="*/ 930584 w 930584"/>
+              <a:gd name="connsiteY1" fmla="*/ 930584 h 1861168"/>
+              <a:gd name="connsiteX2" fmla="*/ 0 w 930584"/>
+              <a:gd name="connsiteY2" fmla="*/ 1861168 h 1861168"/>
+            </a:gdLst>
+            <a:ahLst/>
+            <a:cxnLst>
+              <a:cxn ang="0">
+                <a:pos x="connsiteX0" y="connsiteY0"/>
+              </a:cxn>
+              <a:cxn ang="0">
+                <a:pos x="connsiteX1" y="connsiteY1"/>
+              </a:cxn>
+              <a:cxn ang="0">
+                <a:pos x="connsiteX2" y="connsiteY2"/>
+              </a:cxn>
+            </a:cxnLst>
+            <a:rect l="l" t="t" r="r" b="b"/>
+            <a:pathLst>
+              <a:path w="930584" h="1861168">
+                <a:moveTo>
+                  <a:pt x="0" y="0"/>
+                </a:moveTo>
+                <a:cubicBezTo>
+                  <a:pt x="513947" y="0"/>
+                  <a:pt x="930584" y="416637"/>
+                  <a:pt x="930584" y="930584"/>
+                </a:cubicBezTo>
+                <a:cubicBezTo>
+                  <a:pt x="930584" y="1444531"/>
+                  <a:pt x="513947" y="1861168"/>
+                  <a:pt x="0" y="1861168"/>
+                </a:cubicBezTo>
+              </a:path>
+            </a:pathLst>
+          </a:custGeom>
+          <a:noFill/>
+          <a:ln w="174625">
+            <a:solidFill>
+              <a:srgbClr val="001489"/>
+            </a:solidFill>
+          </a:ln>
+        </p:spPr>
+        <p:style>
+          <a:lnRef idx="2">
+            <a:schemeClr val="accent1">
+              <a:shade val="50000"/>
+            </a:schemeClr>
+          </a:lnRef>
+          <a:fillRef idx="1">
+            <a:schemeClr val="accent1"/>
+          </a:fillRef>
+          <a:effectRef idx="0">
+            <a:schemeClr val="accent1"/>
+          </a:effectRef>
+          <a:fontRef idx="minor">
+            <a:schemeClr val="lt1"/>
+          </a:fontRef>
+        </p:style>
+        <p:txBody>
+          <a:bodyPr rtlCol="0" anchor="ctr"/>
+          <a:lstStyle/>
+          <a:p>
+            <a:pPr algn="ctr"/>
+            <a:endParaRPr lang="en-GB"/>
+          </a:p>
+        </p:txBody>
+      </p:sp>
     </p:spTree>
     <p:extLst>
       <p:ext uri="{BB962C8B-B14F-4D97-AF65-F5344CB8AC3E}">

</xml_diff>

<commit_message>
FE-1352 Adding accommodation icon
</commit_message>
<xml_diff>
--- a/HelpMyStreetFE/HelpMyStreetFE/src/pptx/Icons.pptx
+++ b/HelpMyStreetFE/HelpMyStreetFE/src/pptx/Icons.pptx
@@ -268,7 +268,7 @@
           <a:p>
             <a:fld id="{B2EC5630-BBBD-40F6-B459-AD74AAD6AD00}" type="datetimeFigureOut">
               <a:rPr lang="en-GB" smtClean="0"/>
-              <a:t>07/02/2022</a:t>
+              <a:t>21/03/2022</a:t>
             </a:fld>
             <a:endParaRPr lang="en-GB"/>
           </a:p>
@@ -468,7 +468,7 @@
           <a:p>
             <a:fld id="{B2EC5630-BBBD-40F6-B459-AD74AAD6AD00}" type="datetimeFigureOut">
               <a:rPr lang="en-GB" smtClean="0"/>
-              <a:t>07/02/2022</a:t>
+              <a:t>21/03/2022</a:t>
             </a:fld>
             <a:endParaRPr lang="en-GB"/>
           </a:p>
@@ -678,7 +678,7 @@
           <a:p>
             <a:fld id="{B2EC5630-BBBD-40F6-B459-AD74AAD6AD00}" type="datetimeFigureOut">
               <a:rPr lang="en-GB" smtClean="0"/>
-              <a:t>07/02/2022</a:t>
+              <a:t>21/03/2022</a:t>
             </a:fld>
             <a:endParaRPr lang="en-GB"/>
           </a:p>
@@ -878,7 +878,7 @@
           <a:p>
             <a:fld id="{B2EC5630-BBBD-40F6-B459-AD74AAD6AD00}" type="datetimeFigureOut">
               <a:rPr lang="en-GB" smtClean="0"/>
-              <a:t>07/02/2022</a:t>
+              <a:t>21/03/2022</a:t>
             </a:fld>
             <a:endParaRPr lang="en-GB"/>
           </a:p>
@@ -1154,7 +1154,7 @@
           <a:p>
             <a:fld id="{B2EC5630-BBBD-40F6-B459-AD74AAD6AD00}" type="datetimeFigureOut">
               <a:rPr lang="en-GB" smtClean="0"/>
-              <a:t>07/02/2022</a:t>
+              <a:t>21/03/2022</a:t>
             </a:fld>
             <a:endParaRPr lang="en-GB"/>
           </a:p>
@@ -1422,7 +1422,7 @@
           <a:p>
             <a:fld id="{B2EC5630-BBBD-40F6-B459-AD74AAD6AD00}" type="datetimeFigureOut">
               <a:rPr lang="en-GB" smtClean="0"/>
-              <a:t>07/02/2022</a:t>
+              <a:t>21/03/2022</a:t>
             </a:fld>
             <a:endParaRPr lang="en-GB"/>
           </a:p>
@@ -1837,7 +1837,7 @@
           <a:p>
             <a:fld id="{B2EC5630-BBBD-40F6-B459-AD74AAD6AD00}" type="datetimeFigureOut">
               <a:rPr lang="en-GB" smtClean="0"/>
-              <a:t>07/02/2022</a:t>
+              <a:t>21/03/2022</a:t>
             </a:fld>
             <a:endParaRPr lang="en-GB"/>
           </a:p>
@@ -1979,7 +1979,7 @@
           <a:p>
             <a:fld id="{B2EC5630-BBBD-40F6-B459-AD74AAD6AD00}" type="datetimeFigureOut">
               <a:rPr lang="en-GB" smtClean="0"/>
-              <a:t>07/02/2022</a:t>
+              <a:t>21/03/2022</a:t>
             </a:fld>
             <a:endParaRPr lang="en-GB"/>
           </a:p>
@@ -2092,7 +2092,7 @@
           <a:p>
             <a:fld id="{B2EC5630-BBBD-40F6-B459-AD74AAD6AD00}" type="datetimeFigureOut">
               <a:rPr lang="en-GB" smtClean="0"/>
-              <a:t>07/02/2022</a:t>
+              <a:t>21/03/2022</a:t>
             </a:fld>
             <a:endParaRPr lang="en-GB"/>
           </a:p>
@@ -2405,7 +2405,7 @@
           <a:p>
             <a:fld id="{B2EC5630-BBBD-40F6-B459-AD74AAD6AD00}" type="datetimeFigureOut">
               <a:rPr lang="en-GB" smtClean="0"/>
-              <a:t>07/02/2022</a:t>
+              <a:t>21/03/2022</a:t>
             </a:fld>
             <a:endParaRPr lang="en-GB"/>
           </a:p>
@@ -2694,7 +2694,7 @@
           <a:p>
             <a:fld id="{B2EC5630-BBBD-40F6-B459-AD74AAD6AD00}" type="datetimeFigureOut">
               <a:rPr lang="en-GB" smtClean="0"/>
-              <a:t>07/02/2022</a:t>
+              <a:t>21/03/2022</a:t>
             </a:fld>
             <a:endParaRPr lang="en-GB"/>
           </a:p>
@@ -2937,7 +2937,7 @@
           <a:p>
             <a:fld id="{B2EC5630-BBBD-40F6-B459-AD74AAD6AD00}" type="datetimeFigureOut">
               <a:rPr lang="en-GB" smtClean="0"/>
-              <a:t>07/02/2022</a:t>
+              <a:t>21/03/2022</a:t>
             </a:fld>
             <a:endParaRPr lang="en-GB"/>
           </a:p>
@@ -19274,6 +19274,642 @@
           </p:txBody>
         </p:sp>
       </p:grpSp>
+      <p:grpSp>
+        <p:nvGrpSpPr>
+          <p:cNvPr id="24" name="Group 23">
+            <a:extLst>
+              <a:ext uri="{FF2B5EF4-FFF2-40B4-BE49-F238E27FC236}">
+                <a16:creationId xmlns:a16="http://schemas.microsoft.com/office/drawing/2014/main" id="{88E9CBAA-F05F-4986-954D-88C48935F64C}"/>
+              </a:ext>
+            </a:extLst>
+          </p:cNvPr>
+          <p:cNvGrpSpPr/>
+          <p:nvPr/>
+        </p:nvGrpSpPr>
+        <p:grpSpPr>
+          <a:xfrm>
+            <a:off x="7283173" y="4800527"/>
+            <a:ext cx="800100" cy="685799"/>
+            <a:chOff x="7283173" y="4800527"/>
+            <a:chExt cx="800100" cy="685799"/>
+          </a:xfrm>
+        </p:grpSpPr>
+        <p:sp>
+          <p:nvSpPr>
+            <p:cNvPr id="22" name="Freeform: Shape 21">
+              <a:extLst>
+                <a:ext uri="{FF2B5EF4-FFF2-40B4-BE49-F238E27FC236}">
+                  <a16:creationId xmlns:a16="http://schemas.microsoft.com/office/drawing/2014/main" id="{771D52A5-4036-4F4E-B4DB-B077FE8EF3DB}"/>
+                </a:ext>
+              </a:extLst>
+            </p:cNvPr>
+            <p:cNvSpPr/>
+            <p:nvPr/>
+          </p:nvSpPr>
+          <p:spPr>
+            <a:xfrm>
+              <a:off x="7283173" y="4800527"/>
+              <a:ext cx="800100" cy="417194"/>
+            </a:xfrm>
+            <a:custGeom>
+              <a:avLst/>
+              <a:gdLst>
+                <a:gd name="connsiteX0" fmla="*/ 628650 w 800100"/>
+                <a:gd name="connsiteY0" fmla="*/ 217170 h 417194"/>
+                <a:gd name="connsiteX1" fmla="*/ 628650 w 800100"/>
+                <a:gd name="connsiteY1" fmla="*/ 57150 h 417194"/>
+                <a:gd name="connsiteX2" fmla="*/ 552450 w 800100"/>
+                <a:gd name="connsiteY2" fmla="*/ 57150 h 417194"/>
+                <a:gd name="connsiteX3" fmla="*/ 552450 w 800100"/>
+                <a:gd name="connsiteY3" fmla="*/ 144780 h 417194"/>
+                <a:gd name="connsiteX4" fmla="*/ 400050 w 800100"/>
+                <a:gd name="connsiteY4" fmla="*/ 0 h 417194"/>
+                <a:gd name="connsiteX5" fmla="*/ 400050 w 800100"/>
+                <a:gd name="connsiteY5" fmla="*/ 0 h 417194"/>
+                <a:gd name="connsiteX6" fmla="*/ 0 w 800100"/>
+                <a:gd name="connsiteY6" fmla="*/ 381000 h 417194"/>
+                <a:gd name="connsiteX7" fmla="*/ 42863 w 800100"/>
+                <a:gd name="connsiteY7" fmla="*/ 417195 h 417194"/>
+                <a:gd name="connsiteX8" fmla="*/ 400050 w 800100"/>
+                <a:gd name="connsiteY8" fmla="*/ 78105 h 417194"/>
+                <a:gd name="connsiteX9" fmla="*/ 400050 w 800100"/>
+                <a:gd name="connsiteY9" fmla="*/ 78105 h 417194"/>
+                <a:gd name="connsiteX10" fmla="*/ 757238 w 800100"/>
+                <a:gd name="connsiteY10" fmla="*/ 417195 h 417194"/>
+                <a:gd name="connsiteX11" fmla="*/ 800100 w 800100"/>
+                <a:gd name="connsiteY11" fmla="*/ 381000 h 417194"/>
+              </a:gdLst>
+              <a:ahLst/>
+              <a:cxnLst>
+                <a:cxn ang="0">
+                  <a:pos x="connsiteX0" y="connsiteY0"/>
+                </a:cxn>
+                <a:cxn ang="0">
+                  <a:pos x="connsiteX1" y="connsiteY1"/>
+                </a:cxn>
+                <a:cxn ang="0">
+                  <a:pos x="connsiteX2" y="connsiteY2"/>
+                </a:cxn>
+                <a:cxn ang="0">
+                  <a:pos x="connsiteX3" y="connsiteY3"/>
+                </a:cxn>
+                <a:cxn ang="0">
+                  <a:pos x="connsiteX4" y="connsiteY4"/>
+                </a:cxn>
+                <a:cxn ang="0">
+                  <a:pos x="connsiteX5" y="connsiteY5"/>
+                </a:cxn>
+                <a:cxn ang="0">
+                  <a:pos x="connsiteX6" y="connsiteY6"/>
+                </a:cxn>
+                <a:cxn ang="0">
+                  <a:pos x="connsiteX7" y="connsiteY7"/>
+                </a:cxn>
+                <a:cxn ang="0">
+                  <a:pos x="connsiteX8" y="connsiteY8"/>
+                </a:cxn>
+                <a:cxn ang="0">
+                  <a:pos x="connsiteX9" y="connsiteY9"/>
+                </a:cxn>
+                <a:cxn ang="0">
+                  <a:pos x="connsiteX10" y="connsiteY10"/>
+                </a:cxn>
+                <a:cxn ang="0">
+                  <a:pos x="connsiteX11" y="connsiteY11"/>
+                </a:cxn>
+              </a:cxnLst>
+              <a:rect l="l" t="t" r="r" b="b"/>
+              <a:pathLst>
+                <a:path w="800100" h="417194">
+                  <a:moveTo>
+                    <a:pt x="628650" y="217170"/>
+                  </a:moveTo>
+                  <a:lnTo>
+                    <a:pt x="628650" y="57150"/>
+                  </a:lnTo>
+                  <a:lnTo>
+                    <a:pt x="552450" y="57150"/>
+                  </a:lnTo>
+                  <a:lnTo>
+                    <a:pt x="552450" y="144780"/>
+                  </a:lnTo>
+                  <a:lnTo>
+                    <a:pt x="400050" y="0"/>
+                  </a:lnTo>
+                  <a:lnTo>
+                    <a:pt x="400050" y="0"/>
+                  </a:lnTo>
+                  <a:lnTo>
+                    <a:pt x="0" y="381000"/>
+                  </a:lnTo>
+                  <a:lnTo>
+                    <a:pt x="42863" y="417195"/>
+                  </a:lnTo>
+                  <a:lnTo>
+                    <a:pt x="400050" y="78105"/>
+                  </a:lnTo>
+                  <a:lnTo>
+                    <a:pt x="400050" y="78105"/>
+                  </a:lnTo>
+                  <a:lnTo>
+                    <a:pt x="757238" y="417195"/>
+                  </a:lnTo>
+                  <a:lnTo>
+                    <a:pt x="800100" y="381000"/>
+                  </a:lnTo>
+                  <a:close/>
+                </a:path>
+              </a:pathLst>
+            </a:custGeom>
+            <a:solidFill>
+              <a:srgbClr val="001489"/>
+            </a:solidFill>
+            <a:ln w="9525" cap="flat">
+              <a:noFill/>
+              <a:prstDash val="solid"/>
+              <a:miter/>
+            </a:ln>
+          </p:spPr>
+          <p:txBody>
+            <a:bodyPr rtlCol="0" anchor="ctr"/>
+            <a:lstStyle/>
+            <a:p>
+              <a:endParaRPr lang="en-GB"/>
+            </a:p>
+          </p:txBody>
+        </p:sp>
+        <p:sp>
+          <p:nvSpPr>
+            <p:cNvPr id="23" name="Freeform: Shape 22">
+              <a:extLst>
+                <a:ext uri="{FF2B5EF4-FFF2-40B4-BE49-F238E27FC236}">
+                  <a16:creationId xmlns:a16="http://schemas.microsoft.com/office/drawing/2014/main" id="{7AA47E31-6EC7-4146-9418-CCADE929DDBF}"/>
+                </a:ext>
+              </a:extLst>
+            </p:cNvPr>
+            <p:cNvSpPr/>
+            <p:nvPr/>
+          </p:nvSpPr>
+          <p:spPr>
+            <a:xfrm>
+              <a:off x="7397473" y="4931971"/>
+              <a:ext cx="571500" cy="554355"/>
+            </a:xfrm>
+            <a:custGeom>
+              <a:avLst/>
+              <a:gdLst>
+                <a:gd name="connsiteX0" fmla="*/ 0 w 571500"/>
+                <a:gd name="connsiteY0" fmla="*/ 271463 h 554355"/>
+                <a:gd name="connsiteX1" fmla="*/ 0 w 571500"/>
+                <a:gd name="connsiteY1" fmla="*/ 554355 h 554355"/>
+                <a:gd name="connsiteX2" fmla="*/ 228600 w 571500"/>
+                <a:gd name="connsiteY2" fmla="*/ 554355 h 554355"/>
+                <a:gd name="connsiteX3" fmla="*/ 228600 w 571500"/>
+                <a:gd name="connsiteY3" fmla="*/ 316230 h 554355"/>
+                <a:gd name="connsiteX4" fmla="*/ 342900 w 571500"/>
+                <a:gd name="connsiteY4" fmla="*/ 316230 h 554355"/>
+                <a:gd name="connsiteX5" fmla="*/ 342900 w 571500"/>
+                <a:gd name="connsiteY5" fmla="*/ 554355 h 554355"/>
+                <a:gd name="connsiteX6" fmla="*/ 571500 w 571500"/>
+                <a:gd name="connsiteY6" fmla="*/ 554355 h 554355"/>
+                <a:gd name="connsiteX7" fmla="*/ 571500 w 571500"/>
+                <a:gd name="connsiteY7" fmla="*/ 271463 h 554355"/>
+                <a:gd name="connsiteX8" fmla="*/ 285750 w 571500"/>
+                <a:gd name="connsiteY8" fmla="*/ 0 h 554355"/>
+                <a:gd name="connsiteX9" fmla="*/ 0 w 571500"/>
+                <a:gd name="connsiteY9" fmla="*/ 271463 h 554355"/>
+                <a:gd name="connsiteX10" fmla="*/ 171450 w 571500"/>
+                <a:gd name="connsiteY10" fmla="*/ 430530 h 554355"/>
+                <a:gd name="connsiteX11" fmla="*/ 57150 w 571500"/>
+                <a:gd name="connsiteY11" fmla="*/ 430530 h 554355"/>
+                <a:gd name="connsiteX12" fmla="*/ 57150 w 571500"/>
+                <a:gd name="connsiteY12" fmla="*/ 316230 h 554355"/>
+                <a:gd name="connsiteX13" fmla="*/ 171450 w 571500"/>
+                <a:gd name="connsiteY13" fmla="*/ 316230 h 554355"/>
+                <a:gd name="connsiteX14" fmla="*/ 171450 w 571500"/>
+                <a:gd name="connsiteY14" fmla="*/ 430530 h 554355"/>
+                <a:gd name="connsiteX15" fmla="*/ 400050 w 571500"/>
+                <a:gd name="connsiteY15" fmla="*/ 316230 h 554355"/>
+                <a:gd name="connsiteX16" fmla="*/ 514350 w 571500"/>
+                <a:gd name="connsiteY16" fmla="*/ 316230 h 554355"/>
+                <a:gd name="connsiteX17" fmla="*/ 514350 w 571500"/>
+                <a:gd name="connsiteY17" fmla="*/ 430530 h 554355"/>
+                <a:gd name="connsiteX18" fmla="*/ 400050 w 571500"/>
+                <a:gd name="connsiteY18" fmla="*/ 430530 h 554355"/>
+                <a:gd name="connsiteX19" fmla="*/ 400050 w 571500"/>
+                <a:gd name="connsiteY19" fmla="*/ 316230 h 554355"/>
+              </a:gdLst>
+              <a:ahLst/>
+              <a:cxnLst>
+                <a:cxn ang="0">
+                  <a:pos x="connsiteX0" y="connsiteY0"/>
+                </a:cxn>
+                <a:cxn ang="0">
+                  <a:pos x="connsiteX1" y="connsiteY1"/>
+                </a:cxn>
+                <a:cxn ang="0">
+                  <a:pos x="connsiteX2" y="connsiteY2"/>
+                </a:cxn>
+                <a:cxn ang="0">
+                  <a:pos x="connsiteX3" y="connsiteY3"/>
+                </a:cxn>
+                <a:cxn ang="0">
+                  <a:pos x="connsiteX4" y="connsiteY4"/>
+                </a:cxn>
+                <a:cxn ang="0">
+                  <a:pos x="connsiteX5" y="connsiteY5"/>
+                </a:cxn>
+                <a:cxn ang="0">
+                  <a:pos x="connsiteX6" y="connsiteY6"/>
+                </a:cxn>
+                <a:cxn ang="0">
+                  <a:pos x="connsiteX7" y="connsiteY7"/>
+                </a:cxn>
+                <a:cxn ang="0">
+                  <a:pos x="connsiteX8" y="connsiteY8"/>
+                </a:cxn>
+                <a:cxn ang="0">
+                  <a:pos x="connsiteX9" y="connsiteY9"/>
+                </a:cxn>
+                <a:cxn ang="0">
+                  <a:pos x="connsiteX10" y="connsiteY10"/>
+                </a:cxn>
+                <a:cxn ang="0">
+                  <a:pos x="connsiteX11" y="connsiteY11"/>
+                </a:cxn>
+                <a:cxn ang="0">
+                  <a:pos x="connsiteX12" y="connsiteY12"/>
+                </a:cxn>
+                <a:cxn ang="0">
+                  <a:pos x="connsiteX13" y="connsiteY13"/>
+                </a:cxn>
+                <a:cxn ang="0">
+                  <a:pos x="connsiteX14" y="connsiteY14"/>
+                </a:cxn>
+                <a:cxn ang="0">
+                  <a:pos x="connsiteX15" y="connsiteY15"/>
+                </a:cxn>
+                <a:cxn ang="0">
+                  <a:pos x="connsiteX16" y="connsiteY16"/>
+                </a:cxn>
+                <a:cxn ang="0">
+                  <a:pos x="connsiteX17" y="connsiteY17"/>
+                </a:cxn>
+                <a:cxn ang="0">
+                  <a:pos x="connsiteX18" y="connsiteY18"/>
+                </a:cxn>
+                <a:cxn ang="0">
+                  <a:pos x="connsiteX19" y="connsiteY19"/>
+                </a:cxn>
+              </a:cxnLst>
+              <a:rect l="l" t="t" r="r" b="b"/>
+              <a:pathLst>
+                <a:path w="571500" h="554355">
+                  <a:moveTo>
+                    <a:pt x="0" y="271463"/>
+                  </a:moveTo>
+                  <a:lnTo>
+                    <a:pt x="0" y="554355"/>
+                  </a:lnTo>
+                  <a:lnTo>
+                    <a:pt x="228600" y="554355"/>
+                  </a:lnTo>
+                  <a:lnTo>
+                    <a:pt x="228600" y="316230"/>
+                  </a:lnTo>
+                  <a:lnTo>
+                    <a:pt x="342900" y="316230"/>
+                  </a:lnTo>
+                  <a:lnTo>
+                    <a:pt x="342900" y="554355"/>
+                  </a:lnTo>
+                  <a:lnTo>
+                    <a:pt x="571500" y="554355"/>
+                  </a:lnTo>
+                  <a:lnTo>
+                    <a:pt x="571500" y="271463"/>
+                  </a:lnTo>
+                  <a:lnTo>
+                    <a:pt x="285750" y="0"/>
+                  </a:lnTo>
+                  <a:lnTo>
+                    <a:pt x="0" y="271463"/>
+                  </a:lnTo>
+                  <a:close/>
+                  <a:moveTo>
+                    <a:pt x="171450" y="430530"/>
+                  </a:moveTo>
+                  <a:lnTo>
+                    <a:pt x="57150" y="430530"/>
+                  </a:lnTo>
+                  <a:lnTo>
+                    <a:pt x="57150" y="316230"/>
+                  </a:lnTo>
+                  <a:lnTo>
+                    <a:pt x="171450" y="316230"/>
+                  </a:lnTo>
+                  <a:lnTo>
+                    <a:pt x="171450" y="430530"/>
+                  </a:lnTo>
+                  <a:close/>
+                  <a:moveTo>
+                    <a:pt x="400050" y="316230"/>
+                  </a:moveTo>
+                  <a:lnTo>
+                    <a:pt x="514350" y="316230"/>
+                  </a:lnTo>
+                  <a:lnTo>
+                    <a:pt x="514350" y="430530"/>
+                  </a:lnTo>
+                  <a:lnTo>
+                    <a:pt x="400050" y="430530"/>
+                  </a:lnTo>
+                  <a:lnTo>
+                    <a:pt x="400050" y="316230"/>
+                  </a:lnTo>
+                  <a:close/>
+                </a:path>
+              </a:pathLst>
+            </a:custGeom>
+            <a:solidFill>
+              <a:srgbClr val="001489"/>
+            </a:solidFill>
+            <a:ln w="9525" cap="flat">
+              <a:noFill/>
+              <a:prstDash val="solid"/>
+              <a:miter/>
+            </a:ln>
+          </p:spPr>
+          <p:txBody>
+            <a:bodyPr rtlCol="0" anchor="ctr"/>
+            <a:lstStyle/>
+            <a:p>
+              <a:endParaRPr lang="en-GB"/>
+            </a:p>
+          </p:txBody>
+        </p:sp>
+      </p:grpSp>
+      <p:grpSp>
+        <p:nvGrpSpPr>
+          <p:cNvPr id="13" name="Group 12">
+            <a:extLst>
+              <a:ext uri="{FF2B5EF4-FFF2-40B4-BE49-F238E27FC236}">
+                <a16:creationId xmlns:a16="http://schemas.microsoft.com/office/drawing/2014/main" id="{FB38EDA5-CD08-4B29-BA68-B50A3C218A98}"/>
+              </a:ext>
+            </a:extLst>
+          </p:cNvPr>
+          <p:cNvGrpSpPr/>
+          <p:nvPr/>
+        </p:nvGrpSpPr>
+        <p:grpSpPr>
+          <a:xfrm>
+            <a:off x="5496217" y="4800585"/>
+            <a:ext cx="800100" cy="685799"/>
+            <a:chOff x="5496217" y="4800585"/>
+            <a:chExt cx="800100" cy="685799"/>
+          </a:xfrm>
+        </p:grpSpPr>
+        <p:sp>
+          <p:nvSpPr>
+            <p:cNvPr id="5" name="Freeform: Shape 4">
+              <a:extLst>
+                <a:ext uri="{FF2B5EF4-FFF2-40B4-BE49-F238E27FC236}">
+                  <a16:creationId xmlns:a16="http://schemas.microsoft.com/office/drawing/2014/main" id="{E11C0511-4702-49E6-8F57-8E108DABD8D5}"/>
+                </a:ext>
+              </a:extLst>
+            </p:cNvPr>
+            <p:cNvSpPr/>
+            <p:nvPr/>
+          </p:nvSpPr>
+          <p:spPr>
+            <a:xfrm>
+              <a:off x="5496217" y="4800585"/>
+              <a:ext cx="800100" cy="417194"/>
+            </a:xfrm>
+            <a:custGeom>
+              <a:avLst/>
+              <a:gdLst>
+                <a:gd name="connsiteX0" fmla="*/ 400050 w 800100"/>
+                <a:gd name="connsiteY0" fmla="*/ 0 h 417194"/>
+                <a:gd name="connsiteX1" fmla="*/ 400050 w 800100"/>
+                <a:gd name="connsiteY1" fmla="*/ 0 h 417194"/>
+                <a:gd name="connsiteX2" fmla="*/ 0 w 800100"/>
+                <a:gd name="connsiteY2" fmla="*/ 381000 h 417194"/>
+                <a:gd name="connsiteX3" fmla="*/ 42863 w 800100"/>
+                <a:gd name="connsiteY3" fmla="*/ 417195 h 417194"/>
+                <a:gd name="connsiteX4" fmla="*/ 400050 w 800100"/>
+                <a:gd name="connsiteY4" fmla="*/ 78105 h 417194"/>
+                <a:gd name="connsiteX5" fmla="*/ 400050 w 800100"/>
+                <a:gd name="connsiteY5" fmla="*/ 78105 h 417194"/>
+                <a:gd name="connsiteX6" fmla="*/ 757238 w 800100"/>
+                <a:gd name="connsiteY6" fmla="*/ 417195 h 417194"/>
+                <a:gd name="connsiteX7" fmla="*/ 800100 w 800100"/>
+                <a:gd name="connsiteY7" fmla="*/ 381000 h 417194"/>
+              </a:gdLst>
+              <a:ahLst/>
+              <a:cxnLst>
+                <a:cxn ang="0">
+                  <a:pos x="connsiteX0" y="connsiteY0"/>
+                </a:cxn>
+                <a:cxn ang="0">
+                  <a:pos x="connsiteX1" y="connsiteY1"/>
+                </a:cxn>
+                <a:cxn ang="0">
+                  <a:pos x="connsiteX2" y="connsiteY2"/>
+                </a:cxn>
+                <a:cxn ang="0">
+                  <a:pos x="connsiteX3" y="connsiteY3"/>
+                </a:cxn>
+                <a:cxn ang="0">
+                  <a:pos x="connsiteX4" y="connsiteY4"/>
+                </a:cxn>
+                <a:cxn ang="0">
+                  <a:pos x="connsiteX5" y="connsiteY5"/>
+                </a:cxn>
+                <a:cxn ang="0">
+                  <a:pos x="connsiteX6" y="connsiteY6"/>
+                </a:cxn>
+                <a:cxn ang="0">
+                  <a:pos x="connsiteX7" y="connsiteY7"/>
+                </a:cxn>
+              </a:cxnLst>
+              <a:rect l="l" t="t" r="r" b="b"/>
+              <a:pathLst>
+                <a:path w="800100" h="417194">
+                  <a:moveTo>
+                    <a:pt x="400050" y="0"/>
+                  </a:moveTo>
+                  <a:lnTo>
+                    <a:pt x="400050" y="0"/>
+                  </a:lnTo>
+                  <a:lnTo>
+                    <a:pt x="0" y="381000"/>
+                  </a:lnTo>
+                  <a:lnTo>
+                    <a:pt x="42863" y="417195"/>
+                  </a:lnTo>
+                  <a:lnTo>
+                    <a:pt x="400050" y="78105"/>
+                  </a:lnTo>
+                  <a:lnTo>
+                    <a:pt x="400050" y="78105"/>
+                  </a:lnTo>
+                  <a:lnTo>
+                    <a:pt x="757238" y="417195"/>
+                  </a:lnTo>
+                  <a:lnTo>
+                    <a:pt x="800100" y="381000"/>
+                  </a:lnTo>
+                  <a:close/>
+                </a:path>
+              </a:pathLst>
+            </a:custGeom>
+            <a:solidFill>
+              <a:srgbClr val="001489"/>
+            </a:solidFill>
+            <a:ln w="9525" cap="flat">
+              <a:noFill/>
+              <a:prstDash val="solid"/>
+              <a:miter/>
+            </a:ln>
+          </p:spPr>
+          <p:txBody>
+            <a:bodyPr rtlCol="0" anchor="ctr"/>
+            <a:lstStyle/>
+            <a:p>
+              <a:endParaRPr lang="en-GB"/>
+            </a:p>
+          </p:txBody>
+        </p:sp>
+        <p:sp>
+          <p:nvSpPr>
+            <p:cNvPr id="12" name="Freeform: Shape 11">
+              <a:extLst>
+                <a:ext uri="{FF2B5EF4-FFF2-40B4-BE49-F238E27FC236}">
+                  <a16:creationId xmlns:a16="http://schemas.microsoft.com/office/drawing/2014/main" id="{9DB18F9C-1EC4-4190-B3B6-1C7AAB6FC019}"/>
+                </a:ext>
+              </a:extLst>
+            </p:cNvPr>
+            <p:cNvSpPr/>
+            <p:nvPr/>
+          </p:nvSpPr>
+          <p:spPr>
+            <a:xfrm>
+              <a:off x="5610517" y="4932029"/>
+              <a:ext cx="571500" cy="554355"/>
+            </a:xfrm>
+            <a:custGeom>
+              <a:avLst/>
+              <a:gdLst>
+                <a:gd name="connsiteX0" fmla="*/ 0 w 571500"/>
+                <a:gd name="connsiteY0" fmla="*/ 271463 h 554355"/>
+                <a:gd name="connsiteX1" fmla="*/ 0 w 571500"/>
+                <a:gd name="connsiteY1" fmla="*/ 554355 h 554355"/>
+                <a:gd name="connsiteX2" fmla="*/ 228600 w 571500"/>
+                <a:gd name="connsiteY2" fmla="*/ 554355 h 554355"/>
+                <a:gd name="connsiteX3" fmla="*/ 228600 w 571500"/>
+                <a:gd name="connsiteY3" fmla="*/ 316230 h 554355"/>
+                <a:gd name="connsiteX4" fmla="*/ 342900 w 571500"/>
+                <a:gd name="connsiteY4" fmla="*/ 316230 h 554355"/>
+                <a:gd name="connsiteX5" fmla="*/ 342900 w 571500"/>
+                <a:gd name="connsiteY5" fmla="*/ 554355 h 554355"/>
+                <a:gd name="connsiteX6" fmla="*/ 571500 w 571500"/>
+                <a:gd name="connsiteY6" fmla="*/ 554355 h 554355"/>
+                <a:gd name="connsiteX7" fmla="*/ 571500 w 571500"/>
+                <a:gd name="connsiteY7" fmla="*/ 271463 h 554355"/>
+                <a:gd name="connsiteX8" fmla="*/ 285750 w 571500"/>
+                <a:gd name="connsiteY8" fmla="*/ 0 h 554355"/>
+                <a:gd name="connsiteX9" fmla="*/ 0 w 571500"/>
+                <a:gd name="connsiteY9" fmla="*/ 271463 h 554355"/>
+              </a:gdLst>
+              <a:ahLst/>
+              <a:cxnLst>
+                <a:cxn ang="0">
+                  <a:pos x="connsiteX0" y="connsiteY0"/>
+                </a:cxn>
+                <a:cxn ang="0">
+                  <a:pos x="connsiteX1" y="connsiteY1"/>
+                </a:cxn>
+                <a:cxn ang="0">
+                  <a:pos x="connsiteX2" y="connsiteY2"/>
+                </a:cxn>
+                <a:cxn ang="0">
+                  <a:pos x="connsiteX3" y="connsiteY3"/>
+                </a:cxn>
+                <a:cxn ang="0">
+                  <a:pos x="connsiteX4" y="connsiteY4"/>
+                </a:cxn>
+                <a:cxn ang="0">
+                  <a:pos x="connsiteX5" y="connsiteY5"/>
+                </a:cxn>
+                <a:cxn ang="0">
+                  <a:pos x="connsiteX6" y="connsiteY6"/>
+                </a:cxn>
+                <a:cxn ang="0">
+                  <a:pos x="connsiteX7" y="connsiteY7"/>
+                </a:cxn>
+                <a:cxn ang="0">
+                  <a:pos x="connsiteX8" y="connsiteY8"/>
+                </a:cxn>
+                <a:cxn ang="0">
+                  <a:pos x="connsiteX9" y="connsiteY9"/>
+                </a:cxn>
+              </a:cxnLst>
+              <a:rect l="l" t="t" r="r" b="b"/>
+              <a:pathLst>
+                <a:path w="571500" h="554355">
+                  <a:moveTo>
+                    <a:pt x="0" y="271463"/>
+                  </a:moveTo>
+                  <a:lnTo>
+                    <a:pt x="0" y="554355"/>
+                  </a:lnTo>
+                  <a:lnTo>
+                    <a:pt x="228600" y="554355"/>
+                  </a:lnTo>
+                  <a:lnTo>
+                    <a:pt x="228600" y="316230"/>
+                  </a:lnTo>
+                  <a:lnTo>
+                    <a:pt x="342900" y="316230"/>
+                  </a:lnTo>
+                  <a:lnTo>
+                    <a:pt x="342900" y="554355"/>
+                  </a:lnTo>
+                  <a:lnTo>
+                    <a:pt x="571500" y="554355"/>
+                  </a:lnTo>
+                  <a:lnTo>
+                    <a:pt x="571500" y="271463"/>
+                  </a:lnTo>
+                  <a:lnTo>
+                    <a:pt x="285750" y="0"/>
+                  </a:lnTo>
+                  <a:lnTo>
+                    <a:pt x="0" y="271463"/>
+                  </a:lnTo>
+                  <a:close/>
+                </a:path>
+              </a:pathLst>
+            </a:custGeom>
+            <a:solidFill>
+              <a:srgbClr val="001489"/>
+            </a:solidFill>
+            <a:ln w="9525" cap="flat">
+              <a:noFill/>
+              <a:prstDash val="solid"/>
+              <a:miter/>
+            </a:ln>
+          </p:spPr>
+          <p:txBody>
+            <a:bodyPr rtlCol="0" anchor="ctr"/>
+            <a:lstStyle/>
+            <a:p>
+              <a:endParaRPr lang="en-GB"/>
+            </a:p>
+          </p:txBody>
+        </p:sp>
+      </p:grpSp>
     </p:spTree>
     <p:extLst>
       <p:ext uri="{BB962C8B-B14F-4D97-AF65-F5344CB8AC3E}">

</xml_diff>

<commit_message>
FE-1472 FE-1471 FE-1478 FE-1479 Adding NHS Activities
</commit_message>
<xml_diff>
--- a/HelpMyStreetFE/HelpMyStreetFE/src/pptx/Icons.pptx
+++ b/HelpMyStreetFE/HelpMyStreetFE/src/pptx/Icons.pptx
@@ -13,6 +13,8 @@
     <p:sldId id="261" r:id="rId7"/>
     <p:sldId id="260" r:id="rId8"/>
     <p:sldId id="262" r:id="rId9"/>
+    <p:sldId id="264" r:id="rId10"/>
+    <p:sldId id="265" r:id="rId11"/>
   </p:sldIdLst>
   <p:sldSz cx="12192000" cy="6858000"/>
   <p:notesSz cx="6858000" cy="9144000"/>
@@ -268,7 +270,7 @@
           <a:p>
             <a:fld id="{B2EC5630-BBBD-40F6-B459-AD74AAD6AD00}" type="datetimeFigureOut">
               <a:rPr lang="en-GB" smtClean="0"/>
-              <a:t>02/03/2022</a:t>
+              <a:t>05/07/2022</a:t>
             </a:fld>
             <a:endParaRPr lang="en-GB"/>
           </a:p>
@@ -468,7 +470,7 @@
           <a:p>
             <a:fld id="{B2EC5630-BBBD-40F6-B459-AD74AAD6AD00}" type="datetimeFigureOut">
               <a:rPr lang="en-GB" smtClean="0"/>
-              <a:t>02/03/2022</a:t>
+              <a:t>05/07/2022</a:t>
             </a:fld>
             <a:endParaRPr lang="en-GB"/>
           </a:p>
@@ -678,7 +680,7 @@
           <a:p>
             <a:fld id="{B2EC5630-BBBD-40F6-B459-AD74AAD6AD00}" type="datetimeFigureOut">
               <a:rPr lang="en-GB" smtClean="0"/>
-              <a:t>02/03/2022</a:t>
+              <a:t>05/07/2022</a:t>
             </a:fld>
             <a:endParaRPr lang="en-GB"/>
           </a:p>
@@ -878,7 +880,7 @@
           <a:p>
             <a:fld id="{B2EC5630-BBBD-40F6-B459-AD74AAD6AD00}" type="datetimeFigureOut">
               <a:rPr lang="en-GB" smtClean="0"/>
-              <a:t>02/03/2022</a:t>
+              <a:t>05/07/2022</a:t>
             </a:fld>
             <a:endParaRPr lang="en-GB"/>
           </a:p>
@@ -1154,7 +1156,7 @@
           <a:p>
             <a:fld id="{B2EC5630-BBBD-40F6-B459-AD74AAD6AD00}" type="datetimeFigureOut">
               <a:rPr lang="en-GB" smtClean="0"/>
-              <a:t>02/03/2022</a:t>
+              <a:t>05/07/2022</a:t>
             </a:fld>
             <a:endParaRPr lang="en-GB"/>
           </a:p>
@@ -1422,7 +1424,7 @@
           <a:p>
             <a:fld id="{B2EC5630-BBBD-40F6-B459-AD74AAD6AD00}" type="datetimeFigureOut">
               <a:rPr lang="en-GB" smtClean="0"/>
-              <a:t>02/03/2022</a:t>
+              <a:t>05/07/2022</a:t>
             </a:fld>
             <a:endParaRPr lang="en-GB"/>
           </a:p>
@@ -1837,7 +1839,7 @@
           <a:p>
             <a:fld id="{B2EC5630-BBBD-40F6-B459-AD74AAD6AD00}" type="datetimeFigureOut">
               <a:rPr lang="en-GB" smtClean="0"/>
-              <a:t>02/03/2022</a:t>
+              <a:t>05/07/2022</a:t>
             </a:fld>
             <a:endParaRPr lang="en-GB"/>
           </a:p>
@@ -1979,7 +1981,7 @@
           <a:p>
             <a:fld id="{B2EC5630-BBBD-40F6-B459-AD74AAD6AD00}" type="datetimeFigureOut">
               <a:rPr lang="en-GB" smtClean="0"/>
-              <a:t>02/03/2022</a:t>
+              <a:t>05/07/2022</a:t>
             </a:fld>
             <a:endParaRPr lang="en-GB"/>
           </a:p>
@@ -2092,7 +2094,7 @@
           <a:p>
             <a:fld id="{B2EC5630-BBBD-40F6-B459-AD74AAD6AD00}" type="datetimeFigureOut">
               <a:rPr lang="en-GB" smtClean="0"/>
-              <a:t>02/03/2022</a:t>
+              <a:t>05/07/2022</a:t>
             </a:fld>
             <a:endParaRPr lang="en-GB"/>
           </a:p>
@@ -2405,7 +2407,7 @@
           <a:p>
             <a:fld id="{B2EC5630-BBBD-40F6-B459-AD74AAD6AD00}" type="datetimeFigureOut">
               <a:rPr lang="en-GB" smtClean="0"/>
-              <a:t>02/03/2022</a:t>
+              <a:t>05/07/2022</a:t>
             </a:fld>
             <a:endParaRPr lang="en-GB"/>
           </a:p>
@@ -2694,7 +2696,7 @@
           <a:p>
             <a:fld id="{B2EC5630-BBBD-40F6-B459-AD74AAD6AD00}" type="datetimeFigureOut">
               <a:rPr lang="en-GB" smtClean="0"/>
-              <a:t>02/03/2022</a:t>
+              <a:t>05/07/2022</a:t>
             </a:fld>
             <a:endParaRPr lang="en-GB"/>
           </a:p>
@@ -2937,7 +2939,7 @@
           <a:p>
             <a:fld id="{B2EC5630-BBBD-40F6-B459-AD74AAD6AD00}" type="datetimeFigureOut">
               <a:rPr lang="en-GB" smtClean="0"/>
-              <a:t>02/03/2022</a:t>
+              <a:t>05/07/2022</a:t>
             </a:fld>
             <a:endParaRPr lang="en-GB"/>
           </a:p>
@@ -4261,6 +4263,339 @@
     <p:extLst>
       <p:ext uri="{BB962C8B-B14F-4D97-AF65-F5344CB8AC3E}">
         <p14:creationId xmlns:p14="http://schemas.microsoft.com/office/powerpoint/2010/main" val="1306560118"/>
+      </p:ext>
+    </p:extLst>
+  </p:cSld>
+  <p:clrMapOvr>
+    <a:masterClrMapping/>
+  </p:clrMapOvr>
+</p:sld>
+</file>
+
+<file path=ppt/slides/slide10.xml><?xml version="1.0" encoding="utf-8"?>
+<p:sld xmlns:a="http://schemas.openxmlformats.org/drawingml/2006/main" xmlns:r="http://schemas.openxmlformats.org/officeDocument/2006/relationships" xmlns:p="http://schemas.openxmlformats.org/presentationml/2006/main">
+  <p:cSld>
+    <p:spTree>
+      <p:nvGrpSpPr>
+        <p:cNvPr id="1" name=""/>
+        <p:cNvGrpSpPr/>
+        <p:nvPr/>
+      </p:nvGrpSpPr>
+      <p:grpSpPr>
+        <a:xfrm>
+          <a:off x="0" y="0"/>
+          <a:ext cx="0" cy="0"/>
+          <a:chOff x="0" y="0"/>
+          <a:chExt cx="0" cy="0"/>
+        </a:xfrm>
+      </p:grpSpPr>
+      <p:pic>
+        <p:nvPicPr>
+          <p:cNvPr id="4" name="Picture 3" descr="Icon&#10;&#10;Description automatically generated">
+            <a:extLst>
+              <a:ext uri="{FF2B5EF4-FFF2-40B4-BE49-F238E27FC236}">
+                <a16:creationId xmlns:a16="http://schemas.microsoft.com/office/drawing/2014/main" id="{F6B4DF3D-547C-E6B9-2CD1-3F325F3D9E1C}"/>
+              </a:ext>
+            </a:extLst>
+          </p:cNvPr>
+          <p:cNvPicPr>
+            <a:picLocks noChangeAspect="1"/>
+          </p:cNvPicPr>
+          <p:nvPr/>
+        </p:nvPicPr>
+        <p:blipFill>
+          <a:blip r:embed="rId2">
+            <a:extLst>
+              <a:ext uri="{28A0092B-C50C-407E-A947-70E740481C1C}">
+                <a14:useLocalDpi xmlns:a14="http://schemas.microsoft.com/office/drawing/2010/main" val="0"/>
+              </a:ext>
+            </a:extLst>
+          </a:blip>
+          <a:stretch>
+            <a:fillRect/>
+          </a:stretch>
+        </p:blipFill>
+        <p:spPr>
+          <a:xfrm>
+            <a:off x="554067" y="348238"/>
+            <a:ext cx="1314143" cy="1372278"/>
+          </a:xfrm>
+          <a:prstGeom prst="rect">
+            <a:avLst/>
+          </a:prstGeom>
+          <a:ln>
+            <a:noFill/>
+          </a:ln>
+        </p:spPr>
+      </p:pic>
+      <p:sp>
+        <p:nvSpPr>
+          <p:cNvPr id="5" name="Oval 4">
+            <a:extLst>
+              <a:ext uri="{FF2B5EF4-FFF2-40B4-BE49-F238E27FC236}">
+                <a16:creationId xmlns:a16="http://schemas.microsoft.com/office/drawing/2014/main" id="{B4D919BC-CE56-35A3-6413-6FEA932C9FF6}"/>
+              </a:ext>
+            </a:extLst>
+          </p:cNvPr>
+          <p:cNvSpPr/>
+          <p:nvPr/>
+        </p:nvSpPr>
+        <p:spPr>
+          <a:xfrm>
+            <a:off x="2940371" y="137009"/>
+            <a:ext cx="6311258" cy="6311256"/>
+          </a:xfrm>
+          <a:prstGeom prst="ellipse">
+            <a:avLst/>
+          </a:prstGeom>
+          <a:solidFill>
+            <a:srgbClr val="005EB8"/>
+          </a:solidFill>
+          <a:ln>
+            <a:noFill/>
+          </a:ln>
+        </p:spPr>
+        <p:style>
+          <a:lnRef idx="2">
+            <a:schemeClr val="accent1">
+              <a:shade val="50000"/>
+            </a:schemeClr>
+          </a:lnRef>
+          <a:fillRef idx="1">
+            <a:schemeClr val="accent1"/>
+          </a:fillRef>
+          <a:effectRef idx="0">
+            <a:schemeClr val="accent1"/>
+          </a:effectRef>
+          <a:fontRef idx="minor">
+            <a:schemeClr val="lt1"/>
+          </a:fontRef>
+        </p:style>
+        <p:txBody>
+          <a:bodyPr rtlCol="0" anchor="ctr"/>
+          <a:lstStyle/>
+          <a:p>
+            <a:pPr algn="ctr"/>
+            <a:endParaRPr lang="en-GB" dirty="0"/>
+          </a:p>
+        </p:txBody>
+      </p:sp>
+      <p:sp>
+        <p:nvSpPr>
+          <p:cNvPr id="6" name="Rectangle: Rounded Corners 5">
+            <a:extLst>
+              <a:ext uri="{FF2B5EF4-FFF2-40B4-BE49-F238E27FC236}">
+                <a16:creationId xmlns:a16="http://schemas.microsoft.com/office/drawing/2014/main" id="{2B239533-BF9F-30C6-2CC5-D192F6395267}"/>
+              </a:ext>
+            </a:extLst>
+          </p:cNvPr>
+          <p:cNvSpPr/>
+          <p:nvPr/>
+        </p:nvSpPr>
+        <p:spPr>
+          <a:xfrm>
+            <a:off x="4752474" y="928432"/>
+            <a:ext cx="2687052" cy="4728410"/>
+          </a:xfrm>
+          <a:prstGeom prst="roundRect">
+            <a:avLst>
+              <a:gd name="adj" fmla="val 12936"/>
+            </a:avLst>
+          </a:prstGeom>
+          <a:solidFill>
+            <a:schemeClr val="bg1"/>
+          </a:solidFill>
+          <a:ln>
+            <a:noFill/>
+          </a:ln>
+        </p:spPr>
+        <p:style>
+          <a:lnRef idx="2">
+            <a:schemeClr val="accent1">
+              <a:shade val="50000"/>
+            </a:schemeClr>
+          </a:lnRef>
+          <a:fillRef idx="1">
+            <a:schemeClr val="accent1"/>
+          </a:fillRef>
+          <a:effectRef idx="0">
+            <a:schemeClr val="accent1"/>
+          </a:effectRef>
+          <a:fontRef idx="minor">
+            <a:schemeClr val="lt1"/>
+          </a:fontRef>
+        </p:style>
+        <p:txBody>
+          <a:bodyPr rtlCol="0" anchor="ctr"/>
+          <a:lstStyle/>
+          <a:p>
+            <a:pPr algn="ctr"/>
+            <a:endParaRPr lang="en-GB"/>
+          </a:p>
+        </p:txBody>
+      </p:sp>
+      <p:sp>
+        <p:nvSpPr>
+          <p:cNvPr id="7" name="Rectangle 6">
+            <a:extLst>
+              <a:ext uri="{FF2B5EF4-FFF2-40B4-BE49-F238E27FC236}">
+                <a16:creationId xmlns:a16="http://schemas.microsoft.com/office/drawing/2014/main" id="{F7F42410-77DC-B243-387B-1761C6364742}"/>
+              </a:ext>
+            </a:extLst>
+          </p:cNvPr>
+          <p:cNvSpPr/>
+          <p:nvPr/>
+        </p:nvSpPr>
+        <p:spPr>
+          <a:xfrm>
+            <a:off x="5035216" y="1491636"/>
+            <a:ext cx="2121568" cy="2999873"/>
+          </a:xfrm>
+          <a:prstGeom prst="rect">
+            <a:avLst/>
+          </a:prstGeom>
+          <a:solidFill>
+            <a:srgbClr val="005EB8"/>
+          </a:solidFill>
+          <a:ln>
+            <a:noFill/>
+          </a:ln>
+        </p:spPr>
+        <p:style>
+          <a:lnRef idx="2">
+            <a:schemeClr val="accent1">
+              <a:shade val="50000"/>
+            </a:schemeClr>
+          </a:lnRef>
+          <a:fillRef idx="1">
+            <a:schemeClr val="accent1"/>
+          </a:fillRef>
+          <a:effectRef idx="0">
+            <a:schemeClr val="accent1"/>
+          </a:effectRef>
+          <a:fontRef idx="minor">
+            <a:schemeClr val="lt1"/>
+          </a:fontRef>
+        </p:style>
+        <p:txBody>
+          <a:bodyPr rtlCol="0" anchor="ctr"/>
+          <a:lstStyle/>
+          <a:p>
+            <a:pPr algn="ctr"/>
+            <a:endParaRPr lang="en-GB"/>
+          </a:p>
+        </p:txBody>
+      </p:sp>
+      <p:sp>
+        <p:nvSpPr>
+          <p:cNvPr id="12" name="Rectangle: Rounded Corners 11">
+            <a:extLst>
+              <a:ext uri="{FF2B5EF4-FFF2-40B4-BE49-F238E27FC236}">
+                <a16:creationId xmlns:a16="http://schemas.microsoft.com/office/drawing/2014/main" id="{868BDEFD-4EED-618A-D101-1924DBC5F2C7}"/>
+              </a:ext>
+            </a:extLst>
+          </p:cNvPr>
+          <p:cNvSpPr/>
+          <p:nvPr/>
+        </p:nvSpPr>
+        <p:spPr>
+          <a:xfrm>
+            <a:off x="5582653" y="1153147"/>
+            <a:ext cx="1026695" cy="144379"/>
+          </a:xfrm>
+          <a:prstGeom prst="roundRect">
+            <a:avLst>
+              <a:gd name="adj" fmla="val 50000"/>
+            </a:avLst>
+          </a:prstGeom>
+          <a:solidFill>
+            <a:srgbClr val="005EB8"/>
+          </a:solidFill>
+          <a:ln>
+            <a:noFill/>
+          </a:ln>
+        </p:spPr>
+        <p:style>
+          <a:lnRef idx="2">
+            <a:schemeClr val="accent1">
+              <a:shade val="50000"/>
+            </a:schemeClr>
+          </a:lnRef>
+          <a:fillRef idx="1">
+            <a:schemeClr val="accent1"/>
+          </a:fillRef>
+          <a:effectRef idx="0">
+            <a:schemeClr val="accent1"/>
+          </a:effectRef>
+          <a:fontRef idx="minor">
+            <a:schemeClr val="lt1"/>
+          </a:fontRef>
+        </p:style>
+        <p:txBody>
+          <a:bodyPr rtlCol="0" anchor="ctr"/>
+          <a:lstStyle/>
+          <a:p>
+            <a:pPr algn="ctr"/>
+            <a:endParaRPr lang="en-GB"/>
+          </a:p>
+        </p:txBody>
+      </p:sp>
+      <p:sp>
+        <p:nvSpPr>
+          <p:cNvPr id="13" name="Oval 12">
+            <a:extLst>
+              <a:ext uri="{FF2B5EF4-FFF2-40B4-BE49-F238E27FC236}">
+                <a16:creationId xmlns:a16="http://schemas.microsoft.com/office/drawing/2014/main" id="{D772E904-E4BA-73B6-1F78-299490E018CF}"/>
+              </a:ext>
+            </a:extLst>
+          </p:cNvPr>
+          <p:cNvSpPr/>
+          <p:nvPr/>
+        </p:nvSpPr>
+        <p:spPr>
+          <a:xfrm>
+            <a:off x="5892466" y="4846682"/>
+            <a:ext cx="407068" cy="407068"/>
+          </a:xfrm>
+          <a:prstGeom prst="ellipse">
+            <a:avLst/>
+          </a:prstGeom>
+          <a:solidFill>
+            <a:srgbClr val="005EB8"/>
+          </a:solidFill>
+          <a:ln>
+            <a:noFill/>
+          </a:ln>
+        </p:spPr>
+        <p:style>
+          <a:lnRef idx="2">
+            <a:schemeClr val="accent1">
+              <a:shade val="50000"/>
+            </a:schemeClr>
+          </a:lnRef>
+          <a:fillRef idx="1">
+            <a:schemeClr val="accent1"/>
+          </a:fillRef>
+          <a:effectRef idx="0">
+            <a:schemeClr val="accent1"/>
+          </a:effectRef>
+          <a:fontRef idx="minor">
+            <a:schemeClr val="lt1"/>
+          </a:fontRef>
+        </p:style>
+        <p:txBody>
+          <a:bodyPr rtlCol="0" anchor="ctr"/>
+          <a:lstStyle/>
+          <a:p>
+            <a:pPr algn="ctr"/>
+            <a:endParaRPr lang="en-GB"/>
+          </a:p>
+        </p:txBody>
+      </p:sp>
+    </p:spTree>
+    <p:extLst>
+      <p:ext uri="{BB962C8B-B14F-4D97-AF65-F5344CB8AC3E}">
+        <p14:creationId xmlns:p14="http://schemas.microsoft.com/office/powerpoint/2010/main" val="1755716922"/>
       </p:ext>
     </p:extLst>
   </p:cSld>
@@ -16556,42 +16891,54 @@
           </p:cNvGraphicFramePr>
           <p:nvPr>
             <p:ph idx="1"/>
+            <p:extLst>
+              <p:ext uri="{D42A27DB-BD31-4B8C-83A1-F6EECF244321}">
+                <p14:modId xmlns:p14="http://schemas.microsoft.com/office/powerpoint/2010/main" val="2234379653"/>
+              </p:ext>
+            </p:extLst>
           </p:nvPr>
         </p:nvGraphicFramePr>
         <p:xfrm>
           <a:off x="838200" y="3269774"/>
-          <a:ext cx="10515600" cy="1463040"/>
+          <a:ext cx="10750295" cy="1463040"/>
         </p:xfrm>
         <a:graphic>
           <a:graphicData uri="http://schemas.openxmlformats.org/drawingml/2006/table">
             <a:tbl>
               <a:tblPr/>
               <a:tblGrid>
-                <a:gridCol w="2628900">
+                <a:gridCol w="1520952">
                   <a:extLst>
                     <a:ext uri="{9D8B030D-6E8A-4147-A177-3AD203B41FA5}">
                       <a16:colId xmlns:a16="http://schemas.microsoft.com/office/drawing/2014/main" val="3342120626"/>
                     </a:ext>
                   </a:extLst>
                 </a:gridCol>
-                <a:gridCol w="2628900">
+                <a:gridCol w="2249424">
                   <a:extLst>
                     <a:ext uri="{9D8B030D-6E8A-4147-A177-3AD203B41FA5}">
                       <a16:colId xmlns:a16="http://schemas.microsoft.com/office/drawing/2014/main" val="2836923470"/>
                     </a:ext>
                   </a:extLst>
                 </a:gridCol>
-                <a:gridCol w="2628900">
+                <a:gridCol w="2679801">
                   <a:extLst>
                     <a:ext uri="{9D8B030D-6E8A-4147-A177-3AD203B41FA5}">
                       <a16:colId xmlns:a16="http://schemas.microsoft.com/office/drawing/2014/main" val="145285366"/>
                     </a:ext>
                   </a:extLst>
                 </a:gridCol>
-                <a:gridCol w="2628900">
+                <a:gridCol w="2150059">
                   <a:extLst>
                     <a:ext uri="{9D8B030D-6E8A-4147-A177-3AD203B41FA5}">
                       <a16:colId xmlns:a16="http://schemas.microsoft.com/office/drawing/2014/main" val="3606555231"/>
+                    </a:ext>
+                  </a:extLst>
+                </a:gridCol>
+                <a:gridCol w="2150059">
+                  <a:extLst>
+                    <a:ext uri="{9D8B030D-6E8A-4147-A177-3AD203B41FA5}">
+                      <a16:colId xmlns:a16="http://schemas.microsoft.com/office/drawing/2014/main" val="371966075"/>
                     </a:ext>
                   </a:extLst>
                 </a:gridCol>
@@ -16684,10 +17031,36 @@
                     <a:lstStyle/>
                     <a:p>
                       <a:r>
-                        <a:rPr lang="en-GB" b="1"/>
+                        <a:rPr lang="en-GB" b="1" dirty="0"/>
                         <a:t>Befriending (Purple)</a:t>
                       </a:r>
-                      <a:endParaRPr lang="en-GB"/>
+                      <a:endParaRPr lang="en-GB" dirty="0"/>
+                    </a:p>
+                  </a:txBody>
+                  <a:tcPr anchor="ctr">
+                    <a:lnL>
+                      <a:noFill/>
+                    </a:lnL>
+                    <a:lnR>
+                      <a:noFill/>
+                    </a:lnR>
+                    <a:lnT>
+                      <a:noFill/>
+                    </a:lnT>
+                    <a:lnB>
+                      <a:noFill/>
+                    </a:lnB>
+                  </a:tcPr>
+                </a:tc>
+                <a:tc>
+                  <a:txBody>
+                    <a:bodyPr/>
+                    <a:lstStyle/>
+                    <a:p>
+                      <a:r>
+                        <a:rPr lang="en-GB" b="1" dirty="0"/>
+                        <a:t>NHS</a:t>
+                      </a:r>
                     </a:p>
                   </a:txBody>
                   <a:tcPr anchor="ctr">
@@ -16797,8 +17170,38 @@
                     <a:lstStyle/>
                     <a:p>
                       <a:r>
-                        <a:rPr lang="en-GB"/>
+                        <a:rPr lang="en-GB" dirty="0"/>
                         <a:t>light-purple</a:t>
+                      </a:r>
+                    </a:p>
+                  </a:txBody>
+                  <a:tcPr anchor="ctr">
+                    <a:lnL>
+                      <a:noFill/>
+                    </a:lnL>
+                    <a:lnR>
+                      <a:noFill/>
+                    </a:lnR>
+                    <a:lnT>
+                      <a:noFill/>
+                    </a:lnT>
+                    <a:lnB>
+                      <a:noFill/>
+                    </a:lnB>
+                  </a:tcPr>
+                </a:tc>
+                <a:tc>
+                  <a:txBody>
+                    <a:bodyPr/>
+                    <a:lstStyle/>
+                    <a:p>
+                      <a:r>
+                        <a:rPr lang="en-GB" dirty="0" err="1"/>
+                        <a:t>nhs</a:t>
+                      </a:r>
+                      <a:r>
+                        <a:rPr lang="en-GB" dirty="0"/>
+                        <a:t>-blue</a:t>
                       </a:r>
                     </a:p>
                   </a:txBody>
@@ -16857,7 +17260,7 @@
                     <a:lstStyle/>
                     <a:p>
                       <a:r>
-                        <a:rPr lang="en-GB"/>
+                        <a:rPr lang="en-GB" dirty="0"/>
                         <a:t>#1e91d6</a:t>
                       </a:r>
                     </a:p>
@@ -16909,8 +17312,34 @@
                     <a:lstStyle/>
                     <a:p>
                       <a:r>
-                        <a:rPr lang="en-GB"/>
+                        <a:rPr lang="en-GB" dirty="0"/>
                         <a:t>#574AE2</a:t>
+                      </a:r>
+                    </a:p>
+                  </a:txBody>
+                  <a:tcPr anchor="ctr">
+                    <a:lnL>
+                      <a:noFill/>
+                    </a:lnL>
+                    <a:lnR>
+                      <a:noFill/>
+                    </a:lnR>
+                    <a:lnT>
+                      <a:noFill/>
+                    </a:lnT>
+                    <a:lnB>
+                      <a:noFill/>
+                    </a:lnB>
+                  </a:tcPr>
+                </a:tc>
+                <a:tc>
+                  <a:txBody>
+                    <a:bodyPr/>
+                    <a:lstStyle/>
+                    <a:p>
+                      <a:r>
+                        <a:rPr lang="en-GB" dirty="0"/>
+                        <a:t>#005EB8</a:t>
                       </a:r>
                     </a:p>
                   </a:txBody>
@@ -17027,6 +17456,32 @@
                       <a:r>
                         <a:rPr lang="en-GB" dirty="0"/>
                         <a:t>(87,74,226,0.71)</a:t>
+                      </a:r>
+                    </a:p>
+                  </a:txBody>
+                  <a:tcPr anchor="ctr">
+                    <a:lnL>
+                      <a:noFill/>
+                    </a:lnL>
+                    <a:lnR>
+                      <a:noFill/>
+                    </a:lnR>
+                    <a:lnT>
+                      <a:noFill/>
+                    </a:lnT>
+                    <a:lnB>
+                      <a:noFill/>
+                    </a:lnB>
+                  </a:tcPr>
+                </a:tc>
+                <a:tc>
+                  <a:txBody>
+                    <a:bodyPr/>
+                    <a:lstStyle/>
+                    <a:p>
+                      <a:r>
+                        <a:rPr lang="en-GB" dirty="0"/>
+                        <a:t>#005EB8</a:t>
                       </a:r>
                     </a:p>
                   </a:txBody>
@@ -17857,6 +18312,687 @@
     <p:extLst>
       <p:ext uri="{BB962C8B-B14F-4D97-AF65-F5344CB8AC3E}">
         <p14:creationId xmlns:p14="http://schemas.microsoft.com/office/powerpoint/2010/main" val="1599576613"/>
+      </p:ext>
+    </p:extLst>
+  </p:cSld>
+  <p:clrMapOvr>
+    <a:masterClrMapping/>
+  </p:clrMapOvr>
+</p:sld>
+</file>
+
+<file path=ppt/slides/slide9.xml><?xml version="1.0" encoding="utf-8"?>
+<p:sld xmlns:a="http://schemas.openxmlformats.org/drawingml/2006/main" xmlns:r="http://schemas.openxmlformats.org/officeDocument/2006/relationships" xmlns:p="http://schemas.openxmlformats.org/presentationml/2006/main">
+  <p:cSld>
+    <p:spTree>
+      <p:nvGrpSpPr>
+        <p:cNvPr id="1" name=""/>
+        <p:cNvGrpSpPr/>
+        <p:nvPr/>
+      </p:nvGrpSpPr>
+      <p:grpSpPr>
+        <a:xfrm>
+          <a:off x="0" y="0"/>
+          <a:ext cx="0" cy="0"/>
+          <a:chOff x="0" y="0"/>
+          <a:chExt cx="0" cy="0"/>
+        </a:xfrm>
+      </p:grpSpPr>
+      <p:pic>
+        <p:nvPicPr>
+          <p:cNvPr id="4" name="Picture 3" descr="Icon&#10;&#10;Description automatically generated">
+            <a:extLst>
+              <a:ext uri="{FF2B5EF4-FFF2-40B4-BE49-F238E27FC236}">
+                <a16:creationId xmlns:a16="http://schemas.microsoft.com/office/drawing/2014/main" id="{F6B4DF3D-547C-E6B9-2CD1-3F325F3D9E1C}"/>
+              </a:ext>
+            </a:extLst>
+          </p:cNvPr>
+          <p:cNvPicPr>
+            <a:picLocks noChangeAspect="1"/>
+          </p:cNvPicPr>
+          <p:nvPr/>
+        </p:nvPicPr>
+        <p:blipFill>
+          <a:blip r:embed="rId2">
+            <a:extLst>
+              <a:ext uri="{28A0092B-C50C-407E-A947-70E740481C1C}">
+                <a14:useLocalDpi xmlns:a14="http://schemas.microsoft.com/office/drawing/2010/main" val="0"/>
+              </a:ext>
+            </a:extLst>
+          </a:blip>
+          <a:stretch>
+            <a:fillRect/>
+          </a:stretch>
+        </p:blipFill>
+        <p:spPr>
+          <a:xfrm>
+            <a:off x="554067" y="348238"/>
+            <a:ext cx="1314143" cy="1372278"/>
+          </a:xfrm>
+          <a:prstGeom prst="rect">
+            <a:avLst/>
+          </a:prstGeom>
+          <a:ln>
+            <a:noFill/>
+          </a:ln>
+        </p:spPr>
+      </p:pic>
+      <p:sp>
+        <p:nvSpPr>
+          <p:cNvPr id="5" name="Oval 4">
+            <a:extLst>
+              <a:ext uri="{FF2B5EF4-FFF2-40B4-BE49-F238E27FC236}">
+                <a16:creationId xmlns:a16="http://schemas.microsoft.com/office/drawing/2014/main" id="{B4D919BC-CE56-35A3-6413-6FEA932C9FF6}"/>
+              </a:ext>
+            </a:extLst>
+          </p:cNvPr>
+          <p:cNvSpPr/>
+          <p:nvPr/>
+        </p:nvSpPr>
+        <p:spPr>
+          <a:xfrm>
+            <a:off x="2940371" y="137009"/>
+            <a:ext cx="6311258" cy="6311256"/>
+          </a:xfrm>
+          <a:prstGeom prst="ellipse">
+            <a:avLst/>
+          </a:prstGeom>
+          <a:solidFill>
+            <a:srgbClr val="005EB8"/>
+          </a:solidFill>
+          <a:ln>
+            <a:noFill/>
+          </a:ln>
+        </p:spPr>
+        <p:style>
+          <a:lnRef idx="2">
+            <a:schemeClr val="accent1">
+              <a:shade val="50000"/>
+            </a:schemeClr>
+          </a:lnRef>
+          <a:fillRef idx="1">
+            <a:schemeClr val="accent1"/>
+          </a:fillRef>
+          <a:effectRef idx="0">
+            <a:schemeClr val="accent1"/>
+          </a:effectRef>
+          <a:fontRef idx="minor">
+            <a:schemeClr val="lt1"/>
+          </a:fontRef>
+        </p:style>
+        <p:txBody>
+          <a:bodyPr rtlCol="0" anchor="ctr"/>
+          <a:lstStyle/>
+          <a:p>
+            <a:pPr algn="ctr"/>
+            <a:endParaRPr lang="en-GB" dirty="0"/>
+          </a:p>
+        </p:txBody>
+      </p:sp>
+      <p:sp>
+        <p:nvSpPr>
+          <p:cNvPr id="6" name="Rectangle: Rounded Corners 5">
+            <a:extLst>
+              <a:ext uri="{FF2B5EF4-FFF2-40B4-BE49-F238E27FC236}">
+                <a16:creationId xmlns:a16="http://schemas.microsoft.com/office/drawing/2014/main" id="{2B239533-BF9F-30C6-2CC5-D192F6395267}"/>
+              </a:ext>
+            </a:extLst>
+          </p:cNvPr>
+          <p:cNvSpPr/>
+          <p:nvPr/>
+        </p:nvSpPr>
+        <p:spPr>
+          <a:xfrm>
+            <a:off x="4752474" y="928432"/>
+            <a:ext cx="2687052" cy="4728410"/>
+          </a:xfrm>
+          <a:prstGeom prst="roundRect">
+            <a:avLst>
+              <a:gd name="adj" fmla="val 12936"/>
+            </a:avLst>
+          </a:prstGeom>
+          <a:solidFill>
+            <a:schemeClr val="bg1"/>
+          </a:solidFill>
+          <a:ln>
+            <a:noFill/>
+          </a:ln>
+        </p:spPr>
+        <p:style>
+          <a:lnRef idx="2">
+            <a:schemeClr val="accent1">
+              <a:shade val="50000"/>
+            </a:schemeClr>
+          </a:lnRef>
+          <a:fillRef idx="1">
+            <a:schemeClr val="accent1"/>
+          </a:fillRef>
+          <a:effectRef idx="0">
+            <a:schemeClr val="accent1"/>
+          </a:effectRef>
+          <a:fontRef idx="minor">
+            <a:schemeClr val="lt1"/>
+          </a:fontRef>
+        </p:style>
+        <p:txBody>
+          <a:bodyPr rtlCol="0" anchor="ctr"/>
+          <a:lstStyle/>
+          <a:p>
+            <a:pPr algn="ctr"/>
+            <a:endParaRPr lang="en-GB"/>
+          </a:p>
+        </p:txBody>
+      </p:sp>
+      <p:sp>
+        <p:nvSpPr>
+          <p:cNvPr id="7" name="Rectangle 6">
+            <a:extLst>
+              <a:ext uri="{FF2B5EF4-FFF2-40B4-BE49-F238E27FC236}">
+                <a16:creationId xmlns:a16="http://schemas.microsoft.com/office/drawing/2014/main" id="{F7F42410-77DC-B243-387B-1761C6364742}"/>
+              </a:ext>
+            </a:extLst>
+          </p:cNvPr>
+          <p:cNvSpPr/>
+          <p:nvPr/>
+        </p:nvSpPr>
+        <p:spPr>
+          <a:xfrm>
+            <a:off x="5035216" y="1491636"/>
+            <a:ext cx="2121568" cy="2999873"/>
+          </a:xfrm>
+          <a:prstGeom prst="rect">
+            <a:avLst/>
+          </a:prstGeom>
+          <a:solidFill>
+            <a:srgbClr val="005EB8"/>
+          </a:solidFill>
+          <a:ln>
+            <a:noFill/>
+          </a:ln>
+        </p:spPr>
+        <p:style>
+          <a:lnRef idx="2">
+            <a:schemeClr val="accent1">
+              <a:shade val="50000"/>
+            </a:schemeClr>
+          </a:lnRef>
+          <a:fillRef idx="1">
+            <a:schemeClr val="accent1"/>
+          </a:fillRef>
+          <a:effectRef idx="0">
+            <a:schemeClr val="accent1"/>
+          </a:effectRef>
+          <a:fontRef idx="minor">
+            <a:schemeClr val="lt1"/>
+          </a:fontRef>
+        </p:style>
+        <p:txBody>
+          <a:bodyPr rtlCol="0" anchor="ctr"/>
+          <a:lstStyle/>
+          <a:p>
+            <a:pPr algn="ctr"/>
+            <a:endParaRPr lang="en-GB"/>
+          </a:p>
+        </p:txBody>
+      </p:sp>
+      <p:grpSp>
+        <p:nvGrpSpPr>
+          <p:cNvPr id="14" name="Group 13">
+            <a:extLst>
+              <a:ext uri="{FF2B5EF4-FFF2-40B4-BE49-F238E27FC236}">
+                <a16:creationId xmlns:a16="http://schemas.microsoft.com/office/drawing/2014/main" id="{B1734272-FB00-775F-95DF-FC5A8C83158A}"/>
+              </a:ext>
+            </a:extLst>
+          </p:cNvPr>
+          <p:cNvGrpSpPr/>
+          <p:nvPr/>
+        </p:nvGrpSpPr>
+        <p:grpSpPr>
+          <a:xfrm>
+            <a:off x="5937584" y="2295746"/>
+            <a:ext cx="316833" cy="1391652"/>
+            <a:chOff x="5937583" y="2626895"/>
+            <a:chExt cx="316833" cy="1391652"/>
+          </a:xfrm>
+          <a:solidFill>
+            <a:schemeClr val="bg1"/>
+          </a:solidFill>
+        </p:grpSpPr>
+        <p:sp>
+          <p:nvSpPr>
+            <p:cNvPr id="9" name="Oval 8">
+              <a:extLst>
+                <a:ext uri="{FF2B5EF4-FFF2-40B4-BE49-F238E27FC236}">
+                  <a16:creationId xmlns:a16="http://schemas.microsoft.com/office/drawing/2014/main" id="{88739216-2EB2-C431-07F1-62151531F6AC}"/>
+                </a:ext>
+              </a:extLst>
+            </p:cNvPr>
+            <p:cNvSpPr/>
+            <p:nvPr/>
+          </p:nvSpPr>
+          <p:spPr>
+            <a:xfrm>
+              <a:off x="5937584" y="2626895"/>
+              <a:ext cx="316832" cy="76200"/>
+            </a:xfrm>
+            <a:prstGeom prst="ellipse">
+              <a:avLst/>
+            </a:prstGeom>
+            <a:grpFill/>
+            <a:ln>
+              <a:noFill/>
+            </a:ln>
+          </p:spPr>
+          <p:style>
+            <a:lnRef idx="2">
+              <a:schemeClr val="accent1">
+                <a:shade val="50000"/>
+              </a:schemeClr>
+            </a:lnRef>
+            <a:fillRef idx="1">
+              <a:schemeClr val="accent1"/>
+            </a:fillRef>
+            <a:effectRef idx="0">
+              <a:schemeClr val="accent1"/>
+            </a:effectRef>
+            <a:fontRef idx="minor">
+              <a:schemeClr val="lt1"/>
+            </a:fontRef>
+          </p:style>
+          <p:txBody>
+            <a:bodyPr rtlCol="0" anchor="ctr"/>
+            <a:lstStyle/>
+            <a:p>
+              <a:pPr algn="ctr"/>
+              <a:endParaRPr lang="en-GB"/>
+            </a:p>
+          </p:txBody>
+        </p:sp>
+        <p:sp>
+          <p:nvSpPr>
+            <p:cNvPr id="10" name="Oval 9">
+              <a:extLst>
+                <a:ext uri="{FF2B5EF4-FFF2-40B4-BE49-F238E27FC236}">
+                  <a16:creationId xmlns:a16="http://schemas.microsoft.com/office/drawing/2014/main" id="{7B24A5B1-E30D-8A5B-BB78-D9E98357CA53}"/>
+                </a:ext>
+              </a:extLst>
+            </p:cNvPr>
+            <p:cNvSpPr/>
+            <p:nvPr/>
+          </p:nvSpPr>
+          <p:spPr>
+            <a:xfrm>
+              <a:off x="5937584" y="3942347"/>
+              <a:ext cx="316832" cy="76200"/>
+            </a:xfrm>
+            <a:prstGeom prst="ellipse">
+              <a:avLst/>
+            </a:prstGeom>
+            <a:grpFill/>
+            <a:ln>
+              <a:noFill/>
+            </a:ln>
+          </p:spPr>
+          <p:style>
+            <a:lnRef idx="2">
+              <a:schemeClr val="accent1">
+                <a:shade val="50000"/>
+              </a:schemeClr>
+            </a:lnRef>
+            <a:fillRef idx="1">
+              <a:schemeClr val="accent1"/>
+            </a:fillRef>
+            <a:effectRef idx="0">
+              <a:schemeClr val="accent1"/>
+            </a:effectRef>
+            <a:fontRef idx="minor">
+              <a:schemeClr val="lt1"/>
+            </a:fontRef>
+          </p:style>
+          <p:txBody>
+            <a:bodyPr rtlCol="0" anchor="ctr"/>
+            <a:lstStyle/>
+            <a:p>
+              <a:pPr algn="ctr"/>
+              <a:endParaRPr lang="en-GB"/>
+            </a:p>
+          </p:txBody>
+        </p:sp>
+        <p:sp>
+          <p:nvSpPr>
+            <p:cNvPr id="11" name="Rectangle 10">
+              <a:extLst>
+                <a:ext uri="{FF2B5EF4-FFF2-40B4-BE49-F238E27FC236}">
+                  <a16:creationId xmlns:a16="http://schemas.microsoft.com/office/drawing/2014/main" id="{CFAC31AA-EA74-8623-D6C9-74D811ED0A05}"/>
+                </a:ext>
+              </a:extLst>
+            </p:cNvPr>
+            <p:cNvSpPr/>
+            <p:nvPr/>
+          </p:nvSpPr>
+          <p:spPr>
+            <a:xfrm>
+              <a:off x="5937583" y="2668904"/>
+              <a:ext cx="316832" cy="1312545"/>
+            </a:xfrm>
+            <a:prstGeom prst="rect">
+              <a:avLst/>
+            </a:prstGeom>
+            <a:grpFill/>
+            <a:ln>
+              <a:noFill/>
+            </a:ln>
+          </p:spPr>
+          <p:style>
+            <a:lnRef idx="2">
+              <a:schemeClr val="accent1">
+                <a:shade val="50000"/>
+              </a:schemeClr>
+            </a:lnRef>
+            <a:fillRef idx="1">
+              <a:schemeClr val="accent1"/>
+            </a:fillRef>
+            <a:effectRef idx="0">
+              <a:schemeClr val="accent1"/>
+            </a:effectRef>
+            <a:fontRef idx="minor">
+              <a:schemeClr val="lt1"/>
+            </a:fontRef>
+          </p:style>
+          <p:txBody>
+            <a:bodyPr rtlCol="0" anchor="ctr"/>
+            <a:lstStyle/>
+            <a:p>
+              <a:pPr algn="ctr"/>
+              <a:endParaRPr lang="en-GB"/>
+            </a:p>
+          </p:txBody>
+        </p:sp>
+      </p:grpSp>
+      <p:sp>
+        <p:nvSpPr>
+          <p:cNvPr id="12" name="Rectangle: Rounded Corners 11">
+            <a:extLst>
+              <a:ext uri="{FF2B5EF4-FFF2-40B4-BE49-F238E27FC236}">
+                <a16:creationId xmlns:a16="http://schemas.microsoft.com/office/drawing/2014/main" id="{868BDEFD-4EED-618A-D101-1924DBC5F2C7}"/>
+              </a:ext>
+            </a:extLst>
+          </p:cNvPr>
+          <p:cNvSpPr/>
+          <p:nvPr/>
+        </p:nvSpPr>
+        <p:spPr>
+          <a:xfrm>
+            <a:off x="5582653" y="1153147"/>
+            <a:ext cx="1026695" cy="144379"/>
+          </a:xfrm>
+          <a:prstGeom prst="roundRect">
+            <a:avLst>
+              <a:gd name="adj" fmla="val 50000"/>
+            </a:avLst>
+          </a:prstGeom>
+          <a:solidFill>
+            <a:srgbClr val="005EB8"/>
+          </a:solidFill>
+          <a:ln>
+            <a:noFill/>
+          </a:ln>
+        </p:spPr>
+        <p:style>
+          <a:lnRef idx="2">
+            <a:schemeClr val="accent1">
+              <a:shade val="50000"/>
+            </a:schemeClr>
+          </a:lnRef>
+          <a:fillRef idx="1">
+            <a:schemeClr val="accent1"/>
+          </a:fillRef>
+          <a:effectRef idx="0">
+            <a:schemeClr val="accent1"/>
+          </a:effectRef>
+          <a:fontRef idx="minor">
+            <a:schemeClr val="lt1"/>
+          </a:fontRef>
+        </p:style>
+        <p:txBody>
+          <a:bodyPr rtlCol="0" anchor="ctr"/>
+          <a:lstStyle/>
+          <a:p>
+            <a:pPr algn="ctr"/>
+            <a:endParaRPr lang="en-GB"/>
+          </a:p>
+        </p:txBody>
+      </p:sp>
+      <p:sp>
+        <p:nvSpPr>
+          <p:cNvPr id="13" name="Oval 12">
+            <a:extLst>
+              <a:ext uri="{FF2B5EF4-FFF2-40B4-BE49-F238E27FC236}">
+                <a16:creationId xmlns:a16="http://schemas.microsoft.com/office/drawing/2014/main" id="{D772E904-E4BA-73B6-1F78-299490E018CF}"/>
+              </a:ext>
+            </a:extLst>
+          </p:cNvPr>
+          <p:cNvSpPr/>
+          <p:nvPr/>
+        </p:nvSpPr>
+        <p:spPr>
+          <a:xfrm>
+            <a:off x="5892466" y="4846682"/>
+            <a:ext cx="407068" cy="407068"/>
+          </a:xfrm>
+          <a:prstGeom prst="ellipse">
+            <a:avLst/>
+          </a:prstGeom>
+          <a:solidFill>
+            <a:srgbClr val="005EB8"/>
+          </a:solidFill>
+          <a:ln>
+            <a:noFill/>
+          </a:ln>
+        </p:spPr>
+        <p:style>
+          <a:lnRef idx="2">
+            <a:schemeClr val="accent1">
+              <a:shade val="50000"/>
+            </a:schemeClr>
+          </a:lnRef>
+          <a:fillRef idx="1">
+            <a:schemeClr val="accent1"/>
+          </a:fillRef>
+          <a:effectRef idx="0">
+            <a:schemeClr val="accent1"/>
+          </a:effectRef>
+          <a:fontRef idx="minor">
+            <a:schemeClr val="lt1"/>
+          </a:fontRef>
+        </p:style>
+        <p:txBody>
+          <a:bodyPr rtlCol="0" anchor="ctr"/>
+          <a:lstStyle/>
+          <a:p>
+            <a:pPr algn="ctr"/>
+            <a:endParaRPr lang="en-GB"/>
+          </a:p>
+        </p:txBody>
+      </p:sp>
+      <p:grpSp>
+        <p:nvGrpSpPr>
+          <p:cNvPr id="15" name="Group 14">
+            <a:extLst>
+              <a:ext uri="{FF2B5EF4-FFF2-40B4-BE49-F238E27FC236}">
+                <a16:creationId xmlns:a16="http://schemas.microsoft.com/office/drawing/2014/main" id="{F99F0E49-B539-B556-2F77-49D9C9CDE0D7}"/>
+              </a:ext>
+            </a:extLst>
+          </p:cNvPr>
+          <p:cNvGrpSpPr/>
+          <p:nvPr/>
+        </p:nvGrpSpPr>
+        <p:grpSpPr>
+          <a:xfrm rot="5400000">
+            <a:off x="5937584" y="2295746"/>
+            <a:ext cx="316833" cy="1391652"/>
+            <a:chOff x="5937583" y="2626895"/>
+            <a:chExt cx="316833" cy="1391652"/>
+          </a:xfrm>
+          <a:solidFill>
+            <a:schemeClr val="bg1"/>
+          </a:solidFill>
+        </p:grpSpPr>
+        <p:sp>
+          <p:nvSpPr>
+            <p:cNvPr id="16" name="Oval 15">
+              <a:extLst>
+                <a:ext uri="{FF2B5EF4-FFF2-40B4-BE49-F238E27FC236}">
+                  <a16:creationId xmlns:a16="http://schemas.microsoft.com/office/drawing/2014/main" id="{BC20FF36-6C8C-62E1-E1A0-BD0AE6D3E92A}"/>
+                </a:ext>
+              </a:extLst>
+            </p:cNvPr>
+            <p:cNvSpPr/>
+            <p:nvPr/>
+          </p:nvSpPr>
+          <p:spPr>
+            <a:xfrm>
+              <a:off x="5937584" y="2626895"/>
+              <a:ext cx="316832" cy="76200"/>
+            </a:xfrm>
+            <a:prstGeom prst="ellipse">
+              <a:avLst/>
+            </a:prstGeom>
+            <a:grpFill/>
+            <a:ln>
+              <a:noFill/>
+            </a:ln>
+          </p:spPr>
+          <p:style>
+            <a:lnRef idx="2">
+              <a:schemeClr val="accent1">
+                <a:shade val="50000"/>
+              </a:schemeClr>
+            </a:lnRef>
+            <a:fillRef idx="1">
+              <a:schemeClr val="accent1"/>
+            </a:fillRef>
+            <a:effectRef idx="0">
+              <a:schemeClr val="accent1"/>
+            </a:effectRef>
+            <a:fontRef idx="minor">
+              <a:schemeClr val="lt1"/>
+            </a:fontRef>
+          </p:style>
+          <p:txBody>
+            <a:bodyPr rtlCol="0" anchor="ctr"/>
+            <a:lstStyle/>
+            <a:p>
+              <a:pPr algn="ctr"/>
+              <a:endParaRPr lang="en-GB"/>
+            </a:p>
+          </p:txBody>
+        </p:sp>
+        <p:sp>
+          <p:nvSpPr>
+            <p:cNvPr id="17" name="Oval 16">
+              <a:extLst>
+                <a:ext uri="{FF2B5EF4-FFF2-40B4-BE49-F238E27FC236}">
+                  <a16:creationId xmlns:a16="http://schemas.microsoft.com/office/drawing/2014/main" id="{529F40A3-3968-E025-645E-525DD11E74D2}"/>
+                </a:ext>
+              </a:extLst>
+            </p:cNvPr>
+            <p:cNvSpPr/>
+            <p:nvPr/>
+          </p:nvSpPr>
+          <p:spPr>
+            <a:xfrm>
+              <a:off x="5937584" y="3942347"/>
+              <a:ext cx="316832" cy="76200"/>
+            </a:xfrm>
+            <a:prstGeom prst="ellipse">
+              <a:avLst/>
+            </a:prstGeom>
+            <a:grpFill/>
+            <a:ln>
+              <a:noFill/>
+            </a:ln>
+          </p:spPr>
+          <p:style>
+            <a:lnRef idx="2">
+              <a:schemeClr val="accent1">
+                <a:shade val="50000"/>
+              </a:schemeClr>
+            </a:lnRef>
+            <a:fillRef idx="1">
+              <a:schemeClr val="accent1"/>
+            </a:fillRef>
+            <a:effectRef idx="0">
+              <a:schemeClr val="accent1"/>
+            </a:effectRef>
+            <a:fontRef idx="minor">
+              <a:schemeClr val="lt1"/>
+            </a:fontRef>
+          </p:style>
+          <p:txBody>
+            <a:bodyPr rtlCol="0" anchor="ctr"/>
+            <a:lstStyle/>
+            <a:p>
+              <a:pPr algn="ctr"/>
+              <a:endParaRPr lang="en-GB"/>
+            </a:p>
+          </p:txBody>
+        </p:sp>
+        <p:sp>
+          <p:nvSpPr>
+            <p:cNvPr id="18" name="Rectangle 17">
+              <a:extLst>
+                <a:ext uri="{FF2B5EF4-FFF2-40B4-BE49-F238E27FC236}">
+                  <a16:creationId xmlns:a16="http://schemas.microsoft.com/office/drawing/2014/main" id="{495A3141-A51C-A3D1-4871-BE529581AEFD}"/>
+                </a:ext>
+              </a:extLst>
+            </p:cNvPr>
+            <p:cNvSpPr/>
+            <p:nvPr/>
+          </p:nvSpPr>
+          <p:spPr>
+            <a:xfrm>
+              <a:off x="5937583" y="2668904"/>
+              <a:ext cx="316832" cy="1312545"/>
+            </a:xfrm>
+            <a:prstGeom prst="rect">
+              <a:avLst/>
+            </a:prstGeom>
+            <a:grpFill/>
+            <a:ln>
+              <a:noFill/>
+            </a:ln>
+          </p:spPr>
+          <p:style>
+            <a:lnRef idx="2">
+              <a:schemeClr val="accent1">
+                <a:shade val="50000"/>
+              </a:schemeClr>
+            </a:lnRef>
+            <a:fillRef idx="1">
+              <a:schemeClr val="accent1"/>
+            </a:fillRef>
+            <a:effectRef idx="0">
+              <a:schemeClr val="accent1"/>
+            </a:effectRef>
+            <a:fontRef idx="minor">
+              <a:schemeClr val="lt1"/>
+            </a:fontRef>
+          </p:style>
+          <p:txBody>
+            <a:bodyPr rtlCol="0" anchor="ctr"/>
+            <a:lstStyle/>
+            <a:p>
+              <a:pPr algn="ctr"/>
+              <a:endParaRPr lang="en-GB"/>
+            </a:p>
+          </p:txBody>
+        </p:sp>
+      </p:grpSp>
+    </p:spTree>
+    <p:extLst>
+      <p:ext uri="{BB962C8B-B14F-4D97-AF65-F5344CB8AC3E}">
+        <p14:creationId xmlns:p14="http://schemas.microsoft.com/office/powerpoint/2010/main" val="3320223683"/>
       </p:ext>
     </p:extLst>
   </p:cSld>

</xml_diff>